<commit_message>
Update for apptainer, slurm
</commit_message>
<xml_diff>
--- a/containers_for_hpc.pptx
+++ b/containers_for_hpc.pptx
@@ -348,7 +348,7 @@
           <a:p>
             <a:fld id="{6BD974B4-F374-4E74-84D3-1EB7DBF32A2A}" type="datetimeFigureOut">
               <a:rPr lang="nl-BE" smtClean="0"/>
-              <a:t>18/11/2022</a:t>
+              <a:t>26/10/2023</a:t>
             </a:fld>
             <a:endParaRPr lang="nl-BE"/>
           </a:p>
@@ -831,7 +831,7 @@
           <a:p>
             <a:fld id="{A433E747-842D-4EF3-8202-AC54FEC33061}" type="datetime1">
               <a:rPr lang="nl-BE" smtClean="0"/>
-              <a:t>18/11/2022</a:t>
+              <a:t>26/10/2023</a:t>
             </a:fld>
             <a:endParaRPr lang="nl-BE"/>
           </a:p>
@@ -1001,7 +1001,7 @@
           <a:p>
             <a:fld id="{7C821354-3381-4DF5-ABED-FDAFA2BAD3F8}" type="datetime1">
               <a:rPr lang="nl-BE" smtClean="0"/>
-              <a:t>18/11/2022</a:t>
+              <a:t>26/10/2023</a:t>
             </a:fld>
             <a:endParaRPr lang="nl-BE"/>
           </a:p>
@@ -1181,7 +1181,7 @@
           <a:p>
             <a:fld id="{C6B54B95-9964-4BBF-B171-A69413AB9FC5}" type="datetime1">
               <a:rPr lang="nl-BE" smtClean="0"/>
-              <a:t>18/11/2022</a:t>
+              <a:t>26/10/2023</a:t>
             </a:fld>
             <a:endParaRPr lang="nl-BE"/>
           </a:p>
@@ -1351,7 +1351,7 @@
           <a:p>
             <a:fld id="{BE45CDE5-064C-4862-90E9-83B8FD778625}" type="datetime1">
               <a:rPr lang="nl-BE" smtClean="0"/>
-              <a:t>18/11/2022</a:t>
+              <a:t>26/10/2023</a:t>
             </a:fld>
             <a:endParaRPr lang="nl-BE"/>
           </a:p>
@@ -1595,7 +1595,7 @@
           <a:p>
             <a:fld id="{C75A345C-628E-463E-B8F7-69C25D344DF5}" type="datetime1">
               <a:rPr lang="nl-BE" smtClean="0"/>
-              <a:t>18/11/2022</a:t>
+              <a:t>26/10/2023</a:t>
             </a:fld>
             <a:endParaRPr lang="nl-BE"/>
           </a:p>
@@ -1827,7 +1827,7 @@
           <a:p>
             <a:fld id="{65B04534-538C-4249-A635-8BB2B8486464}" type="datetime1">
               <a:rPr lang="nl-BE" smtClean="0"/>
-              <a:t>18/11/2022</a:t>
+              <a:t>26/10/2023</a:t>
             </a:fld>
             <a:endParaRPr lang="nl-BE"/>
           </a:p>
@@ -2194,7 +2194,7 @@
           <a:p>
             <a:fld id="{089671CB-8547-4C91-A3D5-012E6E8790E6}" type="datetime1">
               <a:rPr lang="nl-BE" smtClean="0"/>
-              <a:t>18/11/2022</a:t>
+              <a:t>26/10/2023</a:t>
             </a:fld>
             <a:endParaRPr lang="nl-BE"/>
           </a:p>
@@ -2312,7 +2312,7 @@
           <a:p>
             <a:fld id="{5765335F-FC99-4A2B-B87B-6AF6F3762B67}" type="datetime1">
               <a:rPr lang="nl-BE" smtClean="0"/>
-              <a:t>18/11/2022</a:t>
+              <a:t>26/10/2023</a:t>
             </a:fld>
             <a:endParaRPr lang="nl-BE"/>
           </a:p>
@@ -2407,7 +2407,7 @@
           <a:p>
             <a:fld id="{1711BA58-B677-4D21-BDCD-9DD1AEA8A328}" type="datetime1">
               <a:rPr lang="nl-BE" smtClean="0"/>
-              <a:t>18/11/2022</a:t>
+              <a:t>26/10/2023</a:t>
             </a:fld>
             <a:endParaRPr lang="nl-BE"/>
           </a:p>
@@ -2684,7 +2684,7 @@
           <a:p>
             <a:fld id="{5513BE8B-B89C-461B-89D1-D5BE33ADB6B9}" type="datetime1">
               <a:rPr lang="nl-BE" smtClean="0"/>
-              <a:t>18/11/2022</a:t>
+              <a:t>26/10/2023</a:t>
             </a:fld>
             <a:endParaRPr lang="nl-BE"/>
           </a:p>
@@ -2941,7 +2941,7 @@
           <a:p>
             <a:fld id="{AEE65485-0554-4482-9B9C-289893A0B56B}" type="datetime1">
               <a:rPr lang="nl-BE" smtClean="0"/>
-              <a:t>18/11/2022</a:t>
+              <a:t>26/10/2023</a:t>
             </a:fld>
             <a:endParaRPr lang="nl-BE"/>
           </a:p>
@@ -3154,7 +3154,7 @@
           <a:p>
             <a:fld id="{6FF26CEC-AF8A-4096-9A53-521F7571A055}" type="datetime1">
               <a:rPr lang="nl-BE" smtClean="0"/>
-              <a:t>18/11/2022</a:t>
+              <a:t>26/10/2023</a:t>
             </a:fld>
             <a:endParaRPr lang="nl-BE"/>
           </a:p>
@@ -4125,9 +4125,9 @@
         <p:grpSpPr>
           <a:xfrm>
             <a:off x="3486150" y="1440288"/>
-            <a:ext cx="3093287" cy="1017162"/>
+            <a:ext cx="2982359" cy="1017162"/>
             <a:chOff x="3486150" y="1440288"/>
-            <a:chExt cx="3093287" cy="1017162"/>
+            <a:chExt cx="2982359" cy="1017162"/>
           </a:xfrm>
         </p:grpSpPr>
         <p:sp>
@@ -4139,7 +4139,7 @@
           <p:spPr>
             <a:xfrm>
               <a:off x="3910693" y="1440288"/>
-              <a:ext cx="2668744" cy="369332"/>
+              <a:ext cx="2557816" cy="369332"/>
             </a:xfrm>
             <a:prstGeom prst="rect">
               <a:avLst/>
@@ -4154,7 +4154,7 @@
             <a:p>
               <a:r>
                 <a:rPr lang="en-US" dirty="0"/>
-                <a:t>Has to be installed on host</a:t>
+                <a:t>Must be installed on host</a:t>
               </a:r>
               <a:endParaRPr lang="nl-BE" dirty="0"/>
             </a:p>
@@ -5257,7 +5257,7 @@
         <p:spPr>
           <a:xfrm>
             <a:off x="628650" y="2297764"/>
-            <a:ext cx="6112571" cy="646331"/>
+            <a:ext cx="6112570" cy="646331"/>
           </a:xfrm>
           <a:prstGeom prst="rect">
             <a:avLst/>
@@ -5274,7 +5274,7 @@
           </a:ln>
         </p:spPr>
         <p:txBody>
-          <a:bodyPr wrap="none" rtlCol="0">
+          <a:bodyPr wrap="square" rtlCol="0">
             <a:spAutoFit/>
           </a:bodyPr>
           <a:lstStyle/>
@@ -5317,7 +5317,7 @@
                 <a:latin typeface="Courier New" panose="02070309020205020404" pitchFamily="49" charset="0"/>
                 <a:cs typeface="Courier New" panose="02070309020205020404" pitchFamily="49" charset="0"/>
               </a:rPr>
-              <a:t>${SINGULARITY_ROOTFS}</a:t>
+              <a:t>${APPTAINER_ROOTFS}</a:t>
             </a:r>
             <a:r>
               <a:rPr lang="en-US" dirty="0">
@@ -6743,11 +6743,18 @@
               <a:t>: action for </a:t>
             </a:r>
             <a:r>
+              <a:rPr lang="en-US" dirty="0" err="1">
+                <a:latin typeface="Courier New" panose="02070309020205020404" pitchFamily="49" charset="0"/>
+                <a:cs typeface="Courier New" panose="02070309020205020404" pitchFamily="49" charset="0"/>
+              </a:rPr>
+              <a:t>apptainer</a:t>
+            </a:r>
+            <a:r>
               <a:rPr lang="en-US" dirty="0">
                 <a:latin typeface="Courier New" panose="02070309020205020404" pitchFamily="49" charset="0"/>
                 <a:cs typeface="Courier New" panose="02070309020205020404" pitchFamily="49" charset="0"/>
               </a:rPr>
-              <a:t>singularity run</a:t>
+              <a:t> run</a:t>
             </a:r>
             <a:r>
               <a:rPr lang="en-US" dirty="0"/>
@@ -7272,11 +7279,18 @@
               <a:t>: action for </a:t>
             </a:r>
             <a:r>
+              <a:rPr lang="en-US" dirty="0" err="1">
+                <a:latin typeface="Courier New" panose="02070309020205020404" pitchFamily="49" charset="0"/>
+                <a:cs typeface="Courier New" panose="02070309020205020404" pitchFamily="49" charset="0"/>
+              </a:rPr>
+              <a:t>apptainer</a:t>
+            </a:r>
+            <a:r>
               <a:rPr lang="en-US" dirty="0">
                 <a:latin typeface="Courier New" panose="02070309020205020404" pitchFamily="49" charset="0"/>
                 <a:cs typeface="Courier New" panose="02070309020205020404" pitchFamily="49" charset="0"/>
               </a:rPr>
-              <a:t>singularity test</a:t>
+              <a:t> test</a:t>
             </a:r>
             <a:r>
               <a:rPr lang="en-US" dirty="0"/>
@@ -7302,11 +7316,18 @@
               <a:t>: shown by </a:t>
             </a:r>
             <a:r>
+              <a:rPr lang="en-US" dirty="0" err="1">
+                <a:latin typeface="Courier New" panose="02070309020205020404" pitchFamily="49" charset="0"/>
+                <a:cs typeface="Courier New" panose="02070309020205020404" pitchFamily="49" charset="0"/>
+              </a:rPr>
+              <a:t>apptainer</a:t>
+            </a:r>
+            <a:r>
               <a:rPr lang="en-US" dirty="0">
                 <a:latin typeface="Courier New" panose="02070309020205020404" pitchFamily="49" charset="0"/>
                 <a:cs typeface="Courier New" panose="02070309020205020404" pitchFamily="49" charset="0"/>
               </a:rPr>
-              <a:t>singularity inspect</a:t>
+              <a:t> inspect</a:t>
             </a:r>
             <a:r>
               <a:rPr lang="en-US" dirty="0"/>
@@ -7332,11 +7353,18 @@
               <a:t>: shown by </a:t>
             </a:r>
             <a:r>
+              <a:rPr lang="en-US" dirty="0" err="1">
+                <a:latin typeface="Courier New" panose="02070309020205020404" pitchFamily="49" charset="0"/>
+                <a:cs typeface="Courier New" panose="02070309020205020404" pitchFamily="49" charset="0"/>
+              </a:rPr>
+              <a:t>apptainer</a:t>
+            </a:r>
+            <a:r>
               <a:rPr lang="en-US" dirty="0">
                 <a:latin typeface="Courier New" panose="02070309020205020404" pitchFamily="49" charset="0"/>
                 <a:cs typeface="Courier New" panose="02070309020205020404" pitchFamily="49" charset="0"/>
               </a:rPr>
-              <a:t>singularity run -help</a:t>
+              <a:t> run -help</a:t>
             </a:r>
           </a:p>
         </p:txBody>
@@ -7540,7 +7568,21 @@
                 <a:latin typeface="Courier New" panose="02070309020205020404" pitchFamily="49" charset="0"/>
                 <a:cs typeface="Courier New" panose="02070309020205020404" pitchFamily="49" charset="0"/>
               </a:rPr>
-              <a:t>Start grace using: singularity run </a:t>
+              <a:t>Start grace using: </a:t>
+            </a:r>
+            <a:r>
+              <a:rPr lang="en-US" dirty="0" err="1">
+                <a:latin typeface="Courier New" panose="02070309020205020404" pitchFamily="49" charset="0"/>
+                <a:cs typeface="Courier New" panose="02070309020205020404" pitchFamily="49" charset="0"/>
+              </a:rPr>
+              <a:t>apptainer</a:t>
+            </a:r>
+            <a:r>
+              <a:rPr lang="en-US" dirty="0">
+                <a:latin typeface="Courier New" panose="02070309020205020404" pitchFamily="49" charset="0"/>
+                <a:cs typeface="Courier New" panose="02070309020205020404" pitchFamily="49" charset="0"/>
+              </a:rPr>
+              <a:t> run </a:t>
             </a:r>
             <a:r>
               <a:rPr lang="en-US" dirty="0" err="1">
@@ -8327,7 +8369,27 @@
                 <a:latin typeface="Courier New" panose="02070309020205020404" pitchFamily="49" charset="0"/>
                 <a:cs typeface="Courier New" panose="02070309020205020404" pitchFamily="49" charset="0"/>
               </a:rPr>
-              <a:t> singularity build </a:t>
+              <a:t> </a:t>
+            </a:r>
+            <a:r>
+              <a:rPr lang="en-US" b="1" dirty="0" err="1">
+                <a:solidFill>
+                  <a:schemeClr val="bg1"/>
+                </a:solidFill>
+                <a:latin typeface="Courier New" panose="02070309020205020404" pitchFamily="49" charset="0"/>
+                <a:cs typeface="Courier New" panose="02070309020205020404" pitchFamily="49" charset="0"/>
+              </a:rPr>
+              <a:t>apptainer</a:t>
+            </a:r>
+            <a:r>
+              <a:rPr lang="en-US" b="1" dirty="0">
+                <a:solidFill>
+                  <a:schemeClr val="bg1"/>
+                </a:solidFill>
+                <a:latin typeface="Courier New" panose="02070309020205020404" pitchFamily="49" charset="0"/>
+                <a:cs typeface="Courier New" panose="02070309020205020404" pitchFamily="49" charset="0"/>
+              </a:rPr>
+              <a:t> build </a:t>
             </a:r>
             <a:r>
               <a:rPr lang="en-US" b="1" dirty="0" err="1">
@@ -8397,7 +8459,7 @@
         <p:spPr>
           <a:xfrm>
             <a:off x="809189" y="4482820"/>
-            <a:ext cx="7077579" cy="369332"/>
+            <a:ext cx="6939720" cy="369332"/>
           </a:xfrm>
           <a:prstGeom prst="rect">
             <a:avLst/>
@@ -8420,7 +8482,27 @@
                 <a:latin typeface="Courier New" panose="02070309020205020404" pitchFamily="49" charset="0"/>
                 <a:cs typeface="Courier New" panose="02070309020205020404" pitchFamily="49" charset="0"/>
               </a:rPr>
-              <a:t>$ singularity build –</a:t>
+              <a:t>$ </a:t>
+            </a:r>
+            <a:r>
+              <a:rPr lang="en-US" b="1" dirty="0" err="1">
+                <a:solidFill>
+                  <a:schemeClr val="bg1"/>
+                </a:solidFill>
+                <a:latin typeface="Courier New" panose="02070309020205020404" pitchFamily="49" charset="0"/>
+                <a:cs typeface="Courier New" panose="02070309020205020404" pitchFamily="49" charset="0"/>
+              </a:rPr>
+              <a:t>apptainer</a:t>
+            </a:r>
+            <a:r>
+              <a:rPr lang="en-US" b="1" dirty="0">
+                <a:solidFill>
+                  <a:schemeClr val="bg1"/>
+                </a:solidFill>
+                <a:latin typeface="Courier New" panose="02070309020205020404" pitchFamily="49" charset="0"/>
+                <a:cs typeface="Courier New" panose="02070309020205020404" pitchFamily="49" charset="0"/>
+              </a:rPr>
+              <a:t> build –-</a:t>
             </a:r>
             <a:r>
               <a:rPr lang="en-US" b="1" dirty="0" err="1">
@@ -10416,7 +10498,7 @@
         <p:spPr>
           <a:xfrm>
             <a:off x="236766" y="2579918"/>
-            <a:ext cx="6388287" cy="369332"/>
+            <a:ext cx="6112571" cy="369332"/>
           </a:xfrm>
           <a:prstGeom prst="rect">
             <a:avLst/>
@@ -10459,7 +10541,27 @@
                 <a:latin typeface="Courier New" panose="02070309020205020404" pitchFamily="49" charset="0"/>
                 <a:cs typeface="Courier New" panose="02070309020205020404" pitchFamily="49" charset="0"/>
               </a:rPr>
-              <a:t> singularity mount --writable grace.</a:t>
+              <a:t> </a:t>
+            </a:r>
+            <a:r>
+              <a:rPr lang="en-US" b="1" dirty="0" err="1">
+                <a:solidFill>
+                  <a:schemeClr val="bg1"/>
+                </a:solidFill>
+                <a:latin typeface="Courier New" panose="02070309020205020404" pitchFamily="49" charset="0"/>
+                <a:cs typeface="Courier New" panose="02070309020205020404" pitchFamily="49" charset="0"/>
+              </a:rPr>
+              <a:t>apptainer</a:t>
+            </a:r>
+            <a:r>
+              <a:rPr lang="en-US" b="1" dirty="0">
+                <a:solidFill>
+                  <a:schemeClr val="bg1"/>
+                </a:solidFill>
+                <a:latin typeface="Courier New" panose="02070309020205020404" pitchFamily="49" charset="0"/>
+                <a:cs typeface="Courier New" panose="02070309020205020404" pitchFamily="49" charset="0"/>
+              </a:rPr>
+              <a:t> mount --writable grace.</a:t>
             </a:r>
             <a:r>
               <a:rPr lang="en-BE" b="1" dirty="0" err="1">
@@ -10513,7 +10615,27 @@
                 <a:latin typeface="Courier New" panose="02070309020205020404" pitchFamily="49" charset="0"/>
                 <a:cs typeface="Courier New" panose="02070309020205020404" pitchFamily="49" charset="0"/>
               </a:rPr>
-              <a:t>$ singularity mount grace.</a:t>
+              <a:t>$ </a:t>
+            </a:r>
+            <a:r>
+              <a:rPr lang="en-US" b="1" dirty="0" err="1">
+                <a:solidFill>
+                  <a:schemeClr val="bg1"/>
+                </a:solidFill>
+                <a:latin typeface="Courier New" panose="02070309020205020404" pitchFamily="49" charset="0"/>
+                <a:cs typeface="Courier New" panose="02070309020205020404" pitchFamily="49" charset="0"/>
+              </a:rPr>
+              <a:t>apptainer</a:t>
+            </a:r>
+            <a:r>
+              <a:rPr lang="en-US" b="1" dirty="0">
+                <a:solidFill>
+                  <a:schemeClr val="bg1"/>
+                </a:solidFill>
+                <a:latin typeface="Courier New" panose="02070309020205020404" pitchFamily="49" charset="0"/>
+                <a:cs typeface="Courier New" panose="02070309020205020404" pitchFamily="49" charset="0"/>
+              </a:rPr>
+              <a:t> mount grace.</a:t>
             </a:r>
             <a:r>
               <a:rPr lang="en-BE" b="1" dirty="0" err="1">
@@ -10618,7 +10740,7 @@
         <p:spPr>
           <a:xfrm>
             <a:off x="1606163" y="3237678"/>
-            <a:ext cx="6702604" cy="400110"/>
+            <a:ext cx="6394828" cy="400110"/>
           </a:xfrm>
           <a:prstGeom prst="rect">
             <a:avLst/>
@@ -10645,21 +10767,21 @@
                 <a:latin typeface="Courier New" panose="02070309020205020404" pitchFamily="49" charset="0"/>
                 <a:cs typeface="Courier New" panose="02070309020205020404" pitchFamily="49" charset="0"/>
               </a:rPr>
+              <a:t>/var/lib/</a:t>
+            </a:r>
+            <a:r>
+              <a:rPr lang="en-US" sz="2000" dirty="0" err="1">
+                <a:latin typeface="Courier New" panose="02070309020205020404" pitchFamily="49" charset="0"/>
+                <a:cs typeface="Courier New" panose="02070309020205020404" pitchFamily="49" charset="0"/>
+              </a:rPr>
+              <a:t>apptainer</a:t>
+            </a:r>
+            <a:r>
+              <a:rPr lang="en-US" sz="2000" dirty="0">
+                <a:latin typeface="Courier New" panose="02070309020205020404" pitchFamily="49" charset="0"/>
+                <a:cs typeface="Courier New" panose="02070309020205020404" pitchFamily="49" charset="0"/>
+              </a:rPr>
               <a:t>/</a:t>
-            </a:r>
-            <a:r>
-              <a:rPr lang="en-US" sz="2000" dirty="0" err="1">
-                <a:latin typeface="Courier New" panose="02070309020205020404" pitchFamily="49" charset="0"/>
-                <a:cs typeface="Courier New" panose="02070309020205020404" pitchFamily="49" charset="0"/>
-              </a:rPr>
-              <a:t>var</a:t>
-            </a:r>
-            <a:r>
-              <a:rPr lang="en-US" sz="2000" dirty="0">
-                <a:latin typeface="Courier New" panose="02070309020205020404" pitchFamily="49" charset="0"/>
-                <a:cs typeface="Courier New" panose="02070309020205020404" pitchFamily="49" charset="0"/>
-              </a:rPr>
-              <a:t>/lib/singularity/</a:t>
             </a:r>
             <a:r>
               <a:rPr lang="en-US" sz="2000" dirty="0" err="1">
@@ -11075,7 +11197,21 @@
                 <a:latin typeface="Courier New" panose="02070309020205020404" pitchFamily="49" charset="0"/>
                 <a:cs typeface="Courier New" panose="02070309020205020404" pitchFamily="49" charset="0"/>
               </a:rPr>
-              <a:t>~/.singularity/</a:t>
+              <a:t>~/.</a:t>
+            </a:r>
+            <a:r>
+              <a:rPr lang="en-US" dirty="0" err="1">
+                <a:latin typeface="Courier New" panose="02070309020205020404" pitchFamily="49" charset="0"/>
+                <a:cs typeface="Courier New" panose="02070309020205020404" pitchFamily="49" charset="0"/>
+              </a:rPr>
+              <a:t>apptainer</a:t>
+            </a:r>
+            <a:r>
+              <a:rPr lang="en-US" dirty="0">
+                <a:latin typeface="Courier New" panose="02070309020205020404" pitchFamily="49" charset="0"/>
+                <a:cs typeface="Courier New" panose="02070309020205020404" pitchFamily="49" charset="0"/>
+              </a:rPr>
+              <a:t>/</a:t>
             </a:r>
             <a:r>
               <a:rPr lang="en-US" dirty="0" err="1">
@@ -11133,7 +11269,7 @@
         <p:spPr>
           <a:xfrm>
             <a:off x="791937" y="5294620"/>
-            <a:ext cx="7077579" cy="369332"/>
+            <a:ext cx="6801862" cy="369332"/>
           </a:xfrm>
           <a:prstGeom prst="rect">
             <a:avLst/>
@@ -11156,7 +11292,27 @@
                 <a:latin typeface="Courier New" panose="02070309020205020404" pitchFamily="49" charset="0"/>
                 <a:cs typeface="Courier New" panose="02070309020205020404" pitchFamily="49" charset="0"/>
               </a:rPr>
-              <a:t>$ singularity build  --remote  </a:t>
+              <a:t>$ </a:t>
+            </a:r>
+            <a:r>
+              <a:rPr lang="en-US" b="1" dirty="0" err="1">
+                <a:solidFill>
+                  <a:schemeClr val="bg1"/>
+                </a:solidFill>
+                <a:latin typeface="Courier New" panose="02070309020205020404" pitchFamily="49" charset="0"/>
+                <a:cs typeface="Courier New" panose="02070309020205020404" pitchFamily="49" charset="0"/>
+              </a:rPr>
+              <a:t>apptainer</a:t>
+            </a:r>
+            <a:r>
+              <a:rPr lang="en-US" b="1" dirty="0">
+                <a:solidFill>
+                  <a:schemeClr val="bg1"/>
+                </a:solidFill>
+                <a:latin typeface="Courier New" panose="02070309020205020404" pitchFamily="49" charset="0"/>
+                <a:cs typeface="Courier New" panose="02070309020205020404" pitchFamily="49" charset="0"/>
+              </a:rPr>
+              <a:t> build  --remote  </a:t>
             </a:r>
             <a:r>
               <a:rPr lang="en-US" b="1" dirty="0" err="1">
@@ -14372,7 +14528,7 @@
         <p:spPr>
           <a:xfrm>
             <a:off x="693966" y="2359483"/>
-            <a:ext cx="3906839" cy="369332"/>
+            <a:ext cx="3631122" cy="369332"/>
           </a:xfrm>
           <a:prstGeom prst="rect">
             <a:avLst/>
@@ -14395,7 +14551,27 @@
                 <a:latin typeface="Courier New" panose="02070309020205020404" pitchFamily="49" charset="0"/>
                 <a:cs typeface="Courier New" panose="02070309020205020404" pitchFamily="49" charset="0"/>
               </a:rPr>
-              <a:t>$ singularity run </a:t>
+              <a:t>$ </a:t>
+            </a:r>
+            <a:r>
+              <a:rPr lang="en-US" b="1" dirty="0" err="1">
+                <a:solidFill>
+                  <a:schemeClr val="bg1"/>
+                </a:solidFill>
+                <a:latin typeface="Courier New" panose="02070309020205020404" pitchFamily="49" charset="0"/>
+                <a:cs typeface="Courier New" panose="02070309020205020404" pitchFamily="49" charset="0"/>
+              </a:rPr>
+              <a:t>apptainer</a:t>
+            </a:r>
+            <a:r>
+              <a:rPr lang="en-US" b="1" dirty="0">
+                <a:solidFill>
+                  <a:schemeClr val="bg1"/>
+                </a:solidFill>
+                <a:latin typeface="Courier New" panose="02070309020205020404" pitchFamily="49" charset="0"/>
+                <a:cs typeface="Courier New" panose="02070309020205020404" pitchFamily="49" charset="0"/>
+              </a:rPr>
+              <a:t> run </a:t>
             </a:r>
             <a:r>
               <a:rPr lang="en-US" b="1" dirty="0" err="1">
@@ -14449,7 +14625,27 @@
                 <a:latin typeface="Courier New" panose="02070309020205020404" pitchFamily="49" charset="0"/>
                 <a:cs typeface="Courier New" panose="02070309020205020404" pitchFamily="49" charset="0"/>
               </a:rPr>
-              <a:t>$ singularity exec </a:t>
+              <a:t>$ </a:t>
+            </a:r>
+            <a:r>
+              <a:rPr lang="en-US" b="1" dirty="0" err="1">
+                <a:solidFill>
+                  <a:schemeClr val="bg1"/>
+                </a:solidFill>
+                <a:latin typeface="Courier New" panose="02070309020205020404" pitchFamily="49" charset="0"/>
+                <a:cs typeface="Courier New" panose="02070309020205020404" pitchFamily="49" charset="0"/>
+              </a:rPr>
+              <a:t>apptainer</a:t>
+            </a:r>
+            <a:r>
+              <a:rPr lang="en-US" b="1" dirty="0">
+                <a:solidFill>
+                  <a:schemeClr val="bg1"/>
+                </a:solidFill>
+                <a:latin typeface="Courier New" panose="02070309020205020404" pitchFamily="49" charset="0"/>
+                <a:cs typeface="Courier New" panose="02070309020205020404" pitchFamily="49" charset="0"/>
+              </a:rPr>
+              <a:t> exec </a:t>
             </a:r>
             <a:r>
               <a:rPr lang="en-US" b="1" dirty="0" err="1">
@@ -14552,7 +14748,27 @@
                 <a:latin typeface="Courier New" panose="02070309020205020404" pitchFamily="49" charset="0"/>
                 <a:cs typeface="Courier New" panose="02070309020205020404" pitchFamily="49" charset="0"/>
               </a:rPr>
-              <a:t>$ singularity exec </a:t>
+              <a:t>$ </a:t>
+            </a:r>
+            <a:r>
+              <a:rPr lang="en-US" b="1" dirty="0" err="1">
+                <a:solidFill>
+                  <a:schemeClr val="bg1"/>
+                </a:solidFill>
+                <a:latin typeface="Courier New" panose="02070309020205020404" pitchFamily="49" charset="0"/>
+                <a:cs typeface="Courier New" panose="02070309020205020404" pitchFamily="49" charset="0"/>
+              </a:rPr>
+              <a:t>apptainer</a:t>
+            </a:r>
+            <a:r>
+              <a:rPr lang="en-US" b="1" dirty="0">
+                <a:solidFill>
+                  <a:schemeClr val="bg1"/>
+                </a:solidFill>
+                <a:latin typeface="Courier New" panose="02070309020205020404" pitchFamily="49" charset="0"/>
+                <a:cs typeface="Courier New" panose="02070309020205020404" pitchFamily="49" charset="0"/>
+              </a:rPr>
+              <a:t> exec </a:t>
             </a:r>
             <a:r>
               <a:rPr lang="en-US" b="1" dirty="0" err="1">
@@ -15054,8 +15270,12 @@
           </a:p>
           <a:p>
             <a:r>
+              <a:rPr lang="en-US" dirty="0" err="1"/>
+              <a:t>Apptainer</a:t>
+            </a:r>
+            <a:r>
               <a:rPr lang="en-US" dirty="0"/>
-              <a:t>Singularity images can be used in any workflow</a:t>
+              <a:t> images can be used in any workflow</a:t>
             </a:r>
             <a:endParaRPr lang="nl-BE" dirty="0"/>
           </a:p>
@@ -15093,7 +15313,7 @@
         <p:spPr>
           <a:xfrm>
             <a:off x="800101" y="2402029"/>
-            <a:ext cx="7491153" cy="2031325"/>
+            <a:ext cx="7215437" cy="1754326"/>
           </a:xfrm>
           <a:prstGeom prst="rect">
             <a:avLst/>
@@ -15129,7 +15349,7 @@
                 <a:latin typeface="Courier New" panose="02070309020205020404" pitchFamily="49" charset="0"/>
                 <a:cs typeface="Courier New" panose="02070309020205020404" pitchFamily="49" charset="0"/>
               </a:rPr>
-              <a:t>#PBS –l nodes=1:ppn=1</a:t>
+              <a:t>#SBATCH –-nodes=1</a:t>
             </a:r>
           </a:p>
           <a:p>
@@ -15138,21 +15358,7 @@
                 <a:latin typeface="Courier New" panose="02070309020205020404" pitchFamily="49" charset="0"/>
                 <a:cs typeface="Courier New" panose="02070309020205020404" pitchFamily="49" charset="0"/>
               </a:rPr>
-              <a:t>#PBS –l </a:t>
-            </a:r>
-            <a:r>
-              <a:rPr lang="en-US" dirty="0" err="1">
-                <a:latin typeface="Courier New" panose="02070309020205020404" pitchFamily="49" charset="0"/>
-                <a:cs typeface="Courier New" panose="02070309020205020404" pitchFamily="49" charset="0"/>
-              </a:rPr>
-              <a:t>walltime</a:t>
-            </a:r>
-            <a:r>
-              <a:rPr lang="en-US" dirty="0">
-                <a:latin typeface="Courier New" panose="02070309020205020404" pitchFamily="49" charset="0"/>
-                <a:cs typeface="Courier New" panose="02070309020205020404" pitchFamily="49" charset="0"/>
-              </a:rPr>
-              <a:t>=00:30:00</a:t>
+              <a:t>#SBATCH –-time=00:30:00</a:t>
             </a:r>
           </a:p>
           <a:p>
@@ -15163,20 +15369,18 @@
           </a:p>
           <a:p>
             <a:r>
+              <a:rPr lang="en-US">
+                <a:latin typeface="Courier New" panose="02070309020205020404" pitchFamily="49" charset="0"/>
+                <a:cs typeface="Courier New" panose="02070309020205020404" pitchFamily="49" charset="0"/>
+              </a:rPr>
+              <a:t>apptainer</a:t>
+            </a:r>
+            <a:r>
               <a:rPr lang="en-US" dirty="0">
                 <a:latin typeface="Courier New" panose="02070309020205020404" pitchFamily="49" charset="0"/>
                 <a:cs typeface="Courier New" panose="02070309020205020404" pitchFamily="49" charset="0"/>
               </a:rPr>
-              <a:t>cd $PBS_O_WORKDIR</a:t>
-            </a:r>
-          </a:p>
-          <a:p>
-            <a:r>
-              <a:rPr lang="en-US" dirty="0">
-                <a:latin typeface="Courier New" panose="02070309020205020404" pitchFamily="49" charset="0"/>
-                <a:cs typeface="Courier New" panose="02070309020205020404" pitchFamily="49" charset="0"/>
-              </a:rPr>
-              <a:t>singularity exec </a:t>
+              <a:t> exec </a:t>
             </a:r>
             <a:r>
               <a:rPr lang="en-US" dirty="0" err="1">
@@ -15651,7 +15855,7 @@
         <p:spPr>
           <a:xfrm>
             <a:off x="693966" y="2359483"/>
-            <a:ext cx="4182555" cy="369332"/>
+            <a:ext cx="4733988" cy="369332"/>
           </a:xfrm>
           <a:prstGeom prst="rect">
             <a:avLst/>
@@ -15674,7 +15878,7 @@
                 <a:latin typeface="Courier New" panose="02070309020205020404" pitchFamily="49" charset="0"/>
                 <a:cs typeface="Courier New" panose="02070309020205020404" pitchFamily="49" charset="0"/>
               </a:rPr>
-              <a:t>$ singularity shell </a:t>
+              <a:t>$ </a:t>
             </a:r>
             <a:r>
               <a:rPr lang="en-US" b="1" dirty="0" err="1">
@@ -15684,7 +15888,27 @@
                 <a:latin typeface="Courier New" panose="02070309020205020404" pitchFamily="49" charset="0"/>
                 <a:cs typeface="Courier New" panose="02070309020205020404" pitchFamily="49" charset="0"/>
               </a:rPr>
-              <a:t>grace.sif</a:t>
+              <a:t>apptainer</a:t>
+            </a:r>
+            <a:r>
+              <a:rPr lang="en-US" b="1" dirty="0">
+                <a:solidFill>
+                  <a:schemeClr val="bg1"/>
+                </a:solidFill>
+                <a:latin typeface="Courier New" panose="02070309020205020404" pitchFamily="49" charset="0"/>
+                <a:cs typeface="Courier New" panose="02070309020205020404" pitchFamily="49" charset="0"/>
+              </a:rPr>
+              <a:t> shell </a:t>
+            </a:r>
+            <a:r>
+              <a:rPr lang="en-US" b="1" dirty="0" err="1">
+                <a:solidFill>
+                  <a:schemeClr val="bg1"/>
+                </a:solidFill>
+                <a:latin typeface="Courier New" panose="02070309020205020404" pitchFamily="49" charset="0"/>
+                <a:cs typeface="Courier New" panose="02070309020205020404" pitchFamily="49" charset="0"/>
+              </a:rPr>
+              <a:t>development.sif</a:t>
             </a:r>
             <a:endParaRPr lang="nl-BE" b="1" dirty="0">
               <a:solidFill>
@@ -15716,6 +15940,96 @@
               <a:t>30</a:t>
             </a:fld>
             <a:endParaRPr lang="nl-BE"/>
+          </a:p>
+        </p:txBody>
+      </p:sp>
+      <p:sp>
+        <p:nvSpPr>
+          <p:cNvPr id="5" name="TextBox 4">
+            <a:extLst>
+              <a:ext uri="{FF2B5EF4-FFF2-40B4-BE49-F238E27FC236}">
+                <a16:creationId xmlns:a16="http://schemas.microsoft.com/office/drawing/2014/main" id="{B6003531-1EA4-EAC1-EE4D-E77B605C1386}"/>
+              </a:ext>
+            </a:extLst>
+          </p:cNvPr>
+          <p:cNvSpPr txBox="1"/>
+          <p:nvPr/>
+        </p:nvSpPr>
+        <p:spPr>
+          <a:xfrm>
+            <a:off x="693966" y="4763377"/>
+            <a:ext cx="6112571" cy="369332"/>
+          </a:xfrm>
+          <a:prstGeom prst="rect">
+            <a:avLst/>
+          </a:prstGeom>
+          <a:solidFill>
+            <a:schemeClr val="tx1"/>
+          </a:solidFill>
+        </p:spPr>
+        <p:txBody>
+          <a:bodyPr wrap="none" rtlCol="0">
+            <a:spAutoFit/>
+          </a:bodyPr>
+          <a:lstStyle/>
+          <a:p>
+            <a:r>
+              <a:rPr lang="en-US" b="1" dirty="0">
+                <a:solidFill>
+                  <a:schemeClr val="bg1"/>
+                </a:solidFill>
+                <a:latin typeface="Courier New" panose="02070309020205020404" pitchFamily="49" charset="0"/>
+                <a:cs typeface="Courier New" panose="02070309020205020404" pitchFamily="49" charset="0"/>
+              </a:rPr>
+              <a:t>$ </a:t>
+            </a:r>
+            <a:r>
+              <a:rPr lang="en-US" b="1" dirty="0" err="1">
+                <a:solidFill>
+                  <a:schemeClr val="bg1"/>
+                </a:solidFill>
+                <a:latin typeface="Courier New" panose="02070309020205020404" pitchFamily="49" charset="0"/>
+                <a:cs typeface="Courier New" panose="02070309020205020404" pitchFamily="49" charset="0"/>
+              </a:rPr>
+              <a:t>apptainer</a:t>
+            </a:r>
+            <a:r>
+              <a:rPr lang="en-US" b="1" dirty="0">
+                <a:solidFill>
+                  <a:schemeClr val="bg1"/>
+                </a:solidFill>
+                <a:latin typeface="Courier New" panose="02070309020205020404" pitchFamily="49" charset="0"/>
+                <a:cs typeface="Courier New" panose="02070309020205020404" pitchFamily="49" charset="0"/>
+              </a:rPr>
+              <a:t> exec </a:t>
+            </a:r>
+            <a:r>
+              <a:rPr lang="en-US" b="1" dirty="0" err="1">
+                <a:solidFill>
+                  <a:schemeClr val="bg1"/>
+                </a:solidFill>
+                <a:latin typeface="Courier New" panose="02070309020205020404" pitchFamily="49" charset="0"/>
+                <a:cs typeface="Courier New" panose="02070309020205020404" pitchFamily="49" charset="0"/>
+              </a:rPr>
+              <a:t>development.sif</a:t>
+            </a:r>
+            <a:r>
+              <a:rPr lang="en-US" b="1" dirty="0">
+                <a:solidFill>
+                  <a:schemeClr val="bg1"/>
+                </a:solidFill>
+                <a:latin typeface="Courier New" panose="02070309020205020404" pitchFamily="49" charset="0"/>
+                <a:cs typeface="Courier New" panose="02070309020205020404" pitchFamily="49" charset="0"/>
+              </a:rPr>
+              <a:t>  /bin/bash</a:t>
+            </a:r>
+            <a:endParaRPr lang="nl-BE" b="1" dirty="0">
+              <a:solidFill>
+                <a:schemeClr val="bg1"/>
+              </a:solidFill>
+              <a:latin typeface="Courier New" panose="02070309020205020404" pitchFamily="49" charset="0"/>
+              <a:cs typeface="Courier New" panose="02070309020205020404" pitchFamily="49" charset="0"/>
+            </a:endParaRPr>
           </a:p>
         </p:txBody>
       </p:sp>
@@ -15939,6 +16253,33 @@
                                   </p:childTnLst>
                                 </p:cTn>
                               </p:par>
+                              <p:par>
+                                <p:cTn id="19" presetID="1" presetClass="entr" presetSubtype="0" fill="hold" grpId="0" nodeType="withEffect">
+                                  <p:stCondLst>
+                                    <p:cond delay="0"/>
+                                  </p:stCondLst>
+                                  <p:childTnLst>
+                                    <p:set>
+                                      <p:cBhvr>
+                                        <p:cTn id="20" dur="1" fill="hold">
+                                          <p:stCondLst>
+                                            <p:cond delay="0"/>
+                                          </p:stCondLst>
+                                        </p:cTn>
+                                        <p:tgtEl>
+                                          <p:spTgt spid="5"/>
+                                        </p:tgtEl>
+                                        <p:attrNameLst>
+                                          <p:attrName>style.visibility</p:attrName>
+                                        </p:attrNameLst>
+                                      </p:cBhvr>
+                                      <p:to>
+                                        <p:strVal val="visible"/>
+                                      </p:to>
+                                    </p:set>
+                                  </p:childTnLst>
+                                </p:cTn>
+                              </p:par>
                             </p:childTnLst>
                           </p:cTn>
                         </p:par>
@@ -15969,6 +16310,7 @@
     <p:bldLst>
       <p:bldP spid="3" grpId="0" uiExpand="1" build="p"/>
       <p:bldP spid="4" grpId="0" animBg="1"/>
+      <p:bldP spid="5" grpId="0" animBg="1"/>
     </p:bldLst>
   </p:timing>
 </p:sld>
@@ -17581,7 +17923,7 @@
         <p:spPr>
           <a:xfrm>
             <a:off x="293917" y="2402029"/>
-            <a:ext cx="6526146" cy="3139321"/>
+            <a:ext cx="6388287" cy="2585323"/>
           </a:xfrm>
           <a:prstGeom prst="rect">
             <a:avLst/>
@@ -17617,30 +17959,44 @@
                 <a:latin typeface="Courier New" panose="02070309020205020404" pitchFamily="49" charset="0"/>
                 <a:cs typeface="Courier New" panose="02070309020205020404" pitchFamily="49" charset="0"/>
               </a:rPr>
-              <a:t>#PBS -l nodes=1:ppn=28</a:t>
-            </a:r>
-          </a:p>
-          <a:p>
+              <a:t>#SBATCH --nodes=1 –</a:t>
+            </a:r>
+            <a:r>
+              <a:rPr lang="en-US" dirty="0" err="1">
+                <a:latin typeface="Courier New" panose="02070309020205020404" pitchFamily="49" charset="0"/>
+                <a:cs typeface="Courier New" panose="02070309020205020404" pitchFamily="49" charset="0"/>
+              </a:rPr>
+              <a:t>ntasks</a:t>
+            </a:r>
             <a:r>
               <a:rPr lang="en-US" dirty="0">
                 <a:latin typeface="Courier New" panose="02070309020205020404" pitchFamily="49" charset="0"/>
                 <a:cs typeface="Courier New" panose="02070309020205020404" pitchFamily="49" charset="0"/>
               </a:rPr>
-              <a:t>#PBS -l </a:t>
+              <a:t>=1 –</a:t>
             </a:r>
             <a:r>
               <a:rPr lang="en-US" dirty="0" err="1">
                 <a:latin typeface="Courier New" panose="02070309020205020404" pitchFamily="49" charset="0"/>
                 <a:cs typeface="Courier New" panose="02070309020205020404" pitchFamily="49" charset="0"/>
               </a:rPr>
-              <a:t>walltime</a:t>
+              <a:t>cpus</a:t>
             </a:r>
             <a:r>
               <a:rPr lang="en-US" dirty="0">
                 <a:latin typeface="Courier New" panose="02070309020205020404" pitchFamily="49" charset="0"/>
                 <a:cs typeface="Courier New" panose="02070309020205020404" pitchFamily="49" charset="0"/>
               </a:rPr>
-              <a:t>=00:05:00</a:t>
+              <a:t>-per-task=28</a:t>
+            </a:r>
+          </a:p>
+          <a:p>
+            <a:r>
+              <a:rPr lang="en-US" dirty="0">
+                <a:latin typeface="Courier New" panose="02070309020205020404" pitchFamily="49" charset="0"/>
+                <a:cs typeface="Courier New" panose="02070309020205020404" pitchFamily="49" charset="0"/>
+              </a:rPr>
+              <a:t>#SBATCH --time=00:05:00</a:t>
             </a:r>
           </a:p>
           <a:p>
@@ -17655,10 +18011,38 @@
                 <a:latin typeface="Courier New" panose="02070309020205020404" pitchFamily="49" charset="0"/>
                 <a:cs typeface="Courier New" panose="02070309020205020404" pitchFamily="49" charset="0"/>
               </a:rPr>
-              <a:t>cd $PBS_O_WORKDIR</a:t>
-            </a:r>
-          </a:p>
-          <a:p>
+              <a:t>for </a:t>
+            </a:r>
+            <a:r>
+              <a:rPr lang="en-US" dirty="0" err="1">
+                <a:latin typeface="Courier New" panose="02070309020205020404" pitchFamily="49" charset="0"/>
+                <a:cs typeface="Courier New" panose="02070309020205020404" pitchFamily="49" charset="0"/>
+              </a:rPr>
+              <a:t>num_threads</a:t>
+            </a:r>
+            <a:r>
+              <a:rPr lang="en-US" dirty="0">
+                <a:latin typeface="Courier New" panose="02070309020205020404" pitchFamily="49" charset="0"/>
+                <a:cs typeface="Courier New" panose="02070309020205020404" pitchFamily="49" charset="0"/>
+              </a:rPr>
+              <a:t> in 1 2 4 8 16 24 28; do</a:t>
+            </a:r>
+          </a:p>
+          <a:p>
+            <a:r>
+              <a:rPr lang="en-US" dirty="0">
+                <a:latin typeface="Courier New" panose="02070309020205020404" pitchFamily="49" charset="0"/>
+                <a:cs typeface="Courier New" panose="02070309020205020404" pitchFamily="49" charset="0"/>
+              </a:rPr>
+              <a:t>    export OMP_NUM_THREADS=$</a:t>
+            </a:r>
+            <a:r>
+              <a:rPr lang="en-US" dirty="0" err="1">
+                <a:latin typeface="Courier New" panose="02070309020205020404" pitchFamily="49" charset="0"/>
+                <a:cs typeface="Courier New" panose="02070309020205020404" pitchFamily="49" charset="0"/>
+              </a:rPr>
+              <a:t>num_threads</a:t>
+            </a:r>
             <a:endParaRPr lang="en-US" dirty="0">
               <a:latin typeface="Courier New" panose="02070309020205020404" pitchFamily="49" charset="0"/>
               <a:cs typeface="Courier New" panose="02070309020205020404" pitchFamily="49" charset="0"/>
@@ -17670,50 +18054,21 @@
                 <a:latin typeface="Courier New" panose="02070309020205020404" pitchFamily="49" charset="0"/>
                 <a:cs typeface="Courier New" panose="02070309020205020404" pitchFamily="49" charset="0"/>
               </a:rPr>
-              <a:t>for </a:t>
+              <a:t>    time </a:t>
             </a:r>
             <a:r>
               <a:rPr lang="en-US" dirty="0" err="1">
                 <a:latin typeface="Courier New" panose="02070309020205020404" pitchFamily="49" charset="0"/>
                 <a:cs typeface="Courier New" panose="02070309020205020404" pitchFamily="49" charset="0"/>
               </a:rPr>
-              <a:t>num_threads</a:t>
+              <a:t>apptainer</a:t>
             </a:r>
             <a:r>
               <a:rPr lang="en-US" dirty="0">
                 <a:latin typeface="Courier New" panose="02070309020205020404" pitchFamily="49" charset="0"/>
                 <a:cs typeface="Courier New" panose="02070309020205020404" pitchFamily="49" charset="0"/>
               </a:rPr>
-              <a:t> in 1 2 4 8 16 24 28; do</a:t>
-            </a:r>
-          </a:p>
-          <a:p>
-            <a:r>
-              <a:rPr lang="en-US" dirty="0">
-                <a:latin typeface="Courier New" panose="02070309020205020404" pitchFamily="49" charset="0"/>
-                <a:cs typeface="Courier New" panose="02070309020205020404" pitchFamily="49" charset="0"/>
-              </a:rPr>
-              <a:t>    export OMP_NUM_THREADS=$</a:t>
-            </a:r>
-            <a:r>
-              <a:rPr lang="en-US" dirty="0" err="1">
-                <a:latin typeface="Courier New" panose="02070309020205020404" pitchFamily="49" charset="0"/>
-                <a:cs typeface="Courier New" panose="02070309020205020404" pitchFamily="49" charset="0"/>
-              </a:rPr>
-              <a:t>num_threads</a:t>
-            </a:r>
-            <a:endParaRPr lang="en-US" dirty="0">
-              <a:latin typeface="Courier New" panose="02070309020205020404" pitchFamily="49" charset="0"/>
-              <a:cs typeface="Courier New" panose="02070309020205020404" pitchFamily="49" charset="0"/>
-            </a:endParaRPr>
-          </a:p>
-          <a:p>
-            <a:r>
-              <a:rPr lang="en-US" dirty="0">
-                <a:latin typeface="Courier New" panose="02070309020205020404" pitchFamily="49" charset="0"/>
-                <a:cs typeface="Courier New" panose="02070309020205020404" pitchFamily="49" charset="0"/>
-              </a:rPr>
-              <a:t>    time singularity exec </a:t>
+              <a:t> exec </a:t>
             </a:r>
             <a:r>
               <a:rPr lang="en-US" dirty="0" err="1">
@@ -17779,7 +18134,15 @@
           <a:p>
             <a:r>
               <a:rPr lang="en-US" sz="2400" dirty="0"/>
-              <a:t>Note: compiler version in image need not be same as on host</a:t>
+              <a:t>Note: compiler version in image need </a:t>
+            </a:r>
+            <a:r>
+              <a:rPr lang="en-US" sz="2400" i="1" dirty="0"/>
+              <a:t>not</a:t>
+            </a:r>
+            <a:r>
+              <a:rPr lang="en-US" sz="2400" dirty="0"/>
+              <a:t> be same as on host</a:t>
             </a:r>
             <a:endParaRPr lang="nl-BE" sz="2400" dirty="0"/>
           </a:p>
@@ -19409,7 +19772,7 @@
         <p:spPr>
           <a:xfrm>
             <a:off x="293917" y="2402029"/>
-            <a:ext cx="8456161" cy="2585323"/>
+            <a:ext cx="8180445" cy="2308324"/>
           </a:xfrm>
           <a:prstGeom prst="rect">
             <a:avLst/>
@@ -19445,30 +19808,30 @@
                 <a:latin typeface="Courier New" panose="02070309020205020404" pitchFamily="49" charset="0"/>
                 <a:cs typeface="Courier New" panose="02070309020205020404" pitchFamily="49" charset="0"/>
               </a:rPr>
-              <a:t>#PBS -l nodes=2:ppn=28</a:t>
-            </a:r>
-          </a:p>
-          <a:p>
+              <a:t>#SBATCH --nodes=2 –</a:t>
+            </a:r>
+            <a:r>
+              <a:rPr lang="en-US" dirty="0" err="1">
+                <a:latin typeface="Courier New" panose="02070309020205020404" pitchFamily="49" charset="0"/>
+                <a:cs typeface="Courier New" panose="02070309020205020404" pitchFamily="49" charset="0"/>
+              </a:rPr>
+              <a:t>ntasks</a:t>
+            </a:r>
             <a:r>
               <a:rPr lang="en-US" dirty="0">
                 <a:latin typeface="Courier New" panose="02070309020205020404" pitchFamily="49" charset="0"/>
                 <a:cs typeface="Courier New" panose="02070309020205020404" pitchFamily="49" charset="0"/>
               </a:rPr>
-              <a:t>#PBS -l </a:t>
-            </a:r>
-            <a:r>
-              <a:rPr lang="en-US" dirty="0" err="1">
-                <a:latin typeface="Courier New" panose="02070309020205020404" pitchFamily="49" charset="0"/>
-                <a:cs typeface="Courier New" panose="02070309020205020404" pitchFamily="49" charset="0"/>
-              </a:rPr>
-              <a:t>walltime</a:t>
-            </a:r>
+              <a:t>-per-node=36</a:t>
+            </a:r>
+          </a:p>
+          <a:p>
             <a:r>
               <a:rPr lang="en-US" dirty="0">
                 <a:latin typeface="Courier New" panose="02070309020205020404" pitchFamily="49" charset="0"/>
                 <a:cs typeface="Courier New" panose="02070309020205020404" pitchFamily="49" charset="0"/>
               </a:rPr>
-              <a:t>=00:05:00</a:t>
+              <a:t>#SBATCH --time=00:05:00</a:t>
             </a:r>
           </a:p>
           <a:p>
@@ -19483,15 +19846,6 @@
                 <a:latin typeface="Courier New" panose="02070309020205020404" pitchFamily="49" charset="0"/>
                 <a:cs typeface="Courier New" panose="02070309020205020404" pitchFamily="49" charset="0"/>
               </a:rPr>
-              <a:t>cd $PBS_O_WORKDIR</a:t>
-            </a:r>
-          </a:p>
-          <a:p>
-            <a:r>
-              <a:rPr lang="en-US" dirty="0">
-                <a:latin typeface="Courier New" panose="02070309020205020404" pitchFamily="49" charset="0"/>
-                <a:cs typeface="Courier New" panose="02070309020205020404" pitchFamily="49" charset="0"/>
-              </a:rPr>
               <a:t>module load </a:t>
             </a:r>
             <a:r>
@@ -19579,7 +19933,21 @@
                 <a:latin typeface="Courier New" panose="02070309020205020404" pitchFamily="49" charset="0"/>
                 <a:cs typeface="Courier New" panose="02070309020205020404" pitchFamily="49" charset="0"/>
               </a:rPr>
-              <a:t>    singularity exec </a:t>
+              <a:t>    </a:t>
+            </a:r>
+            <a:r>
+              <a:rPr lang="en-US" dirty="0" err="1">
+                <a:latin typeface="Courier New" panose="02070309020205020404" pitchFamily="49" charset="0"/>
+                <a:cs typeface="Courier New" panose="02070309020205020404" pitchFamily="49" charset="0"/>
+              </a:rPr>
+              <a:t>apptainer</a:t>
+            </a:r>
+            <a:r>
+              <a:rPr lang="en-US" dirty="0">
+                <a:latin typeface="Courier New" panose="02070309020205020404" pitchFamily="49" charset="0"/>
+                <a:cs typeface="Courier New" panose="02070309020205020404" pitchFamily="49" charset="0"/>
+              </a:rPr>
+              <a:t> exec </a:t>
             </a:r>
             <a:r>
               <a:rPr lang="en-US" dirty="0" err="1">
@@ -20024,8 +20392,12 @@
           <a:lstStyle/>
           <a:p>
             <a:r>
+              <a:rPr lang="en-US" sz="2800" dirty="0" err="1"/>
+              <a:t>Apptainer</a:t>
+            </a:r>
+            <a:r>
               <a:rPr lang="en-US" sz="2800" dirty="0"/>
-              <a:t>Singularity instances</a:t>
+              <a:t> instances</a:t>
             </a:r>
           </a:p>
         </p:txBody>
@@ -22568,7 +22940,27 @@
                 <a:latin typeface="Courier New" panose="02070309020205020404" pitchFamily="49" charset="0"/>
                 <a:cs typeface="Courier New" panose="02070309020205020404" pitchFamily="49" charset="0"/>
               </a:rPr>
-              <a:t>$ singularity  </a:t>
+              <a:t>$ </a:t>
+            </a:r>
+            <a:r>
+              <a:rPr lang="en-US" b="1" dirty="0" err="1">
+                <a:solidFill>
+                  <a:schemeClr val="bg1"/>
+                </a:solidFill>
+                <a:latin typeface="Courier New" panose="02070309020205020404" pitchFamily="49" charset="0"/>
+                <a:cs typeface="Courier New" panose="02070309020205020404" pitchFamily="49" charset="0"/>
+              </a:rPr>
+              <a:t>apptainer</a:t>
+            </a:r>
+            <a:r>
+              <a:rPr lang="en-US" b="1" dirty="0">
+                <a:solidFill>
+                  <a:schemeClr val="bg1"/>
+                </a:solidFill>
+                <a:latin typeface="Courier New" panose="02070309020205020404" pitchFamily="49" charset="0"/>
+                <a:cs typeface="Courier New" panose="02070309020205020404" pitchFamily="49" charset="0"/>
+              </a:rPr>
+              <a:t>  </a:t>
             </a:r>
             <a:r>
               <a:rPr lang="en-US" b="1" dirty="0" err="1">
@@ -22721,7 +23113,27 @@
                 <a:latin typeface="Courier New" panose="02070309020205020404" pitchFamily="49" charset="0"/>
                 <a:cs typeface="Courier New" panose="02070309020205020404" pitchFamily="49" charset="0"/>
               </a:rPr>
-              <a:t>$ singularity  </a:t>
+              <a:t>$ </a:t>
+            </a:r>
+            <a:r>
+              <a:rPr lang="en-US" b="1" dirty="0" err="1">
+                <a:solidFill>
+                  <a:schemeClr val="bg1"/>
+                </a:solidFill>
+                <a:latin typeface="Courier New" panose="02070309020205020404" pitchFamily="49" charset="0"/>
+                <a:cs typeface="Courier New" panose="02070309020205020404" pitchFamily="49" charset="0"/>
+              </a:rPr>
+              <a:t>apptainer</a:t>
+            </a:r>
+            <a:r>
+              <a:rPr lang="en-US" b="1" dirty="0">
+                <a:solidFill>
+                  <a:schemeClr val="bg1"/>
+                </a:solidFill>
+                <a:latin typeface="Courier New" panose="02070309020205020404" pitchFamily="49" charset="0"/>
+                <a:cs typeface="Courier New" panose="02070309020205020404" pitchFamily="49" charset="0"/>
+              </a:rPr>
+              <a:t>  </a:t>
             </a:r>
             <a:r>
               <a:rPr lang="en-US" b="1" dirty="0" err="1">
@@ -22790,7 +23202,27 @@
                 <a:latin typeface="Courier New" panose="02070309020205020404" pitchFamily="49" charset="0"/>
                 <a:cs typeface="Courier New" panose="02070309020205020404" pitchFamily="49" charset="0"/>
               </a:rPr>
-              <a:t>$ singularity  </a:t>
+              <a:t>$ </a:t>
+            </a:r>
+            <a:r>
+              <a:rPr lang="en-US" b="1" dirty="0" err="1">
+                <a:solidFill>
+                  <a:schemeClr val="bg1"/>
+                </a:solidFill>
+                <a:latin typeface="Courier New" panose="02070309020205020404" pitchFamily="49" charset="0"/>
+                <a:cs typeface="Courier New" panose="02070309020205020404" pitchFamily="49" charset="0"/>
+              </a:rPr>
+              <a:t>apptainer</a:t>
+            </a:r>
+            <a:r>
+              <a:rPr lang="en-US" b="1" dirty="0">
+                <a:solidFill>
+                  <a:schemeClr val="bg1"/>
+                </a:solidFill>
+                <a:latin typeface="Courier New" panose="02070309020205020404" pitchFamily="49" charset="0"/>
+                <a:cs typeface="Courier New" panose="02070309020205020404" pitchFamily="49" charset="0"/>
+              </a:rPr>
+              <a:t>  </a:t>
             </a:r>
             <a:r>
               <a:rPr lang="en-US" b="1" dirty="0" err="1">
@@ -23466,8 +23898,12 @@
           <a:lstStyle/>
           <a:p>
             <a:r>
+              <a:rPr lang="en-US" dirty="0" err="1"/>
+              <a:t>Apptainer</a:t>
+            </a:r>
+            <a:r>
               <a:rPr lang="en-US" dirty="0"/>
-              <a:t>Singularity overhead</a:t>
+              <a:t> overhead</a:t>
             </a:r>
             <a:endParaRPr lang="nl-BE" dirty="0"/>
           </a:p>
@@ -24206,8 +24642,12 @@
           <a:lstStyle/>
           <a:p>
             <a:r>
+              <a:rPr lang="en-US" dirty="0" err="1"/>
+              <a:t>Apptainer</a:t>
+            </a:r>
+            <a:r>
               <a:rPr lang="en-US" dirty="0"/>
-              <a:t>Singularity performance pitfalls</a:t>
+              <a:t> performance pitfalls</a:t>
             </a:r>
             <a:endParaRPr lang="nl-BE" dirty="0"/>
           </a:p>
@@ -25263,8 +25703,12 @@
           <a:lstStyle/>
           <a:p>
             <a:r>
+              <a:rPr lang="en-US" dirty="0" err="1"/>
+              <a:t>Apptainer</a:t>
+            </a:r>
+            <a:r>
               <a:rPr lang="en-US" dirty="0"/>
-              <a:t>Singularity advantages</a:t>
+              <a:t> advantages</a:t>
             </a:r>
           </a:p>
           <a:p>
@@ -25334,7 +25778,7 @@
           <a:p>
             <a:r>
               <a:rPr lang="en-US" dirty="0"/>
-              <a:t>No excuse to run crappy/suboptimal software!</a:t>
+              <a:t>Not an excuse to run crappy/suboptimal software!</a:t>
             </a:r>
             <a:endParaRPr lang="nl-BE" dirty="0"/>
           </a:p>
@@ -26945,7 +27389,7 @@
         <p:spPr>
           <a:xfrm>
             <a:off x="1004208" y="2898322"/>
-            <a:ext cx="7491153" cy="369332"/>
+            <a:ext cx="7215437" cy="369332"/>
           </a:xfrm>
           <a:prstGeom prst="rect">
             <a:avLst/>
@@ -26988,7 +27432,27 @@
                 <a:latin typeface="Courier New" panose="02070309020205020404" pitchFamily="49" charset="0"/>
                 <a:cs typeface="Courier New" panose="02070309020205020404" pitchFamily="49" charset="0"/>
               </a:rPr>
-              <a:t> singularity </a:t>
+              <a:t> </a:t>
+            </a:r>
+            <a:r>
+              <a:rPr lang="en-US" b="1" dirty="0" err="1">
+                <a:solidFill>
+                  <a:schemeClr val="bg1"/>
+                </a:solidFill>
+                <a:latin typeface="Courier New" panose="02070309020205020404" pitchFamily="49" charset="0"/>
+                <a:cs typeface="Courier New" panose="02070309020205020404" pitchFamily="49" charset="0"/>
+              </a:rPr>
+              <a:t>apptainer</a:t>
+            </a:r>
+            <a:r>
+              <a:rPr lang="en-US" b="1" dirty="0">
+                <a:solidFill>
+                  <a:schemeClr val="bg1"/>
+                </a:solidFill>
+                <a:latin typeface="Courier New" panose="02070309020205020404" pitchFamily="49" charset="0"/>
+                <a:cs typeface="Courier New" panose="02070309020205020404" pitchFamily="49" charset="0"/>
+              </a:rPr>
+              <a:t> </a:t>
             </a:r>
             <a:r>
               <a:rPr lang="en-US" b="1" dirty="0" err="1">
@@ -27039,7 +27503,7 @@
         <p:spPr>
           <a:xfrm>
             <a:off x="1004208" y="4340351"/>
-            <a:ext cx="7491153" cy="369332"/>
+            <a:ext cx="7215437" cy="369332"/>
           </a:xfrm>
           <a:prstGeom prst="rect">
             <a:avLst/>
@@ -27082,7 +27546,27 @@
                 <a:latin typeface="Courier New" panose="02070309020205020404" pitchFamily="49" charset="0"/>
                 <a:cs typeface="Courier New" panose="02070309020205020404" pitchFamily="49" charset="0"/>
               </a:rPr>
-              <a:t> singularity </a:t>
+              <a:t> </a:t>
+            </a:r>
+            <a:r>
+              <a:rPr lang="en-US" b="1" dirty="0" err="1">
+                <a:solidFill>
+                  <a:schemeClr val="bg1"/>
+                </a:solidFill>
+                <a:latin typeface="Courier New" panose="02070309020205020404" pitchFamily="49" charset="0"/>
+                <a:cs typeface="Courier New" panose="02070309020205020404" pitchFamily="49" charset="0"/>
+              </a:rPr>
+              <a:t>apptainer</a:t>
+            </a:r>
+            <a:r>
+              <a:rPr lang="en-US" b="1" dirty="0">
+                <a:solidFill>
+                  <a:schemeClr val="bg1"/>
+                </a:solidFill>
+                <a:latin typeface="Courier New" panose="02070309020205020404" pitchFamily="49" charset="0"/>
+                <a:cs typeface="Courier New" panose="02070309020205020404" pitchFamily="49" charset="0"/>
+              </a:rPr>
+              <a:t> </a:t>
             </a:r>
             <a:r>
               <a:rPr lang="en-US" b="1" dirty="0" err="1">
@@ -27617,7 +28101,7 @@
         <p:spPr>
           <a:xfrm>
             <a:off x="2767695" y="5404757"/>
-            <a:ext cx="2557944" cy="523220"/>
+            <a:ext cx="2455800" cy="523220"/>
           </a:xfrm>
           <a:prstGeom prst="rect">
             <a:avLst/>
@@ -27637,7 +28121,11 @@
           <a:p>
             <a:r>
               <a:rPr lang="en-US" sz="2800" dirty="0"/>
-              <a:t>Enter singularity</a:t>
+              <a:t>Enter </a:t>
+            </a:r>
+            <a:r>
+              <a:rPr lang="en-US" sz="2800" dirty="0" err="1"/>
+              <a:t>apptainer</a:t>
             </a:r>
             <a:endParaRPr lang="nl-BE" sz="2800" dirty="0"/>
           </a:p>
@@ -28150,8 +28638,12 @@
           <a:lstStyle/>
           <a:p>
             <a:r>
+              <a:rPr lang="en-US" dirty="0" err="1"/>
+              <a:t>Apptainer</a:t>
+            </a:r>
+            <a:r>
               <a:rPr lang="en-US" dirty="0"/>
-              <a:t>Singularity architecture</a:t>
+              <a:t> architecture</a:t>
             </a:r>
             <a:endParaRPr lang="nl-BE" dirty="0"/>
           </a:p>
@@ -28317,8 +28809,12 @@
           <a:lstStyle/>
           <a:p>
             <a:r>
+              <a:rPr lang="en-US" dirty="0" err="1"/>
+              <a:t>Apptainer</a:t>
+            </a:r>
+            <a:r>
               <a:rPr lang="en-US" dirty="0"/>
-              <a:t>Singularity image</a:t>
+              <a:t> image</a:t>
             </a:r>
             <a:endParaRPr lang="nl-BE" dirty="0"/>
           </a:p>
@@ -28411,7 +28907,15 @@
             <a:pPr lvl="1"/>
             <a:r>
               <a:rPr lang="en-US" dirty="0"/>
-              <a:t>Runs on any (Linux) machine, singularity installed</a:t>
+              <a:t>Runs on any (Linux) machine, </a:t>
+            </a:r>
+            <a:r>
+              <a:rPr lang="en-US" dirty="0" err="1"/>
+              <a:t>apptainer</a:t>
+            </a:r>
+            <a:r>
+              <a:rPr lang="en-US" dirty="0"/>
+              <a:t> installed</a:t>
             </a:r>
           </a:p>
           <a:p>
@@ -28956,8 +29460,13 @@
           <a:p>
             <a:r>
               <a:rPr lang="en-US" dirty="0"/>
-              <a:t>Installing singularity</a:t>
-            </a:r>
+              <a:t>Installing </a:t>
+            </a:r>
+            <a:r>
+              <a:rPr lang="en-US" dirty="0" err="1"/>
+              <a:t>apptainer</a:t>
+            </a:r>
+            <a:endParaRPr lang="en-US" dirty="0"/>
           </a:p>
         </p:txBody>
       </p:sp>

</xml_diff>

<commit_message>
Fix scheduler name to Slurm
</commit_message>
<xml_diff>
--- a/containers_for_hpc.pptx
+++ b/containers_for_hpc.pptx
@@ -348,7 +348,7 @@
           <a:p>
             <a:fld id="{6BD974B4-F374-4E74-84D3-1EB7DBF32A2A}" type="datetimeFigureOut">
               <a:rPr lang="nl-BE" smtClean="0"/>
-              <a:t>26/10/2023</a:t>
+              <a:t>24/01/2024</a:t>
             </a:fld>
             <a:endParaRPr lang="nl-BE"/>
           </a:p>
@@ -831,7 +831,7 @@
           <a:p>
             <a:fld id="{A433E747-842D-4EF3-8202-AC54FEC33061}" type="datetime1">
               <a:rPr lang="nl-BE" smtClean="0"/>
-              <a:t>26/10/2023</a:t>
+              <a:t>24/01/2024</a:t>
             </a:fld>
             <a:endParaRPr lang="nl-BE"/>
           </a:p>
@@ -1001,7 +1001,7 @@
           <a:p>
             <a:fld id="{7C821354-3381-4DF5-ABED-FDAFA2BAD3F8}" type="datetime1">
               <a:rPr lang="nl-BE" smtClean="0"/>
-              <a:t>26/10/2023</a:t>
+              <a:t>24/01/2024</a:t>
             </a:fld>
             <a:endParaRPr lang="nl-BE"/>
           </a:p>
@@ -1181,7 +1181,7 @@
           <a:p>
             <a:fld id="{C6B54B95-9964-4BBF-B171-A69413AB9FC5}" type="datetime1">
               <a:rPr lang="nl-BE" smtClean="0"/>
-              <a:t>26/10/2023</a:t>
+              <a:t>24/01/2024</a:t>
             </a:fld>
             <a:endParaRPr lang="nl-BE"/>
           </a:p>
@@ -1351,7 +1351,7 @@
           <a:p>
             <a:fld id="{BE45CDE5-064C-4862-90E9-83B8FD778625}" type="datetime1">
               <a:rPr lang="nl-BE" smtClean="0"/>
-              <a:t>26/10/2023</a:t>
+              <a:t>24/01/2024</a:t>
             </a:fld>
             <a:endParaRPr lang="nl-BE"/>
           </a:p>
@@ -1595,7 +1595,7 @@
           <a:p>
             <a:fld id="{C75A345C-628E-463E-B8F7-69C25D344DF5}" type="datetime1">
               <a:rPr lang="nl-BE" smtClean="0"/>
-              <a:t>26/10/2023</a:t>
+              <a:t>24/01/2024</a:t>
             </a:fld>
             <a:endParaRPr lang="nl-BE"/>
           </a:p>
@@ -1827,7 +1827,7 @@
           <a:p>
             <a:fld id="{65B04534-538C-4249-A635-8BB2B8486464}" type="datetime1">
               <a:rPr lang="nl-BE" smtClean="0"/>
-              <a:t>26/10/2023</a:t>
+              <a:t>24/01/2024</a:t>
             </a:fld>
             <a:endParaRPr lang="nl-BE"/>
           </a:p>
@@ -2194,7 +2194,7 @@
           <a:p>
             <a:fld id="{089671CB-8547-4C91-A3D5-012E6E8790E6}" type="datetime1">
               <a:rPr lang="nl-BE" smtClean="0"/>
-              <a:t>26/10/2023</a:t>
+              <a:t>24/01/2024</a:t>
             </a:fld>
             <a:endParaRPr lang="nl-BE"/>
           </a:p>
@@ -2312,7 +2312,7 @@
           <a:p>
             <a:fld id="{5765335F-FC99-4A2B-B87B-6AF6F3762B67}" type="datetime1">
               <a:rPr lang="nl-BE" smtClean="0"/>
-              <a:t>26/10/2023</a:t>
+              <a:t>24/01/2024</a:t>
             </a:fld>
             <a:endParaRPr lang="nl-BE"/>
           </a:p>
@@ -2407,7 +2407,7 @@
           <a:p>
             <a:fld id="{1711BA58-B677-4D21-BDCD-9DD1AEA8A328}" type="datetime1">
               <a:rPr lang="nl-BE" smtClean="0"/>
-              <a:t>26/10/2023</a:t>
+              <a:t>24/01/2024</a:t>
             </a:fld>
             <a:endParaRPr lang="nl-BE"/>
           </a:p>
@@ -2684,7 +2684,7 @@
           <a:p>
             <a:fld id="{5513BE8B-B89C-461B-89D1-D5BE33ADB6B9}" type="datetime1">
               <a:rPr lang="nl-BE" smtClean="0"/>
-              <a:t>26/10/2023</a:t>
+              <a:t>24/01/2024</a:t>
             </a:fld>
             <a:endParaRPr lang="nl-BE"/>
           </a:p>
@@ -2941,7 +2941,7 @@
           <a:p>
             <a:fld id="{AEE65485-0554-4482-9B9C-289893A0B56B}" type="datetime1">
               <a:rPr lang="nl-BE" smtClean="0"/>
-              <a:t>26/10/2023</a:t>
+              <a:t>24/01/2024</a:t>
             </a:fld>
             <a:endParaRPr lang="nl-BE"/>
           </a:p>
@@ -3154,7 +3154,7 @@
           <a:p>
             <a:fld id="{6FF26CEC-AF8A-4096-9A53-521F7571A055}" type="datetime1">
               <a:rPr lang="nl-BE" smtClean="0"/>
-              <a:t>26/10/2023</a:t>
+              <a:t>24/01/2024</a:t>
             </a:fld>
             <a:endParaRPr lang="nl-BE"/>
           </a:p>
@@ -17884,8 +17884,12 @@
           <a:lstStyle/>
           <a:p>
             <a:r>
+              <a:rPr lang="en-US" dirty="0" err="1"/>
+              <a:t>Slurm</a:t>
+            </a:r>
+            <a:r>
               <a:rPr lang="en-US" dirty="0"/>
-              <a:t>PBS job script, e.g., scaling test</a:t>
+              <a:t> job script, e.g., scaling test</a:t>
             </a:r>
             <a:endParaRPr lang="nl-BE" dirty="0"/>
           </a:p>
@@ -19733,8 +19737,12 @@
           <a:lstStyle/>
           <a:p>
             <a:r>
+              <a:rPr lang="en-US" dirty="0" err="1"/>
+              <a:t>Slurm</a:t>
+            </a:r>
+            <a:r>
               <a:rPr lang="en-US" dirty="0"/>
-              <a:t>PBS job script</a:t>
+              <a:t> job script</a:t>
             </a:r>
             <a:endParaRPr lang="nl-BE" dirty="0"/>
           </a:p>

</xml_diff>

<commit_message>
Remove slide on mount command, remote build
</commit_message>
<xml_diff>
--- a/containers_for_hpc.pptx
+++ b/containers_for_hpc.pptx
@@ -5,7 +5,7 @@
     <p:sldMasterId id="2147483660" r:id="rId1"/>
   </p:sldMasterIdLst>
   <p:notesMasterIdLst>
-    <p:notesMasterId r:id="rId54"/>
+    <p:notesMasterId r:id="rId53"/>
   </p:notesMasterIdLst>
   <p:sldIdLst>
     <p:sldId id="256" r:id="rId2"/>
@@ -28,38 +28,37 @@
     <p:sldId id="267" r:id="rId19"/>
     <p:sldId id="293" r:id="rId20"/>
     <p:sldId id="310" r:id="rId21"/>
-    <p:sldId id="268" r:id="rId22"/>
-    <p:sldId id="302" r:id="rId23"/>
-    <p:sldId id="292" r:id="rId24"/>
-    <p:sldId id="304" r:id="rId25"/>
-    <p:sldId id="305" r:id="rId26"/>
-    <p:sldId id="306" r:id="rId27"/>
-    <p:sldId id="275" r:id="rId28"/>
-    <p:sldId id="269" r:id="rId29"/>
-    <p:sldId id="278" r:id="rId30"/>
-    <p:sldId id="271" r:id="rId31"/>
-    <p:sldId id="289" r:id="rId32"/>
-    <p:sldId id="282" r:id="rId33"/>
-    <p:sldId id="283" r:id="rId34"/>
-    <p:sldId id="284" r:id="rId35"/>
-    <p:sldId id="279" r:id="rId36"/>
-    <p:sldId id="280" r:id="rId37"/>
-    <p:sldId id="281" r:id="rId38"/>
-    <p:sldId id="296" r:id="rId39"/>
-    <p:sldId id="297" r:id="rId40"/>
-    <p:sldId id="298" r:id="rId41"/>
-    <p:sldId id="299" r:id="rId42"/>
-    <p:sldId id="300" r:id="rId43"/>
-    <p:sldId id="285" r:id="rId44"/>
-    <p:sldId id="286" r:id="rId45"/>
-    <p:sldId id="287" r:id="rId46"/>
-    <p:sldId id="270" r:id="rId47"/>
-    <p:sldId id="272" r:id="rId48"/>
-    <p:sldId id="276" r:id="rId49"/>
-    <p:sldId id="277" r:id="rId50"/>
-    <p:sldId id="307" r:id="rId51"/>
-    <p:sldId id="308" r:id="rId52"/>
-    <p:sldId id="291" r:id="rId53"/>
+    <p:sldId id="302" r:id="rId22"/>
+    <p:sldId id="292" r:id="rId23"/>
+    <p:sldId id="304" r:id="rId24"/>
+    <p:sldId id="305" r:id="rId25"/>
+    <p:sldId id="306" r:id="rId26"/>
+    <p:sldId id="275" r:id="rId27"/>
+    <p:sldId id="269" r:id="rId28"/>
+    <p:sldId id="278" r:id="rId29"/>
+    <p:sldId id="271" r:id="rId30"/>
+    <p:sldId id="289" r:id="rId31"/>
+    <p:sldId id="282" r:id="rId32"/>
+    <p:sldId id="283" r:id="rId33"/>
+    <p:sldId id="284" r:id="rId34"/>
+    <p:sldId id="279" r:id="rId35"/>
+    <p:sldId id="280" r:id="rId36"/>
+    <p:sldId id="281" r:id="rId37"/>
+    <p:sldId id="296" r:id="rId38"/>
+    <p:sldId id="297" r:id="rId39"/>
+    <p:sldId id="298" r:id="rId40"/>
+    <p:sldId id="299" r:id="rId41"/>
+    <p:sldId id="300" r:id="rId42"/>
+    <p:sldId id="285" r:id="rId43"/>
+    <p:sldId id="286" r:id="rId44"/>
+    <p:sldId id="287" r:id="rId45"/>
+    <p:sldId id="270" r:id="rId46"/>
+    <p:sldId id="272" r:id="rId47"/>
+    <p:sldId id="276" r:id="rId48"/>
+    <p:sldId id="277" r:id="rId49"/>
+    <p:sldId id="307" r:id="rId50"/>
+    <p:sldId id="308" r:id="rId51"/>
+    <p:sldId id="291" r:id="rId52"/>
   </p:sldIdLst>
   <p:sldSz cx="9144000" cy="6858000" type="screen4x3"/>
   <p:notesSz cx="6858000" cy="9144000"/>
@@ -191,7 +190,6 @@
             <p14:sldId id="267"/>
             <p14:sldId id="293"/>
             <p14:sldId id="310"/>
-            <p14:sldId id="268"/>
             <p14:sldId id="302"/>
             <p14:sldId id="292"/>
           </p14:sldIdLst>
@@ -348,7 +346,7 @@
           <a:p>
             <a:fld id="{6BD974B4-F374-4E74-84D3-1EB7DBF32A2A}" type="datetimeFigureOut">
               <a:rPr lang="nl-BE" smtClean="0"/>
-              <a:t>24/01/2024</a:t>
+              <a:t>21/10/2024</a:t>
             </a:fld>
             <a:endParaRPr lang="nl-BE"/>
           </a:p>
@@ -831,7 +829,7 @@
           <a:p>
             <a:fld id="{A433E747-842D-4EF3-8202-AC54FEC33061}" type="datetime1">
               <a:rPr lang="nl-BE" smtClean="0"/>
-              <a:t>24/01/2024</a:t>
+              <a:t>21/10/2024</a:t>
             </a:fld>
             <a:endParaRPr lang="nl-BE"/>
           </a:p>
@@ -1001,7 +999,7 @@
           <a:p>
             <a:fld id="{7C821354-3381-4DF5-ABED-FDAFA2BAD3F8}" type="datetime1">
               <a:rPr lang="nl-BE" smtClean="0"/>
-              <a:t>24/01/2024</a:t>
+              <a:t>21/10/2024</a:t>
             </a:fld>
             <a:endParaRPr lang="nl-BE"/>
           </a:p>
@@ -1181,7 +1179,7 @@
           <a:p>
             <a:fld id="{C6B54B95-9964-4BBF-B171-A69413AB9FC5}" type="datetime1">
               <a:rPr lang="nl-BE" smtClean="0"/>
-              <a:t>24/01/2024</a:t>
+              <a:t>21/10/2024</a:t>
             </a:fld>
             <a:endParaRPr lang="nl-BE"/>
           </a:p>
@@ -1351,7 +1349,7 @@
           <a:p>
             <a:fld id="{BE45CDE5-064C-4862-90E9-83B8FD778625}" type="datetime1">
               <a:rPr lang="nl-BE" smtClean="0"/>
-              <a:t>24/01/2024</a:t>
+              <a:t>21/10/2024</a:t>
             </a:fld>
             <a:endParaRPr lang="nl-BE"/>
           </a:p>
@@ -1595,7 +1593,7 @@
           <a:p>
             <a:fld id="{C75A345C-628E-463E-B8F7-69C25D344DF5}" type="datetime1">
               <a:rPr lang="nl-BE" smtClean="0"/>
-              <a:t>24/01/2024</a:t>
+              <a:t>21/10/2024</a:t>
             </a:fld>
             <a:endParaRPr lang="nl-BE"/>
           </a:p>
@@ -1827,7 +1825,7 @@
           <a:p>
             <a:fld id="{65B04534-538C-4249-A635-8BB2B8486464}" type="datetime1">
               <a:rPr lang="nl-BE" smtClean="0"/>
-              <a:t>24/01/2024</a:t>
+              <a:t>21/10/2024</a:t>
             </a:fld>
             <a:endParaRPr lang="nl-BE"/>
           </a:p>
@@ -2194,7 +2192,7 @@
           <a:p>
             <a:fld id="{089671CB-8547-4C91-A3D5-012E6E8790E6}" type="datetime1">
               <a:rPr lang="nl-BE" smtClean="0"/>
-              <a:t>24/01/2024</a:t>
+              <a:t>21/10/2024</a:t>
             </a:fld>
             <a:endParaRPr lang="nl-BE"/>
           </a:p>
@@ -2312,7 +2310,7 @@
           <a:p>
             <a:fld id="{5765335F-FC99-4A2B-B87B-6AF6F3762B67}" type="datetime1">
               <a:rPr lang="nl-BE" smtClean="0"/>
-              <a:t>24/01/2024</a:t>
+              <a:t>21/10/2024</a:t>
             </a:fld>
             <a:endParaRPr lang="nl-BE"/>
           </a:p>
@@ -2407,7 +2405,7 @@
           <a:p>
             <a:fld id="{1711BA58-B677-4D21-BDCD-9DD1AEA8A328}" type="datetime1">
               <a:rPr lang="nl-BE" smtClean="0"/>
-              <a:t>24/01/2024</a:t>
+              <a:t>21/10/2024</a:t>
             </a:fld>
             <a:endParaRPr lang="nl-BE"/>
           </a:p>
@@ -2684,7 +2682,7 @@
           <a:p>
             <a:fld id="{5513BE8B-B89C-461B-89D1-D5BE33ADB6B9}" type="datetime1">
               <a:rPr lang="nl-BE" smtClean="0"/>
-              <a:t>24/01/2024</a:t>
+              <a:t>21/10/2024</a:t>
             </a:fld>
             <a:endParaRPr lang="nl-BE"/>
           </a:p>
@@ -2941,7 +2939,7 @@
           <a:p>
             <a:fld id="{AEE65485-0554-4482-9B9C-289893A0B56B}" type="datetime1">
               <a:rPr lang="nl-BE" smtClean="0"/>
-              <a:t>24/01/2024</a:t>
+              <a:t>21/10/2024</a:t>
             </a:fld>
             <a:endParaRPr lang="nl-BE"/>
           </a:p>
@@ -3154,7 +3152,7 @@
           <a:p>
             <a:fld id="{6FF26CEC-AF8A-4096-9A53-521F7571A055}" type="datetime1">
               <a:rPr lang="nl-BE" smtClean="0"/>
-              <a:t>24/01/2024</a:t>
+              <a:t>21/10/2024</a:t>
             </a:fld>
             <a:endParaRPr lang="nl-BE"/>
           </a:p>
@@ -10445,9 +10443,8 @@
           <a:p>
             <a:r>
               <a:rPr lang="en-US" dirty="0"/>
-              <a:t>Mount image</a:t>
-            </a:r>
-            <a:endParaRPr lang="nl-BE" dirty="0"/>
+              <a:t>Remote builds</a:t>
+            </a:r>
           </a:p>
         </p:txBody>
       </p:sp>
@@ -10468,689 +10465,6 @@
           <a:p>
             <a:r>
               <a:rPr lang="en-US" dirty="0"/>
-              <a:t>To manually modify image</a:t>
-            </a:r>
-          </a:p>
-          <a:p>
-            <a:endParaRPr lang="en-US" dirty="0"/>
-          </a:p>
-          <a:p>
-            <a:endParaRPr lang="en-US" dirty="0"/>
-          </a:p>
-          <a:p>
-            <a:endParaRPr lang="en-US" dirty="0"/>
-          </a:p>
-          <a:p>
-            <a:r>
-              <a:rPr lang="en-US" dirty="0"/>
-              <a:t>To inspect/test image (read only)</a:t>
-            </a:r>
-            <a:endParaRPr lang="nl-BE" dirty="0"/>
-          </a:p>
-        </p:txBody>
-      </p:sp>
-      <p:sp>
-        <p:nvSpPr>
-          <p:cNvPr id="4" name="TextBox 3"/>
-          <p:cNvSpPr txBox="1"/>
-          <p:nvPr/>
-        </p:nvSpPr>
-        <p:spPr>
-          <a:xfrm>
-            <a:off x="236766" y="2579918"/>
-            <a:ext cx="6112571" cy="369332"/>
-          </a:xfrm>
-          <a:prstGeom prst="rect">
-            <a:avLst/>
-          </a:prstGeom>
-          <a:solidFill>
-            <a:schemeClr val="tx1"/>
-          </a:solidFill>
-        </p:spPr>
-        <p:txBody>
-          <a:bodyPr wrap="none" rtlCol="0">
-            <a:spAutoFit/>
-          </a:bodyPr>
-          <a:lstStyle/>
-          <a:p>
-            <a:r>
-              <a:rPr lang="en-US" b="1" dirty="0">
-                <a:solidFill>
-                  <a:schemeClr val="bg1"/>
-                </a:solidFill>
-                <a:latin typeface="Courier New" panose="02070309020205020404" pitchFamily="49" charset="0"/>
-                <a:cs typeface="Courier New" panose="02070309020205020404" pitchFamily="49" charset="0"/>
-              </a:rPr>
-              <a:t>$ </a:t>
-            </a:r>
-            <a:r>
-              <a:rPr lang="en-US" b="1" dirty="0" err="1">
-                <a:solidFill>
-                  <a:schemeClr val="bg1"/>
-                </a:solidFill>
-                <a:latin typeface="Courier New" panose="02070309020205020404" pitchFamily="49" charset="0"/>
-                <a:cs typeface="Courier New" panose="02070309020205020404" pitchFamily="49" charset="0"/>
-              </a:rPr>
-              <a:t>sudo</a:t>
-            </a:r>
-            <a:r>
-              <a:rPr lang="en-US" b="1" dirty="0">
-                <a:solidFill>
-                  <a:schemeClr val="bg1"/>
-                </a:solidFill>
-                <a:latin typeface="Courier New" panose="02070309020205020404" pitchFamily="49" charset="0"/>
-                <a:cs typeface="Courier New" panose="02070309020205020404" pitchFamily="49" charset="0"/>
-              </a:rPr>
-              <a:t> </a:t>
-            </a:r>
-            <a:r>
-              <a:rPr lang="en-US" b="1" dirty="0" err="1">
-                <a:solidFill>
-                  <a:schemeClr val="bg1"/>
-                </a:solidFill>
-                <a:latin typeface="Courier New" panose="02070309020205020404" pitchFamily="49" charset="0"/>
-                <a:cs typeface="Courier New" panose="02070309020205020404" pitchFamily="49" charset="0"/>
-              </a:rPr>
-              <a:t>apptainer</a:t>
-            </a:r>
-            <a:r>
-              <a:rPr lang="en-US" b="1" dirty="0">
-                <a:solidFill>
-                  <a:schemeClr val="bg1"/>
-                </a:solidFill>
-                <a:latin typeface="Courier New" panose="02070309020205020404" pitchFamily="49" charset="0"/>
-                <a:cs typeface="Courier New" panose="02070309020205020404" pitchFamily="49" charset="0"/>
-              </a:rPr>
-              <a:t> mount --writable grace.</a:t>
-            </a:r>
-            <a:r>
-              <a:rPr lang="en-BE" b="1" dirty="0" err="1">
-                <a:solidFill>
-                  <a:schemeClr val="bg1"/>
-                </a:solidFill>
-                <a:latin typeface="Courier New" panose="02070309020205020404" pitchFamily="49" charset="0"/>
-                <a:cs typeface="Courier New" panose="02070309020205020404" pitchFamily="49" charset="0"/>
-              </a:rPr>
-              <a:t>sif</a:t>
-            </a:r>
-            <a:endParaRPr lang="nl-BE" b="1" dirty="0">
-              <a:solidFill>
-                <a:schemeClr val="bg1"/>
-              </a:solidFill>
-              <a:latin typeface="Courier New" panose="02070309020205020404" pitchFamily="49" charset="0"/>
-              <a:cs typeface="Courier New" panose="02070309020205020404" pitchFamily="49" charset="0"/>
-            </a:endParaRPr>
-          </a:p>
-        </p:txBody>
-      </p:sp>
-      <p:sp>
-        <p:nvSpPr>
-          <p:cNvPr id="5" name="TextBox 4"/>
-          <p:cNvSpPr txBox="1"/>
-          <p:nvPr/>
-        </p:nvSpPr>
-        <p:spPr>
-          <a:xfrm>
-            <a:off x="236765" y="4561118"/>
-            <a:ext cx="6526147" cy="369332"/>
-          </a:xfrm>
-          <a:prstGeom prst="rect">
-            <a:avLst/>
-          </a:prstGeom>
-          <a:solidFill>
-            <a:schemeClr val="tx1"/>
-          </a:solidFill>
-        </p:spPr>
-        <p:txBody>
-          <a:bodyPr wrap="square" rtlCol="0">
-            <a:spAutoFit/>
-          </a:bodyPr>
-          <a:lstStyle/>
-          <a:p>
-            <a:r>
-              <a:rPr lang="en-US" b="1" dirty="0">
-                <a:solidFill>
-                  <a:schemeClr val="bg1"/>
-                </a:solidFill>
-                <a:latin typeface="Courier New" panose="02070309020205020404" pitchFamily="49" charset="0"/>
-                <a:cs typeface="Courier New" panose="02070309020205020404" pitchFamily="49" charset="0"/>
-              </a:rPr>
-              <a:t>$ </a:t>
-            </a:r>
-            <a:r>
-              <a:rPr lang="en-US" b="1" dirty="0" err="1">
-                <a:solidFill>
-                  <a:schemeClr val="bg1"/>
-                </a:solidFill>
-                <a:latin typeface="Courier New" panose="02070309020205020404" pitchFamily="49" charset="0"/>
-                <a:cs typeface="Courier New" panose="02070309020205020404" pitchFamily="49" charset="0"/>
-              </a:rPr>
-              <a:t>apptainer</a:t>
-            </a:r>
-            <a:r>
-              <a:rPr lang="en-US" b="1" dirty="0">
-                <a:solidFill>
-                  <a:schemeClr val="bg1"/>
-                </a:solidFill>
-                <a:latin typeface="Courier New" panose="02070309020205020404" pitchFamily="49" charset="0"/>
-                <a:cs typeface="Courier New" panose="02070309020205020404" pitchFamily="49" charset="0"/>
-              </a:rPr>
-              <a:t> mount grace.</a:t>
-            </a:r>
-            <a:r>
-              <a:rPr lang="en-BE" b="1" dirty="0" err="1">
-                <a:solidFill>
-                  <a:schemeClr val="bg1"/>
-                </a:solidFill>
-                <a:latin typeface="Courier New" panose="02070309020205020404" pitchFamily="49" charset="0"/>
-                <a:cs typeface="Courier New" panose="02070309020205020404" pitchFamily="49" charset="0"/>
-              </a:rPr>
-              <a:t>sif</a:t>
-            </a:r>
-            <a:endParaRPr lang="nl-BE" b="1" dirty="0">
-              <a:solidFill>
-                <a:schemeClr val="bg1"/>
-              </a:solidFill>
-              <a:latin typeface="Courier New" panose="02070309020205020404" pitchFamily="49" charset="0"/>
-              <a:cs typeface="Courier New" panose="02070309020205020404" pitchFamily="49" charset="0"/>
-            </a:endParaRPr>
-          </a:p>
-        </p:txBody>
-      </p:sp>
-      <p:sp>
-        <p:nvSpPr>
-          <p:cNvPr id="6" name="Slide Number Placeholder 5"/>
-          <p:cNvSpPr>
-            <a:spLocks noGrp="1"/>
-          </p:cNvSpPr>
-          <p:nvPr>
-            <p:ph type="sldNum" sz="quarter" idx="12"/>
-          </p:nvPr>
-        </p:nvSpPr>
-        <p:spPr/>
-        <p:txBody>
-          <a:bodyPr/>
-          <a:lstStyle/>
-          <a:p>
-            <a:fld id="{AEFF399F-E3B5-4890-BC79-9BC8D4DF3F2D}" type="slidenum">
-              <a:rPr lang="nl-BE" smtClean="0"/>
-              <a:t>21</a:t>
-            </a:fld>
-            <a:endParaRPr lang="nl-BE"/>
-          </a:p>
-        </p:txBody>
-      </p:sp>
-      <p:sp>
-        <p:nvSpPr>
-          <p:cNvPr id="7" name="TextBox 6"/>
-          <p:cNvSpPr txBox="1"/>
-          <p:nvPr/>
-        </p:nvSpPr>
-        <p:spPr>
-          <a:xfrm>
-            <a:off x="6457950" y="1690689"/>
-            <a:ext cx="2053960" cy="923330"/>
-          </a:xfrm>
-          <a:prstGeom prst="rect">
-            <a:avLst/>
-          </a:prstGeom>
-          <a:solidFill>
-            <a:schemeClr val="bg1"/>
-          </a:solidFill>
-          <a:ln>
-            <a:solidFill>
-              <a:schemeClr val="tx1"/>
-            </a:solidFill>
-          </a:ln>
-        </p:spPr>
-        <p:txBody>
-          <a:bodyPr wrap="none" rtlCol="0">
-            <a:spAutoFit/>
-          </a:bodyPr>
-          <a:lstStyle/>
-          <a:p>
-            <a:r>
-              <a:rPr lang="en-US" dirty="0"/>
-              <a:t>Only to experiment,</a:t>
-            </a:r>
-            <a:br>
-              <a:rPr lang="en-US" dirty="0"/>
-            </a:br>
-            <a:r>
-              <a:rPr lang="en-US" dirty="0"/>
-              <a:t>not as part of final</a:t>
-            </a:r>
-            <a:br>
-              <a:rPr lang="en-US" dirty="0"/>
-            </a:br>
-            <a:r>
-              <a:rPr lang="en-US" dirty="0"/>
-              <a:t>setup!</a:t>
-            </a:r>
-            <a:endParaRPr lang="nl-BE" dirty="0"/>
-          </a:p>
-        </p:txBody>
-      </p:sp>
-      <p:sp>
-        <p:nvSpPr>
-          <p:cNvPr id="9" name="TextBox 8"/>
-          <p:cNvSpPr txBox="1"/>
-          <p:nvPr/>
-        </p:nvSpPr>
-        <p:spPr>
-          <a:xfrm>
-            <a:off x="1606163" y="3237678"/>
-            <a:ext cx="6394828" cy="400110"/>
-          </a:xfrm>
-          <a:prstGeom prst="rect">
-            <a:avLst/>
-          </a:prstGeom>
-          <a:noFill/>
-          <a:ln>
-            <a:solidFill>
-              <a:schemeClr val="tx1"/>
-            </a:solidFill>
-          </a:ln>
-        </p:spPr>
-        <p:txBody>
-          <a:bodyPr wrap="none" rtlCol="0">
-            <a:spAutoFit/>
-          </a:bodyPr>
-          <a:lstStyle/>
-          <a:p>
-            <a:r>
-              <a:rPr lang="en-US" sz="2000" dirty="0"/>
-              <a:t>Note: mounted in </a:t>
-            </a:r>
-            <a:r>
-              <a:rPr lang="en-US" sz="2000" dirty="0">
-                <a:latin typeface="Courier New" panose="02070309020205020404" pitchFamily="49" charset="0"/>
-                <a:cs typeface="Courier New" panose="02070309020205020404" pitchFamily="49" charset="0"/>
-              </a:rPr>
-              <a:t>/var/lib/</a:t>
-            </a:r>
-            <a:r>
-              <a:rPr lang="en-US" sz="2000" dirty="0" err="1">
-                <a:latin typeface="Courier New" panose="02070309020205020404" pitchFamily="49" charset="0"/>
-                <a:cs typeface="Courier New" panose="02070309020205020404" pitchFamily="49" charset="0"/>
-              </a:rPr>
-              <a:t>apptainer</a:t>
-            </a:r>
-            <a:r>
-              <a:rPr lang="en-US" sz="2000" dirty="0">
-                <a:latin typeface="Courier New" panose="02070309020205020404" pitchFamily="49" charset="0"/>
-                <a:cs typeface="Courier New" panose="02070309020205020404" pitchFamily="49" charset="0"/>
-              </a:rPr>
-              <a:t>/</a:t>
-            </a:r>
-            <a:r>
-              <a:rPr lang="en-US" sz="2000" dirty="0" err="1">
-                <a:latin typeface="Courier New" panose="02070309020205020404" pitchFamily="49" charset="0"/>
-                <a:cs typeface="Courier New" panose="02070309020205020404" pitchFamily="49" charset="0"/>
-              </a:rPr>
-              <a:t>mnt</a:t>
-            </a:r>
-            <a:r>
-              <a:rPr lang="en-US" sz="2000" dirty="0">
-                <a:latin typeface="Courier New" panose="02070309020205020404" pitchFamily="49" charset="0"/>
-                <a:cs typeface="Courier New" panose="02070309020205020404" pitchFamily="49" charset="0"/>
-              </a:rPr>
-              <a:t>/final</a:t>
-            </a:r>
-          </a:p>
-        </p:txBody>
-      </p:sp>
-    </p:spTree>
-    <p:extLst>
-      <p:ext uri="{BB962C8B-B14F-4D97-AF65-F5344CB8AC3E}">
-        <p14:creationId xmlns:p14="http://schemas.microsoft.com/office/powerpoint/2010/main" val="1462311868"/>
-      </p:ext>
-    </p:extLst>
-  </p:cSld>
-  <p:clrMapOvr>
-    <a:masterClrMapping/>
-  </p:clrMapOvr>
-  <p:timing>
-    <p:tnLst>
-      <p:par>
-        <p:cTn id="1" dur="indefinite" restart="never" nodeType="tmRoot">
-          <p:childTnLst>
-            <p:seq concurrent="1" nextAc="seek">
-              <p:cTn id="2" dur="indefinite" nodeType="mainSeq">
-                <p:childTnLst>
-                  <p:par>
-                    <p:cTn id="3" fill="hold">
-                      <p:stCondLst>
-                        <p:cond delay="indefinite"/>
-                        <p:cond evt="onBegin" delay="0">
-                          <p:tn val="2"/>
-                        </p:cond>
-                      </p:stCondLst>
-                      <p:childTnLst>
-                        <p:par>
-                          <p:cTn id="4" fill="hold">
-                            <p:stCondLst>
-                              <p:cond delay="0"/>
-                            </p:stCondLst>
-                            <p:childTnLst>
-                              <p:par>
-                                <p:cTn id="5" presetID="1" presetClass="entr" presetSubtype="0" fill="hold" grpId="0" nodeType="withEffect">
-                                  <p:stCondLst>
-                                    <p:cond delay="0"/>
-                                  </p:stCondLst>
-                                  <p:childTnLst>
-                                    <p:set>
-                                      <p:cBhvr>
-                                        <p:cTn id="6" dur="1" fill="hold">
-                                          <p:stCondLst>
-                                            <p:cond delay="0"/>
-                                          </p:stCondLst>
-                                        </p:cTn>
-                                        <p:tgtEl>
-                                          <p:spTgt spid="3">
-                                            <p:txEl>
-                                              <p:pRg st="0" end="0"/>
-                                            </p:txEl>
-                                          </p:spTgt>
-                                        </p:tgtEl>
-                                        <p:attrNameLst>
-                                          <p:attrName>style.visibility</p:attrName>
-                                        </p:attrNameLst>
-                                      </p:cBhvr>
-                                      <p:to>
-                                        <p:strVal val="visible"/>
-                                      </p:to>
-                                    </p:set>
-                                  </p:childTnLst>
-                                </p:cTn>
-                              </p:par>
-                              <p:par>
-                                <p:cTn id="7" presetID="1" presetClass="entr" presetSubtype="0" fill="hold" grpId="0" nodeType="withEffect">
-                                  <p:stCondLst>
-                                    <p:cond delay="0"/>
-                                  </p:stCondLst>
-                                  <p:childTnLst>
-                                    <p:set>
-                                      <p:cBhvr>
-                                        <p:cTn id="8" dur="1" fill="hold">
-                                          <p:stCondLst>
-                                            <p:cond delay="0"/>
-                                          </p:stCondLst>
-                                        </p:cTn>
-                                        <p:tgtEl>
-                                          <p:spTgt spid="4"/>
-                                        </p:tgtEl>
-                                        <p:attrNameLst>
-                                          <p:attrName>style.visibility</p:attrName>
-                                        </p:attrNameLst>
-                                      </p:cBhvr>
-                                      <p:to>
-                                        <p:strVal val="visible"/>
-                                      </p:to>
-                                    </p:set>
-                                  </p:childTnLst>
-                                </p:cTn>
-                              </p:par>
-                            </p:childTnLst>
-                          </p:cTn>
-                        </p:par>
-                      </p:childTnLst>
-                    </p:cTn>
-                  </p:par>
-                  <p:par>
-                    <p:cTn id="9" fill="hold">
-                      <p:stCondLst>
-                        <p:cond delay="indefinite"/>
-                      </p:stCondLst>
-                      <p:childTnLst>
-                        <p:par>
-                          <p:cTn id="10" fill="hold">
-                            <p:stCondLst>
-                              <p:cond delay="0"/>
-                            </p:stCondLst>
-                            <p:childTnLst>
-                              <p:par>
-                                <p:cTn id="11" presetID="1" presetClass="entr" presetSubtype="0" fill="hold" grpId="0" nodeType="clickEffect">
-                                  <p:stCondLst>
-                                    <p:cond delay="0"/>
-                                  </p:stCondLst>
-                                  <p:childTnLst>
-                                    <p:set>
-                                      <p:cBhvr>
-                                        <p:cTn id="12" dur="1" fill="hold">
-                                          <p:stCondLst>
-                                            <p:cond delay="0"/>
-                                          </p:stCondLst>
-                                        </p:cTn>
-                                        <p:tgtEl>
-                                          <p:spTgt spid="7"/>
-                                        </p:tgtEl>
-                                        <p:attrNameLst>
-                                          <p:attrName>style.visibility</p:attrName>
-                                        </p:attrNameLst>
-                                      </p:cBhvr>
-                                      <p:to>
-                                        <p:strVal val="visible"/>
-                                      </p:to>
-                                    </p:set>
-                                  </p:childTnLst>
-                                </p:cTn>
-                              </p:par>
-                            </p:childTnLst>
-                          </p:cTn>
-                        </p:par>
-                      </p:childTnLst>
-                    </p:cTn>
-                  </p:par>
-                  <p:par>
-                    <p:cTn id="13" fill="hold">
-                      <p:stCondLst>
-                        <p:cond delay="indefinite"/>
-                      </p:stCondLst>
-                      <p:childTnLst>
-                        <p:par>
-                          <p:cTn id="14" fill="hold">
-                            <p:stCondLst>
-                              <p:cond delay="0"/>
-                            </p:stCondLst>
-                            <p:childTnLst>
-                              <p:par>
-                                <p:cTn id="15" presetID="1" presetClass="entr" presetSubtype="0" fill="hold" grpId="0" nodeType="clickEffect">
-                                  <p:stCondLst>
-                                    <p:cond delay="0"/>
-                                  </p:stCondLst>
-                                  <p:childTnLst>
-                                    <p:set>
-                                      <p:cBhvr>
-                                        <p:cTn id="16" dur="1" fill="hold">
-                                          <p:stCondLst>
-                                            <p:cond delay="0"/>
-                                          </p:stCondLst>
-                                        </p:cTn>
-                                        <p:tgtEl>
-                                          <p:spTgt spid="9"/>
-                                        </p:tgtEl>
-                                        <p:attrNameLst>
-                                          <p:attrName>style.visibility</p:attrName>
-                                        </p:attrNameLst>
-                                      </p:cBhvr>
-                                      <p:to>
-                                        <p:strVal val="visible"/>
-                                      </p:to>
-                                    </p:set>
-                                  </p:childTnLst>
-                                </p:cTn>
-                              </p:par>
-                            </p:childTnLst>
-                          </p:cTn>
-                        </p:par>
-                      </p:childTnLst>
-                    </p:cTn>
-                  </p:par>
-                  <p:par>
-                    <p:cTn id="17" fill="hold">
-                      <p:stCondLst>
-                        <p:cond delay="indefinite"/>
-                      </p:stCondLst>
-                      <p:childTnLst>
-                        <p:par>
-                          <p:cTn id="18" fill="hold">
-                            <p:stCondLst>
-                              <p:cond delay="0"/>
-                            </p:stCondLst>
-                            <p:childTnLst>
-                              <p:par>
-                                <p:cTn id="19" presetID="1" presetClass="entr" presetSubtype="0" fill="hold" grpId="0" nodeType="clickEffect">
-                                  <p:stCondLst>
-                                    <p:cond delay="0"/>
-                                  </p:stCondLst>
-                                  <p:childTnLst>
-                                    <p:set>
-                                      <p:cBhvr>
-                                        <p:cTn id="20" dur="1" fill="hold">
-                                          <p:stCondLst>
-                                            <p:cond delay="0"/>
-                                          </p:stCondLst>
-                                        </p:cTn>
-                                        <p:tgtEl>
-                                          <p:spTgt spid="3">
-                                            <p:txEl>
-                                              <p:pRg st="4" end="4"/>
-                                            </p:txEl>
-                                          </p:spTgt>
-                                        </p:tgtEl>
-                                        <p:attrNameLst>
-                                          <p:attrName>style.visibility</p:attrName>
-                                        </p:attrNameLst>
-                                      </p:cBhvr>
-                                      <p:to>
-                                        <p:strVal val="visible"/>
-                                      </p:to>
-                                    </p:set>
-                                  </p:childTnLst>
-                                </p:cTn>
-                              </p:par>
-                              <p:par>
-                                <p:cTn id="21" presetID="1" presetClass="entr" presetSubtype="0" fill="hold" grpId="0" nodeType="withEffect">
-                                  <p:stCondLst>
-                                    <p:cond delay="0"/>
-                                  </p:stCondLst>
-                                  <p:childTnLst>
-                                    <p:set>
-                                      <p:cBhvr>
-                                        <p:cTn id="22" dur="1" fill="hold">
-                                          <p:stCondLst>
-                                            <p:cond delay="0"/>
-                                          </p:stCondLst>
-                                        </p:cTn>
-                                        <p:tgtEl>
-                                          <p:spTgt spid="5"/>
-                                        </p:tgtEl>
-                                        <p:attrNameLst>
-                                          <p:attrName>style.visibility</p:attrName>
-                                        </p:attrNameLst>
-                                      </p:cBhvr>
-                                      <p:to>
-                                        <p:strVal val="visible"/>
-                                      </p:to>
-                                    </p:set>
-                                  </p:childTnLst>
-                                </p:cTn>
-                              </p:par>
-                            </p:childTnLst>
-                          </p:cTn>
-                        </p:par>
-                      </p:childTnLst>
-                    </p:cTn>
-                  </p:par>
-                </p:childTnLst>
-              </p:cTn>
-              <p:prevCondLst>
-                <p:cond evt="onPrev" delay="0">
-                  <p:tgtEl>
-                    <p:sldTgt/>
-                  </p:tgtEl>
-                </p:cond>
-              </p:prevCondLst>
-              <p:nextCondLst>
-                <p:cond evt="onNext" delay="0">
-                  <p:tgtEl>
-                    <p:sldTgt/>
-                  </p:tgtEl>
-                </p:cond>
-              </p:nextCondLst>
-            </p:seq>
-          </p:childTnLst>
-        </p:cTn>
-      </p:par>
-    </p:tnLst>
-    <p:bldLst>
-      <p:bldP spid="3" grpId="0" uiExpand="1" build="p"/>
-      <p:bldP spid="4" grpId="0" animBg="1"/>
-      <p:bldP spid="5" grpId="0" animBg="1"/>
-      <p:bldP spid="7" grpId="0" animBg="1"/>
-      <p:bldP spid="9" grpId="0" animBg="1"/>
-    </p:bldLst>
-  </p:timing>
-</p:sld>
-</file>
-
-<file path=ppt/slides/slide22.xml><?xml version="1.0" encoding="utf-8"?>
-<p:sld xmlns:a="http://schemas.openxmlformats.org/drawingml/2006/main" xmlns:r="http://schemas.openxmlformats.org/officeDocument/2006/relationships" xmlns:p="http://schemas.openxmlformats.org/presentationml/2006/main">
-  <p:cSld>
-    <p:spTree>
-      <p:nvGrpSpPr>
-        <p:cNvPr id="1" name=""/>
-        <p:cNvGrpSpPr/>
-        <p:nvPr/>
-      </p:nvGrpSpPr>
-      <p:grpSpPr>
-        <a:xfrm>
-          <a:off x="0" y="0"/>
-          <a:ext cx="0" cy="0"/>
-          <a:chOff x="0" y="0"/>
-          <a:chExt cx="0" cy="0"/>
-        </a:xfrm>
-      </p:grpSpPr>
-      <p:sp>
-        <p:nvSpPr>
-          <p:cNvPr id="2" name="Title 1"/>
-          <p:cNvSpPr>
-            <a:spLocks noGrp="1"/>
-          </p:cNvSpPr>
-          <p:nvPr>
-            <p:ph type="title"/>
-          </p:nvPr>
-        </p:nvSpPr>
-        <p:spPr/>
-        <p:txBody>
-          <a:bodyPr/>
-          <a:lstStyle/>
-          <a:p>
-            <a:r>
-              <a:rPr lang="en-US" dirty="0"/>
-              <a:t>Remote builds</a:t>
-            </a:r>
-          </a:p>
-        </p:txBody>
-      </p:sp>
-      <p:sp>
-        <p:nvSpPr>
-          <p:cNvPr id="3" name="Content Placeholder 2"/>
-          <p:cNvSpPr>
-            <a:spLocks noGrp="1"/>
-          </p:cNvSpPr>
-          <p:nvPr>
-            <p:ph idx="1"/>
-          </p:nvPr>
-        </p:nvSpPr>
-        <p:spPr/>
-        <p:txBody>
-          <a:bodyPr/>
-          <a:lstStyle/>
-          <a:p>
-            <a:r>
-              <a:rPr lang="en-US" dirty="0"/>
               <a:t>Requires account at Sylabs.io</a:t>
             </a:r>
           </a:p>
@@ -11178,61 +10492,6 @@
             <a:r>
               <a:rPr lang="en-US" dirty="0"/>
               <a:t>requires Singularity definition file</a:t>
-            </a:r>
-          </a:p>
-          <a:p>
-            <a:r>
-              <a:rPr lang="en-US" dirty="0"/>
-              <a:t>Build using command line</a:t>
-            </a:r>
-          </a:p>
-          <a:p>
-            <a:pPr lvl="1"/>
-            <a:r>
-              <a:rPr lang="en-US" dirty="0"/>
-              <a:t>create application token at Sylabs.io, install in </a:t>
-            </a:r>
-            <a:r>
-              <a:rPr lang="en-US" dirty="0">
-                <a:latin typeface="Courier New" panose="02070309020205020404" pitchFamily="49" charset="0"/>
-                <a:cs typeface="Courier New" panose="02070309020205020404" pitchFamily="49" charset="0"/>
-              </a:rPr>
-              <a:t>~/.</a:t>
-            </a:r>
-            <a:r>
-              <a:rPr lang="en-US" dirty="0" err="1">
-                <a:latin typeface="Courier New" panose="02070309020205020404" pitchFamily="49" charset="0"/>
-                <a:cs typeface="Courier New" panose="02070309020205020404" pitchFamily="49" charset="0"/>
-              </a:rPr>
-              <a:t>apptainer</a:t>
-            </a:r>
-            <a:r>
-              <a:rPr lang="en-US" dirty="0">
-                <a:latin typeface="Courier New" panose="02070309020205020404" pitchFamily="49" charset="0"/>
-                <a:cs typeface="Courier New" panose="02070309020205020404" pitchFamily="49" charset="0"/>
-              </a:rPr>
-              <a:t>/</a:t>
-            </a:r>
-            <a:r>
-              <a:rPr lang="en-US" dirty="0" err="1">
-                <a:latin typeface="Courier New" panose="02070309020205020404" pitchFamily="49" charset="0"/>
-                <a:cs typeface="Courier New" panose="02070309020205020404" pitchFamily="49" charset="0"/>
-              </a:rPr>
-              <a:t>sylabs</a:t>
-            </a:r>
-            <a:r>
-              <a:rPr lang="en-US" dirty="0">
-                <a:latin typeface="Courier New" panose="02070309020205020404" pitchFamily="49" charset="0"/>
-                <a:cs typeface="Courier New" panose="02070309020205020404" pitchFamily="49" charset="0"/>
-              </a:rPr>
-              <a:t>-token</a:t>
-            </a:r>
-          </a:p>
-          <a:p>
-            <a:pPr lvl="1"/>
-            <a:r>
-              <a:rPr lang="en-US" dirty="0"/>
-              <a:t>build using</a:t>
             </a:r>
           </a:p>
         </p:txBody>
@@ -11254,138 +10513,9 @@
           <a:p>
             <a:fld id="{AEFF399F-E3B5-4890-BC79-9BC8D4DF3F2D}" type="slidenum">
               <a:rPr lang="nl-BE" smtClean="0"/>
-              <a:t>22</a:t>
+              <a:t>21</a:t>
             </a:fld>
             <a:endParaRPr lang="nl-BE"/>
-          </a:p>
-        </p:txBody>
-      </p:sp>
-      <p:sp>
-        <p:nvSpPr>
-          <p:cNvPr id="5" name="TextBox 4"/>
-          <p:cNvSpPr txBox="1"/>
-          <p:nvPr/>
-        </p:nvSpPr>
-        <p:spPr>
-          <a:xfrm>
-            <a:off x="791937" y="5294620"/>
-            <a:ext cx="6801862" cy="369332"/>
-          </a:xfrm>
-          <a:prstGeom prst="rect">
-            <a:avLst/>
-          </a:prstGeom>
-          <a:solidFill>
-            <a:schemeClr val="tx1"/>
-          </a:solidFill>
-        </p:spPr>
-        <p:txBody>
-          <a:bodyPr wrap="none" rtlCol="0">
-            <a:spAutoFit/>
-          </a:bodyPr>
-          <a:lstStyle/>
-          <a:p>
-            <a:r>
-              <a:rPr lang="en-US" b="1" dirty="0">
-                <a:solidFill>
-                  <a:schemeClr val="bg1"/>
-                </a:solidFill>
-                <a:latin typeface="Courier New" panose="02070309020205020404" pitchFamily="49" charset="0"/>
-                <a:cs typeface="Courier New" panose="02070309020205020404" pitchFamily="49" charset="0"/>
-              </a:rPr>
-              <a:t>$ </a:t>
-            </a:r>
-            <a:r>
-              <a:rPr lang="en-US" b="1" dirty="0" err="1">
-                <a:solidFill>
-                  <a:schemeClr val="bg1"/>
-                </a:solidFill>
-                <a:latin typeface="Courier New" panose="02070309020205020404" pitchFamily="49" charset="0"/>
-                <a:cs typeface="Courier New" panose="02070309020205020404" pitchFamily="49" charset="0"/>
-              </a:rPr>
-              <a:t>apptainer</a:t>
-            </a:r>
-            <a:r>
-              <a:rPr lang="en-US" b="1" dirty="0">
-                <a:solidFill>
-                  <a:schemeClr val="bg1"/>
-                </a:solidFill>
-                <a:latin typeface="Courier New" panose="02070309020205020404" pitchFamily="49" charset="0"/>
-                <a:cs typeface="Courier New" panose="02070309020205020404" pitchFamily="49" charset="0"/>
-              </a:rPr>
-              <a:t> build  --remote  </a:t>
-            </a:r>
-            <a:r>
-              <a:rPr lang="en-US" b="1" dirty="0" err="1">
-                <a:solidFill>
-                  <a:schemeClr val="bg1"/>
-                </a:solidFill>
-                <a:latin typeface="Courier New" panose="02070309020205020404" pitchFamily="49" charset="0"/>
-                <a:cs typeface="Courier New" panose="02070309020205020404" pitchFamily="49" charset="0"/>
-              </a:rPr>
-              <a:t>grace.sif</a:t>
-            </a:r>
-            <a:r>
-              <a:rPr lang="en-US" b="1" dirty="0">
-                <a:solidFill>
-                  <a:schemeClr val="bg1"/>
-                </a:solidFill>
-                <a:latin typeface="Courier New" panose="02070309020205020404" pitchFamily="49" charset="0"/>
-                <a:cs typeface="Courier New" panose="02070309020205020404" pitchFamily="49" charset="0"/>
-              </a:rPr>
-              <a:t> grace.def</a:t>
-            </a:r>
-            <a:endParaRPr lang="nl-BE" b="1" dirty="0">
-              <a:solidFill>
-                <a:schemeClr val="bg1"/>
-              </a:solidFill>
-              <a:latin typeface="Courier New" panose="02070309020205020404" pitchFamily="49" charset="0"/>
-              <a:cs typeface="Courier New" panose="02070309020205020404" pitchFamily="49" charset="0"/>
-            </a:endParaRPr>
-          </a:p>
-        </p:txBody>
-      </p:sp>
-      <p:sp>
-        <p:nvSpPr>
-          <p:cNvPr id="6" name="TextBox 5"/>
-          <p:cNvSpPr txBox="1"/>
-          <p:nvPr/>
-        </p:nvSpPr>
-        <p:spPr>
-          <a:xfrm>
-            <a:off x="4690976" y="5901244"/>
-            <a:ext cx="2592313" cy="461665"/>
-          </a:xfrm>
-          <a:prstGeom prst="rect">
-            <a:avLst/>
-          </a:prstGeom>
-          <a:noFill/>
-          <a:ln>
-            <a:solidFill>
-              <a:schemeClr val="tx1"/>
-            </a:solidFill>
-          </a:ln>
-        </p:spPr>
-        <p:txBody>
-          <a:bodyPr wrap="none" rtlCol="0">
-            <a:spAutoFit/>
-          </a:bodyPr>
-          <a:lstStyle/>
-          <a:p>
-            <a:r>
-              <a:rPr lang="en-US" sz="2400" dirty="0"/>
-              <a:t>No </a:t>
-            </a:r>
-            <a:r>
-              <a:rPr lang="en-US" sz="2400" dirty="0" err="1">
-                <a:latin typeface="Courier New" panose="02070309020205020404" pitchFamily="49" charset="0"/>
-                <a:cs typeface="Courier New" panose="02070309020205020404" pitchFamily="49" charset="0"/>
-              </a:rPr>
-              <a:t>sudo</a:t>
-            </a:r>
-            <a:r>
-              <a:rPr lang="en-US" sz="2400" dirty="0"/>
-              <a:t> required!</a:t>
-            </a:r>
           </a:p>
         </p:txBody>
       </p:sp>
@@ -11570,189 +10700,6 @@
                       </p:childTnLst>
                     </p:cTn>
                   </p:par>
-                  <p:par>
-                    <p:cTn id="15" fill="hold">
-                      <p:stCondLst>
-                        <p:cond delay="indefinite"/>
-                      </p:stCondLst>
-                      <p:childTnLst>
-                        <p:par>
-                          <p:cTn id="16" fill="hold">
-                            <p:stCondLst>
-                              <p:cond delay="0"/>
-                            </p:stCondLst>
-                            <p:childTnLst>
-                              <p:par>
-                                <p:cTn id="17" presetID="1" presetClass="entr" presetSubtype="0" fill="hold" grpId="0" nodeType="clickEffect">
-                                  <p:stCondLst>
-                                    <p:cond delay="0"/>
-                                  </p:stCondLst>
-                                  <p:childTnLst>
-                                    <p:set>
-                                      <p:cBhvr>
-                                        <p:cTn id="18" dur="1" fill="hold">
-                                          <p:stCondLst>
-                                            <p:cond delay="0"/>
-                                          </p:stCondLst>
-                                        </p:cTn>
-                                        <p:tgtEl>
-                                          <p:spTgt spid="3">
-                                            <p:txEl>
-                                              <p:pRg st="4" end="4"/>
-                                            </p:txEl>
-                                          </p:spTgt>
-                                        </p:tgtEl>
-                                        <p:attrNameLst>
-                                          <p:attrName>style.visibility</p:attrName>
-                                        </p:attrNameLst>
-                                      </p:cBhvr>
-                                      <p:to>
-                                        <p:strVal val="visible"/>
-                                      </p:to>
-                                    </p:set>
-                                  </p:childTnLst>
-                                </p:cTn>
-                              </p:par>
-                              <p:par>
-                                <p:cTn id="19" presetID="1" presetClass="entr" presetSubtype="0" fill="hold" grpId="0" nodeType="withEffect">
-                                  <p:stCondLst>
-                                    <p:cond delay="0"/>
-                                  </p:stCondLst>
-                                  <p:childTnLst>
-                                    <p:set>
-                                      <p:cBhvr>
-                                        <p:cTn id="20" dur="1" fill="hold">
-                                          <p:stCondLst>
-                                            <p:cond delay="0"/>
-                                          </p:stCondLst>
-                                        </p:cTn>
-                                        <p:tgtEl>
-                                          <p:spTgt spid="3">
-                                            <p:txEl>
-                                              <p:pRg st="5" end="5"/>
-                                            </p:txEl>
-                                          </p:spTgt>
-                                        </p:tgtEl>
-                                        <p:attrNameLst>
-                                          <p:attrName>style.visibility</p:attrName>
-                                        </p:attrNameLst>
-                                      </p:cBhvr>
-                                      <p:to>
-                                        <p:strVal val="visible"/>
-                                      </p:to>
-                                    </p:set>
-                                  </p:childTnLst>
-                                </p:cTn>
-                              </p:par>
-                              <p:par>
-                                <p:cTn id="21" presetID="1" presetClass="entr" presetSubtype="0" fill="hold" grpId="0" nodeType="withEffect">
-                                  <p:stCondLst>
-                                    <p:cond delay="0"/>
-                                  </p:stCondLst>
-                                  <p:childTnLst>
-                                    <p:set>
-                                      <p:cBhvr>
-                                        <p:cTn id="22" dur="1" fill="hold">
-                                          <p:stCondLst>
-                                            <p:cond delay="0"/>
-                                          </p:stCondLst>
-                                        </p:cTn>
-                                        <p:tgtEl>
-                                          <p:spTgt spid="3">
-                                            <p:txEl>
-                                              <p:pRg st="6" end="6"/>
-                                            </p:txEl>
-                                          </p:spTgt>
-                                        </p:tgtEl>
-                                        <p:attrNameLst>
-                                          <p:attrName>style.visibility</p:attrName>
-                                        </p:attrNameLst>
-                                      </p:cBhvr>
-                                      <p:to>
-                                        <p:strVal val="visible"/>
-                                      </p:to>
-                                    </p:set>
-                                  </p:childTnLst>
-                                </p:cTn>
-                              </p:par>
-                              <p:par>
-                                <p:cTn id="23" presetID="1" presetClass="entr" presetSubtype="0" fill="hold" grpId="0" nodeType="withEffect">
-                                  <p:stCondLst>
-                                    <p:cond delay="0"/>
-                                  </p:stCondLst>
-                                  <p:childTnLst>
-                                    <p:set>
-                                      <p:cBhvr>
-                                        <p:cTn id="24" dur="1" fill="hold">
-                                          <p:stCondLst>
-                                            <p:cond delay="0"/>
-                                          </p:stCondLst>
-                                        </p:cTn>
-                                        <p:tgtEl>
-                                          <p:spTgt spid="5"/>
-                                        </p:tgtEl>
-                                        <p:attrNameLst>
-                                          <p:attrName>style.visibility</p:attrName>
-                                        </p:attrNameLst>
-                                      </p:cBhvr>
-                                      <p:to>
-                                        <p:strVal val="visible"/>
-                                      </p:to>
-                                    </p:set>
-                                  </p:childTnLst>
-                                </p:cTn>
-                              </p:par>
-                            </p:childTnLst>
-                          </p:cTn>
-                        </p:par>
-                      </p:childTnLst>
-                    </p:cTn>
-                  </p:par>
-                  <p:par>
-                    <p:cTn id="25" fill="hold">
-                      <p:stCondLst>
-                        <p:cond delay="indefinite"/>
-                      </p:stCondLst>
-                      <p:childTnLst>
-                        <p:par>
-                          <p:cTn id="26" fill="hold">
-                            <p:stCondLst>
-                              <p:cond delay="0"/>
-                            </p:stCondLst>
-                            <p:childTnLst>
-                              <p:par>
-                                <p:cTn id="27" presetID="1" presetClass="entr" presetSubtype="0" fill="hold" grpId="0" nodeType="clickEffect">
-                                  <p:stCondLst>
-                                    <p:cond delay="0"/>
-                                  </p:stCondLst>
-                                  <p:childTnLst>
-                                    <p:set>
-                                      <p:cBhvr>
-                                        <p:cTn id="28" dur="1" fill="hold">
-                                          <p:stCondLst>
-                                            <p:cond delay="0"/>
-                                          </p:stCondLst>
-                                        </p:cTn>
-                                        <p:tgtEl>
-                                          <p:spTgt spid="6"/>
-                                        </p:tgtEl>
-                                        <p:attrNameLst>
-                                          <p:attrName>style.visibility</p:attrName>
-                                        </p:attrNameLst>
-                                      </p:cBhvr>
-                                      <p:to>
-                                        <p:strVal val="visible"/>
-                                      </p:to>
-                                    </p:set>
-                                  </p:childTnLst>
-                                </p:cTn>
-                              </p:par>
-                            </p:childTnLst>
-                          </p:cTn>
-                        </p:par>
-                      </p:childTnLst>
-                    </p:cTn>
-                  </p:par>
                 </p:childTnLst>
               </p:cTn>
               <p:prevCondLst>
@@ -11776,14 +10723,12 @@
     </p:tnLst>
     <p:bldLst>
       <p:bldP spid="3" grpId="0" uiExpand="1" build="p"/>
-      <p:bldP spid="5" grpId="0" animBg="1"/>
-      <p:bldP spid="6" grpId="0" animBg="1"/>
     </p:bldLst>
   </p:timing>
 </p:sld>
 </file>
 
-<file path=ppt/slides/slide23.xml><?xml version="1.0" encoding="utf-8"?>
+<file path=ppt/slides/slide22.xml><?xml version="1.0" encoding="utf-8"?>
 <p:sld xmlns:a="http://schemas.openxmlformats.org/drawingml/2006/main" xmlns:r="http://schemas.openxmlformats.org/officeDocument/2006/relationships" xmlns:p="http://schemas.openxmlformats.org/presentationml/2006/main">
   <p:cSld>
     <p:spTree>
@@ -11839,7 +10784,7 @@
           <a:p>
             <a:fld id="{AEFF399F-E3B5-4890-BC79-9BC8D4DF3F2D}" type="slidenum">
               <a:rPr lang="nl-BE" smtClean="0"/>
-              <a:t>23</a:t>
+              <a:t>22</a:t>
             </a:fld>
             <a:endParaRPr lang="nl-BE"/>
           </a:p>
@@ -11882,7 +10827,7 @@
 </p:sld>
 </file>
 
-<file path=ppt/slides/slide24.xml><?xml version="1.0" encoding="utf-8"?>
+<file path=ppt/slides/slide23.xml><?xml version="1.0" encoding="utf-8"?>
 <p:sld xmlns:a="http://schemas.openxmlformats.org/drawingml/2006/main" xmlns:r="http://schemas.openxmlformats.org/officeDocument/2006/relationships" xmlns:p="http://schemas.openxmlformats.org/presentationml/2006/main">
   <p:cSld>
     <p:spTree>
@@ -12040,7 +10985,7 @@
           <a:p>
             <a:fld id="{AEFF399F-E3B5-4890-BC79-9BC8D4DF3F2D}" type="slidenum">
               <a:rPr lang="nl-BE" smtClean="0"/>
-              <a:t>24</a:t>
+              <a:t>23</a:t>
             </a:fld>
             <a:endParaRPr lang="nl-BE"/>
           </a:p>
@@ -12471,7 +11416,7 @@
 </p:sld>
 </file>
 
-<file path=ppt/slides/slide25.xml><?xml version="1.0" encoding="utf-8"?>
+<file path=ppt/slides/slide24.xml><?xml version="1.0" encoding="utf-8"?>
 <p:sld xmlns:a="http://schemas.openxmlformats.org/drawingml/2006/main" xmlns:r="http://schemas.openxmlformats.org/officeDocument/2006/relationships" xmlns:p="http://schemas.openxmlformats.org/presentationml/2006/main">
   <p:cSld>
     <p:spTree>
@@ -12544,7 +11489,7 @@
           <a:p>
             <a:fld id="{AEFF399F-E3B5-4890-BC79-9BC8D4DF3F2D}" type="slidenum">
               <a:rPr lang="nl-BE" smtClean="0"/>
-              <a:t>25</a:t>
+              <a:t>24</a:t>
             </a:fld>
             <a:endParaRPr lang="nl-BE"/>
           </a:p>
@@ -13770,7 +12715,7 @@
 </p:sld>
 </file>
 
-<file path=ppt/slides/slide26.xml><?xml version="1.0" encoding="utf-8"?>
+<file path=ppt/slides/slide25.xml><?xml version="1.0" encoding="utf-8"?>
 <p:sld xmlns:a="http://schemas.openxmlformats.org/drawingml/2006/main" xmlns:r="http://schemas.openxmlformats.org/officeDocument/2006/relationships" xmlns:p="http://schemas.openxmlformats.org/presentationml/2006/main">
   <p:cSld>
     <p:spTree>
@@ -13891,7 +12836,7 @@
           <a:p>
             <a:fld id="{AEFF399F-E3B5-4890-BC79-9BC8D4DF3F2D}" type="slidenum">
               <a:rPr lang="nl-BE" smtClean="0"/>
-              <a:t>26</a:t>
+              <a:t>25</a:t>
             </a:fld>
             <a:endParaRPr lang="nl-BE"/>
           </a:p>
@@ -14298,6 +13243,101 @@
 </p:sld>
 </file>
 
+<file path=ppt/slides/slide26.xml><?xml version="1.0" encoding="utf-8"?>
+<p:sld xmlns:a="http://schemas.openxmlformats.org/drawingml/2006/main" xmlns:r="http://schemas.openxmlformats.org/officeDocument/2006/relationships" xmlns:p="http://schemas.openxmlformats.org/presentationml/2006/main">
+  <p:cSld>
+    <p:spTree>
+      <p:nvGrpSpPr>
+        <p:cNvPr id="1" name=""/>
+        <p:cNvGrpSpPr/>
+        <p:nvPr/>
+      </p:nvGrpSpPr>
+      <p:grpSpPr>
+        <a:xfrm>
+          <a:off x="0" y="0"/>
+          <a:ext cx="0" cy="0"/>
+          <a:chOff x="0" y="0"/>
+          <a:chExt cx="0" cy="0"/>
+        </a:xfrm>
+      </p:grpSpPr>
+      <p:sp>
+        <p:nvSpPr>
+          <p:cNvPr id="2" name="Title 1"/>
+          <p:cNvSpPr>
+            <a:spLocks noGrp="1"/>
+          </p:cNvSpPr>
+          <p:nvPr>
+            <p:ph type="title"/>
+          </p:nvPr>
+        </p:nvSpPr>
+        <p:spPr/>
+        <p:txBody>
+          <a:bodyPr/>
+          <a:lstStyle/>
+          <a:p>
+            <a:r>
+              <a:rPr lang="en-US" dirty="0"/>
+              <a:t>Using images</a:t>
+            </a:r>
+            <a:endParaRPr lang="nl-BE" dirty="0"/>
+          </a:p>
+        </p:txBody>
+      </p:sp>
+      <p:sp>
+        <p:nvSpPr>
+          <p:cNvPr id="3" name="Text Placeholder 2"/>
+          <p:cNvSpPr>
+            <a:spLocks noGrp="1"/>
+          </p:cNvSpPr>
+          <p:nvPr>
+            <p:ph type="body" idx="1"/>
+          </p:nvPr>
+        </p:nvSpPr>
+        <p:spPr/>
+        <p:txBody>
+          <a:bodyPr/>
+          <a:lstStyle/>
+          <a:p>
+            <a:endParaRPr lang="nl-BE"/>
+          </a:p>
+        </p:txBody>
+      </p:sp>
+      <p:sp>
+        <p:nvSpPr>
+          <p:cNvPr id="4" name="Slide Number Placeholder 3"/>
+          <p:cNvSpPr>
+            <a:spLocks noGrp="1"/>
+          </p:cNvSpPr>
+          <p:nvPr>
+            <p:ph type="sldNum" sz="quarter" idx="12"/>
+          </p:nvPr>
+        </p:nvSpPr>
+        <p:spPr/>
+        <p:txBody>
+          <a:bodyPr/>
+          <a:lstStyle/>
+          <a:p>
+            <a:fld id="{AEFF399F-E3B5-4890-BC79-9BC8D4DF3F2D}" type="slidenum">
+              <a:rPr lang="nl-BE" smtClean="0"/>
+              <a:t>26</a:t>
+            </a:fld>
+            <a:endParaRPr lang="nl-BE"/>
+          </a:p>
+        </p:txBody>
+      </p:sp>
+    </p:spTree>
+    <p:extLst>
+      <p:ext uri="{BB962C8B-B14F-4D97-AF65-F5344CB8AC3E}">
+        <p14:creationId xmlns:p14="http://schemas.microsoft.com/office/powerpoint/2010/main" val="276782416"/>
+      </p:ext>
+    </p:extLst>
+  </p:cSld>
+  <p:clrMapOvr>
+    <a:masterClrMapping/>
+  </p:clrMapOvr>
+</p:sld>
+</file>
+
 <file path=ppt/slides/slide27.xml><?xml version="1.0" encoding="utf-8"?>
 <p:sld xmlns:a="http://schemas.openxmlformats.org/drawingml/2006/main" xmlns:r="http://schemas.openxmlformats.org/officeDocument/2006/relationships" xmlns:p="http://schemas.openxmlformats.org/presentationml/2006/main">
   <p:cSld>
@@ -14332,101 +13372,6 @@
           <a:p>
             <a:r>
               <a:rPr lang="en-US" dirty="0"/>
-              <a:t>Using images</a:t>
-            </a:r>
-            <a:endParaRPr lang="nl-BE" dirty="0"/>
-          </a:p>
-        </p:txBody>
-      </p:sp>
-      <p:sp>
-        <p:nvSpPr>
-          <p:cNvPr id="3" name="Text Placeholder 2"/>
-          <p:cNvSpPr>
-            <a:spLocks noGrp="1"/>
-          </p:cNvSpPr>
-          <p:nvPr>
-            <p:ph type="body" idx="1"/>
-          </p:nvPr>
-        </p:nvSpPr>
-        <p:spPr/>
-        <p:txBody>
-          <a:bodyPr/>
-          <a:lstStyle/>
-          <a:p>
-            <a:endParaRPr lang="nl-BE"/>
-          </a:p>
-        </p:txBody>
-      </p:sp>
-      <p:sp>
-        <p:nvSpPr>
-          <p:cNvPr id="4" name="Slide Number Placeholder 3"/>
-          <p:cNvSpPr>
-            <a:spLocks noGrp="1"/>
-          </p:cNvSpPr>
-          <p:nvPr>
-            <p:ph type="sldNum" sz="quarter" idx="12"/>
-          </p:nvPr>
-        </p:nvSpPr>
-        <p:spPr/>
-        <p:txBody>
-          <a:bodyPr/>
-          <a:lstStyle/>
-          <a:p>
-            <a:fld id="{AEFF399F-E3B5-4890-BC79-9BC8D4DF3F2D}" type="slidenum">
-              <a:rPr lang="nl-BE" smtClean="0"/>
-              <a:t>27</a:t>
-            </a:fld>
-            <a:endParaRPr lang="nl-BE"/>
-          </a:p>
-        </p:txBody>
-      </p:sp>
-    </p:spTree>
-    <p:extLst>
-      <p:ext uri="{BB962C8B-B14F-4D97-AF65-F5344CB8AC3E}">
-        <p14:creationId xmlns:p14="http://schemas.microsoft.com/office/powerpoint/2010/main" val="276782416"/>
-      </p:ext>
-    </p:extLst>
-  </p:cSld>
-  <p:clrMapOvr>
-    <a:masterClrMapping/>
-  </p:clrMapOvr>
-</p:sld>
-</file>
-
-<file path=ppt/slides/slide28.xml><?xml version="1.0" encoding="utf-8"?>
-<p:sld xmlns:a="http://schemas.openxmlformats.org/drawingml/2006/main" xmlns:r="http://schemas.openxmlformats.org/officeDocument/2006/relationships" xmlns:p="http://schemas.openxmlformats.org/presentationml/2006/main">
-  <p:cSld>
-    <p:spTree>
-      <p:nvGrpSpPr>
-        <p:cNvPr id="1" name=""/>
-        <p:cNvGrpSpPr/>
-        <p:nvPr/>
-      </p:nvGrpSpPr>
-      <p:grpSpPr>
-        <a:xfrm>
-          <a:off x="0" y="0"/>
-          <a:ext cx="0" cy="0"/>
-          <a:chOff x="0" y="0"/>
-          <a:chExt cx="0" cy="0"/>
-        </a:xfrm>
-      </p:grpSpPr>
-      <p:sp>
-        <p:nvSpPr>
-          <p:cNvPr id="2" name="Title 1"/>
-          <p:cNvSpPr>
-            <a:spLocks noGrp="1"/>
-          </p:cNvSpPr>
-          <p:nvPr>
-            <p:ph type="title"/>
-          </p:nvPr>
-        </p:nvSpPr>
-        <p:spPr/>
-        <p:txBody>
-          <a:bodyPr/>
-          <a:lstStyle/>
-          <a:p>
-            <a:r>
-              <a:rPr lang="en-US" dirty="0"/>
               <a:t>Run container/execute commands</a:t>
             </a:r>
             <a:endParaRPr lang="nl-BE" dirty="0"/>
@@ -14827,7 +13772,7 @@
           <a:p>
             <a:fld id="{AEFF399F-E3B5-4890-BC79-9BC8D4DF3F2D}" type="slidenum">
               <a:rPr lang="nl-BE" smtClean="0"/>
-              <a:t>28</a:t>
+              <a:t>27</a:t>
             </a:fld>
             <a:endParaRPr lang="nl-BE"/>
           </a:p>
@@ -15193,7 +14138,7 @@
 </p:sld>
 </file>
 
-<file path=ppt/slides/slide29.xml><?xml version="1.0" encoding="utf-8"?>
+<file path=ppt/slides/slide28.xml><?xml version="1.0" encoding="utf-8"?>
 <p:sld xmlns:a="http://schemas.openxmlformats.org/drawingml/2006/main" xmlns:r="http://schemas.openxmlformats.org/officeDocument/2006/relationships" xmlns:p="http://schemas.openxmlformats.org/presentationml/2006/main">
   <p:cSld>
     <p:spTree>
@@ -15298,7 +14243,7 @@
           <a:p>
             <a:fld id="{AEFF399F-E3B5-4890-BC79-9BC8D4DF3F2D}" type="slidenum">
               <a:rPr lang="nl-BE" smtClean="0"/>
-              <a:t>29</a:t>
+              <a:t>28</a:t>
             </a:fld>
             <a:endParaRPr lang="nl-BE"/>
           </a:p>
@@ -15601,102 +14546,7 @@
 </p:sld>
 </file>
 
-<file path=ppt/slides/slide3.xml><?xml version="1.0" encoding="utf-8"?>
-<p:sld xmlns:a="http://schemas.openxmlformats.org/drawingml/2006/main" xmlns:r="http://schemas.openxmlformats.org/officeDocument/2006/relationships" xmlns:p="http://schemas.openxmlformats.org/presentationml/2006/main">
-  <p:cSld>
-    <p:spTree>
-      <p:nvGrpSpPr>
-        <p:cNvPr id="1" name=""/>
-        <p:cNvGrpSpPr/>
-        <p:nvPr/>
-      </p:nvGrpSpPr>
-      <p:grpSpPr>
-        <a:xfrm>
-          <a:off x="0" y="0"/>
-          <a:ext cx="0" cy="0"/>
-          <a:chOff x="0" y="0"/>
-          <a:chExt cx="0" cy="0"/>
-        </a:xfrm>
-      </p:grpSpPr>
-      <p:sp>
-        <p:nvSpPr>
-          <p:cNvPr id="2" name="Slide Number Placeholder 1">
-            <a:extLst>
-              <a:ext uri="{FF2B5EF4-FFF2-40B4-BE49-F238E27FC236}">
-                <a16:creationId xmlns:a16="http://schemas.microsoft.com/office/drawing/2014/main" id="{B4DA63DE-79C3-1664-D137-3450C51B6223}"/>
-              </a:ext>
-            </a:extLst>
-          </p:cNvPr>
-          <p:cNvSpPr>
-            <a:spLocks noGrp="1"/>
-          </p:cNvSpPr>
-          <p:nvPr>
-            <p:ph type="sldNum" sz="quarter" idx="12"/>
-          </p:nvPr>
-        </p:nvSpPr>
-        <p:spPr/>
-        <p:txBody>
-          <a:bodyPr/>
-          <a:lstStyle/>
-          <a:p>
-            <a:fld id="{AEFF399F-E3B5-4890-BC79-9BC8D4DF3F2D}" type="slidenum">
-              <a:rPr lang="nl-BE" smtClean="0"/>
-              <a:t>3</a:t>
-            </a:fld>
-            <a:endParaRPr lang="nl-BE"/>
-          </a:p>
-        </p:txBody>
-      </p:sp>
-      <p:pic>
-        <p:nvPicPr>
-          <p:cNvPr id="4" name="Picture 3" descr="Qr code&#10;&#10;Description automatically generated">
-            <a:extLst>
-              <a:ext uri="{FF2B5EF4-FFF2-40B4-BE49-F238E27FC236}">
-                <a16:creationId xmlns:a16="http://schemas.microsoft.com/office/drawing/2014/main" id="{045858B9-522D-F8D1-A73A-3C2E724E3B50}"/>
-              </a:ext>
-            </a:extLst>
-          </p:cNvPr>
-          <p:cNvPicPr>
-            <a:picLocks noChangeAspect="1"/>
-          </p:cNvPicPr>
-          <p:nvPr/>
-        </p:nvPicPr>
-        <p:blipFill>
-          <a:blip r:embed="rId2">
-            <a:extLst>
-              <a:ext uri="{28A0092B-C50C-407E-A947-70E740481C1C}">
-                <a14:useLocalDpi xmlns:a14="http://schemas.microsoft.com/office/drawing/2010/main" val="0"/>
-              </a:ext>
-            </a:extLst>
-          </a:blip>
-          <a:stretch>
-            <a:fillRect/>
-          </a:stretch>
-        </p:blipFill>
-        <p:spPr>
-          <a:xfrm>
-            <a:off x="0" y="0"/>
-            <a:ext cx="9144000" cy="6858000"/>
-          </a:xfrm>
-          <a:prstGeom prst="rect">
-            <a:avLst/>
-          </a:prstGeom>
-        </p:spPr>
-      </p:pic>
-    </p:spTree>
-    <p:extLst>
-      <p:ext uri="{BB962C8B-B14F-4D97-AF65-F5344CB8AC3E}">
-        <p14:creationId xmlns:p14="http://schemas.microsoft.com/office/powerpoint/2010/main" val="3579092201"/>
-      </p:ext>
-    </p:extLst>
-  </p:cSld>
-  <p:clrMapOvr>
-    <a:masterClrMapping/>
-  </p:clrMapOvr>
-</p:sld>
-</file>
-
-<file path=ppt/slides/slide30.xml><?xml version="1.0" encoding="utf-8"?>
+<file path=ppt/slides/slide29.xml><?xml version="1.0" encoding="utf-8"?>
 <p:sld xmlns:a="http://schemas.openxmlformats.org/drawingml/2006/main" xmlns:r="http://schemas.openxmlformats.org/officeDocument/2006/relationships" xmlns:p="http://schemas.openxmlformats.org/presentationml/2006/main">
   <p:cSld>
     <p:spTree>
@@ -15937,7 +14787,7 @@
           <a:p>
             <a:fld id="{AEFF399F-E3B5-4890-BC79-9BC8D4DF3F2D}" type="slidenum">
               <a:rPr lang="nl-BE" smtClean="0"/>
-              <a:t>30</a:t>
+              <a:t>29</a:t>
             </a:fld>
             <a:endParaRPr lang="nl-BE"/>
           </a:p>
@@ -16316,7 +15166,102 @@
 </p:sld>
 </file>
 
-<file path=ppt/slides/slide31.xml><?xml version="1.0" encoding="utf-8"?>
+<file path=ppt/slides/slide3.xml><?xml version="1.0" encoding="utf-8"?>
+<p:sld xmlns:a="http://schemas.openxmlformats.org/drawingml/2006/main" xmlns:r="http://schemas.openxmlformats.org/officeDocument/2006/relationships" xmlns:p="http://schemas.openxmlformats.org/presentationml/2006/main">
+  <p:cSld>
+    <p:spTree>
+      <p:nvGrpSpPr>
+        <p:cNvPr id="1" name=""/>
+        <p:cNvGrpSpPr/>
+        <p:nvPr/>
+      </p:nvGrpSpPr>
+      <p:grpSpPr>
+        <a:xfrm>
+          <a:off x="0" y="0"/>
+          <a:ext cx="0" cy="0"/>
+          <a:chOff x="0" y="0"/>
+          <a:chExt cx="0" cy="0"/>
+        </a:xfrm>
+      </p:grpSpPr>
+      <p:sp>
+        <p:nvSpPr>
+          <p:cNvPr id="2" name="Slide Number Placeholder 1">
+            <a:extLst>
+              <a:ext uri="{FF2B5EF4-FFF2-40B4-BE49-F238E27FC236}">
+                <a16:creationId xmlns:a16="http://schemas.microsoft.com/office/drawing/2014/main" id="{B4DA63DE-79C3-1664-D137-3450C51B6223}"/>
+              </a:ext>
+            </a:extLst>
+          </p:cNvPr>
+          <p:cNvSpPr>
+            <a:spLocks noGrp="1"/>
+          </p:cNvSpPr>
+          <p:nvPr>
+            <p:ph type="sldNum" sz="quarter" idx="12"/>
+          </p:nvPr>
+        </p:nvSpPr>
+        <p:spPr/>
+        <p:txBody>
+          <a:bodyPr/>
+          <a:lstStyle/>
+          <a:p>
+            <a:fld id="{AEFF399F-E3B5-4890-BC79-9BC8D4DF3F2D}" type="slidenum">
+              <a:rPr lang="nl-BE" smtClean="0"/>
+              <a:t>3</a:t>
+            </a:fld>
+            <a:endParaRPr lang="nl-BE"/>
+          </a:p>
+        </p:txBody>
+      </p:sp>
+      <p:pic>
+        <p:nvPicPr>
+          <p:cNvPr id="4" name="Picture 3" descr="Qr code&#10;&#10;Description automatically generated">
+            <a:extLst>
+              <a:ext uri="{FF2B5EF4-FFF2-40B4-BE49-F238E27FC236}">
+                <a16:creationId xmlns:a16="http://schemas.microsoft.com/office/drawing/2014/main" id="{045858B9-522D-F8D1-A73A-3C2E724E3B50}"/>
+              </a:ext>
+            </a:extLst>
+          </p:cNvPr>
+          <p:cNvPicPr>
+            <a:picLocks noChangeAspect="1"/>
+          </p:cNvPicPr>
+          <p:nvPr/>
+        </p:nvPicPr>
+        <p:blipFill>
+          <a:blip r:embed="rId2">
+            <a:extLst>
+              <a:ext uri="{28A0092B-C50C-407E-A947-70E740481C1C}">
+                <a14:useLocalDpi xmlns:a14="http://schemas.microsoft.com/office/drawing/2010/main" val="0"/>
+              </a:ext>
+            </a:extLst>
+          </a:blip>
+          <a:stretch>
+            <a:fillRect/>
+          </a:stretch>
+        </p:blipFill>
+        <p:spPr>
+          <a:xfrm>
+            <a:off x="0" y="0"/>
+            <a:ext cx="9144000" cy="6858000"/>
+          </a:xfrm>
+          <a:prstGeom prst="rect">
+            <a:avLst/>
+          </a:prstGeom>
+        </p:spPr>
+      </p:pic>
+    </p:spTree>
+    <p:extLst>
+      <p:ext uri="{BB962C8B-B14F-4D97-AF65-F5344CB8AC3E}">
+        <p14:creationId xmlns:p14="http://schemas.microsoft.com/office/powerpoint/2010/main" val="3579092201"/>
+      </p:ext>
+    </p:extLst>
+  </p:cSld>
+  <p:clrMapOvr>
+    <a:masterClrMapping/>
+  </p:clrMapOvr>
+</p:sld>
+</file>
+
+<file path=ppt/slides/slide30.xml><?xml version="1.0" encoding="utf-8"?>
 <p:sld xmlns:a="http://schemas.openxmlformats.org/drawingml/2006/main" xmlns:r="http://schemas.openxmlformats.org/officeDocument/2006/relationships" xmlns:p="http://schemas.openxmlformats.org/presentationml/2006/main">
   <p:cSld>
     <p:spTree>
@@ -16527,7 +15472,7 @@
           <a:p>
             <a:fld id="{AEFF399F-E3B5-4890-BC79-9BC8D4DF3F2D}" type="slidenum">
               <a:rPr lang="nl-BE" smtClean="0"/>
-              <a:t>31</a:t>
+              <a:t>30</a:t>
             </a:fld>
             <a:endParaRPr lang="nl-BE"/>
           </a:p>
@@ -16884,6 +15829,101 @@
 </p:sld>
 </file>
 
+<file path=ppt/slides/slide31.xml><?xml version="1.0" encoding="utf-8"?>
+<p:sld xmlns:a="http://schemas.openxmlformats.org/drawingml/2006/main" xmlns:r="http://schemas.openxmlformats.org/officeDocument/2006/relationships" xmlns:p="http://schemas.openxmlformats.org/presentationml/2006/main">
+  <p:cSld>
+    <p:spTree>
+      <p:nvGrpSpPr>
+        <p:cNvPr id="1" name=""/>
+        <p:cNvGrpSpPr/>
+        <p:nvPr/>
+      </p:nvGrpSpPr>
+      <p:grpSpPr>
+        <a:xfrm>
+          <a:off x="0" y="0"/>
+          <a:ext cx="0" cy="0"/>
+          <a:chOff x="0" y="0"/>
+          <a:chExt cx="0" cy="0"/>
+        </a:xfrm>
+      </p:grpSpPr>
+      <p:sp>
+        <p:nvSpPr>
+          <p:cNvPr id="2" name="Title 1"/>
+          <p:cNvSpPr>
+            <a:spLocks noGrp="1"/>
+          </p:cNvSpPr>
+          <p:nvPr>
+            <p:ph type="title"/>
+          </p:nvPr>
+        </p:nvSpPr>
+        <p:spPr/>
+        <p:txBody>
+          <a:bodyPr/>
+          <a:lstStyle/>
+          <a:p>
+            <a:r>
+              <a:rPr lang="en-US" dirty="0"/>
+              <a:t>Multithreaded applications</a:t>
+            </a:r>
+            <a:endParaRPr lang="nl-BE" dirty="0"/>
+          </a:p>
+        </p:txBody>
+      </p:sp>
+      <p:sp>
+        <p:nvSpPr>
+          <p:cNvPr id="3" name="Text Placeholder 2"/>
+          <p:cNvSpPr>
+            <a:spLocks noGrp="1"/>
+          </p:cNvSpPr>
+          <p:nvPr>
+            <p:ph type="body" idx="1"/>
+          </p:nvPr>
+        </p:nvSpPr>
+        <p:spPr/>
+        <p:txBody>
+          <a:bodyPr/>
+          <a:lstStyle/>
+          <a:p>
+            <a:endParaRPr lang="nl-BE"/>
+          </a:p>
+        </p:txBody>
+      </p:sp>
+      <p:sp>
+        <p:nvSpPr>
+          <p:cNvPr id="4" name="Slide Number Placeholder 3"/>
+          <p:cNvSpPr>
+            <a:spLocks noGrp="1"/>
+          </p:cNvSpPr>
+          <p:nvPr>
+            <p:ph type="sldNum" sz="quarter" idx="12"/>
+          </p:nvPr>
+        </p:nvSpPr>
+        <p:spPr/>
+        <p:txBody>
+          <a:bodyPr/>
+          <a:lstStyle/>
+          <a:p>
+            <a:fld id="{AEFF399F-E3B5-4890-BC79-9BC8D4DF3F2D}" type="slidenum">
+              <a:rPr lang="nl-BE" smtClean="0"/>
+              <a:t>31</a:t>
+            </a:fld>
+            <a:endParaRPr lang="nl-BE"/>
+          </a:p>
+        </p:txBody>
+      </p:sp>
+    </p:spTree>
+    <p:extLst>
+      <p:ext uri="{BB962C8B-B14F-4D97-AF65-F5344CB8AC3E}">
+        <p14:creationId xmlns:p14="http://schemas.microsoft.com/office/powerpoint/2010/main" val="2233734622"/>
+      </p:ext>
+    </p:extLst>
+  </p:cSld>
+  <p:clrMapOvr>
+    <a:masterClrMapping/>
+  </p:clrMapOvr>
+</p:sld>
+</file>
+
 <file path=ppt/slides/slide32.xml><?xml version="1.0" encoding="utf-8"?>
 <p:sld xmlns:a="http://schemas.openxmlformats.org/drawingml/2006/main" xmlns:r="http://schemas.openxmlformats.org/officeDocument/2006/relationships" xmlns:p="http://schemas.openxmlformats.org/presentationml/2006/main">
   <p:cSld>
@@ -16918,28 +15958,9 @@
           <a:p>
             <a:r>
               <a:rPr lang="en-US" dirty="0"/>
-              <a:t>Multithreaded applications</a:t>
+              <a:t>Example recipe file</a:t>
             </a:r>
             <a:endParaRPr lang="nl-BE" dirty="0"/>
-          </a:p>
-        </p:txBody>
-      </p:sp>
-      <p:sp>
-        <p:nvSpPr>
-          <p:cNvPr id="3" name="Text Placeholder 2"/>
-          <p:cNvSpPr>
-            <a:spLocks noGrp="1"/>
-          </p:cNvSpPr>
-          <p:nvPr>
-            <p:ph type="body" idx="1"/>
-          </p:nvPr>
-        </p:nvSpPr>
-        <p:spPr/>
-        <p:txBody>
-          <a:bodyPr/>
-          <a:lstStyle/>
-          <a:p>
-            <a:endParaRPr lang="nl-BE"/>
           </a:p>
         </p:txBody>
       </p:sp>
@@ -16961,82 +15982,6 @@
             <a:fld id="{AEFF399F-E3B5-4890-BC79-9BC8D4DF3F2D}" type="slidenum">
               <a:rPr lang="nl-BE" smtClean="0"/>
               <a:t>32</a:t>
-            </a:fld>
-            <a:endParaRPr lang="nl-BE"/>
-          </a:p>
-        </p:txBody>
-      </p:sp>
-    </p:spTree>
-    <p:extLst>
-      <p:ext uri="{BB962C8B-B14F-4D97-AF65-F5344CB8AC3E}">
-        <p14:creationId xmlns:p14="http://schemas.microsoft.com/office/powerpoint/2010/main" val="2233734622"/>
-      </p:ext>
-    </p:extLst>
-  </p:cSld>
-  <p:clrMapOvr>
-    <a:masterClrMapping/>
-  </p:clrMapOvr>
-</p:sld>
-</file>
-
-<file path=ppt/slides/slide33.xml><?xml version="1.0" encoding="utf-8"?>
-<p:sld xmlns:a="http://schemas.openxmlformats.org/drawingml/2006/main" xmlns:r="http://schemas.openxmlformats.org/officeDocument/2006/relationships" xmlns:p="http://schemas.openxmlformats.org/presentationml/2006/main">
-  <p:cSld>
-    <p:spTree>
-      <p:nvGrpSpPr>
-        <p:cNvPr id="1" name=""/>
-        <p:cNvGrpSpPr/>
-        <p:nvPr/>
-      </p:nvGrpSpPr>
-      <p:grpSpPr>
-        <a:xfrm>
-          <a:off x="0" y="0"/>
-          <a:ext cx="0" cy="0"/>
-          <a:chOff x="0" y="0"/>
-          <a:chExt cx="0" cy="0"/>
-        </a:xfrm>
-      </p:grpSpPr>
-      <p:sp>
-        <p:nvSpPr>
-          <p:cNvPr id="2" name="Title 1"/>
-          <p:cNvSpPr>
-            <a:spLocks noGrp="1"/>
-          </p:cNvSpPr>
-          <p:nvPr>
-            <p:ph type="title"/>
-          </p:nvPr>
-        </p:nvSpPr>
-        <p:spPr/>
-        <p:txBody>
-          <a:bodyPr/>
-          <a:lstStyle/>
-          <a:p>
-            <a:r>
-              <a:rPr lang="en-US" dirty="0"/>
-              <a:t>Example recipe file</a:t>
-            </a:r>
-            <a:endParaRPr lang="nl-BE" dirty="0"/>
-          </a:p>
-        </p:txBody>
-      </p:sp>
-      <p:sp>
-        <p:nvSpPr>
-          <p:cNvPr id="4" name="Slide Number Placeholder 3"/>
-          <p:cNvSpPr>
-            <a:spLocks noGrp="1"/>
-          </p:cNvSpPr>
-          <p:nvPr>
-            <p:ph type="sldNum" sz="quarter" idx="12"/>
-          </p:nvPr>
-        </p:nvSpPr>
-        <p:spPr/>
-        <p:txBody>
-          <a:bodyPr/>
-          <a:lstStyle/>
-          <a:p>
-            <a:fld id="{AEFF399F-E3B5-4890-BC79-9BC8D4DF3F2D}" type="slidenum">
-              <a:rPr lang="nl-BE" smtClean="0"/>
-              <a:t>33</a:t>
             </a:fld>
             <a:endParaRPr lang="nl-BE"/>
           </a:p>
@@ -17820,7 +16765,7 @@
 </p:sld>
 </file>
 
-<file path=ppt/slides/slide34.xml><?xml version="1.0" encoding="utf-8"?>
+<file path=ppt/slides/slide33.xml><?xml version="1.0" encoding="utf-8"?>
 <p:sld xmlns:a="http://schemas.openxmlformats.org/drawingml/2006/main" xmlns:r="http://schemas.openxmlformats.org/officeDocument/2006/relationships" xmlns:p="http://schemas.openxmlformats.org/presentationml/2006/main">
   <p:cSld>
     <p:spTree>
@@ -17912,7 +16857,7 @@
           <a:p>
             <a:fld id="{AEFF399F-E3B5-4890-BC79-9BC8D4DF3F2D}" type="slidenum">
               <a:rPr lang="nl-BE" smtClean="0"/>
-              <a:t>34</a:t>
+              <a:t>33</a:t>
             </a:fld>
             <a:endParaRPr lang="nl-BE"/>
           </a:p>
@@ -18243,6 +17188,101 @@
 </p:sld>
 </file>
 
+<file path=ppt/slides/slide34.xml><?xml version="1.0" encoding="utf-8"?>
+<p:sld xmlns:a="http://schemas.openxmlformats.org/drawingml/2006/main" xmlns:r="http://schemas.openxmlformats.org/officeDocument/2006/relationships" xmlns:p="http://schemas.openxmlformats.org/presentationml/2006/main">
+  <p:cSld>
+    <p:spTree>
+      <p:nvGrpSpPr>
+        <p:cNvPr id="1" name=""/>
+        <p:cNvGrpSpPr/>
+        <p:nvPr/>
+      </p:nvGrpSpPr>
+      <p:grpSpPr>
+        <a:xfrm>
+          <a:off x="0" y="0"/>
+          <a:ext cx="0" cy="0"/>
+          <a:chOff x="0" y="0"/>
+          <a:chExt cx="0" cy="0"/>
+        </a:xfrm>
+      </p:grpSpPr>
+      <p:sp>
+        <p:nvSpPr>
+          <p:cNvPr id="2" name="Title 1"/>
+          <p:cNvSpPr>
+            <a:spLocks noGrp="1"/>
+          </p:cNvSpPr>
+          <p:nvPr>
+            <p:ph type="title"/>
+          </p:nvPr>
+        </p:nvSpPr>
+        <p:spPr/>
+        <p:txBody>
+          <a:bodyPr/>
+          <a:lstStyle/>
+          <a:p>
+            <a:r>
+              <a:rPr lang="en-US" dirty="0"/>
+              <a:t>Distributed applications</a:t>
+            </a:r>
+            <a:endParaRPr lang="nl-BE" dirty="0"/>
+          </a:p>
+        </p:txBody>
+      </p:sp>
+      <p:sp>
+        <p:nvSpPr>
+          <p:cNvPr id="3" name="Text Placeholder 2"/>
+          <p:cNvSpPr>
+            <a:spLocks noGrp="1"/>
+          </p:cNvSpPr>
+          <p:nvPr>
+            <p:ph type="body" idx="1"/>
+          </p:nvPr>
+        </p:nvSpPr>
+        <p:spPr/>
+        <p:txBody>
+          <a:bodyPr/>
+          <a:lstStyle/>
+          <a:p>
+            <a:endParaRPr lang="nl-BE"/>
+          </a:p>
+        </p:txBody>
+      </p:sp>
+      <p:sp>
+        <p:nvSpPr>
+          <p:cNvPr id="4" name="Slide Number Placeholder 3"/>
+          <p:cNvSpPr>
+            <a:spLocks noGrp="1"/>
+          </p:cNvSpPr>
+          <p:nvPr>
+            <p:ph type="sldNum" sz="quarter" idx="12"/>
+          </p:nvPr>
+        </p:nvSpPr>
+        <p:spPr/>
+        <p:txBody>
+          <a:bodyPr/>
+          <a:lstStyle/>
+          <a:p>
+            <a:fld id="{AEFF399F-E3B5-4890-BC79-9BC8D4DF3F2D}" type="slidenum">
+              <a:rPr lang="nl-BE" smtClean="0"/>
+              <a:t>34</a:t>
+            </a:fld>
+            <a:endParaRPr lang="nl-BE"/>
+          </a:p>
+        </p:txBody>
+      </p:sp>
+    </p:spTree>
+    <p:extLst>
+      <p:ext uri="{BB962C8B-B14F-4D97-AF65-F5344CB8AC3E}">
+        <p14:creationId xmlns:p14="http://schemas.microsoft.com/office/powerpoint/2010/main" val="3672421668"/>
+      </p:ext>
+    </p:extLst>
+  </p:cSld>
+  <p:clrMapOvr>
+    <a:masterClrMapping/>
+  </p:clrMapOvr>
+</p:sld>
+</file>
+
 <file path=ppt/slides/slide35.xml><?xml version="1.0" encoding="utf-8"?>
 <p:sld xmlns:a="http://schemas.openxmlformats.org/drawingml/2006/main" xmlns:r="http://schemas.openxmlformats.org/officeDocument/2006/relationships" xmlns:p="http://schemas.openxmlformats.org/presentationml/2006/main">
   <p:cSld>
@@ -18277,28 +17317,9 @@
           <a:p>
             <a:r>
               <a:rPr lang="en-US" dirty="0"/>
-              <a:t>Distributed applications</a:t>
+              <a:t>Example recipe file</a:t>
             </a:r>
             <a:endParaRPr lang="nl-BE" dirty="0"/>
-          </a:p>
-        </p:txBody>
-      </p:sp>
-      <p:sp>
-        <p:nvSpPr>
-          <p:cNvPr id="3" name="Text Placeholder 2"/>
-          <p:cNvSpPr>
-            <a:spLocks noGrp="1"/>
-          </p:cNvSpPr>
-          <p:nvPr>
-            <p:ph type="body" idx="1"/>
-          </p:nvPr>
-        </p:nvSpPr>
-        <p:spPr/>
-        <p:txBody>
-          <a:bodyPr/>
-          <a:lstStyle/>
-          <a:p>
-            <a:endParaRPr lang="nl-BE"/>
           </a:p>
         </p:txBody>
       </p:sp>
@@ -18320,82 +17341,6 @@
             <a:fld id="{AEFF399F-E3B5-4890-BC79-9BC8D4DF3F2D}" type="slidenum">
               <a:rPr lang="nl-BE" smtClean="0"/>
               <a:t>35</a:t>
-            </a:fld>
-            <a:endParaRPr lang="nl-BE"/>
-          </a:p>
-        </p:txBody>
-      </p:sp>
-    </p:spTree>
-    <p:extLst>
-      <p:ext uri="{BB962C8B-B14F-4D97-AF65-F5344CB8AC3E}">
-        <p14:creationId xmlns:p14="http://schemas.microsoft.com/office/powerpoint/2010/main" val="3672421668"/>
-      </p:ext>
-    </p:extLst>
-  </p:cSld>
-  <p:clrMapOvr>
-    <a:masterClrMapping/>
-  </p:clrMapOvr>
-</p:sld>
-</file>
-
-<file path=ppt/slides/slide36.xml><?xml version="1.0" encoding="utf-8"?>
-<p:sld xmlns:a="http://schemas.openxmlformats.org/drawingml/2006/main" xmlns:r="http://schemas.openxmlformats.org/officeDocument/2006/relationships" xmlns:p="http://schemas.openxmlformats.org/presentationml/2006/main">
-  <p:cSld>
-    <p:spTree>
-      <p:nvGrpSpPr>
-        <p:cNvPr id="1" name=""/>
-        <p:cNvGrpSpPr/>
-        <p:nvPr/>
-      </p:nvGrpSpPr>
-      <p:grpSpPr>
-        <a:xfrm>
-          <a:off x="0" y="0"/>
-          <a:ext cx="0" cy="0"/>
-          <a:chOff x="0" y="0"/>
-          <a:chExt cx="0" cy="0"/>
-        </a:xfrm>
-      </p:grpSpPr>
-      <p:sp>
-        <p:nvSpPr>
-          <p:cNvPr id="2" name="Title 1"/>
-          <p:cNvSpPr>
-            <a:spLocks noGrp="1"/>
-          </p:cNvSpPr>
-          <p:nvPr>
-            <p:ph type="title"/>
-          </p:nvPr>
-        </p:nvSpPr>
-        <p:spPr/>
-        <p:txBody>
-          <a:bodyPr/>
-          <a:lstStyle/>
-          <a:p>
-            <a:r>
-              <a:rPr lang="en-US" dirty="0"/>
-              <a:t>Example recipe file</a:t>
-            </a:r>
-            <a:endParaRPr lang="nl-BE" dirty="0"/>
-          </a:p>
-        </p:txBody>
-      </p:sp>
-      <p:sp>
-        <p:nvSpPr>
-          <p:cNvPr id="4" name="Slide Number Placeholder 3"/>
-          <p:cNvSpPr>
-            <a:spLocks noGrp="1"/>
-          </p:cNvSpPr>
-          <p:nvPr>
-            <p:ph type="sldNum" sz="quarter" idx="12"/>
-          </p:nvPr>
-        </p:nvSpPr>
-        <p:spPr/>
-        <p:txBody>
-          <a:bodyPr/>
-          <a:lstStyle/>
-          <a:p>
-            <a:fld id="{AEFF399F-E3B5-4890-BC79-9BC8D4DF3F2D}" type="slidenum">
-              <a:rPr lang="nl-BE" smtClean="0"/>
-              <a:t>36</a:t>
             </a:fld>
             <a:endParaRPr lang="nl-BE"/>
           </a:p>
@@ -19681,7 +18626,7 @@
 </p:sld>
 </file>
 
-<file path=ppt/slides/slide37.xml><?xml version="1.0" encoding="utf-8"?>
+<file path=ppt/slides/slide36.xml><?xml version="1.0" encoding="utf-8"?>
 <p:sld xmlns:a="http://schemas.openxmlformats.org/drawingml/2006/main" xmlns:r="http://schemas.openxmlformats.org/officeDocument/2006/relationships" xmlns:p="http://schemas.openxmlformats.org/presentationml/2006/main">
   <p:cSld>
     <p:spTree>
@@ -19765,7 +18710,7 @@
           <a:p>
             <a:fld id="{AEFF399F-E3B5-4890-BC79-9BC8D4DF3F2D}" type="slidenum">
               <a:rPr lang="nl-BE" smtClean="0"/>
-              <a:t>37</a:t>
+              <a:t>36</a:t>
             </a:fld>
             <a:endParaRPr lang="nl-BE"/>
           </a:p>
@@ -20100,6 +19045,100 @@
 </p:sld>
 </file>
 
+<file path=ppt/slides/slide37.xml><?xml version="1.0" encoding="utf-8"?>
+<p:sld xmlns:a="http://schemas.openxmlformats.org/drawingml/2006/main" xmlns:r="http://schemas.openxmlformats.org/officeDocument/2006/relationships" xmlns:p="http://schemas.openxmlformats.org/presentationml/2006/main">
+  <p:cSld>
+    <p:spTree>
+      <p:nvGrpSpPr>
+        <p:cNvPr id="1" name=""/>
+        <p:cNvGrpSpPr/>
+        <p:nvPr/>
+      </p:nvGrpSpPr>
+      <p:grpSpPr>
+        <a:xfrm>
+          <a:off x="0" y="0"/>
+          <a:ext cx="0" cy="0"/>
+          <a:chOff x="0" y="0"/>
+          <a:chExt cx="0" cy="0"/>
+        </a:xfrm>
+      </p:grpSpPr>
+      <p:sp>
+        <p:nvSpPr>
+          <p:cNvPr id="2" name="Title 1"/>
+          <p:cNvSpPr>
+            <a:spLocks noGrp="1"/>
+          </p:cNvSpPr>
+          <p:nvPr>
+            <p:ph type="title"/>
+          </p:nvPr>
+        </p:nvSpPr>
+        <p:spPr/>
+        <p:txBody>
+          <a:bodyPr/>
+          <a:lstStyle/>
+          <a:p>
+            <a:r>
+              <a:rPr lang="en-US" dirty="0"/>
+              <a:t>Services</a:t>
+            </a:r>
+          </a:p>
+        </p:txBody>
+      </p:sp>
+      <p:sp>
+        <p:nvSpPr>
+          <p:cNvPr id="3" name="Text Placeholder 2"/>
+          <p:cNvSpPr>
+            <a:spLocks noGrp="1"/>
+          </p:cNvSpPr>
+          <p:nvPr>
+            <p:ph type="body" idx="1"/>
+          </p:nvPr>
+        </p:nvSpPr>
+        <p:spPr/>
+        <p:txBody>
+          <a:bodyPr/>
+          <a:lstStyle/>
+          <a:p>
+            <a:endParaRPr lang="en-US"/>
+          </a:p>
+        </p:txBody>
+      </p:sp>
+      <p:sp>
+        <p:nvSpPr>
+          <p:cNvPr id="4" name="Slide Number Placeholder 3"/>
+          <p:cNvSpPr>
+            <a:spLocks noGrp="1"/>
+          </p:cNvSpPr>
+          <p:nvPr>
+            <p:ph type="sldNum" sz="quarter" idx="12"/>
+          </p:nvPr>
+        </p:nvSpPr>
+        <p:spPr/>
+        <p:txBody>
+          <a:bodyPr/>
+          <a:lstStyle/>
+          <a:p>
+            <a:fld id="{AEFF399F-E3B5-4890-BC79-9BC8D4DF3F2D}" type="slidenum">
+              <a:rPr lang="nl-BE" smtClean="0"/>
+              <a:t>37</a:t>
+            </a:fld>
+            <a:endParaRPr lang="nl-BE"/>
+          </a:p>
+        </p:txBody>
+      </p:sp>
+    </p:spTree>
+    <p:extLst>
+      <p:ext uri="{BB962C8B-B14F-4D97-AF65-F5344CB8AC3E}">
+        <p14:creationId xmlns:p14="http://schemas.microsoft.com/office/powerpoint/2010/main" val="1160171864"/>
+      </p:ext>
+    </p:extLst>
+  </p:cSld>
+  <p:clrMapOvr>
+    <a:masterClrMapping/>
+  </p:clrMapOvr>
+</p:sld>
+</file>
+
 <file path=ppt/slides/slide38.xml><?xml version="1.0" encoding="utf-8"?>
 <p:sld xmlns:a="http://schemas.openxmlformats.org/drawingml/2006/main" xmlns:r="http://schemas.openxmlformats.org/officeDocument/2006/relationships" xmlns:p="http://schemas.openxmlformats.org/presentationml/2006/main">
   <p:cSld>
@@ -20134,19 +19173,19 @@
           <a:p>
             <a:r>
               <a:rPr lang="en-US" dirty="0"/>
-              <a:t>Services</a:t>
+              <a:t>Server processes</a:t>
             </a:r>
           </a:p>
         </p:txBody>
       </p:sp>
       <p:sp>
         <p:nvSpPr>
-          <p:cNvPr id="3" name="Text Placeholder 2"/>
+          <p:cNvPr id="3" name="Content Placeholder 2"/>
           <p:cNvSpPr>
             <a:spLocks noGrp="1"/>
           </p:cNvSpPr>
           <p:nvPr>
-            <p:ph type="body" idx="1"/>
+            <p:ph idx="1"/>
           </p:nvPr>
         </p:nvSpPr>
         <p:spPr/>
@@ -20154,7 +19193,70 @@
           <a:bodyPr/>
           <a:lstStyle/>
           <a:p>
-            <a:endParaRPr lang="en-US"/>
+            <a:r>
+              <a:rPr lang="en-US" dirty="0"/>
+              <a:t>Image runs service, e.g.,</a:t>
+            </a:r>
+          </a:p>
+          <a:p>
+            <a:pPr lvl="1"/>
+            <a:r>
+              <a:rPr lang="en-US" dirty="0"/>
+              <a:t>web server</a:t>
+            </a:r>
+          </a:p>
+          <a:p>
+            <a:pPr lvl="1"/>
+            <a:r>
+              <a:rPr lang="en-US" dirty="0"/>
+              <a:t>RDBMS</a:t>
+            </a:r>
+          </a:p>
+          <a:p>
+            <a:pPr lvl="1"/>
+            <a:r>
+              <a:rPr lang="en-US" dirty="0"/>
+              <a:t>…</a:t>
+            </a:r>
+          </a:p>
+          <a:p>
+            <a:pPr lvl="1"/>
+            <a:endParaRPr lang="en-US" dirty="0"/>
+          </a:p>
+          <a:p>
+            <a:pPr lvl="1"/>
+            <a:endParaRPr lang="en-US" dirty="0"/>
+          </a:p>
+          <a:p>
+            <a:r>
+              <a:rPr lang="en-US" dirty="0"/>
+              <a:t>Workflow</a:t>
+            </a:r>
+          </a:p>
+          <a:p>
+            <a:pPr lvl="1"/>
+            <a:r>
+              <a:rPr lang="en-US" dirty="0"/>
+              <a:t>start service</a:t>
+            </a:r>
+          </a:p>
+          <a:p>
+            <a:pPr lvl="1"/>
+            <a:r>
+              <a:rPr lang="en-US" dirty="0"/>
+              <a:t>client(s) interaction</a:t>
+            </a:r>
+          </a:p>
+          <a:p>
+            <a:pPr lvl="1"/>
+            <a:r>
+              <a:rPr lang="en-US" dirty="0"/>
+              <a:t>stop service</a:t>
+            </a:r>
+          </a:p>
+          <a:p>
+            <a:pPr lvl="1"/>
+            <a:endParaRPr lang="en-US" dirty="0"/>
           </a:p>
         </p:txBody>
       </p:sp>
@@ -20176,163 +19278,6 @@
             <a:fld id="{AEFF399F-E3B5-4890-BC79-9BC8D4DF3F2D}" type="slidenum">
               <a:rPr lang="nl-BE" smtClean="0"/>
               <a:t>38</a:t>
-            </a:fld>
-            <a:endParaRPr lang="nl-BE"/>
-          </a:p>
-        </p:txBody>
-      </p:sp>
-    </p:spTree>
-    <p:extLst>
-      <p:ext uri="{BB962C8B-B14F-4D97-AF65-F5344CB8AC3E}">
-        <p14:creationId xmlns:p14="http://schemas.microsoft.com/office/powerpoint/2010/main" val="1160171864"/>
-      </p:ext>
-    </p:extLst>
-  </p:cSld>
-  <p:clrMapOvr>
-    <a:masterClrMapping/>
-  </p:clrMapOvr>
-</p:sld>
-</file>
-
-<file path=ppt/slides/slide39.xml><?xml version="1.0" encoding="utf-8"?>
-<p:sld xmlns:a="http://schemas.openxmlformats.org/drawingml/2006/main" xmlns:r="http://schemas.openxmlformats.org/officeDocument/2006/relationships" xmlns:p="http://schemas.openxmlformats.org/presentationml/2006/main">
-  <p:cSld>
-    <p:spTree>
-      <p:nvGrpSpPr>
-        <p:cNvPr id="1" name=""/>
-        <p:cNvGrpSpPr/>
-        <p:nvPr/>
-      </p:nvGrpSpPr>
-      <p:grpSpPr>
-        <a:xfrm>
-          <a:off x="0" y="0"/>
-          <a:ext cx="0" cy="0"/>
-          <a:chOff x="0" y="0"/>
-          <a:chExt cx="0" cy="0"/>
-        </a:xfrm>
-      </p:grpSpPr>
-      <p:sp>
-        <p:nvSpPr>
-          <p:cNvPr id="2" name="Title 1"/>
-          <p:cNvSpPr>
-            <a:spLocks noGrp="1"/>
-          </p:cNvSpPr>
-          <p:nvPr>
-            <p:ph type="title"/>
-          </p:nvPr>
-        </p:nvSpPr>
-        <p:spPr/>
-        <p:txBody>
-          <a:bodyPr/>
-          <a:lstStyle/>
-          <a:p>
-            <a:r>
-              <a:rPr lang="en-US" dirty="0"/>
-              <a:t>Server processes</a:t>
-            </a:r>
-          </a:p>
-        </p:txBody>
-      </p:sp>
-      <p:sp>
-        <p:nvSpPr>
-          <p:cNvPr id="3" name="Content Placeholder 2"/>
-          <p:cNvSpPr>
-            <a:spLocks noGrp="1"/>
-          </p:cNvSpPr>
-          <p:nvPr>
-            <p:ph idx="1"/>
-          </p:nvPr>
-        </p:nvSpPr>
-        <p:spPr/>
-        <p:txBody>
-          <a:bodyPr/>
-          <a:lstStyle/>
-          <a:p>
-            <a:r>
-              <a:rPr lang="en-US" dirty="0"/>
-              <a:t>Image runs service, e.g.,</a:t>
-            </a:r>
-          </a:p>
-          <a:p>
-            <a:pPr lvl="1"/>
-            <a:r>
-              <a:rPr lang="en-US" dirty="0"/>
-              <a:t>web server</a:t>
-            </a:r>
-          </a:p>
-          <a:p>
-            <a:pPr lvl="1"/>
-            <a:r>
-              <a:rPr lang="en-US" dirty="0"/>
-              <a:t>RDBMS</a:t>
-            </a:r>
-          </a:p>
-          <a:p>
-            <a:pPr lvl="1"/>
-            <a:r>
-              <a:rPr lang="en-US" dirty="0"/>
-              <a:t>…</a:t>
-            </a:r>
-          </a:p>
-          <a:p>
-            <a:pPr lvl="1"/>
-            <a:endParaRPr lang="en-US" dirty="0"/>
-          </a:p>
-          <a:p>
-            <a:pPr lvl="1"/>
-            <a:endParaRPr lang="en-US" dirty="0"/>
-          </a:p>
-          <a:p>
-            <a:r>
-              <a:rPr lang="en-US" dirty="0"/>
-              <a:t>Workflow</a:t>
-            </a:r>
-          </a:p>
-          <a:p>
-            <a:pPr lvl="1"/>
-            <a:r>
-              <a:rPr lang="en-US" dirty="0"/>
-              <a:t>start service</a:t>
-            </a:r>
-          </a:p>
-          <a:p>
-            <a:pPr lvl="1"/>
-            <a:r>
-              <a:rPr lang="en-US" dirty="0"/>
-              <a:t>client(s) interaction</a:t>
-            </a:r>
-          </a:p>
-          <a:p>
-            <a:pPr lvl="1"/>
-            <a:r>
-              <a:rPr lang="en-US" dirty="0"/>
-              <a:t>stop service</a:t>
-            </a:r>
-          </a:p>
-          <a:p>
-            <a:pPr lvl="1"/>
-            <a:endParaRPr lang="en-US" dirty="0"/>
-          </a:p>
-        </p:txBody>
-      </p:sp>
-      <p:sp>
-        <p:nvSpPr>
-          <p:cNvPr id="4" name="Slide Number Placeholder 3"/>
-          <p:cNvSpPr>
-            <a:spLocks noGrp="1"/>
-          </p:cNvSpPr>
-          <p:nvPr>
-            <p:ph type="sldNum" sz="quarter" idx="12"/>
-          </p:nvPr>
-        </p:nvSpPr>
-        <p:spPr/>
-        <p:txBody>
-          <a:bodyPr/>
-          <a:lstStyle/>
-          <a:p>
-            <a:fld id="{AEFF399F-E3B5-4890-BC79-9BC8D4DF3F2D}" type="slidenum">
-              <a:rPr lang="nl-BE" smtClean="0"/>
-              <a:t>39</a:t>
             </a:fld>
             <a:endParaRPr lang="nl-BE"/>
           </a:p>
@@ -20943,7 +19888,7 @@
 </p:sld>
 </file>
 
-<file path=ppt/slides/slide4.xml><?xml version="1.0" encoding="utf-8"?>
+<file path=ppt/slides/slide39.xml><?xml version="1.0" encoding="utf-8"?>
 <p:sld xmlns:a="http://schemas.openxmlformats.org/drawingml/2006/main" xmlns:r="http://schemas.openxmlformats.org/officeDocument/2006/relationships" xmlns:p="http://schemas.openxmlformats.org/presentationml/2006/main">
   <p:cSld>
     <p:spTree>
@@ -20977,28 +19922,8 @@
           <a:p>
             <a:r>
               <a:rPr lang="en-US" dirty="0"/>
-              <a:t>Introduction</a:t>
-            </a:r>
-            <a:endParaRPr lang="nl-BE" dirty="0"/>
-          </a:p>
-        </p:txBody>
-      </p:sp>
-      <p:sp>
-        <p:nvSpPr>
-          <p:cNvPr id="3" name="Text Placeholder 2"/>
-          <p:cNvSpPr>
-            <a:spLocks noGrp="1"/>
-          </p:cNvSpPr>
-          <p:nvPr>
-            <p:ph type="body" idx="1"/>
-          </p:nvPr>
-        </p:nvSpPr>
-        <p:spPr/>
-        <p:txBody>
-          <a:bodyPr/>
-          <a:lstStyle/>
-          <a:p>
-            <a:endParaRPr lang="nl-BE"/>
+              <a:t>Define service</a:t>
+            </a:r>
           </a:p>
         </p:txBody>
       </p:sp>
@@ -21019,82 +19944,7 @@
           <a:p>
             <a:fld id="{AEFF399F-E3B5-4890-BC79-9BC8D4DF3F2D}" type="slidenum">
               <a:rPr lang="nl-BE" smtClean="0"/>
-              <a:t>4</a:t>
-            </a:fld>
-            <a:endParaRPr lang="nl-BE"/>
-          </a:p>
-        </p:txBody>
-      </p:sp>
-    </p:spTree>
-    <p:extLst>
-      <p:ext uri="{BB962C8B-B14F-4D97-AF65-F5344CB8AC3E}">
-        <p14:creationId xmlns:p14="http://schemas.microsoft.com/office/powerpoint/2010/main" val="2215557954"/>
-      </p:ext>
-    </p:extLst>
-  </p:cSld>
-  <p:clrMapOvr>
-    <a:masterClrMapping/>
-  </p:clrMapOvr>
-</p:sld>
-</file>
-
-<file path=ppt/slides/slide40.xml><?xml version="1.0" encoding="utf-8"?>
-<p:sld xmlns:a="http://schemas.openxmlformats.org/drawingml/2006/main" xmlns:r="http://schemas.openxmlformats.org/officeDocument/2006/relationships" xmlns:p="http://schemas.openxmlformats.org/presentationml/2006/main">
-  <p:cSld>
-    <p:spTree>
-      <p:nvGrpSpPr>
-        <p:cNvPr id="1" name=""/>
-        <p:cNvGrpSpPr/>
-        <p:nvPr/>
-      </p:nvGrpSpPr>
-      <p:grpSpPr>
-        <a:xfrm>
-          <a:off x="0" y="0"/>
-          <a:ext cx="0" cy="0"/>
-          <a:chOff x="0" y="0"/>
-          <a:chExt cx="0" cy="0"/>
-        </a:xfrm>
-      </p:grpSpPr>
-      <p:sp>
-        <p:nvSpPr>
-          <p:cNvPr id="2" name="Title 1"/>
-          <p:cNvSpPr>
-            <a:spLocks noGrp="1"/>
-          </p:cNvSpPr>
-          <p:nvPr>
-            <p:ph type="title"/>
-          </p:nvPr>
-        </p:nvSpPr>
-        <p:spPr/>
-        <p:txBody>
-          <a:bodyPr/>
-          <a:lstStyle/>
-          <a:p>
-            <a:r>
-              <a:rPr lang="en-US" dirty="0"/>
-              <a:t>Define service</a:t>
-            </a:r>
-          </a:p>
-        </p:txBody>
-      </p:sp>
-      <p:sp>
-        <p:nvSpPr>
-          <p:cNvPr id="4" name="Slide Number Placeholder 3"/>
-          <p:cNvSpPr>
-            <a:spLocks noGrp="1"/>
-          </p:cNvSpPr>
-          <p:nvPr>
-            <p:ph type="sldNum" sz="quarter" idx="12"/>
-          </p:nvPr>
-        </p:nvSpPr>
-        <p:spPr/>
-        <p:txBody>
-          <a:bodyPr/>
-          <a:lstStyle/>
-          <a:p>
-            <a:fld id="{AEFF399F-E3B5-4890-BC79-9BC8D4DF3F2D}" type="slidenum">
-              <a:rPr lang="nl-BE" smtClean="0"/>
-              <a:t>40</a:t>
+              <a:t>39</a:t>
             </a:fld>
             <a:endParaRPr lang="nl-BE"/>
           </a:p>
@@ -21858,7 +20708,7 @@
 </p:sld>
 </file>
 
-<file path=ppt/slides/slide41.xml><?xml version="1.0" encoding="utf-8"?>
+<file path=ppt/slides/slide4.xml><?xml version="1.0" encoding="utf-8"?>
 <p:sld xmlns:a="http://schemas.openxmlformats.org/drawingml/2006/main" xmlns:r="http://schemas.openxmlformats.org/officeDocument/2006/relationships" xmlns:p="http://schemas.openxmlformats.org/presentationml/2006/main">
   <p:cSld>
     <p:spTree>
@@ -21892,6 +20742,101 @@
           <a:p>
             <a:r>
               <a:rPr lang="en-US" dirty="0"/>
+              <a:t>Introduction</a:t>
+            </a:r>
+            <a:endParaRPr lang="nl-BE" dirty="0"/>
+          </a:p>
+        </p:txBody>
+      </p:sp>
+      <p:sp>
+        <p:nvSpPr>
+          <p:cNvPr id="3" name="Text Placeholder 2"/>
+          <p:cNvSpPr>
+            <a:spLocks noGrp="1"/>
+          </p:cNvSpPr>
+          <p:nvPr>
+            <p:ph type="body" idx="1"/>
+          </p:nvPr>
+        </p:nvSpPr>
+        <p:spPr/>
+        <p:txBody>
+          <a:bodyPr/>
+          <a:lstStyle/>
+          <a:p>
+            <a:endParaRPr lang="nl-BE"/>
+          </a:p>
+        </p:txBody>
+      </p:sp>
+      <p:sp>
+        <p:nvSpPr>
+          <p:cNvPr id="4" name="Slide Number Placeholder 3"/>
+          <p:cNvSpPr>
+            <a:spLocks noGrp="1"/>
+          </p:cNvSpPr>
+          <p:nvPr>
+            <p:ph type="sldNum" sz="quarter" idx="12"/>
+          </p:nvPr>
+        </p:nvSpPr>
+        <p:spPr/>
+        <p:txBody>
+          <a:bodyPr/>
+          <a:lstStyle/>
+          <a:p>
+            <a:fld id="{AEFF399F-E3B5-4890-BC79-9BC8D4DF3F2D}" type="slidenum">
+              <a:rPr lang="nl-BE" smtClean="0"/>
+              <a:t>4</a:t>
+            </a:fld>
+            <a:endParaRPr lang="nl-BE"/>
+          </a:p>
+        </p:txBody>
+      </p:sp>
+    </p:spTree>
+    <p:extLst>
+      <p:ext uri="{BB962C8B-B14F-4D97-AF65-F5344CB8AC3E}">
+        <p14:creationId xmlns:p14="http://schemas.microsoft.com/office/powerpoint/2010/main" val="2215557954"/>
+      </p:ext>
+    </p:extLst>
+  </p:cSld>
+  <p:clrMapOvr>
+    <a:masterClrMapping/>
+  </p:clrMapOvr>
+</p:sld>
+</file>
+
+<file path=ppt/slides/slide40.xml><?xml version="1.0" encoding="utf-8"?>
+<p:sld xmlns:a="http://schemas.openxmlformats.org/drawingml/2006/main" xmlns:r="http://schemas.openxmlformats.org/officeDocument/2006/relationships" xmlns:p="http://schemas.openxmlformats.org/presentationml/2006/main">
+  <p:cSld>
+    <p:spTree>
+      <p:nvGrpSpPr>
+        <p:cNvPr id="1" name=""/>
+        <p:cNvGrpSpPr/>
+        <p:nvPr/>
+      </p:nvGrpSpPr>
+      <p:grpSpPr>
+        <a:xfrm>
+          <a:off x="0" y="0"/>
+          <a:ext cx="0" cy="0"/>
+          <a:chOff x="0" y="0"/>
+          <a:chExt cx="0" cy="0"/>
+        </a:xfrm>
+      </p:grpSpPr>
+      <p:sp>
+        <p:nvSpPr>
+          <p:cNvPr id="2" name="Title 1"/>
+          <p:cNvSpPr>
+            <a:spLocks noGrp="1"/>
+          </p:cNvSpPr>
+          <p:nvPr>
+            <p:ph type="title"/>
+          </p:nvPr>
+        </p:nvSpPr>
+        <p:spPr/>
+        <p:txBody>
+          <a:bodyPr/>
+          <a:lstStyle/>
+          <a:p>
+            <a:r>
+              <a:rPr lang="en-US" dirty="0"/>
               <a:t>Recipe</a:t>
             </a:r>
           </a:p>
@@ -21914,7 +20859,7 @@
           <a:p>
             <a:fld id="{AEFF399F-E3B5-4890-BC79-9BC8D4DF3F2D}" type="slidenum">
               <a:rPr lang="nl-BE" smtClean="0"/>
-              <a:t>41</a:t>
+              <a:t>40</a:t>
             </a:fld>
             <a:endParaRPr lang="nl-BE"/>
           </a:p>
@@ -22802,7 +21747,7 @@
 </p:sld>
 </file>
 
-<file path=ppt/slides/slide42.xml><?xml version="1.0" encoding="utf-8"?>
+<file path=ppt/slides/slide41.xml><?xml version="1.0" encoding="utf-8"?>
 <p:sld xmlns:a="http://schemas.openxmlformats.org/drawingml/2006/main" xmlns:r="http://schemas.openxmlformats.org/officeDocument/2006/relationships" xmlns:p="http://schemas.openxmlformats.org/presentationml/2006/main">
   <p:cSld>
     <p:spTree>
@@ -22910,7 +21855,7 @@
           <a:p>
             <a:fld id="{AEFF399F-E3B5-4890-BC79-9BC8D4DF3F2D}" type="slidenum">
               <a:rPr lang="nl-BE" smtClean="0"/>
-              <a:t>42</a:t>
+              <a:t>41</a:t>
             </a:fld>
             <a:endParaRPr lang="nl-BE" dirty="0"/>
           </a:p>
@@ -23778,7 +22723,7 @@
 </p:sld>
 </file>
 
-<file path=ppt/slides/slide43.xml><?xml version="1.0" encoding="utf-8"?>
+<file path=ppt/slides/slide42.xml><?xml version="1.0" encoding="utf-8"?>
 <p:sld xmlns:a="http://schemas.openxmlformats.org/drawingml/2006/main" xmlns:r="http://schemas.openxmlformats.org/officeDocument/2006/relationships" xmlns:p="http://schemas.openxmlformats.org/presentationml/2006/main">
   <p:cSld>
     <p:spTree>
@@ -23854,7 +22799,7 @@
           <a:p>
             <a:fld id="{AEFF399F-E3B5-4890-BC79-9BC8D4DF3F2D}" type="slidenum">
               <a:rPr lang="nl-BE" smtClean="0"/>
-              <a:t>43</a:t>
+              <a:t>42</a:t>
             </a:fld>
             <a:endParaRPr lang="nl-BE"/>
           </a:p>
@@ -23873,7 +22818,7 @@
 </p:sld>
 </file>
 
-<file path=ppt/slides/slide44.xml><?xml version="1.0" encoding="utf-8"?>
+<file path=ppt/slides/slide43.xml><?xml version="1.0" encoding="utf-8"?>
 <p:sld xmlns:a="http://schemas.openxmlformats.org/drawingml/2006/main" xmlns:r="http://schemas.openxmlformats.org/officeDocument/2006/relationships" xmlns:p="http://schemas.openxmlformats.org/presentationml/2006/main">
   <p:cSld>
     <p:spTree>
@@ -24087,7 +23032,7 @@
           <a:p>
             <a:fld id="{AEFF399F-E3B5-4890-BC79-9BC8D4DF3F2D}" type="slidenum">
               <a:rPr lang="nl-BE" smtClean="0"/>
-              <a:t>44</a:t>
+              <a:t>43</a:t>
             </a:fld>
             <a:endParaRPr lang="nl-BE"/>
           </a:p>
@@ -24617,7 +23562,7 @@
 </p:sld>
 </file>
 
-<file path=ppt/slides/slide45.xml><?xml version="1.0" encoding="utf-8"?>
+<file path=ppt/slides/slide44.xml><?xml version="1.0" encoding="utf-8"?>
 <p:sld xmlns:a="http://schemas.openxmlformats.org/drawingml/2006/main" xmlns:r="http://schemas.openxmlformats.org/officeDocument/2006/relationships" xmlns:p="http://schemas.openxmlformats.org/presentationml/2006/main">
   <p:cSld>
     <p:spTree>
@@ -24767,7 +23712,7 @@
           <a:p>
             <a:fld id="{AEFF399F-E3B5-4890-BC79-9BC8D4DF3F2D}" type="slidenum">
               <a:rPr lang="nl-BE" smtClean="0"/>
-              <a:t>45</a:t>
+              <a:t>44</a:t>
             </a:fld>
             <a:endParaRPr lang="nl-BE"/>
           </a:p>
@@ -25018,7 +23963,7 @@
 </p:sld>
 </file>
 
-<file path=ppt/slides/slide46.xml><?xml version="1.0" encoding="utf-8"?>
+<file path=ppt/slides/slide45.xml><?xml version="1.0" encoding="utf-8"?>
 <p:sld xmlns:a="http://schemas.openxmlformats.org/drawingml/2006/main" xmlns:r="http://schemas.openxmlformats.org/officeDocument/2006/relationships" xmlns:p="http://schemas.openxmlformats.org/presentationml/2006/main">
   <p:cSld>
     <p:spTree>
@@ -25229,7 +24174,7 @@
           <a:p>
             <a:fld id="{AEFF399F-E3B5-4890-BC79-9BC8D4DF3F2D}" type="slidenum">
               <a:rPr lang="nl-BE" smtClean="0"/>
-              <a:t>46</a:t>
+              <a:t>45</a:t>
             </a:fld>
             <a:endParaRPr lang="nl-BE"/>
           </a:p>
@@ -25560,6 +24505,101 @@
 </p:sld>
 </file>
 
+<file path=ppt/slides/slide46.xml><?xml version="1.0" encoding="utf-8"?>
+<p:sld xmlns:a="http://schemas.openxmlformats.org/drawingml/2006/main" xmlns:r="http://schemas.openxmlformats.org/officeDocument/2006/relationships" xmlns:p="http://schemas.openxmlformats.org/presentationml/2006/main">
+  <p:cSld>
+    <p:spTree>
+      <p:nvGrpSpPr>
+        <p:cNvPr id="1" name=""/>
+        <p:cNvGrpSpPr/>
+        <p:nvPr/>
+      </p:nvGrpSpPr>
+      <p:grpSpPr>
+        <a:xfrm>
+          <a:off x="0" y="0"/>
+          <a:ext cx="0" cy="0"/>
+          <a:chOff x="0" y="0"/>
+          <a:chExt cx="0" cy="0"/>
+        </a:xfrm>
+      </p:grpSpPr>
+      <p:sp>
+        <p:nvSpPr>
+          <p:cNvPr id="2" name="Title 1"/>
+          <p:cNvSpPr>
+            <a:spLocks noGrp="1"/>
+          </p:cNvSpPr>
+          <p:nvPr>
+            <p:ph type="title"/>
+          </p:nvPr>
+        </p:nvSpPr>
+        <p:spPr/>
+        <p:txBody>
+          <a:bodyPr/>
+          <a:lstStyle/>
+          <a:p>
+            <a:r>
+              <a:rPr lang="en-US" dirty="0"/>
+              <a:t>Conclusions</a:t>
+            </a:r>
+            <a:endParaRPr lang="nl-BE" dirty="0"/>
+          </a:p>
+        </p:txBody>
+      </p:sp>
+      <p:sp>
+        <p:nvSpPr>
+          <p:cNvPr id="3" name="Text Placeholder 2"/>
+          <p:cNvSpPr>
+            <a:spLocks noGrp="1"/>
+          </p:cNvSpPr>
+          <p:nvPr>
+            <p:ph type="body" idx="1"/>
+          </p:nvPr>
+        </p:nvSpPr>
+        <p:spPr/>
+        <p:txBody>
+          <a:bodyPr/>
+          <a:lstStyle/>
+          <a:p>
+            <a:endParaRPr lang="nl-BE"/>
+          </a:p>
+        </p:txBody>
+      </p:sp>
+      <p:sp>
+        <p:nvSpPr>
+          <p:cNvPr id="4" name="Slide Number Placeholder 3"/>
+          <p:cNvSpPr>
+            <a:spLocks noGrp="1"/>
+          </p:cNvSpPr>
+          <p:nvPr>
+            <p:ph type="sldNum" sz="quarter" idx="12"/>
+          </p:nvPr>
+        </p:nvSpPr>
+        <p:spPr/>
+        <p:txBody>
+          <a:bodyPr/>
+          <a:lstStyle/>
+          <a:p>
+            <a:fld id="{AEFF399F-E3B5-4890-BC79-9BC8D4DF3F2D}" type="slidenum">
+              <a:rPr lang="nl-BE" smtClean="0"/>
+              <a:t>46</a:t>
+            </a:fld>
+            <a:endParaRPr lang="nl-BE"/>
+          </a:p>
+        </p:txBody>
+      </p:sp>
+    </p:spTree>
+    <p:extLst>
+      <p:ext uri="{BB962C8B-B14F-4D97-AF65-F5344CB8AC3E}">
+        <p14:creationId xmlns:p14="http://schemas.microsoft.com/office/powerpoint/2010/main" val="2192721825"/>
+      </p:ext>
+    </p:extLst>
+  </p:cSld>
+  <p:clrMapOvr>
+    <a:masterClrMapping/>
+  </p:clrMapOvr>
+</p:sld>
+</file>
+
 <file path=ppt/slides/slide47.xml><?xml version="1.0" encoding="utf-8"?>
 <p:sld xmlns:a="http://schemas.openxmlformats.org/drawingml/2006/main" xmlns:r="http://schemas.openxmlformats.org/officeDocument/2006/relationships" xmlns:p="http://schemas.openxmlformats.org/presentationml/2006/main">
   <p:cSld>
@@ -25602,12 +24642,12 @@
       </p:sp>
       <p:sp>
         <p:nvSpPr>
-          <p:cNvPr id="3" name="Text Placeholder 2"/>
+          <p:cNvPr id="3" name="Content Placeholder 2"/>
           <p:cNvSpPr>
             <a:spLocks noGrp="1"/>
           </p:cNvSpPr>
           <p:nvPr>
-            <p:ph type="body" idx="1"/>
+            <p:ph idx="1"/>
           </p:nvPr>
         </p:nvSpPr>
         <p:spPr/>
@@ -25615,7 +24655,85 @@
           <a:bodyPr/>
           <a:lstStyle/>
           <a:p>
-            <a:endParaRPr lang="nl-BE"/>
+            <a:r>
+              <a:rPr lang="en-US" dirty="0" err="1"/>
+              <a:t>Apptainer</a:t>
+            </a:r>
+            <a:r>
+              <a:rPr lang="en-US" dirty="0"/>
+              <a:t> advantages</a:t>
+            </a:r>
+          </a:p>
+          <a:p>
+            <a:pPr lvl="1"/>
+            <a:r>
+              <a:rPr lang="en-US" dirty="0"/>
+              <a:t>Portability</a:t>
+            </a:r>
+          </a:p>
+          <a:p>
+            <a:pPr lvl="1"/>
+            <a:r>
+              <a:rPr lang="en-US" dirty="0"/>
+              <a:t>Reproducibility: recipes under version control</a:t>
+            </a:r>
+          </a:p>
+          <a:p>
+            <a:pPr lvl="1"/>
+            <a:r>
+              <a:rPr lang="en-US" dirty="0"/>
+              <a:t>Easily create images</a:t>
+            </a:r>
+          </a:p>
+          <a:p>
+            <a:pPr lvl="1"/>
+            <a:r>
+              <a:rPr lang="en-US" dirty="0"/>
+              <a:t>Integrate images into existing workflows</a:t>
+            </a:r>
+          </a:p>
+          <a:p>
+            <a:pPr lvl="1"/>
+            <a:r>
+              <a:rPr lang="en-US" dirty="0"/>
+              <a:t>No privilege escalation</a:t>
+            </a:r>
+          </a:p>
+          <a:p>
+            <a:pPr lvl="2"/>
+            <a:r>
+              <a:rPr lang="en-US" dirty="0"/>
+              <a:t>Create as root</a:t>
+            </a:r>
+          </a:p>
+          <a:p>
+            <a:pPr lvl="2"/>
+            <a:r>
+              <a:rPr lang="en-US" dirty="0"/>
+              <a:t>Run as user, no </a:t>
+            </a:r>
+            <a:r>
+              <a:rPr lang="en-US" dirty="0" err="1"/>
+              <a:t>sudo</a:t>
+            </a:r>
+            <a:r>
+              <a:rPr lang="en-US" dirty="0"/>
+              <a:t> possible</a:t>
+            </a:r>
+          </a:p>
+          <a:p>
+            <a:pPr lvl="1"/>
+            <a:r>
+              <a:rPr lang="en-US" dirty="0"/>
+              <a:t>Quite reasonable performance/overhead</a:t>
+            </a:r>
+          </a:p>
+          <a:p>
+            <a:r>
+              <a:rPr lang="en-US" dirty="0"/>
+              <a:t>Not an excuse to run crappy/suboptimal software!</a:t>
+            </a:r>
+            <a:endParaRPr lang="nl-BE" dirty="0"/>
           </a:p>
         </p:txBody>
       </p:sp>
@@ -25637,179 +24755,6 @@
             <a:fld id="{AEFF399F-E3B5-4890-BC79-9BC8D4DF3F2D}" type="slidenum">
               <a:rPr lang="nl-BE" smtClean="0"/>
               <a:t>47</a:t>
-            </a:fld>
-            <a:endParaRPr lang="nl-BE"/>
-          </a:p>
-        </p:txBody>
-      </p:sp>
-    </p:spTree>
-    <p:extLst>
-      <p:ext uri="{BB962C8B-B14F-4D97-AF65-F5344CB8AC3E}">
-        <p14:creationId xmlns:p14="http://schemas.microsoft.com/office/powerpoint/2010/main" val="2192721825"/>
-      </p:ext>
-    </p:extLst>
-  </p:cSld>
-  <p:clrMapOvr>
-    <a:masterClrMapping/>
-  </p:clrMapOvr>
-</p:sld>
-</file>
-
-<file path=ppt/slides/slide48.xml><?xml version="1.0" encoding="utf-8"?>
-<p:sld xmlns:a="http://schemas.openxmlformats.org/drawingml/2006/main" xmlns:r="http://schemas.openxmlformats.org/officeDocument/2006/relationships" xmlns:p="http://schemas.openxmlformats.org/presentationml/2006/main">
-  <p:cSld>
-    <p:spTree>
-      <p:nvGrpSpPr>
-        <p:cNvPr id="1" name=""/>
-        <p:cNvGrpSpPr/>
-        <p:nvPr/>
-      </p:nvGrpSpPr>
-      <p:grpSpPr>
-        <a:xfrm>
-          <a:off x="0" y="0"/>
-          <a:ext cx="0" cy="0"/>
-          <a:chOff x="0" y="0"/>
-          <a:chExt cx="0" cy="0"/>
-        </a:xfrm>
-      </p:grpSpPr>
-      <p:sp>
-        <p:nvSpPr>
-          <p:cNvPr id="2" name="Title 1"/>
-          <p:cNvSpPr>
-            <a:spLocks noGrp="1"/>
-          </p:cNvSpPr>
-          <p:nvPr>
-            <p:ph type="title"/>
-          </p:nvPr>
-        </p:nvSpPr>
-        <p:spPr/>
-        <p:txBody>
-          <a:bodyPr/>
-          <a:lstStyle/>
-          <a:p>
-            <a:r>
-              <a:rPr lang="en-US" dirty="0"/>
-              <a:t>Conclusions</a:t>
-            </a:r>
-            <a:endParaRPr lang="nl-BE" dirty="0"/>
-          </a:p>
-        </p:txBody>
-      </p:sp>
-      <p:sp>
-        <p:nvSpPr>
-          <p:cNvPr id="3" name="Content Placeholder 2"/>
-          <p:cNvSpPr>
-            <a:spLocks noGrp="1"/>
-          </p:cNvSpPr>
-          <p:nvPr>
-            <p:ph idx="1"/>
-          </p:nvPr>
-        </p:nvSpPr>
-        <p:spPr/>
-        <p:txBody>
-          <a:bodyPr/>
-          <a:lstStyle/>
-          <a:p>
-            <a:r>
-              <a:rPr lang="en-US" dirty="0" err="1"/>
-              <a:t>Apptainer</a:t>
-            </a:r>
-            <a:r>
-              <a:rPr lang="en-US" dirty="0"/>
-              <a:t> advantages</a:t>
-            </a:r>
-          </a:p>
-          <a:p>
-            <a:pPr lvl="1"/>
-            <a:r>
-              <a:rPr lang="en-US" dirty="0"/>
-              <a:t>Portability</a:t>
-            </a:r>
-          </a:p>
-          <a:p>
-            <a:pPr lvl="1"/>
-            <a:r>
-              <a:rPr lang="en-US" dirty="0"/>
-              <a:t>Reproducibility: recipes under version control</a:t>
-            </a:r>
-          </a:p>
-          <a:p>
-            <a:pPr lvl="1"/>
-            <a:r>
-              <a:rPr lang="en-US" dirty="0"/>
-              <a:t>Easily create images</a:t>
-            </a:r>
-          </a:p>
-          <a:p>
-            <a:pPr lvl="1"/>
-            <a:r>
-              <a:rPr lang="en-US" dirty="0"/>
-              <a:t>Integrate images into existing workflows</a:t>
-            </a:r>
-          </a:p>
-          <a:p>
-            <a:pPr lvl="1"/>
-            <a:r>
-              <a:rPr lang="en-US" dirty="0"/>
-              <a:t>No privilege escalation</a:t>
-            </a:r>
-          </a:p>
-          <a:p>
-            <a:pPr lvl="2"/>
-            <a:r>
-              <a:rPr lang="en-US" dirty="0"/>
-              <a:t>Create as root</a:t>
-            </a:r>
-          </a:p>
-          <a:p>
-            <a:pPr lvl="2"/>
-            <a:r>
-              <a:rPr lang="en-US" dirty="0"/>
-              <a:t>Run as user, no </a:t>
-            </a:r>
-            <a:r>
-              <a:rPr lang="en-US" dirty="0" err="1"/>
-              <a:t>sudo</a:t>
-            </a:r>
-            <a:r>
-              <a:rPr lang="en-US" dirty="0"/>
-              <a:t> possible</a:t>
-            </a:r>
-          </a:p>
-          <a:p>
-            <a:pPr lvl="1"/>
-            <a:r>
-              <a:rPr lang="en-US" dirty="0"/>
-              <a:t>Quite reasonable performance/overhead</a:t>
-            </a:r>
-          </a:p>
-          <a:p>
-            <a:r>
-              <a:rPr lang="en-US" dirty="0"/>
-              <a:t>Not an excuse to run crappy/suboptimal software!</a:t>
-            </a:r>
-            <a:endParaRPr lang="nl-BE" dirty="0"/>
-          </a:p>
-        </p:txBody>
-      </p:sp>
-      <p:sp>
-        <p:nvSpPr>
-          <p:cNvPr id="4" name="Slide Number Placeholder 3"/>
-          <p:cNvSpPr>
-            <a:spLocks noGrp="1"/>
-          </p:cNvSpPr>
-          <p:nvPr>
-            <p:ph type="sldNum" sz="quarter" idx="12"/>
-          </p:nvPr>
-        </p:nvSpPr>
-        <p:spPr/>
-        <p:txBody>
-          <a:bodyPr/>
-          <a:lstStyle/>
-          <a:p>
-            <a:fld id="{AEFF399F-E3B5-4890-BC79-9BC8D4DF3F2D}" type="slidenum">
-              <a:rPr lang="nl-BE" smtClean="0"/>
-              <a:t>48</a:t>
             </a:fld>
             <a:endParaRPr lang="nl-BE"/>
           </a:p>
@@ -26318,7 +25263,7 @@
 </p:sld>
 </file>
 
-<file path=ppt/slides/slide49.xml><?xml version="1.0" encoding="utf-8"?>
+<file path=ppt/slides/slide48.xml><?xml version="1.0" encoding="utf-8"?>
 <p:sld xmlns:a="http://schemas.openxmlformats.org/drawingml/2006/main" xmlns:r="http://schemas.openxmlformats.org/officeDocument/2006/relationships" xmlns:p="http://schemas.openxmlformats.org/presentationml/2006/main">
   <p:cSld>
     <p:spTree>
@@ -26491,7 +25436,7 @@
           <a:p>
             <a:fld id="{AEFF399F-E3B5-4890-BC79-9BC8D4DF3F2D}" type="slidenum">
               <a:rPr lang="nl-BE" smtClean="0"/>
-              <a:t>49</a:t>
+              <a:t>48</a:t>
             </a:fld>
             <a:endParaRPr lang="nl-BE"/>
           </a:p>
@@ -26501,6 +25446,119 @@
     <p:extLst>
       <p:ext uri="{BB962C8B-B14F-4D97-AF65-F5344CB8AC3E}">
         <p14:creationId xmlns:p14="http://schemas.microsoft.com/office/powerpoint/2010/main" val="3984500910"/>
+      </p:ext>
+    </p:extLst>
+  </p:cSld>
+  <p:clrMapOvr>
+    <a:masterClrMapping/>
+  </p:clrMapOvr>
+</p:sld>
+</file>
+
+<file path=ppt/slides/slide49.xml><?xml version="1.0" encoding="utf-8"?>
+<p:sld xmlns:a="http://schemas.openxmlformats.org/drawingml/2006/main" xmlns:r="http://schemas.openxmlformats.org/officeDocument/2006/relationships" xmlns:p="http://schemas.openxmlformats.org/presentationml/2006/main">
+  <p:cSld>
+    <p:spTree>
+      <p:nvGrpSpPr>
+        <p:cNvPr id="1" name=""/>
+        <p:cNvGrpSpPr/>
+        <p:nvPr/>
+      </p:nvGrpSpPr>
+      <p:grpSpPr>
+        <a:xfrm>
+          <a:off x="0" y="0"/>
+          <a:ext cx="0" cy="0"/>
+          <a:chOff x="0" y="0"/>
+          <a:chExt cx="0" cy="0"/>
+        </a:xfrm>
+      </p:grpSpPr>
+      <p:sp>
+        <p:nvSpPr>
+          <p:cNvPr id="5" name="Title 4">
+            <a:extLst>
+              <a:ext uri="{FF2B5EF4-FFF2-40B4-BE49-F238E27FC236}">
+                <a16:creationId xmlns:a16="http://schemas.microsoft.com/office/drawing/2014/main" id="{9091AECB-7A4E-4CDD-8034-431325CB5480}"/>
+              </a:ext>
+            </a:extLst>
+          </p:cNvPr>
+          <p:cNvSpPr>
+            <a:spLocks noGrp="1"/>
+          </p:cNvSpPr>
+          <p:nvPr>
+            <p:ph type="title"/>
+          </p:nvPr>
+        </p:nvSpPr>
+        <p:spPr/>
+        <p:txBody>
+          <a:bodyPr/>
+          <a:lstStyle/>
+          <a:p>
+            <a:r>
+              <a:rPr lang="en-US" dirty="0" err="1"/>
+              <a:t>podman</a:t>
+            </a:r>
+            <a:endParaRPr lang="en-US" dirty="0"/>
+          </a:p>
+        </p:txBody>
+      </p:sp>
+      <p:sp>
+        <p:nvSpPr>
+          <p:cNvPr id="6" name="Text Placeholder 5">
+            <a:extLst>
+              <a:ext uri="{FF2B5EF4-FFF2-40B4-BE49-F238E27FC236}">
+                <a16:creationId xmlns:a16="http://schemas.microsoft.com/office/drawing/2014/main" id="{C6E58A0E-B656-4AC9-956C-A89EE4C1B406}"/>
+              </a:ext>
+            </a:extLst>
+          </p:cNvPr>
+          <p:cNvSpPr>
+            <a:spLocks noGrp="1"/>
+          </p:cNvSpPr>
+          <p:nvPr>
+            <p:ph type="body" idx="1"/>
+          </p:nvPr>
+        </p:nvSpPr>
+        <p:spPr/>
+        <p:txBody>
+          <a:bodyPr/>
+          <a:lstStyle/>
+          <a:p>
+            <a:endParaRPr lang="en-US"/>
+          </a:p>
+        </p:txBody>
+      </p:sp>
+      <p:sp>
+        <p:nvSpPr>
+          <p:cNvPr id="4" name="Slide Number Placeholder 3">
+            <a:extLst>
+              <a:ext uri="{FF2B5EF4-FFF2-40B4-BE49-F238E27FC236}">
+                <a16:creationId xmlns:a16="http://schemas.microsoft.com/office/drawing/2014/main" id="{452170FA-B818-48CB-9A82-774DAE2FEC5D}"/>
+              </a:ext>
+            </a:extLst>
+          </p:cNvPr>
+          <p:cNvSpPr>
+            <a:spLocks noGrp="1"/>
+          </p:cNvSpPr>
+          <p:nvPr>
+            <p:ph type="sldNum" sz="quarter" idx="12"/>
+          </p:nvPr>
+        </p:nvSpPr>
+        <p:spPr/>
+        <p:txBody>
+          <a:bodyPr/>
+          <a:lstStyle/>
+          <a:p>
+            <a:fld id="{AEFF399F-E3B5-4890-BC79-9BC8D4DF3F2D}" type="slidenum">
+              <a:rPr lang="nl-BE" smtClean="0"/>
+              <a:t>49</a:t>
+            </a:fld>
+            <a:endParaRPr lang="nl-BE"/>
+          </a:p>
+        </p:txBody>
+      </p:sp>
+    </p:spTree>
+    <p:extLst>
+      <p:ext uri="{BB962C8B-B14F-4D97-AF65-F5344CB8AC3E}">
+        <p14:creationId xmlns:p14="http://schemas.microsoft.com/office/powerpoint/2010/main" val="1670907563"/>
       </p:ext>
     </p:extLst>
   </p:cSld>
@@ -27041,119 +26099,6 @@
           <p:cNvPr id="5" name="Title 4">
             <a:extLst>
               <a:ext uri="{FF2B5EF4-FFF2-40B4-BE49-F238E27FC236}">
-                <a16:creationId xmlns:a16="http://schemas.microsoft.com/office/drawing/2014/main" id="{9091AECB-7A4E-4CDD-8034-431325CB5480}"/>
-              </a:ext>
-            </a:extLst>
-          </p:cNvPr>
-          <p:cNvSpPr>
-            <a:spLocks noGrp="1"/>
-          </p:cNvSpPr>
-          <p:nvPr>
-            <p:ph type="title"/>
-          </p:nvPr>
-        </p:nvSpPr>
-        <p:spPr/>
-        <p:txBody>
-          <a:bodyPr/>
-          <a:lstStyle/>
-          <a:p>
-            <a:r>
-              <a:rPr lang="en-US" dirty="0" err="1"/>
-              <a:t>podman</a:t>
-            </a:r>
-            <a:endParaRPr lang="en-US" dirty="0"/>
-          </a:p>
-        </p:txBody>
-      </p:sp>
-      <p:sp>
-        <p:nvSpPr>
-          <p:cNvPr id="6" name="Text Placeholder 5">
-            <a:extLst>
-              <a:ext uri="{FF2B5EF4-FFF2-40B4-BE49-F238E27FC236}">
-                <a16:creationId xmlns:a16="http://schemas.microsoft.com/office/drawing/2014/main" id="{C6E58A0E-B656-4AC9-956C-A89EE4C1B406}"/>
-              </a:ext>
-            </a:extLst>
-          </p:cNvPr>
-          <p:cNvSpPr>
-            <a:spLocks noGrp="1"/>
-          </p:cNvSpPr>
-          <p:nvPr>
-            <p:ph type="body" idx="1"/>
-          </p:nvPr>
-        </p:nvSpPr>
-        <p:spPr/>
-        <p:txBody>
-          <a:bodyPr/>
-          <a:lstStyle/>
-          <a:p>
-            <a:endParaRPr lang="en-US"/>
-          </a:p>
-        </p:txBody>
-      </p:sp>
-      <p:sp>
-        <p:nvSpPr>
-          <p:cNvPr id="4" name="Slide Number Placeholder 3">
-            <a:extLst>
-              <a:ext uri="{FF2B5EF4-FFF2-40B4-BE49-F238E27FC236}">
-                <a16:creationId xmlns:a16="http://schemas.microsoft.com/office/drawing/2014/main" id="{452170FA-B818-48CB-9A82-774DAE2FEC5D}"/>
-              </a:ext>
-            </a:extLst>
-          </p:cNvPr>
-          <p:cNvSpPr>
-            <a:spLocks noGrp="1"/>
-          </p:cNvSpPr>
-          <p:nvPr>
-            <p:ph type="sldNum" sz="quarter" idx="12"/>
-          </p:nvPr>
-        </p:nvSpPr>
-        <p:spPr/>
-        <p:txBody>
-          <a:bodyPr/>
-          <a:lstStyle/>
-          <a:p>
-            <a:fld id="{AEFF399F-E3B5-4890-BC79-9BC8D4DF3F2D}" type="slidenum">
-              <a:rPr lang="nl-BE" smtClean="0"/>
-              <a:t>50</a:t>
-            </a:fld>
-            <a:endParaRPr lang="nl-BE"/>
-          </a:p>
-        </p:txBody>
-      </p:sp>
-    </p:spTree>
-    <p:extLst>
-      <p:ext uri="{BB962C8B-B14F-4D97-AF65-F5344CB8AC3E}">
-        <p14:creationId xmlns:p14="http://schemas.microsoft.com/office/powerpoint/2010/main" val="1670907563"/>
-      </p:ext>
-    </p:extLst>
-  </p:cSld>
-  <p:clrMapOvr>
-    <a:masterClrMapping/>
-  </p:clrMapOvr>
-</p:sld>
-</file>
-
-<file path=ppt/slides/slide51.xml><?xml version="1.0" encoding="utf-8"?>
-<p:sld xmlns:a="http://schemas.openxmlformats.org/drawingml/2006/main" xmlns:r="http://schemas.openxmlformats.org/officeDocument/2006/relationships" xmlns:p="http://schemas.openxmlformats.org/presentationml/2006/main">
-  <p:cSld>
-    <p:spTree>
-      <p:nvGrpSpPr>
-        <p:cNvPr id="1" name=""/>
-        <p:cNvGrpSpPr/>
-        <p:nvPr/>
-      </p:nvGrpSpPr>
-      <p:grpSpPr>
-        <a:xfrm>
-          <a:off x="0" y="0"/>
-          <a:ext cx="0" cy="0"/>
-          <a:chOff x="0" y="0"/>
-          <a:chExt cx="0" cy="0"/>
-        </a:xfrm>
-      </p:grpSpPr>
-      <p:sp>
-        <p:nvSpPr>
-          <p:cNvPr id="5" name="Title 4">
-            <a:extLst>
-              <a:ext uri="{FF2B5EF4-FFF2-40B4-BE49-F238E27FC236}">
                 <a16:creationId xmlns:a16="http://schemas.microsoft.com/office/drawing/2014/main" id="{0CEDB9E8-B663-4F3A-A21B-A8783B115314}"/>
               </a:ext>
             </a:extLst>
@@ -27262,7 +26207,7 @@
           <a:p>
             <a:fld id="{AEFF399F-E3B5-4890-BC79-9BC8D4DF3F2D}" type="slidenum">
               <a:rPr lang="nl-BE" smtClean="0"/>
-              <a:t>51</a:t>
+              <a:t>50</a:t>
             </a:fld>
             <a:endParaRPr lang="nl-BE"/>
           </a:p>
@@ -27281,7 +26226,7 @@
 </p:sld>
 </file>
 
-<file path=ppt/slides/slide52.xml><?xml version="1.0" encoding="utf-8"?>
+<file path=ppt/slides/slide51.xml><?xml version="1.0" encoding="utf-8"?>
 <p:sld xmlns:a="http://schemas.openxmlformats.org/drawingml/2006/main" xmlns:r="http://schemas.openxmlformats.org/officeDocument/2006/relationships" xmlns:p="http://schemas.openxmlformats.org/presentationml/2006/main">
   <p:cSld>
     <p:spTree>
@@ -27633,7 +26578,7 @@
           <a:p>
             <a:fld id="{AEFF399F-E3B5-4890-BC79-9BC8D4DF3F2D}" type="slidenum">
               <a:rPr lang="nl-BE" smtClean="0"/>
-              <a:t>52</a:t>
+              <a:t>51</a:t>
             </a:fld>
             <a:endParaRPr lang="nl-BE"/>
           </a:p>

</xml_diff>

<commit_message>
Add logos, fix typos
</commit_message>
<xml_diff>
--- a/containers_for_hpc.pptx
+++ b/containers_for_hpc.pptx
@@ -346,7 +346,7 @@
           <a:p>
             <a:fld id="{6BD974B4-F374-4E74-84D3-1EB7DBF32A2A}" type="datetimeFigureOut">
               <a:rPr lang="nl-BE" smtClean="0"/>
-              <a:t>21/10/2024</a:t>
+              <a:t>12/03/2025</a:t>
             </a:fld>
             <a:endParaRPr lang="nl-BE"/>
           </a:p>
@@ -829,7 +829,7 @@
           <a:p>
             <a:fld id="{A433E747-842D-4EF3-8202-AC54FEC33061}" type="datetime1">
               <a:rPr lang="nl-BE" smtClean="0"/>
-              <a:t>21/10/2024</a:t>
+              <a:t>12/03/2025</a:t>
             </a:fld>
             <a:endParaRPr lang="nl-BE"/>
           </a:p>
@@ -999,7 +999,7 @@
           <a:p>
             <a:fld id="{7C821354-3381-4DF5-ABED-FDAFA2BAD3F8}" type="datetime1">
               <a:rPr lang="nl-BE" smtClean="0"/>
-              <a:t>21/10/2024</a:t>
+              <a:t>12/03/2025</a:t>
             </a:fld>
             <a:endParaRPr lang="nl-BE"/>
           </a:p>
@@ -1179,7 +1179,7 @@
           <a:p>
             <a:fld id="{C6B54B95-9964-4BBF-B171-A69413AB9FC5}" type="datetime1">
               <a:rPr lang="nl-BE" smtClean="0"/>
-              <a:t>21/10/2024</a:t>
+              <a:t>12/03/2025</a:t>
             </a:fld>
             <a:endParaRPr lang="nl-BE"/>
           </a:p>
@@ -1349,7 +1349,7 @@
           <a:p>
             <a:fld id="{BE45CDE5-064C-4862-90E9-83B8FD778625}" type="datetime1">
               <a:rPr lang="nl-BE" smtClean="0"/>
-              <a:t>21/10/2024</a:t>
+              <a:t>12/03/2025</a:t>
             </a:fld>
             <a:endParaRPr lang="nl-BE"/>
           </a:p>
@@ -1593,7 +1593,7 @@
           <a:p>
             <a:fld id="{C75A345C-628E-463E-B8F7-69C25D344DF5}" type="datetime1">
               <a:rPr lang="nl-BE" smtClean="0"/>
-              <a:t>21/10/2024</a:t>
+              <a:t>12/03/2025</a:t>
             </a:fld>
             <a:endParaRPr lang="nl-BE"/>
           </a:p>
@@ -1825,7 +1825,7 @@
           <a:p>
             <a:fld id="{65B04534-538C-4249-A635-8BB2B8486464}" type="datetime1">
               <a:rPr lang="nl-BE" smtClean="0"/>
-              <a:t>21/10/2024</a:t>
+              <a:t>12/03/2025</a:t>
             </a:fld>
             <a:endParaRPr lang="nl-BE"/>
           </a:p>
@@ -2192,7 +2192,7 @@
           <a:p>
             <a:fld id="{089671CB-8547-4C91-A3D5-012E6E8790E6}" type="datetime1">
               <a:rPr lang="nl-BE" smtClean="0"/>
-              <a:t>21/10/2024</a:t>
+              <a:t>12/03/2025</a:t>
             </a:fld>
             <a:endParaRPr lang="nl-BE"/>
           </a:p>
@@ -2310,7 +2310,7 @@
           <a:p>
             <a:fld id="{5765335F-FC99-4A2B-B87B-6AF6F3762B67}" type="datetime1">
               <a:rPr lang="nl-BE" smtClean="0"/>
-              <a:t>21/10/2024</a:t>
+              <a:t>12/03/2025</a:t>
             </a:fld>
             <a:endParaRPr lang="nl-BE"/>
           </a:p>
@@ -2405,7 +2405,7 @@
           <a:p>
             <a:fld id="{1711BA58-B677-4D21-BDCD-9DD1AEA8A328}" type="datetime1">
               <a:rPr lang="nl-BE" smtClean="0"/>
-              <a:t>21/10/2024</a:t>
+              <a:t>12/03/2025</a:t>
             </a:fld>
             <a:endParaRPr lang="nl-BE"/>
           </a:p>
@@ -2682,7 +2682,7 @@
           <a:p>
             <a:fld id="{5513BE8B-B89C-461B-89D1-D5BE33ADB6B9}" type="datetime1">
               <a:rPr lang="nl-BE" smtClean="0"/>
-              <a:t>21/10/2024</a:t>
+              <a:t>12/03/2025</a:t>
             </a:fld>
             <a:endParaRPr lang="nl-BE"/>
           </a:p>
@@ -2939,7 +2939,7 @@
           <a:p>
             <a:fld id="{AEE65485-0554-4482-9B9C-289893A0B56B}" type="datetime1">
               <a:rPr lang="nl-BE" smtClean="0"/>
-              <a:t>21/10/2024</a:t>
+              <a:t>12/03/2025</a:t>
             </a:fld>
             <a:endParaRPr lang="nl-BE"/>
           </a:p>
@@ -3152,7 +3152,7 @@
           <a:p>
             <a:fld id="{6FF26CEC-AF8A-4096-9A53-521F7571A055}" type="datetime1">
               <a:rPr lang="nl-BE" smtClean="0"/>
-              <a:t>21/10/2024</a:t>
+              <a:t>12/03/2025</a:t>
             </a:fld>
             <a:endParaRPr lang="nl-BE"/>
           </a:p>
@@ -3691,6 +3691,87 @@
           </a:p>
         </p:txBody>
       </p:sp>
+      <p:pic>
+        <p:nvPicPr>
+          <p:cNvPr id="10" name="Picture 9">
+            <a:extLst>
+              <a:ext uri="{FF2B5EF4-FFF2-40B4-BE49-F238E27FC236}">
+                <a16:creationId xmlns:a16="http://schemas.microsoft.com/office/drawing/2014/main" id="{54CF7DEC-17C8-FFD7-5C81-5CF58552EA61}"/>
+              </a:ext>
+            </a:extLst>
+          </p:cNvPr>
+          <p:cNvPicPr>
+            <a:picLocks noChangeAspect="1"/>
+          </p:cNvPicPr>
+          <p:nvPr/>
+        </p:nvPicPr>
+        <p:blipFill>
+          <a:blip r:embed="rId4">
+            <a:extLst>
+              <a:ext uri="{28A0092B-C50C-407E-A947-70E740481C1C}">
+                <a14:useLocalDpi xmlns:a14="http://schemas.microsoft.com/office/drawing/2010/main" val="0"/>
+              </a:ext>
+            </a:extLst>
+          </a:blip>
+          <a:stretch>
+            <a:fillRect/>
+          </a:stretch>
+        </p:blipFill>
+        <p:spPr>
+          <a:xfrm>
+            <a:off x="987224" y="1046566"/>
+            <a:ext cx="2085975" cy="352425"/>
+          </a:xfrm>
+          <a:prstGeom prst="rect">
+            <a:avLst/>
+          </a:prstGeom>
+        </p:spPr>
+      </p:pic>
+      <p:pic>
+        <p:nvPicPr>
+          <p:cNvPr id="11" name="Picture 10">
+            <a:extLst>
+              <a:ext uri="{FF2B5EF4-FFF2-40B4-BE49-F238E27FC236}">
+                <a16:creationId xmlns:a16="http://schemas.microsoft.com/office/drawing/2014/main" id="{2D8B39AB-C0C4-F427-A259-DED7855ECAC7}"/>
+              </a:ext>
+            </a:extLst>
+          </p:cNvPr>
+          <p:cNvPicPr>
+            <a:picLocks noChangeAspect="1" noChangeArrowheads="1"/>
+          </p:cNvPicPr>
+          <p:nvPr/>
+        </p:nvPicPr>
+        <p:blipFill rotWithShape="1">
+          <a:blip r:embed="rId5" cstate="print">
+            <a:extLst>
+              <a:ext uri="{28A0092B-C50C-407E-A947-70E740481C1C}">
+                <a14:useLocalDpi xmlns:a14="http://schemas.microsoft.com/office/drawing/2010/main" val="0"/>
+              </a:ext>
+            </a:extLst>
+          </a:blip>
+          <a:srcRect b="16829"/>
+          <a:stretch/>
+        </p:blipFill>
+        <p:spPr bwMode="auto">
+          <a:xfrm>
+            <a:off x="6923707" y="511428"/>
+            <a:ext cx="1534493" cy="1422699"/>
+          </a:xfrm>
+          <a:prstGeom prst="rect">
+            <a:avLst/>
+          </a:prstGeom>
+          <a:noFill/>
+          <a:extLst>
+            <a:ext uri="{909E8E84-426E-40DD-AFC4-6F175D3DCCD1}">
+              <a14:hiddenFill xmlns:a14="http://schemas.microsoft.com/office/drawing/2010/main">
+                <a:solidFill>
+                  <a:srgbClr val="FFFFFF"/>
+                </a:solidFill>
+              </a14:hiddenFill>
+            </a:ext>
+          </a:extLst>
+        </p:spPr>
+      </p:pic>
     </p:spTree>
     <p:extLst>
       <p:ext uri="{BB962C8B-B14F-4D97-AF65-F5344CB8AC3E}">
@@ -10052,7 +10133,7 @@
                 <a:latin typeface="Courier New" panose="02070309020205020404" pitchFamily="49" charset="0"/>
                 <a:cs typeface="Courier New" panose="02070309020205020404" pitchFamily="49" charset="0"/>
               </a:rPr>
-              <a:t>dll</a:t>
+              <a:t>ldd</a:t>
             </a:r>
             <a:r>
               <a:rPr lang="en-US" sz="2400" dirty="0"/>
@@ -25691,7 +25772,7 @@
           <a:p>
             <a:r>
               <a:rPr lang="en-US" dirty="0"/>
-              <a:t>Open source project: name change to </a:t>
+              <a:t>Open-source project: name change to </a:t>
             </a:r>
             <a:r>
               <a:rPr lang="en-US" dirty="0" err="1"/>
@@ -27786,7 +27867,7 @@
         <p:spPr/>
         <p:txBody>
           <a:bodyPr>
-            <a:normAutofit fontScale="92500" lnSpcReduction="20000"/>
+            <a:normAutofit fontScale="92500" lnSpcReduction="10000"/>
           </a:bodyPr>
           <a:lstStyle/>
           <a:p>
@@ -27840,14 +27921,14 @@
             <a:pPr lvl="1"/>
             <a:r>
               <a:rPr lang="en-US" dirty="0"/>
-              <a:t>Can be done on any machine, any (Linux) OS, requires root privileges</a:t>
+              <a:t>On any machine, any (Linux) OS, may require root privileges</a:t>
             </a:r>
           </a:p>
           <a:p>
             <a:pPr lvl="1"/>
             <a:r>
               <a:rPr lang="en-US" dirty="0"/>
-              <a:t>Can be done remote</a:t>
+              <a:t>Remotely</a:t>
             </a:r>
           </a:p>
           <a:p>
@@ -27860,7 +27941,7 @@
             <a:pPr lvl="1"/>
             <a:r>
               <a:rPr lang="en-US" dirty="0"/>
-              <a:t>Runs on any (Linux) machine, </a:t>
+              <a:t>On any (Linux) machine, </a:t>
             </a:r>
             <a:r>
               <a:rPr lang="en-US" dirty="0" err="1"/>

</xml_diff>

<commit_message>
Add section on GPU usage
</commit_message>
<xml_diff>
--- a/containers_for_hpc.pptx
+++ b/containers_for_hpc.pptx
@@ -5,7 +5,7 @@
     <p:sldMasterId id="2147483660" r:id="rId1"/>
   </p:sldMasterIdLst>
   <p:notesMasterIdLst>
-    <p:notesMasterId r:id="rId64"/>
+    <p:notesMasterId r:id="rId67"/>
   </p:notesMasterIdLst>
   <p:sldIdLst>
     <p:sldId id="256" r:id="rId2"/>
@@ -55,21 +55,24 @@
     <p:sldId id="279" r:id="rId46"/>
     <p:sldId id="280" r:id="rId47"/>
     <p:sldId id="281" r:id="rId48"/>
-    <p:sldId id="296" r:id="rId49"/>
-    <p:sldId id="297" r:id="rId50"/>
-    <p:sldId id="298" r:id="rId51"/>
-    <p:sldId id="299" r:id="rId52"/>
-    <p:sldId id="300" r:id="rId53"/>
-    <p:sldId id="285" r:id="rId54"/>
-    <p:sldId id="286" r:id="rId55"/>
-    <p:sldId id="287" r:id="rId56"/>
-    <p:sldId id="270" r:id="rId57"/>
-    <p:sldId id="272" r:id="rId58"/>
-    <p:sldId id="276" r:id="rId59"/>
-    <p:sldId id="277" r:id="rId60"/>
-    <p:sldId id="307" r:id="rId61"/>
-    <p:sldId id="308" r:id="rId62"/>
-    <p:sldId id="291" r:id="rId63"/>
+    <p:sldId id="363" r:id="rId49"/>
+    <p:sldId id="364" r:id="rId50"/>
+    <p:sldId id="365" r:id="rId51"/>
+    <p:sldId id="296" r:id="rId52"/>
+    <p:sldId id="297" r:id="rId53"/>
+    <p:sldId id="298" r:id="rId54"/>
+    <p:sldId id="299" r:id="rId55"/>
+    <p:sldId id="300" r:id="rId56"/>
+    <p:sldId id="285" r:id="rId57"/>
+    <p:sldId id="286" r:id="rId58"/>
+    <p:sldId id="287" r:id="rId59"/>
+    <p:sldId id="270" r:id="rId60"/>
+    <p:sldId id="272" r:id="rId61"/>
+    <p:sldId id="276" r:id="rId62"/>
+    <p:sldId id="277" r:id="rId63"/>
+    <p:sldId id="307" r:id="rId64"/>
+    <p:sldId id="308" r:id="rId65"/>
+    <p:sldId id="291" r:id="rId66"/>
   </p:sldIdLst>
   <p:sldSz cx="9144000" cy="6858000" type="screen4x3"/>
   <p:notesSz cx="6858000" cy="9144000"/>
@@ -244,6 +247,13 @@
             <p14:sldId id="279"/>
             <p14:sldId id="280"/>
             <p14:sldId id="281"/>
+          </p14:sldIdLst>
+        </p14:section>
+        <p14:section name="GPUs" id="{E2F30F21-59CD-4478-8CDB-A2B2905987EF}">
+          <p14:sldIdLst>
+            <p14:sldId id="363"/>
+            <p14:sldId id="364"/>
+            <p14:sldId id="365"/>
           </p14:sldIdLst>
         </p14:section>
         <p14:section name="Services" id="{73BC88DB-DEAD-4A8C-B24B-311D00DBBC0A}">
@@ -15177,57 +15187,131 @@
           </a:p>
         </p:txBody>
       </p:sp>
-      <p:sp>
-        <p:nvSpPr>
-          <p:cNvPr id="5" name="TextBox 4">
+      <p:grpSp>
+        <p:nvGrpSpPr>
+          <p:cNvPr id="7" name="Group 6">
             <a:extLst>
               <a:ext uri="{FF2B5EF4-FFF2-40B4-BE49-F238E27FC236}">
-                <a16:creationId xmlns:a16="http://schemas.microsoft.com/office/drawing/2014/main" id="{3FAB717A-4C72-2769-2BBE-DA78ECCF26B9}"/>
+                <a16:creationId xmlns:a16="http://schemas.microsoft.com/office/drawing/2014/main" id="{05C4DA47-E1FE-0D8D-8847-4B87BFF7E03D}"/>
               </a:ext>
             </a:extLst>
           </p:cNvPr>
-          <p:cNvSpPr txBox="1"/>
+          <p:cNvGrpSpPr/>
           <p:nvPr/>
-        </p:nvSpPr>
-        <p:spPr>
+        </p:nvGrpSpPr>
+        <p:grpSpPr>
           <a:xfrm>
-            <a:off x="1242883" y="5574160"/>
-            <a:ext cx="6908301" cy="461665"/>
+            <a:off x="1242883" y="5356319"/>
+            <a:ext cx="5215067" cy="1048838"/>
+            <a:chOff x="1242883" y="5356319"/>
+            <a:chExt cx="5215067" cy="1048838"/>
           </a:xfrm>
-          <a:prstGeom prst="rect">
-            <a:avLst/>
-          </a:prstGeom>
-          <a:noFill/>
-          <a:ln>
-            <a:solidFill>
-              <a:schemeClr val="tx1"/>
-            </a:solidFill>
-          </a:ln>
-        </p:spPr>
-        <p:txBody>
-          <a:bodyPr wrap="none" rtlCol="0">
-            <a:spAutoFit/>
-          </a:bodyPr>
-          <a:lstStyle/>
-          <a:p>
-            <a:r>
-              <a:rPr lang="en-US" sz="2400" dirty="0"/>
-              <a:t>Don't forget to copy dependencies, use </a:t>
-            </a:r>
-            <a:r>
-              <a:rPr lang="en-US" sz="2400" dirty="0" err="1">
-                <a:latin typeface="Courier New" panose="02070309020205020404" pitchFamily="49" charset="0"/>
-                <a:cs typeface="Courier New" panose="02070309020205020404" pitchFamily="49" charset="0"/>
-              </a:rPr>
-              <a:t>ldd</a:t>
-            </a:r>
-            <a:r>
-              <a:rPr lang="en-US" sz="2400" dirty="0"/>
-              <a:t> to check!</a:t>
-            </a:r>
-          </a:p>
-        </p:txBody>
-      </p:sp>
+        </p:grpSpPr>
+        <p:sp>
+          <p:nvSpPr>
+            <p:cNvPr id="5" name="TextBox 4">
+              <a:extLst>
+                <a:ext uri="{FF2B5EF4-FFF2-40B4-BE49-F238E27FC236}">
+                  <a16:creationId xmlns:a16="http://schemas.microsoft.com/office/drawing/2014/main" id="{3FAB717A-4C72-2769-2BBE-DA78ECCF26B9}"/>
+                </a:ext>
+              </a:extLst>
+            </p:cNvPr>
+            <p:cNvSpPr txBox="1"/>
+            <p:nvPr/>
+          </p:nvSpPr>
+          <p:spPr>
+            <a:xfrm>
+              <a:off x="1242883" y="5574160"/>
+              <a:ext cx="4923592" cy="830997"/>
+            </a:xfrm>
+            <a:prstGeom prst="rect">
+              <a:avLst/>
+            </a:prstGeom>
+            <a:noFill/>
+            <a:ln>
+              <a:solidFill>
+                <a:schemeClr val="tx1"/>
+              </a:solidFill>
+            </a:ln>
+          </p:spPr>
+          <p:txBody>
+            <a:bodyPr wrap="none" rtlCol="0">
+              <a:spAutoFit/>
+            </a:bodyPr>
+            <a:lstStyle/>
+            <a:p>
+              <a:r>
+                <a:rPr lang="en-US" sz="2400" dirty="0"/>
+                <a:t>Don't forget to copy all dependencies,</a:t>
+              </a:r>
+            </a:p>
+            <a:p>
+              <a:r>
+                <a:rPr lang="en-US" sz="2400" dirty="0"/>
+                <a:t>use </a:t>
+              </a:r>
+              <a:r>
+                <a:rPr lang="en-US" sz="2400" dirty="0" err="1">
+                  <a:latin typeface="Courier New" panose="02070309020205020404" pitchFamily="49" charset="0"/>
+                  <a:cs typeface="Courier New" panose="02070309020205020404" pitchFamily="49" charset="0"/>
+                </a:rPr>
+                <a:t>ldd</a:t>
+              </a:r>
+              <a:r>
+                <a:rPr lang="en-US" sz="2400" dirty="0"/>
+                <a:t> to check!</a:t>
+              </a:r>
+            </a:p>
+          </p:txBody>
+        </p:sp>
+        <p:pic>
+          <p:nvPicPr>
+            <p:cNvPr id="6" name="Picture 2" descr="C:\Users\lucg5005\AppData\Local\Microsoft\Windows\Temporary Internet Files\Content.IE5\CWZUAEH4\lgi01a201309290600[1].jpg">
+              <a:extLst>
+                <a:ext uri="{FF2B5EF4-FFF2-40B4-BE49-F238E27FC236}">
+                  <a16:creationId xmlns:a16="http://schemas.microsoft.com/office/drawing/2014/main" id="{652346C7-5A4B-0907-7750-581542CA9F1E}"/>
+                </a:ext>
+              </a:extLst>
+            </p:cNvPr>
+            <p:cNvPicPr>
+              <a:picLocks noChangeAspect="1" noChangeArrowheads="1"/>
+            </p:cNvPicPr>
+            <p:nvPr/>
+          </p:nvPicPr>
+          <p:blipFill>
+            <a:blip r:embed="rId2" cstate="print">
+              <a:extLst>
+                <a:ext uri="{28A0092B-C50C-407E-A947-70E740481C1C}">
+                  <a14:useLocalDpi xmlns:a14="http://schemas.microsoft.com/office/drawing/2010/main" val="0"/>
+                </a:ext>
+              </a:extLst>
+            </a:blip>
+            <a:srcRect/>
+            <a:stretch>
+              <a:fillRect/>
+            </a:stretch>
+          </p:blipFill>
+          <p:spPr bwMode="auto">
+            <a:xfrm>
+              <a:off x="6033337" y="5356319"/>
+              <a:ext cx="424613" cy="435681"/>
+            </a:xfrm>
+            <a:prstGeom prst="rect">
+              <a:avLst/>
+            </a:prstGeom>
+            <a:noFill/>
+            <a:extLst>
+              <a:ext uri="{909E8E84-426E-40DD-AFC4-6F175D3DCCD1}">
+                <a14:hiddenFill xmlns:a14="http://schemas.microsoft.com/office/drawing/2010/main">
+                  <a:solidFill>
+                    <a:srgbClr val="FFFFFF"/>
+                  </a:solidFill>
+                </a14:hiddenFill>
+              </a:ext>
+            </a:extLst>
+          </p:spPr>
+        </p:pic>
+      </p:grpSp>
     </p:spTree>
     <p:extLst>
       <p:ext uri="{BB962C8B-B14F-4D97-AF65-F5344CB8AC3E}">
@@ -15515,7 +15599,7 @@
                             </p:stCondLst>
                             <p:childTnLst>
                               <p:par>
-                                <p:cTn id="23" presetID="1" presetClass="entr" presetSubtype="0" fill="hold" grpId="0" nodeType="clickEffect">
+                                <p:cTn id="23" presetID="1" presetClass="entr" presetSubtype="0" fill="hold" nodeType="clickEffect">
                                   <p:stCondLst>
                                     <p:cond delay="0"/>
                                   </p:stCondLst>
@@ -15528,7 +15612,7 @@
                                           </p:stCondLst>
                                         </p:cTn>
                                         <p:tgtEl>
-                                          <p:spTgt spid="5"/>
+                                          <p:spTgt spid="7"/>
                                         </p:tgtEl>
                                         <p:attrNameLst>
                                           <p:attrName>style.visibility</p:attrName>
@@ -15570,7 +15654,6 @@
     </p:tnLst>
     <p:bldLst>
       <p:bldP spid="3" grpId="0" uiExpand="1" build="p"/>
-      <p:bldP spid="5" grpId="0" animBg="1"/>
     </p:bldLst>
   </p:timing>
 </p:sld>
@@ -21179,7 +21262,7 @@
                 <a:latin typeface="Courier New" panose="02070309020205020404" pitchFamily="49" charset="0"/>
                 <a:cs typeface="Courier New" panose="02070309020205020404" pitchFamily="49" charset="0"/>
               </a:rPr>
-              <a:t>                                      -batch plot.bat</a:t>
+              <a:t>                                    -batch plot.bat</a:t>
             </a:r>
             <a:endParaRPr lang="nl-BE" b="1" dirty="0">
               <a:solidFill>
@@ -27415,7 +27498,13 @@
       </p:grpSpPr>
       <p:sp>
         <p:nvSpPr>
-          <p:cNvPr id="2" name="Title 1"/>
+          <p:cNvPr id="2" name="Title 1">
+            <a:extLst>
+              <a:ext uri="{FF2B5EF4-FFF2-40B4-BE49-F238E27FC236}">
+                <a16:creationId xmlns:a16="http://schemas.microsoft.com/office/drawing/2014/main" id="{6FC2D181-C389-C427-6015-74C31116D1CE}"/>
+              </a:ext>
+            </a:extLst>
+          </p:cNvPr>
           <p:cNvSpPr>
             <a:spLocks noGrp="1"/>
           </p:cNvSpPr>
@@ -27430,14 +27519,21 @@
           <a:p>
             <a:r>
               <a:rPr lang="en-US" dirty="0"/>
-              <a:t>Services</a:t>
-            </a:r>
+              <a:t>GPU applications</a:t>
+            </a:r>
+            <a:endParaRPr lang="LID4096" dirty="0"/>
           </a:p>
         </p:txBody>
       </p:sp>
       <p:sp>
         <p:nvSpPr>
-          <p:cNvPr id="3" name="Text Placeholder 2"/>
+          <p:cNvPr id="3" name="Text Placeholder 2">
+            <a:extLst>
+              <a:ext uri="{FF2B5EF4-FFF2-40B4-BE49-F238E27FC236}">
+                <a16:creationId xmlns:a16="http://schemas.microsoft.com/office/drawing/2014/main" id="{92B23273-688E-45EB-E7D7-FFB6B40A2EEF}"/>
+              </a:ext>
+            </a:extLst>
+          </p:cNvPr>
           <p:cNvSpPr>
             <a:spLocks noGrp="1"/>
           </p:cNvSpPr>
@@ -27450,13 +27546,19 @@
           <a:bodyPr/>
           <a:lstStyle/>
           <a:p>
-            <a:endParaRPr lang="en-US"/>
+            <a:endParaRPr lang="LID4096"/>
           </a:p>
         </p:txBody>
       </p:sp>
       <p:sp>
         <p:nvSpPr>
-          <p:cNvPr id="4" name="Slide Number Placeholder 3"/>
+          <p:cNvPr id="4" name="Slide Number Placeholder 3">
+            <a:extLst>
+              <a:ext uri="{FF2B5EF4-FFF2-40B4-BE49-F238E27FC236}">
+                <a16:creationId xmlns:a16="http://schemas.microsoft.com/office/drawing/2014/main" id="{6311F6D4-ABD9-3D7A-F655-0B5D202C3FD0}"/>
+              </a:ext>
+            </a:extLst>
+          </p:cNvPr>
           <p:cNvSpPr>
             <a:spLocks noGrp="1"/>
           </p:cNvSpPr>
@@ -27480,7 +27582,7 @@
     </p:spTree>
     <p:extLst>
       <p:ext uri="{BB962C8B-B14F-4D97-AF65-F5344CB8AC3E}">
-        <p14:creationId xmlns:p14="http://schemas.microsoft.com/office/powerpoint/2010/main" val="1160171864"/>
+        <p14:creationId xmlns:p14="http://schemas.microsoft.com/office/powerpoint/2010/main" val="1250157618"/>
       </p:ext>
     </p:extLst>
   </p:cSld>
@@ -27509,7 +27611,13 @@
       </p:grpSpPr>
       <p:sp>
         <p:nvSpPr>
-          <p:cNvPr id="2" name="Title 1"/>
+          <p:cNvPr id="5" name="Title 4">
+            <a:extLst>
+              <a:ext uri="{FF2B5EF4-FFF2-40B4-BE49-F238E27FC236}">
+                <a16:creationId xmlns:a16="http://schemas.microsoft.com/office/drawing/2014/main" id="{B877C462-9706-B3CD-9114-DF6262C46809}"/>
+              </a:ext>
+            </a:extLst>
+          </p:cNvPr>
           <p:cNvSpPr>
             <a:spLocks noGrp="1"/>
           </p:cNvSpPr>
@@ -27524,14 +27632,21 @@
           <a:p>
             <a:r>
               <a:rPr lang="en-US" dirty="0"/>
-              <a:t>Server processes</a:t>
-            </a:r>
+              <a:t>Using GPUs</a:t>
+            </a:r>
+            <a:endParaRPr lang="LID4096" dirty="0"/>
           </a:p>
         </p:txBody>
       </p:sp>
       <p:sp>
         <p:nvSpPr>
-          <p:cNvPr id="3" name="Content Placeholder 2"/>
+          <p:cNvPr id="6" name="Content Placeholder 5">
+            <a:extLst>
+              <a:ext uri="{FF2B5EF4-FFF2-40B4-BE49-F238E27FC236}">
+                <a16:creationId xmlns:a16="http://schemas.microsoft.com/office/drawing/2014/main" id="{8257F33C-31CB-B832-800E-ADC8C0491B31}"/>
+              </a:ext>
+            </a:extLst>
+          </p:cNvPr>
           <p:cNvSpPr>
             <a:spLocks noGrp="1"/>
           </p:cNvSpPr>
@@ -27545,75 +27660,100 @@
           <a:lstStyle/>
           <a:p>
             <a:r>
+              <a:rPr lang="en-US" dirty="0" err="1"/>
+              <a:t>apptainer</a:t>
+            </a:r>
+            <a:r>
               <a:rPr lang="en-US" dirty="0"/>
-              <a:t>Image runs service, e.g.,</a:t>
+              <a:t> works well with GPUs</a:t>
             </a:r>
           </a:p>
           <a:p>
             <a:pPr lvl="1"/>
             <a:r>
               <a:rPr lang="en-US" dirty="0"/>
-              <a:t>web server</a:t>
+              <a:t>NVIDIA (</a:t>
+            </a:r>
+            <a:r>
+              <a:rPr lang="en-US" dirty="0">
+                <a:latin typeface="Courier New" panose="02070309020205020404" pitchFamily="49" charset="0"/>
+                <a:cs typeface="Courier New" panose="02070309020205020404" pitchFamily="49" charset="0"/>
+              </a:rPr>
+              <a:t>--</a:t>
+            </a:r>
+            <a:r>
+              <a:rPr lang="en-US" dirty="0" err="1">
+                <a:latin typeface="Courier New" panose="02070309020205020404" pitchFamily="49" charset="0"/>
+                <a:cs typeface="Courier New" panose="02070309020205020404" pitchFamily="49" charset="0"/>
+              </a:rPr>
+              <a:t>nv</a:t>
+            </a:r>
+            <a:r>
+              <a:rPr lang="en-US" dirty="0"/>
+              <a:t>)</a:t>
             </a:r>
           </a:p>
           <a:p>
             <a:pPr lvl="1"/>
             <a:r>
               <a:rPr lang="en-US" dirty="0"/>
-              <a:t>RDBMS</a:t>
-            </a:r>
-          </a:p>
-          <a:p>
-            <a:pPr lvl="1"/>
+              <a:t>AMD (</a:t>
+            </a:r>
+            <a:r>
+              <a:rPr lang="en-US" dirty="0">
+                <a:latin typeface="Courier New" panose="02070309020205020404" pitchFamily="49" charset="0"/>
+                <a:cs typeface="Courier New" panose="02070309020205020404" pitchFamily="49" charset="0"/>
+              </a:rPr>
+              <a:t>--</a:t>
+            </a:r>
+            <a:r>
+              <a:rPr lang="en-US" dirty="0" err="1">
+                <a:latin typeface="Courier New" panose="02070309020205020404" pitchFamily="49" charset="0"/>
+                <a:cs typeface="Courier New" panose="02070309020205020404" pitchFamily="49" charset="0"/>
+              </a:rPr>
+              <a:t>rocm</a:t>
+            </a:r>
             <a:r>
               <a:rPr lang="en-US" dirty="0"/>
-              <a:t>…</a:t>
-            </a:r>
-          </a:p>
-          <a:p>
-            <a:pPr lvl="1"/>
+              <a:t>)</a:t>
+            </a:r>
+          </a:p>
+          <a:p>
+            <a:r>
+              <a:rPr lang="en-US" dirty="0"/>
+              <a:t>Will bind drivers/libraries/tools from host</a:t>
+            </a:r>
+          </a:p>
+          <a:p>
+            <a:r>
+              <a:rPr lang="en-US" dirty="0"/>
+              <a:t>Build image</a:t>
+            </a:r>
+          </a:p>
+          <a:p>
             <a:endParaRPr lang="en-US" dirty="0"/>
           </a:p>
           <a:p>
-            <a:pPr lvl="1"/>
             <a:endParaRPr lang="en-US" dirty="0"/>
           </a:p>
           <a:p>
             <a:r>
               <a:rPr lang="en-US" dirty="0"/>
-              <a:t>Workflow</a:t>
-            </a:r>
-          </a:p>
-          <a:p>
-            <a:pPr lvl="1"/>
-            <a:r>
-              <a:rPr lang="en-US" dirty="0"/>
-              <a:t>start service</a:t>
-            </a:r>
-          </a:p>
-          <a:p>
-            <a:pPr lvl="1"/>
-            <a:r>
-              <a:rPr lang="en-US" dirty="0"/>
-              <a:t>client(s) interaction</a:t>
-            </a:r>
-          </a:p>
-          <a:p>
-            <a:pPr lvl="1"/>
-            <a:r>
-              <a:rPr lang="en-US" dirty="0"/>
-              <a:t>stop service</a:t>
-            </a:r>
-          </a:p>
-          <a:p>
-            <a:pPr lvl="1"/>
-            <a:endParaRPr lang="en-US" dirty="0"/>
+              <a:t>Run image</a:t>
+            </a:r>
+            <a:endParaRPr lang="LID4096" dirty="0"/>
           </a:p>
         </p:txBody>
       </p:sp>
       <p:sp>
         <p:nvSpPr>
-          <p:cNvPr id="4" name="Slide Number Placeholder 3"/>
+          <p:cNvPr id="4" name="Slide Number Placeholder 3">
+            <a:extLst>
+              <a:ext uri="{FF2B5EF4-FFF2-40B4-BE49-F238E27FC236}">
+                <a16:creationId xmlns:a16="http://schemas.microsoft.com/office/drawing/2014/main" id="{6D017D37-6FE8-7E82-3CF5-93CD6E576498}"/>
+              </a:ext>
+            </a:extLst>
+          </p:cNvPr>
           <p:cNvSpPr>
             <a:spLocks noGrp="1"/>
           </p:cNvSpPr>
@@ -27636,24 +27776,169 @@
       </p:sp>
       <p:sp>
         <p:nvSpPr>
-          <p:cNvPr id="5" name="TextBox 4"/>
+          <p:cNvPr id="7" name="TextBox 6">
+            <a:extLst>
+              <a:ext uri="{FF2B5EF4-FFF2-40B4-BE49-F238E27FC236}">
+                <a16:creationId xmlns:a16="http://schemas.microsoft.com/office/drawing/2014/main" id="{9992C118-3D25-D10B-CA21-41238C7247CF}"/>
+              </a:ext>
+            </a:extLst>
+          </p:cNvPr>
           <p:cNvSpPr txBox="1"/>
           <p:nvPr/>
         </p:nvSpPr>
         <p:spPr>
           <a:xfrm>
-            <a:off x="2242987" y="3539629"/>
-            <a:ext cx="4363759" cy="461665"/>
+            <a:off x="1241713" y="4086905"/>
+            <a:ext cx="6388286" cy="646331"/>
           </a:xfrm>
           <a:prstGeom prst="rect">
             <a:avLst/>
           </a:prstGeom>
-          <a:noFill/>
-          <a:ln>
-            <a:solidFill>
-              <a:schemeClr val="tx1"/>
-            </a:solidFill>
-          </a:ln>
+          <a:solidFill>
+            <a:schemeClr val="tx1"/>
+          </a:solidFill>
+        </p:spPr>
+        <p:txBody>
+          <a:bodyPr wrap="square" rtlCol="0">
+            <a:spAutoFit/>
+          </a:bodyPr>
+          <a:lstStyle/>
+          <a:p>
+            <a:r>
+              <a:rPr lang="en-US" b="1" dirty="0">
+                <a:solidFill>
+                  <a:schemeClr val="bg1"/>
+                </a:solidFill>
+                <a:latin typeface="Courier New" panose="02070309020205020404" pitchFamily="49" charset="0"/>
+                <a:cs typeface="Courier New" panose="02070309020205020404" pitchFamily="49" charset="0"/>
+              </a:rPr>
+              <a:t>$ </a:t>
+            </a:r>
+            <a:r>
+              <a:rPr lang="en-US" b="1" dirty="0" err="1">
+                <a:solidFill>
+                  <a:schemeClr val="bg1"/>
+                </a:solidFill>
+                <a:latin typeface="Courier New" panose="02070309020205020404" pitchFamily="49" charset="0"/>
+                <a:cs typeface="Courier New" panose="02070309020205020404" pitchFamily="49" charset="0"/>
+              </a:rPr>
+              <a:t>apptainer</a:t>
+            </a:r>
+            <a:r>
+              <a:rPr lang="en-US" b="1" dirty="0">
+                <a:solidFill>
+                  <a:schemeClr val="bg1"/>
+                </a:solidFill>
+                <a:latin typeface="Courier New" panose="02070309020205020404" pitchFamily="49" charset="0"/>
+                <a:cs typeface="Courier New" panose="02070309020205020404" pitchFamily="49" charset="0"/>
+              </a:rPr>
+              <a:t> build --</a:t>
+            </a:r>
+            <a:r>
+              <a:rPr lang="en-US" b="1" dirty="0" err="1">
+                <a:solidFill>
+                  <a:schemeClr val="bg1"/>
+                </a:solidFill>
+                <a:latin typeface="Courier New" panose="02070309020205020404" pitchFamily="49" charset="0"/>
+                <a:cs typeface="Courier New" panose="02070309020205020404" pitchFamily="49" charset="0"/>
+              </a:rPr>
+              <a:t>nv</a:t>
+            </a:r>
+            <a:r>
+              <a:rPr lang="en-US" b="1" dirty="0">
+                <a:solidFill>
+                  <a:schemeClr val="bg1"/>
+                </a:solidFill>
+                <a:latin typeface="Courier New" panose="02070309020205020404" pitchFamily="49" charset="0"/>
+                <a:cs typeface="Courier New" panose="02070309020205020404" pitchFamily="49" charset="0"/>
+              </a:rPr>
+              <a:t>  –-</a:t>
+            </a:r>
+            <a:r>
+              <a:rPr lang="en-US" b="1" dirty="0" err="1">
+                <a:solidFill>
+                  <a:schemeClr val="bg1"/>
+                </a:solidFill>
+                <a:latin typeface="Courier New" panose="02070309020205020404" pitchFamily="49" charset="0"/>
+                <a:cs typeface="Courier New" panose="02070309020205020404" pitchFamily="49" charset="0"/>
+              </a:rPr>
+              <a:t>fakeroot</a:t>
+            </a:r>
+            <a:r>
+              <a:rPr lang="en-US" b="1" dirty="0">
+                <a:solidFill>
+                  <a:schemeClr val="bg1"/>
+                </a:solidFill>
+                <a:latin typeface="Courier New" panose="02070309020205020404" pitchFamily="49" charset="0"/>
+                <a:cs typeface="Courier New" panose="02070309020205020404" pitchFamily="49" charset="0"/>
+              </a:rPr>
+              <a:t>  \</a:t>
+            </a:r>
+          </a:p>
+          <a:p>
+            <a:r>
+              <a:rPr lang="en-US" b="1" dirty="0">
+                <a:solidFill>
+                  <a:schemeClr val="bg1"/>
+                </a:solidFill>
+                <a:latin typeface="Courier New" panose="02070309020205020404" pitchFamily="49" charset="0"/>
+                <a:cs typeface="Courier New" panose="02070309020205020404" pitchFamily="49" charset="0"/>
+              </a:rPr>
+              <a:t>      </a:t>
+            </a:r>
+            <a:r>
+              <a:rPr lang="en-US" b="1" dirty="0" err="1">
+                <a:solidFill>
+                  <a:schemeClr val="bg1"/>
+                </a:solidFill>
+                <a:latin typeface="Courier New" panose="02070309020205020404" pitchFamily="49" charset="0"/>
+                <a:cs typeface="Courier New" panose="02070309020205020404" pitchFamily="49" charset="0"/>
+              </a:rPr>
+              <a:t>gpu_dev.sif</a:t>
+            </a:r>
+            <a:r>
+              <a:rPr lang="en-US" b="1" dirty="0">
+                <a:solidFill>
+                  <a:schemeClr val="bg1"/>
+                </a:solidFill>
+                <a:latin typeface="Courier New" panose="02070309020205020404" pitchFamily="49" charset="0"/>
+                <a:cs typeface="Courier New" panose="02070309020205020404" pitchFamily="49" charset="0"/>
+              </a:rPr>
+              <a:t> gpu_dev.def</a:t>
+            </a:r>
+            <a:endParaRPr lang="nl-BE" b="1" dirty="0">
+              <a:solidFill>
+                <a:schemeClr val="bg1"/>
+              </a:solidFill>
+              <a:latin typeface="Courier New" panose="02070309020205020404" pitchFamily="49" charset="0"/>
+              <a:cs typeface="Courier New" panose="02070309020205020404" pitchFamily="49" charset="0"/>
+            </a:endParaRPr>
+          </a:p>
+        </p:txBody>
+      </p:sp>
+      <p:sp>
+        <p:nvSpPr>
+          <p:cNvPr id="8" name="TextBox 7">
+            <a:extLst>
+              <a:ext uri="{FF2B5EF4-FFF2-40B4-BE49-F238E27FC236}">
+                <a16:creationId xmlns:a16="http://schemas.microsoft.com/office/drawing/2014/main" id="{8FBEFD40-DDB8-35A0-EDBE-75000B6439BD}"/>
+              </a:ext>
+            </a:extLst>
+          </p:cNvPr>
+          <p:cNvSpPr txBox="1"/>
+          <p:nvPr/>
+        </p:nvSpPr>
+        <p:spPr>
+          <a:xfrm>
+            <a:off x="1241712" y="5634395"/>
+            <a:ext cx="6388287" cy="369332"/>
+          </a:xfrm>
+          <a:prstGeom prst="rect">
+            <a:avLst/>
+          </a:prstGeom>
+          <a:solidFill>
+            <a:schemeClr val="tx1"/>
+          </a:solidFill>
         </p:spPr>
         <p:txBody>
           <a:bodyPr wrap="none" rtlCol="0">
@@ -27662,54 +27947,223 @@
           <a:lstStyle/>
           <a:p>
             <a:r>
-              <a:rPr lang="en-US" sz="2400" dirty="0"/>
-              <a:t>Processes need to be cleaned up!</a:t>
-            </a:r>
+              <a:rPr lang="en-US" b="1" dirty="0">
+                <a:solidFill>
+                  <a:schemeClr val="bg1"/>
+                </a:solidFill>
+                <a:latin typeface="Courier New" panose="02070309020205020404" pitchFamily="49" charset="0"/>
+                <a:cs typeface="Courier New" panose="02070309020205020404" pitchFamily="49" charset="0"/>
+              </a:rPr>
+              <a:t>$ </a:t>
+            </a:r>
+            <a:r>
+              <a:rPr lang="en-US" b="1" dirty="0" err="1">
+                <a:solidFill>
+                  <a:schemeClr val="bg1"/>
+                </a:solidFill>
+                <a:latin typeface="Courier New" panose="02070309020205020404" pitchFamily="49" charset="0"/>
+                <a:cs typeface="Courier New" panose="02070309020205020404" pitchFamily="49" charset="0"/>
+              </a:rPr>
+              <a:t>apptainer</a:t>
+            </a:r>
+            <a:r>
+              <a:rPr lang="en-US" b="1" dirty="0">
+                <a:solidFill>
+                  <a:schemeClr val="bg1"/>
+                </a:solidFill>
+                <a:latin typeface="Courier New" panose="02070309020205020404" pitchFamily="49" charset="0"/>
+                <a:cs typeface="Courier New" panose="02070309020205020404" pitchFamily="49" charset="0"/>
+              </a:rPr>
+              <a:t> exec --</a:t>
+            </a:r>
+            <a:r>
+              <a:rPr lang="en-US" b="1" dirty="0" err="1">
+                <a:solidFill>
+                  <a:schemeClr val="bg1"/>
+                </a:solidFill>
+                <a:latin typeface="Courier New" panose="02070309020205020404" pitchFamily="49" charset="0"/>
+                <a:cs typeface="Courier New" panose="02070309020205020404" pitchFamily="49" charset="0"/>
+              </a:rPr>
+              <a:t>nv</a:t>
+            </a:r>
+            <a:r>
+              <a:rPr lang="en-US" b="1" dirty="0">
+                <a:solidFill>
+                  <a:schemeClr val="bg1"/>
+                </a:solidFill>
+                <a:latin typeface="Courier New" panose="02070309020205020404" pitchFamily="49" charset="0"/>
+                <a:cs typeface="Courier New" panose="02070309020205020404" pitchFamily="49" charset="0"/>
+              </a:rPr>
+              <a:t>  </a:t>
+            </a:r>
+            <a:r>
+              <a:rPr lang="en-US" b="1" dirty="0" err="1">
+                <a:solidFill>
+                  <a:schemeClr val="bg1"/>
+                </a:solidFill>
+                <a:latin typeface="Courier New" panose="02070309020205020404" pitchFamily="49" charset="0"/>
+                <a:cs typeface="Courier New" panose="02070309020205020404" pitchFamily="49" charset="0"/>
+              </a:rPr>
+              <a:t>gpu_dev.sif</a:t>
+            </a:r>
+            <a:r>
+              <a:rPr lang="en-US" b="1" dirty="0">
+                <a:solidFill>
+                  <a:schemeClr val="bg1"/>
+                </a:solidFill>
+                <a:latin typeface="Courier New" panose="02070309020205020404" pitchFamily="49" charset="0"/>
+                <a:cs typeface="Courier New" panose="02070309020205020404" pitchFamily="49" charset="0"/>
+              </a:rPr>
+              <a:t>  /bin/bash</a:t>
+            </a:r>
+            <a:endParaRPr lang="nl-BE" b="1" dirty="0">
+              <a:solidFill>
+                <a:schemeClr val="bg1"/>
+              </a:solidFill>
+              <a:latin typeface="Courier New" panose="02070309020205020404" pitchFamily="49" charset="0"/>
+              <a:cs typeface="Courier New" panose="02070309020205020404" pitchFamily="49" charset="0"/>
+            </a:endParaRPr>
           </a:p>
         </p:txBody>
       </p:sp>
-      <p:sp>
-        <p:nvSpPr>
-          <p:cNvPr id="6" name="TextBox 5"/>
-          <p:cNvSpPr txBox="1"/>
+      <p:grpSp>
+        <p:nvGrpSpPr>
+          <p:cNvPr id="11" name="Group 10">
+            <a:extLst>
+              <a:ext uri="{FF2B5EF4-FFF2-40B4-BE49-F238E27FC236}">
+                <a16:creationId xmlns:a16="http://schemas.microsoft.com/office/drawing/2014/main" id="{707A9ACA-E368-7FD3-108C-CC8CB14191D0}"/>
+              </a:ext>
+            </a:extLst>
+          </p:cNvPr>
+          <p:cNvGrpSpPr/>
           <p:nvPr/>
-        </p:nvSpPr>
-        <p:spPr>
+        </p:nvGrpSpPr>
+        <p:grpSpPr>
           <a:xfrm>
-            <a:off x="4818046" y="4835497"/>
-            <a:ext cx="1788700" cy="954107"/>
+            <a:off x="4946072" y="786501"/>
+            <a:ext cx="4031080" cy="1384995"/>
+            <a:chOff x="4946072" y="786501"/>
+            <a:chExt cx="4031080" cy="1384995"/>
           </a:xfrm>
-          <a:prstGeom prst="rect">
-            <a:avLst/>
-          </a:prstGeom>
-          <a:noFill/>
-          <a:ln>
+        </p:grpSpPr>
+        <p:sp>
+          <p:nvSpPr>
+            <p:cNvPr id="9" name="TextBox 8">
+              <a:extLst>
+                <a:ext uri="{FF2B5EF4-FFF2-40B4-BE49-F238E27FC236}">
+                  <a16:creationId xmlns:a16="http://schemas.microsoft.com/office/drawing/2014/main" id="{051E36C3-ECDA-FDB6-912D-C9C17A7EC361}"/>
+                </a:ext>
+              </a:extLst>
+            </p:cNvPr>
+            <p:cNvSpPr txBox="1"/>
+            <p:nvPr/>
+          </p:nvSpPr>
+          <p:spPr>
+            <a:xfrm rot="1067759">
+              <a:off x="4946072" y="786501"/>
+              <a:ext cx="3732560" cy="1384995"/>
+            </a:xfrm>
+            <a:prstGeom prst="rect">
+              <a:avLst/>
+            </a:prstGeom>
             <a:solidFill>
-              <a:schemeClr val="tx1"/>
+              <a:schemeClr val="bg1"/>
             </a:solidFill>
-          </a:ln>
-        </p:spPr>
-        <p:txBody>
-          <a:bodyPr wrap="square" rtlCol="0">
-            <a:spAutoFit/>
-          </a:bodyPr>
-          <a:lstStyle/>
-          <a:p>
-            <a:r>
-              <a:rPr lang="en-US" sz="2800" dirty="0" err="1"/>
-              <a:t>Apptainer</a:t>
-            </a:r>
-            <a:r>
-              <a:rPr lang="en-US" sz="2800" dirty="0"/>
-              <a:t> instances</a:t>
-            </a:r>
-          </a:p>
-        </p:txBody>
-      </p:sp>
+            <a:ln>
+              <a:solidFill>
+                <a:schemeClr val="tx1"/>
+              </a:solidFill>
+            </a:ln>
+          </p:spPr>
+          <p:txBody>
+            <a:bodyPr wrap="none" rtlCol="0">
+              <a:spAutoFit/>
+            </a:bodyPr>
+            <a:lstStyle/>
+            <a:p>
+              <a:pPr algn="ctr"/>
+              <a:r>
+                <a:rPr lang="en-US" sz="2800" dirty="0"/>
+                <a:t>Do </a:t>
+              </a:r>
+              <a:r>
+                <a:rPr lang="en-US" sz="2800" i="1" dirty="0"/>
+                <a:t>not</a:t>
+              </a:r>
+              <a:r>
+                <a:rPr lang="en-US" sz="2800" dirty="0"/>
+                <a:t> install</a:t>
+              </a:r>
+            </a:p>
+            <a:p>
+              <a:pPr algn="ctr"/>
+              <a:r>
+                <a:rPr lang="en-US" sz="2800" dirty="0"/>
+                <a:t>drivers/runtime libraries</a:t>
+              </a:r>
+            </a:p>
+            <a:p>
+              <a:pPr algn="ctr"/>
+              <a:r>
+                <a:rPr lang="en-US" sz="2800" dirty="0"/>
+                <a:t>in image!</a:t>
+              </a:r>
+              <a:endParaRPr lang="LID4096" sz="2800" dirty="0"/>
+            </a:p>
+          </p:txBody>
+        </p:sp>
+        <p:pic>
+          <p:nvPicPr>
+            <p:cNvPr id="10" name="Picture 2" descr="C:\Users\lucg5005\AppData\Local\Microsoft\Windows\Temporary Internet Files\Content.IE5\CWZUAEH4\lgi01a201309290600[1].jpg">
+              <a:extLst>
+                <a:ext uri="{FF2B5EF4-FFF2-40B4-BE49-F238E27FC236}">
+                  <a16:creationId xmlns:a16="http://schemas.microsoft.com/office/drawing/2014/main" id="{24FAA368-FD55-1434-C3AE-2979472BBD7D}"/>
+                </a:ext>
+              </a:extLst>
+            </p:cNvPr>
+            <p:cNvPicPr>
+              <a:picLocks noChangeAspect="1" noChangeArrowheads="1"/>
+            </p:cNvPicPr>
+            <p:nvPr/>
+          </p:nvPicPr>
+          <p:blipFill>
+            <a:blip r:embed="rId2" cstate="print">
+              <a:extLst>
+                <a:ext uri="{28A0092B-C50C-407E-A947-70E740481C1C}">
+                  <a14:useLocalDpi xmlns:a14="http://schemas.microsoft.com/office/drawing/2010/main" val="0"/>
+                </a:ext>
+              </a:extLst>
+            </a:blip>
+            <a:srcRect/>
+            <a:stretch>
+              <a:fillRect/>
+            </a:stretch>
+          </p:blipFill>
+          <p:spPr bwMode="auto">
+            <a:xfrm>
+              <a:off x="8380502" y="862080"/>
+              <a:ext cx="596650" cy="612202"/>
+            </a:xfrm>
+            <a:prstGeom prst="rect">
+              <a:avLst/>
+            </a:prstGeom>
+            <a:noFill/>
+            <a:extLst>
+              <a:ext uri="{909E8E84-426E-40DD-AFC4-6F175D3DCCD1}">
+                <a14:hiddenFill xmlns:a14="http://schemas.microsoft.com/office/drawing/2010/main">
+                  <a:solidFill>
+                    <a:srgbClr val="FFFFFF"/>
+                  </a:solidFill>
+                </a14:hiddenFill>
+              </a:ext>
+            </a:extLst>
+          </p:spPr>
+        </p:pic>
+      </p:grpSp>
     </p:spTree>
     <p:extLst>
       <p:ext uri="{BB962C8B-B14F-4D97-AF65-F5344CB8AC3E}">
-        <p14:creationId xmlns:p14="http://schemas.microsoft.com/office/powerpoint/2010/main" val="2243081709"/>
+        <p14:creationId xmlns:p14="http://schemas.microsoft.com/office/powerpoint/2010/main" val="2501378450"/>
       </p:ext>
     </p:extLst>
   </p:cSld>
@@ -27728,9 +28182,6 @@
                     <p:cTn id="3" fill="hold">
                       <p:stCondLst>
                         <p:cond delay="indefinite"/>
-                        <p:cond evt="onBegin" delay="0">
-                          <p:tn val="2"/>
-                        </p:cond>
                       </p:stCondLst>
                       <p:childTnLst>
                         <p:par>
@@ -27740,7 +28191,7 @@
                             </p:stCondLst>
                             <p:childTnLst>
                               <p:par>
-                                <p:cTn id="5" presetID="1" presetClass="entr" presetSubtype="0" fill="hold" grpId="0" nodeType="withEffect">
+                                <p:cTn id="5" presetID="1" presetClass="entr" presetSubtype="0" fill="hold" grpId="0" nodeType="clickEffect">
                                   <p:stCondLst>
                                     <p:cond delay="0"/>
                                   </p:stCondLst>
@@ -27753,11 +28204,7 @@
                                           </p:stCondLst>
                                         </p:cTn>
                                         <p:tgtEl>
-                                          <p:spTgt spid="3">
-                                            <p:txEl>
-                                              <p:pRg st="0" end="0"/>
-                                            </p:txEl>
-                                          </p:spTgt>
+                                          <p:spTgt spid="7"/>
                                         </p:tgtEl>
                                         <p:attrNameLst>
                                           <p:attrName>style.visibility</p:attrName>
@@ -27802,395 +28249,7 @@
                                           </p:stCondLst>
                                         </p:cTn>
                                         <p:tgtEl>
-                                          <p:spTgt spid="3">
-                                            <p:txEl>
-                                              <p:pRg st="1" end="1"/>
-                                            </p:txEl>
-                                          </p:spTgt>
-                                        </p:tgtEl>
-                                        <p:attrNameLst>
-                                          <p:attrName>style.visibility</p:attrName>
-                                        </p:attrNameLst>
-                                      </p:cBhvr>
-                                      <p:to>
-                                        <p:strVal val="visible"/>
-                                      </p:to>
-                                    </p:set>
-                                  </p:childTnLst>
-                                </p:cTn>
-                              </p:par>
-                            </p:childTnLst>
-                          </p:cTn>
-                        </p:par>
-                      </p:childTnLst>
-                    </p:cTn>
-                  </p:par>
-                  <p:par>
-                    <p:cTn id="11" fill="hold">
-                      <p:stCondLst>
-                        <p:cond delay="indefinite"/>
-                      </p:stCondLst>
-                      <p:childTnLst>
-                        <p:par>
-                          <p:cTn id="12" fill="hold">
-                            <p:stCondLst>
-                              <p:cond delay="0"/>
-                            </p:stCondLst>
-                            <p:childTnLst>
-                              <p:par>
-                                <p:cTn id="13" presetID="1" presetClass="entr" presetSubtype="0" fill="hold" grpId="0" nodeType="clickEffect">
-                                  <p:stCondLst>
-                                    <p:cond delay="0"/>
-                                  </p:stCondLst>
-                                  <p:childTnLst>
-                                    <p:set>
-                                      <p:cBhvr>
-                                        <p:cTn id="14" dur="1" fill="hold">
-                                          <p:stCondLst>
-                                            <p:cond delay="0"/>
-                                          </p:stCondLst>
-                                        </p:cTn>
-                                        <p:tgtEl>
-                                          <p:spTgt spid="3">
-                                            <p:txEl>
-                                              <p:pRg st="2" end="2"/>
-                                            </p:txEl>
-                                          </p:spTgt>
-                                        </p:tgtEl>
-                                        <p:attrNameLst>
-                                          <p:attrName>style.visibility</p:attrName>
-                                        </p:attrNameLst>
-                                      </p:cBhvr>
-                                      <p:to>
-                                        <p:strVal val="visible"/>
-                                      </p:to>
-                                    </p:set>
-                                  </p:childTnLst>
-                                </p:cTn>
-                              </p:par>
-                            </p:childTnLst>
-                          </p:cTn>
-                        </p:par>
-                      </p:childTnLst>
-                    </p:cTn>
-                  </p:par>
-                  <p:par>
-                    <p:cTn id="15" fill="hold">
-                      <p:stCondLst>
-                        <p:cond delay="indefinite"/>
-                      </p:stCondLst>
-                      <p:childTnLst>
-                        <p:par>
-                          <p:cTn id="16" fill="hold">
-                            <p:stCondLst>
-                              <p:cond delay="0"/>
-                            </p:stCondLst>
-                            <p:childTnLst>
-                              <p:par>
-                                <p:cTn id="17" presetID="1" presetClass="entr" presetSubtype="0" fill="hold" grpId="0" nodeType="clickEffect">
-                                  <p:stCondLst>
-                                    <p:cond delay="0"/>
-                                  </p:stCondLst>
-                                  <p:childTnLst>
-                                    <p:set>
-                                      <p:cBhvr>
-                                        <p:cTn id="18" dur="1" fill="hold">
-                                          <p:stCondLst>
-                                            <p:cond delay="0"/>
-                                          </p:stCondLst>
-                                        </p:cTn>
-                                        <p:tgtEl>
-                                          <p:spTgt spid="3">
-                                            <p:txEl>
-                                              <p:pRg st="3" end="3"/>
-                                            </p:txEl>
-                                          </p:spTgt>
-                                        </p:tgtEl>
-                                        <p:attrNameLst>
-                                          <p:attrName>style.visibility</p:attrName>
-                                        </p:attrNameLst>
-                                      </p:cBhvr>
-                                      <p:to>
-                                        <p:strVal val="visible"/>
-                                      </p:to>
-                                    </p:set>
-                                  </p:childTnLst>
-                                </p:cTn>
-                              </p:par>
-                            </p:childTnLst>
-                          </p:cTn>
-                        </p:par>
-                      </p:childTnLst>
-                    </p:cTn>
-                  </p:par>
-                  <p:par>
-                    <p:cTn id="19" fill="hold">
-                      <p:stCondLst>
-                        <p:cond delay="indefinite"/>
-                      </p:stCondLst>
-                      <p:childTnLst>
-                        <p:par>
-                          <p:cTn id="20" fill="hold">
-                            <p:stCondLst>
-                              <p:cond delay="0"/>
-                            </p:stCondLst>
-                            <p:childTnLst>
-                              <p:par>
-                                <p:cTn id="21" presetID="1" presetClass="entr" presetSubtype="0" fill="hold" grpId="0" nodeType="clickEffect">
-                                  <p:stCondLst>
-                                    <p:cond delay="0"/>
-                                  </p:stCondLst>
-                                  <p:childTnLst>
-                                    <p:set>
-                                      <p:cBhvr>
-                                        <p:cTn id="22" dur="1" fill="hold">
-                                          <p:stCondLst>
-                                            <p:cond delay="0"/>
-                                          </p:stCondLst>
-                                        </p:cTn>
-                                        <p:tgtEl>
-                                          <p:spTgt spid="5"/>
-                                        </p:tgtEl>
-                                        <p:attrNameLst>
-                                          <p:attrName>style.visibility</p:attrName>
-                                        </p:attrNameLst>
-                                      </p:cBhvr>
-                                      <p:to>
-                                        <p:strVal val="visible"/>
-                                      </p:to>
-                                    </p:set>
-                                  </p:childTnLst>
-                                </p:cTn>
-                              </p:par>
-                            </p:childTnLst>
-                          </p:cTn>
-                        </p:par>
-                      </p:childTnLst>
-                    </p:cTn>
-                  </p:par>
-                  <p:par>
-                    <p:cTn id="23" fill="hold">
-                      <p:stCondLst>
-                        <p:cond delay="indefinite"/>
-                      </p:stCondLst>
-                      <p:childTnLst>
-                        <p:par>
-                          <p:cTn id="24" fill="hold">
-                            <p:stCondLst>
-                              <p:cond delay="0"/>
-                            </p:stCondLst>
-                            <p:childTnLst>
-                              <p:par>
-                                <p:cTn id="25" presetID="1" presetClass="entr" presetSubtype="0" fill="hold" grpId="0" nodeType="clickEffect">
-                                  <p:stCondLst>
-                                    <p:cond delay="0"/>
-                                  </p:stCondLst>
-                                  <p:childTnLst>
-                                    <p:set>
-                                      <p:cBhvr>
-                                        <p:cTn id="26" dur="1" fill="hold">
-                                          <p:stCondLst>
-                                            <p:cond delay="0"/>
-                                          </p:stCondLst>
-                                        </p:cTn>
-                                        <p:tgtEl>
-                                          <p:spTgt spid="3">
-                                            <p:txEl>
-                                              <p:pRg st="6" end="6"/>
-                                            </p:txEl>
-                                          </p:spTgt>
-                                        </p:tgtEl>
-                                        <p:attrNameLst>
-                                          <p:attrName>style.visibility</p:attrName>
-                                        </p:attrNameLst>
-                                      </p:cBhvr>
-                                      <p:to>
-                                        <p:strVal val="visible"/>
-                                      </p:to>
-                                    </p:set>
-                                  </p:childTnLst>
-                                </p:cTn>
-                              </p:par>
-                            </p:childTnLst>
-                          </p:cTn>
-                        </p:par>
-                      </p:childTnLst>
-                    </p:cTn>
-                  </p:par>
-                  <p:par>
-                    <p:cTn id="27" fill="hold">
-                      <p:stCondLst>
-                        <p:cond delay="indefinite"/>
-                      </p:stCondLst>
-                      <p:childTnLst>
-                        <p:par>
-                          <p:cTn id="28" fill="hold">
-                            <p:stCondLst>
-                              <p:cond delay="0"/>
-                            </p:stCondLst>
-                            <p:childTnLst>
-                              <p:par>
-                                <p:cTn id="29" presetID="1" presetClass="entr" presetSubtype="0" fill="hold" grpId="0" nodeType="clickEffect">
-                                  <p:stCondLst>
-                                    <p:cond delay="0"/>
-                                  </p:stCondLst>
-                                  <p:childTnLst>
-                                    <p:set>
-                                      <p:cBhvr>
-                                        <p:cTn id="30" dur="1" fill="hold">
-                                          <p:stCondLst>
-                                            <p:cond delay="0"/>
-                                          </p:stCondLst>
-                                        </p:cTn>
-                                        <p:tgtEl>
-                                          <p:spTgt spid="3">
-                                            <p:txEl>
-                                              <p:pRg st="7" end="7"/>
-                                            </p:txEl>
-                                          </p:spTgt>
-                                        </p:tgtEl>
-                                        <p:attrNameLst>
-                                          <p:attrName>style.visibility</p:attrName>
-                                        </p:attrNameLst>
-                                      </p:cBhvr>
-                                      <p:to>
-                                        <p:strVal val="visible"/>
-                                      </p:to>
-                                    </p:set>
-                                  </p:childTnLst>
-                                </p:cTn>
-                              </p:par>
-                            </p:childTnLst>
-                          </p:cTn>
-                        </p:par>
-                      </p:childTnLst>
-                    </p:cTn>
-                  </p:par>
-                  <p:par>
-                    <p:cTn id="31" fill="hold">
-                      <p:stCondLst>
-                        <p:cond delay="indefinite"/>
-                      </p:stCondLst>
-                      <p:childTnLst>
-                        <p:par>
-                          <p:cTn id="32" fill="hold">
-                            <p:stCondLst>
-                              <p:cond delay="0"/>
-                            </p:stCondLst>
-                            <p:childTnLst>
-                              <p:par>
-                                <p:cTn id="33" presetID="1" presetClass="entr" presetSubtype="0" fill="hold" grpId="0" nodeType="clickEffect">
-                                  <p:stCondLst>
-                                    <p:cond delay="0"/>
-                                  </p:stCondLst>
-                                  <p:childTnLst>
-                                    <p:set>
-                                      <p:cBhvr>
-                                        <p:cTn id="34" dur="1" fill="hold">
-                                          <p:stCondLst>
-                                            <p:cond delay="0"/>
-                                          </p:stCondLst>
-                                        </p:cTn>
-                                        <p:tgtEl>
-                                          <p:spTgt spid="3">
-                                            <p:txEl>
-                                              <p:pRg st="8" end="8"/>
-                                            </p:txEl>
-                                          </p:spTgt>
-                                        </p:tgtEl>
-                                        <p:attrNameLst>
-                                          <p:attrName>style.visibility</p:attrName>
-                                        </p:attrNameLst>
-                                      </p:cBhvr>
-                                      <p:to>
-                                        <p:strVal val="visible"/>
-                                      </p:to>
-                                    </p:set>
-                                  </p:childTnLst>
-                                </p:cTn>
-                              </p:par>
-                            </p:childTnLst>
-                          </p:cTn>
-                        </p:par>
-                      </p:childTnLst>
-                    </p:cTn>
-                  </p:par>
-                  <p:par>
-                    <p:cTn id="35" fill="hold">
-                      <p:stCondLst>
-                        <p:cond delay="indefinite"/>
-                      </p:stCondLst>
-                      <p:childTnLst>
-                        <p:par>
-                          <p:cTn id="36" fill="hold">
-                            <p:stCondLst>
-                              <p:cond delay="0"/>
-                            </p:stCondLst>
-                            <p:childTnLst>
-                              <p:par>
-                                <p:cTn id="37" presetID="1" presetClass="entr" presetSubtype="0" fill="hold" grpId="0" nodeType="clickEffect">
-                                  <p:stCondLst>
-                                    <p:cond delay="0"/>
-                                  </p:stCondLst>
-                                  <p:childTnLst>
-                                    <p:set>
-                                      <p:cBhvr>
-                                        <p:cTn id="38" dur="1" fill="hold">
-                                          <p:stCondLst>
-                                            <p:cond delay="0"/>
-                                          </p:stCondLst>
-                                        </p:cTn>
-                                        <p:tgtEl>
-                                          <p:spTgt spid="3">
-                                            <p:txEl>
-                                              <p:pRg st="9" end="9"/>
-                                            </p:txEl>
-                                          </p:spTgt>
-                                        </p:tgtEl>
-                                        <p:attrNameLst>
-                                          <p:attrName>style.visibility</p:attrName>
-                                        </p:attrNameLst>
-                                      </p:cBhvr>
-                                      <p:to>
-                                        <p:strVal val="visible"/>
-                                      </p:to>
-                                    </p:set>
-                                  </p:childTnLst>
-                                </p:cTn>
-                              </p:par>
-                            </p:childTnLst>
-                          </p:cTn>
-                        </p:par>
-                      </p:childTnLst>
-                    </p:cTn>
-                  </p:par>
-                  <p:par>
-                    <p:cTn id="39" fill="hold">
-                      <p:stCondLst>
-                        <p:cond delay="indefinite"/>
-                      </p:stCondLst>
-                      <p:childTnLst>
-                        <p:par>
-                          <p:cTn id="40" fill="hold">
-                            <p:stCondLst>
-                              <p:cond delay="0"/>
-                            </p:stCondLst>
-                            <p:childTnLst>
-                              <p:par>
-                                <p:cTn id="41" presetID="1" presetClass="entr" presetSubtype="0" fill="hold" grpId="0" nodeType="clickEffect">
-                                  <p:stCondLst>
-                                    <p:cond delay="0"/>
-                                  </p:stCondLst>
-                                  <p:childTnLst>
-                                    <p:set>
-                                      <p:cBhvr>
-                                        <p:cTn id="42" dur="1" fill="hold">
-                                          <p:stCondLst>
-                                            <p:cond delay="0"/>
-                                          </p:stCondLst>
-                                        </p:cTn>
-                                        <p:tgtEl>
-                                          <p:spTgt spid="6"/>
+                                          <p:spTgt spid="8"/>
                                         </p:tgtEl>
                                         <p:attrNameLst>
                                           <p:attrName>style.visibility</p:attrName>
@@ -28231,9 +28290,8 @@
       </p:par>
     </p:tnLst>
     <p:bldLst>
-      <p:bldP spid="3" grpId="0" uiExpand="1" build="p" bldLvl="2"/>
-      <p:bldP spid="5" grpId="0" animBg="1"/>
-      <p:bldP spid="6" grpId="0" animBg="1"/>
+      <p:bldP spid="7" grpId="0" animBg="1"/>
+      <p:bldP spid="8" grpId="0" animBg="1"/>
     </p:bldLst>
   </p:timing>
 </p:sld>
@@ -29228,6 +29286,220 @@
       </p:grpSpPr>
       <p:sp>
         <p:nvSpPr>
+          <p:cNvPr id="2" name="Title 1">
+            <a:extLst>
+              <a:ext uri="{FF2B5EF4-FFF2-40B4-BE49-F238E27FC236}">
+                <a16:creationId xmlns:a16="http://schemas.microsoft.com/office/drawing/2014/main" id="{DA8BA102-5410-4356-62AF-DF46D7CC871E}"/>
+              </a:ext>
+            </a:extLst>
+          </p:cNvPr>
+          <p:cNvSpPr>
+            <a:spLocks noGrp="1"/>
+          </p:cNvSpPr>
+          <p:nvPr>
+            <p:ph type="title"/>
+          </p:nvPr>
+        </p:nvSpPr>
+        <p:spPr/>
+        <p:txBody>
+          <a:bodyPr/>
+          <a:lstStyle/>
+          <a:p>
+            <a:r>
+              <a:rPr lang="en-US" dirty="0"/>
+              <a:t>Developing on GPUs</a:t>
+            </a:r>
+            <a:endParaRPr lang="LID4096" dirty="0"/>
+          </a:p>
+        </p:txBody>
+      </p:sp>
+      <p:sp>
+        <p:nvSpPr>
+          <p:cNvPr id="3" name="Content Placeholder 2">
+            <a:extLst>
+              <a:ext uri="{FF2B5EF4-FFF2-40B4-BE49-F238E27FC236}">
+                <a16:creationId xmlns:a16="http://schemas.microsoft.com/office/drawing/2014/main" id="{B602D71A-BD9C-F24B-A236-0A54145A95F3}"/>
+              </a:ext>
+            </a:extLst>
+          </p:cNvPr>
+          <p:cNvSpPr>
+            <a:spLocks noGrp="1"/>
+          </p:cNvSpPr>
+          <p:nvPr>
+            <p:ph idx="1"/>
+          </p:nvPr>
+        </p:nvSpPr>
+        <p:spPr/>
+        <p:txBody>
+          <a:bodyPr>
+            <a:normAutofit/>
+          </a:bodyPr>
+          <a:lstStyle/>
+          <a:p>
+            <a:r>
+              <a:rPr lang="en-US" dirty="0"/>
+              <a:t>Development libraries required</a:t>
+            </a:r>
+          </a:p>
+          <a:p>
+            <a:r>
+              <a:rPr lang="en-US" dirty="0"/>
+              <a:t>NVIDIA NGC: container catalog</a:t>
+            </a:r>
+            <a:br>
+              <a:rPr lang="en-US" dirty="0"/>
+            </a:br>
+            <a:r>
+              <a:rPr lang="en-US" sz="2400" dirty="0">
+                <a:hlinkClick r:id="rId2"/>
+              </a:rPr>
+              <a:t>https://catalog.ngc.nvidia.com/containers</a:t>
+            </a:r>
+            <a:r>
+              <a:rPr lang="en-US" sz="2400" dirty="0"/>
+              <a:t> </a:t>
+            </a:r>
+            <a:endParaRPr lang="en-US" dirty="0"/>
+          </a:p>
+          <a:p>
+            <a:pPr lvl="1"/>
+            <a:r>
+              <a:rPr lang="en-US" dirty="0"/>
+              <a:t>NVIDIA HPC SDK</a:t>
+            </a:r>
+          </a:p>
+          <a:p>
+            <a:pPr lvl="1"/>
+            <a:r>
+              <a:rPr lang="en-US" dirty="0" err="1"/>
+              <a:t>PyTorch</a:t>
+            </a:r>
+            <a:r>
+              <a:rPr lang="en-US" dirty="0"/>
+              <a:t>, </a:t>
+            </a:r>
+            <a:r>
+              <a:rPr lang="en-US" dirty="0" err="1"/>
+              <a:t>PyTorch</a:t>
+            </a:r>
+            <a:r>
+              <a:rPr lang="en-US" dirty="0"/>
+              <a:t> Lightning</a:t>
+            </a:r>
+          </a:p>
+          <a:p>
+            <a:pPr lvl="1"/>
+            <a:r>
+              <a:rPr lang="en-US" dirty="0"/>
+              <a:t>TensorFlow</a:t>
+            </a:r>
+          </a:p>
+          <a:p>
+            <a:pPr lvl="1"/>
+            <a:r>
+              <a:rPr lang="en-US" dirty="0"/>
+              <a:t>RAPIDS/RAPIDS Notebooks</a:t>
+            </a:r>
+          </a:p>
+          <a:p>
+            <a:pPr lvl="1"/>
+            <a:r>
+              <a:rPr lang="en-US" dirty="0">
+                <a:sym typeface="Symbol" panose="05050102010706020507" pitchFamily="18" charset="2"/>
+              </a:rPr>
+              <a:t></a:t>
+            </a:r>
+          </a:p>
+          <a:p>
+            <a:r>
+              <a:rPr lang="en-US" dirty="0">
+                <a:sym typeface="Symbol" panose="05050102010706020507" pitchFamily="18" charset="2"/>
+              </a:rPr>
+              <a:t>AMD Instinct</a:t>
+            </a:r>
+            <a:br>
+              <a:rPr lang="en-US" dirty="0">
+                <a:sym typeface="Symbol" panose="05050102010706020507" pitchFamily="18" charset="2"/>
+              </a:rPr>
+            </a:br>
+            <a:r>
+              <a:rPr lang="en-US" sz="2400" dirty="0">
+                <a:sym typeface="Symbol" panose="05050102010706020507" pitchFamily="18" charset="2"/>
+                <a:hlinkClick r:id="rId3"/>
+              </a:rPr>
+              <a:t>https://instinct.docs.amd.com/projects/container-toolkit/</a:t>
+            </a:r>
+            <a:r>
+              <a:rPr lang="en-US" sz="2400" dirty="0">
+                <a:sym typeface="Symbol" panose="05050102010706020507" pitchFamily="18" charset="2"/>
+              </a:rPr>
+              <a:t> </a:t>
+            </a:r>
+            <a:endParaRPr lang="LID4096" dirty="0"/>
+          </a:p>
+        </p:txBody>
+      </p:sp>
+      <p:sp>
+        <p:nvSpPr>
+          <p:cNvPr id="4" name="Slide Number Placeholder 3">
+            <a:extLst>
+              <a:ext uri="{FF2B5EF4-FFF2-40B4-BE49-F238E27FC236}">
+                <a16:creationId xmlns:a16="http://schemas.microsoft.com/office/drawing/2014/main" id="{920597EE-A522-7690-D5D4-94B343EBCCEC}"/>
+              </a:ext>
+            </a:extLst>
+          </p:cNvPr>
+          <p:cNvSpPr>
+            <a:spLocks noGrp="1"/>
+          </p:cNvSpPr>
+          <p:nvPr>
+            <p:ph type="sldNum" sz="quarter" idx="12"/>
+          </p:nvPr>
+        </p:nvSpPr>
+        <p:spPr/>
+        <p:txBody>
+          <a:bodyPr/>
+          <a:lstStyle/>
+          <a:p>
+            <a:fld id="{AEFF399F-E3B5-4890-BC79-9BC8D4DF3F2D}" type="slidenum">
+              <a:rPr lang="nl-BE" smtClean="0"/>
+              <a:t>50</a:t>
+            </a:fld>
+            <a:endParaRPr lang="nl-BE"/>
+          </a:p>
+        </p:txBody>
+      </p:sp>
+    </p:spTree>
+    <p:extLst>
+      <p:ext uri="{BB962C8B-B14F-4D97-AF65-F5344CB8AC3E}">
+        <p14:creationId xmlns:p14="http://schemas.microsoft.com/office/powerpoint/2010/main" val="4165295725"/>
+      </p:ext>
+    </p:extLst>
+  </p:cSld>
+  <p:clrMapOvr>
+    <a:masterClrMapping/>
+  </p:clrMapOvr>
+</p:sld>
+</file>
+
+<file path=ppt/slides/slide51.xml><?xml version="1.0" encoding="utf-8"?>
+<p:sld xmlns:a="http://schemas.openxmlformats.org/drawingml/2006/main" xmlns:r="http://schemas.openxmlformats.org/officeDocument/2006/relationships" xmlns:p="http://schemas.openxmlformats.org/presentationml/2006/main">
+  <p:cSld>
+    <p:spTree>
+      <p:nvGrpSpPr>
+        <p:cNvPr id="1" name=""/>
+        <p:cNvGrpSpPr/>
+        <p:nvPr/>
+      </p:nvGrpSpPr>
+      <p:grpSpPr>
+        <a:xfrm>
+          <a:off x="0" y="0"/>
+          <a:ext cx="0" cy="0"/>
+          <a:chOff x="0" y="0"/>
+          <a:chExt cx="0" cy="0"/>
+        </a:xfrm>
+      </p:grpSpPr>
+      <p:sp>
+        <p:nvSpPr>
           <p:cNvPr id="2" name="Title 1"/>
           <p:cNvSpPr>
             <a:spLocks noGrp="1"/>
@@ -29243,8 +29515,27 @@
           <a:p>
             <a:r>
               <a:rPr lang="en-US" dirty="0"/>
-              <a:t>Define service</a:t>
-            </a:r>
+              <a:t>Services</a:t>
+            </a:r>
+          </a:p>
+        </p:txBody>
+      </p:sp>
+      <p:sp>
+        <p:nvSpPr>
+          <p:cNvPr id="3" name="Text Placeholder 2"/>
+          <p:cNvSpPr>
+            <a:spLocks noGrp="1"/>
+          </p:cNvSpPr>
+          <p:nvPr>
+            <p:ph type="body" idx="1"/>
+          </p:nvPr>
+        </p:nvSpPr>
+        <p:spPr/>
+        <p:txBody>
+          <a:bodyPr/>
+          <a:lstStyle/>
+          <a:p>
+            <a:endParaRPr lang="en-US"/>
           </a:p>
         </p:txBody>
       </p:sp>
@@ -29265,7 +29556,831 @@
           <a:p>
             <a:fld id="{AEFF399F-E3B5-4890-BC79-9BC8D4DF3F2D}" type="slidenum">
               <a:rPr lang="nl-BE" smtClean="0"/>
-              <a:t>50</a:t>
+              <a:t>51</a:t>
+            </a:fld>
+            <a:endParaRPr lang="nl-BE"/>
+          </a:p>
+        </p:txBody>
+      </p:sp>
+    </p:spTree>
+    <p:extLst>
+      <p:ext uri="{BB962C8B-B14F-4D97-AF65-F5344CB8AC3E}">
+        <p14:creationId xmlns:p14="http://schemas.microsoft.com/office/powerpoint/2010/main" val="1160171864"/>
+      </p:ext>
+    </p:extLst>
+  </p:cSld>
+  <p:clrMapOvr>
+    <a:masterClrMapping/>
+  </p:clrMapOvr>
+</p:sld>
+</file>
+
+<file path=ppt/slides/slide52.xml><?xml version="1.0" encoding="utf-8"?>
+<p:sld xmlns:a="http://schemas.openxmlformats.org/drawingml/2006/main" xmlns:r="http://schemas.openxmlformats.org/officeDocument/2006/relationships" xmlns:p="http://schemas.openxmlformats.org/presentationml/2006/main">
+  <p:cSld>
+    <p:spTree>
+      <p:nvGrpSpPr>
+        <p:cNvPr id="1" name=""/>
+        <p:cNvGrpSpPr/>
+        <p:nvPr/>
+      </p:nvGrpSpPr>
+      <p:grpSpPr>
+        <a:xfrm>
+          <a:off x="0" y="0"/>
+          <a:ext cx="0" cy="0"/>
+          <a:chOff x="0" y="0"/>
+          <a:chExt cx="0" cy="0"/>
+        </a:xfrm>
+      </p:grpSpPr>
+      <p:sp>
+        <p:nvSpPr>
+          <p:cNvPr id="2" name="Title 1"/>
+          <p:cNvSpPr>
+            <a:spLocks noGrp="1"/>
+          </p:cNvSpPr>
+          <p:nvPr>
+            <p:ph type="title"/>
+          </p:nvPr>
+        </p:nvSpPr>
+        <p:spPr/>
+        <p:txBody>
+          <a:bodyPr/>
+          <a:lstStyle/>
+          <a:p>
+            <a:r>
+              <a:rPr lang="en-US" dirty="0"/>
+              <a:t>Server processes</a:t>
+            </a:r>
+          </a:p>
+        </p:txBody>
+      </p:sp>
+      <p:sp>
+        <p:nvSpPr>
+          <p:cNvPr id="3" name="Content Placeholder 2"/>
+          <p:cNvSpPr>
+            <a:spLocks noGrp="1"/>
+          </p:cNvSpPr>
+          <p:nvPr>
+            <p:ph idx="1"/>
+          </p:nvPr>
+        </p:nvSpPr>
+        <p:spPr/>
+        <p:txBody>
+          <a:bodyPr/>
+          <a:lstStyle/>
+          <a:p>
+            <a:r>
+              <a:rPr lang="en-US" dirty="0"/>
+              <a:t>Image runs service, e.g.,</a:t>
+            </a:r>
+          </a:p>
+          <a:p>
+            <a:pPr lvl="1"/>
+            <a:r>
+              <a:rPr lang="en-US" dirty="0"/>
+              <a:t>web server</a:t>
+            </a:r>
+          </a:p>
+          <a:p>
+            <a:pPr lvl="1"/>
+            <a:r>
+              <a:rPr lang="en-US" dirty="0"/>
+              <a:t>RDBMS</a:t>
+            </a:r>
+          </a:p>
+          <a:p>
+            <a:pPr lvl="1"/>
+            <a:r>
+              <a:rPr lang="en-US" dirty="0"/>
+              <a:t>…</a:t>
+            </a:r>
+          </a:p>
+          <a:p>
+            <a:pPr lvl="1"/>
+            <a:endParaRPr lang="en-US" dirty="0"/>
+          </a:p>
+          <a:p>
+            <a:pPr lvl="1"/>
+            <a:endParaRPr lang="en-US" dirty="0"/>
+          </a:p>
+          <a:p>
+            <a:r>
+              <a:rPr lang="en-US" dirty="0"/>
+              <a:t>Workflow</a:t>
+            </a:r>
+          </a:p>
+          <a:p>
+            <a:pPr lvl="1"/>
+            <a:r>
+              <a:rPr lang="en-US" dirty="0"/>
+              <a:t>start service</a:t>
+            </a:r>
+          </a:p>
+          <a:p>
+            <a:pPr lvl="1"/>
+            <a:r>
+              <a:rPr lang="en-US" dirty="0"/>
+              <a:t>client(s) interaction</a:t>
+            </a:r>
+          </a:p>
+          <a:p>
+            <a:pPr lvl="1"/>
+            <a:r>
+              <a:rPr lang="en-US" dirty="0"/>
+              <a:t>stop service</a:t>
+            </a:r>
+          </a:p>
+          <a:p>
+            <a:pPr lvl="1"/>
+            <a:endParaRPr lang="en-US" dirty="0"/>
+          </a:p>
+        </p:txBody>
+      </p:sp>
+      <p:sp>
+        <p:nvSpPr>
+          <p:cNvPr id="4" name="Slide Number Placeholder 3"/>
+          <p:cNvSpPr>
+            <a:spLocks noGrp="1"/>
+          </p:cNvSpPr>
+          <p:nvPr>
+            <p:ph type="sldNum" sz="quarter" idx="12"/>
+          </p:nvPr>
+        </p:nvSpPr>
+        <p:spPr/>
+        <p:txBody>
+          <a:bodyPr/>
+          <a:lstStyle/>
+          <a:p>
+            <a:fld id="{AEFF399F-E3B5-4890-BC79-9BC8D4DF3F2D}" type="slidenum">
+              <a:rPr lang="nl-BE" smtClean="0"/>
+              <a:t>52</a:t>
+            </a:fld>
+            <a:endParaRPr lang="nl-BE"/>
+          </a:p>
+        </p:txBody>
+      </p:sp>
+      <p:sp>
+        <p:nvSpPr>
+          <p:cNvPr id="5" name="TextBox 4"/>
+          <p:cNvSpPr txBox="1"/>
+          <p:nvPr/>
+        </p:nvSpPr>
+        <p:spPr>
+          <a:xfrm>
+            <a:off x="2242987" y="3539629"/>
+            <a:ext cx="4363759" cy="461665"/>
+          </a:xfrm>
+          <a:prstGeom prst="rect">
+            <a:avLst/>
+          </a:prstGeom>
+          <a:noFill/>
+          <a:ln>
+            <a:solidFill>
+              <a:schemeClr val="tx1"/>
+            </a:solidFill>
+          </a:ln>
+        </p:spPr>
+        <p:txBody>
+          <a:bodyPr wrap="none" rtlCol="0">
+            <a:spAutoFit/>
+          </a:bodyPr>
+          <a:lstStyle/>
+          <a:p>
+            <a:r>
+              <a:rPr lang="en-US" sz="2400" dirty="0"/>
+              <a:t>Processes need to be cleaned up!</a:t>
+            </a:r>
+          </a:p>
+        </p:txBody>
+      </p:sp>
+      <p:sp>
+        <p:nvSpPr>
+          <p:cNvPr id="6" name="TextBox 5"/>
+          <p:cNvSpPr txBox="1"/>
+          <p:nvPr/>
+        </p:nvSpPr>
+        <p:spPr>
+          <a:xfrm>
+            <a:off x="4818046" y="4835497"/>
+            <a:ext cx="1788700" cy="954107"/>
+          </a:xfrm>
+          <a:prstGeom prst="rect">
+            <a:avLst/>
+          </a:prstGeom>
+          <a:noFill/>
+          <a:ln>
+            <a:solidFill>
+              <a:schemeClr val="tx1"/>
+            </a:solidFill>
+          </a:ln>
+        </p:spPr>
+        <p:txBody>
+          <a:bodyPr wrap="square" rtlCol="0">
+            <a:spAutoFit/>
+          </a:bodyPr>
+          <a:lstStyle/>
+          <a:p>
+            <a:r>
+              <a:rPr lang="en-US" sz="2800" dirty="0" err="1"/>
+              <a:t>Apptainer</a:t>
+            </a:r>
+            <a:r>
+              <a:rPr lang="en-US" sz="2800" dirty="0"/>
+              <a:t> instances</a:t>
+            </a:r>
+          </a:p>
+        </p:txBody>
+      </p:sp>
+    </p:spTree>
+    <p:extLst>
+      <p:ext uri="{BB962C8B-B14F-4D97-AF65-F5344CB8AC3E}">
+        <p14:creationId xmlns:p14="http://schemas.microsoft.com/office/powerpoint/2010/main" val="2243081709"/>
+      </p:ext>
+    </p:extLst>
+  </p:cSld>
+  <p:clrMapOvr>
+    <a:masterClrMapping/>
+  </p:clrMapOvr>
+  <p:timing>
+    <p:tnLst>
+      <p:par>
+        <p:cTn id="1" dur="indefinite" restart="never" nodeType="tmRoot">
+          <p:childTnLst>
+            <p:seq concurrent="1" nextAc="seek">
+              <p:cTn id="2" dur="indefinite" nodeType="mainSeq">
+                <p:childTnLst>
+                  <p:par>
+                    <p:cTn id="3" fill="hold">
+                      <p:stCondLst>
+                        <p:cond delay="indefinite"/>
+                        <p:cond evt="onBegin" delay="0">
+                          <p:tn val="2"/>
+                        </p:cond>
+                      </p:stCondLst>
+                      <p:childTnLst>
+                        <p:par>
+                          <p:cTn id="4" fill="hold">
+                            <p:stCondLst>
+                              <p:cond delay="0"/>
+                            </p:stCondLst>
+                            <p:childTnLst>
+                              <p:par>
+                                <p:cTn id="5" presetID="1" presetClass="entr" presetSubtype="0" fill="hold" grpId="0" nodeType="withEffect">
+                                  <p:stCondLst>
+                                    <p:cond delay="0"/>
+                                  </p:stCondLst>
+                                  <p:childTnLst>
+                                    <p:set>
+                                      <p:cBhvr>
+                                        <p:cTn id="6" dur="1" fill="hold">
+                                          <p:stCondLst>
+                                            <p:cond delay="0"/>
+                                          </p:stCondLst>
+                                        </p:cTn>
+                                        <p:tgtEl>
+                                          <p:spTgt spid="3">
+                                            <p:txEl>
+                                              <p:pRg st="0" end="0"/>
+                                            </p:txEl>
+                                          </p:spTgt>
+                                        </p:tgtEl>
+                                        <p:attrNameLst>
+                                          <p:attrName>style.visibility</p:attrName>
+                                        </p:attrNameLst>
+                                      </p:cBhvr>
+                                      <p:to>
+                                        <p:strVal val="visible"/>
+                                      </p:to>
+                                    </p:set>
+                                  </p:childTnLst>
+                                </p:cTn>
+                              </p:par>
+                            </p:childTnLst>
+                          </p:cTn>
+                        </p:par>
+                      </p:childTnLst>
+                    </p:cTn>
+                  </p:par>
+                  <p:par>
+                    <p:cTn id="7" fill="hold">
+                      <p:stCondLst>
+                        <p:cond delay="indefinite"/>
+                      </p:stCondLst>
+                      <p:childTnLst>
+                        <p:par>
+                          <p:cTn id="8" fill="hold">
+                            <p:stCondLst>
+                              <p:cond delay="0"/>
+                            </p:stCondLst>
+                            <p:childTnLst>
+                              <p:par>
+                                <p:cTn id="9" presetID="1" presetClass="entr" presetSubtype="0" fill="hold" grpId="0" nodeType="clickEffect">
+                                  <p:stCondLst>
+                                    <p:cond delay="0"/>
+                                  </p:stCondLst>
+                                  <p:childTnLst>
+                                    <p:set>
+                                      <p:cBhvr>
+                                        <p:cTn id="10" dur="1" fill="hold">
+                                          <p:stCondLst>
+                                            <p:cond delay="0"/>
+                                          </p:stCondLst>
+                                        </p:cTn>
+                                        <p:tgtEl>
+                                          <p:spTgt spid="3">
+                                            <p:txEl>
+                                              <p:pRg st="1" end="1"/>
+                                            </p:txEl>
+                                          </p:spTgt>
+                                        </p:tgtEl>
+                                        <p:attrNameLst>
+                                          <p:attrName>style.visibility</p:attrName>
+                                        </p:attrNameLst>
+                                      </p:cBhvr>
+                                      <p:to>
+                                        <p:strVal val="visible"/>
+                                      </p:to>
+                                    </p:set>
+                                  </p:childTnLst>
+                                </p:cTn>
+                              </p:par>
+                            </p:childTnLst>
+                          </p:cTn>
+                        </p:par>
+                      </p:childTnLst>
+                    </p:cTn>
+                  </p:par>
+                  <p:par>
+                    <p:cTn id="11" fill="hold">
+                      <p:stCondLst>
+                        <p:cond delay="indefinite"/>
+                      </p:stCondLst>
+                      <p:childTnLst>
+                        <p:par>
+                          <p:cTn id="12" fill="hold">
+                            <p:stCondLst>
+                              <p:cond delay="0"/>
+                            </p:stCondLst>
+                            <p:childTnLst>
+                              <p:par>
+                                <p:cTn id="13" presetID="1" presetClass="entr" presetSubtype="0" fill="hold" grpId="0" nodeType="clickEffect">
+                                  <p:stCondLst>
+                                    <p:cond delay="0"/>
+                                  </p:stCondLst>
+                                  <p:childTnLst>
+                                    <p:set>
+                                      <p:cBhvr>
+                                        <p:cTn id="14" dur="1" fill="hold">
+                                          <p:stCondLst>
+                                            <p:cond delay="0"/>
+                                          </p:stCondLst>
+                                        </p:cTn>
+                                        <p:tgtEl>
+                                          <p:spTgt spid="3">
+                                            <p:txEl>
+                                              <p:pRg st="2" end="2"/>
+                                            </p:txEl>
+                                          </p:spTgt>
+                                        </p:tgtEl>
+                                        <p:attrNameLst>
+                                          <p:attrName>style.visibility</p:attrName>
+                                        </p:attrNameLst>
+                                      </p:cBhvr>
+                                      <p:to>
+                                        <p:strVal val="visible"/>
+                                      </p:to>
+                                    </p:set>
+                                  </p:childTnLst>
+                                </p:cTn>
+                              </p:par>
+                            </p:childTnLst>
+                          </p:cTn>
+                        </p:par>
+                      </p:childTnLst>
+                    </p:cTn>
+                  </p:par>
+                  <p:par>
+                    <p:cTn id="15" fill="hold">
+                      <p:stCondLst>
+                        <p:cond delay="indefinite"/>
+                      </p:stCondLst>
+                      <p:childTnLst>
+                        <p:par>
+                          <p:cTn id="16" fill="hold">
+                            <p:stCondLst>
+                              <p:cond delay="0"/>
+                            </p:stCondLst>
+                            <p:childTnLst>
+                              <p:par>
+                                <p:cTn id="17" presetID="1" presetClass="entr" presetSubtype="0" fill="hold" grpId="0" nodeType="clickEffect">
+                                  <p:stCondLst>
+                                    <p:cond delay="0"/>
+                                  </p:stCondLst>
+                                  <p:childTnLst>
+                                    <p:set>
+                                      <p:cBhvr>
+                                        <p:cTn id="18" dur="1" fill="hold">
+                                          <p:stCondLst>
+                                            <p:cond delay="0"/>
+                                          </p:stCondLst>
+                                        </p:cTn>
+                                        <p:tgtEl>
+                                          <p:spTgt spid="3">
+                                            <p:txEl>
+                                              <p:pRg st="3" end="3"/>
+                                            </p:txEl>
+                                          </p:spTgt>
+                                        </p:tgtEl>
+                                        <p:attrNameLst>
+                                          <p:attrName>style.visibility</p:attrName>
+                                        </p:attrNameLst>
+                                      </p:cBhvr>
+                                      <p:to>
+                                        <p:strVal val="visible"/>
+                                      </p:to>
+                                    </p:set>
+                                  </p:childTnLst>
+                                </p:cTn>
+                              </p:par>
+                            </p:childTnLst>
+                          </p:cTn>
+                        </p:par>
+                      </p:childTnLst>
+                    </p:cTn>
+                  </p:par>
+                  <p:par>
+                    <p:cTn id="19" fill="hold">
+                      <p:stCondLst>
+                        <p:cond delay="indefinite"/>
+                      </p:stCondLst>
+                      <p:childTnLst>
+                        <p:par>
+                          <p:cTn id="20" fill="hold">
+                            <p:stCondLst>
+                              <p:cond delay="0"/>
+                            </p:stCondLst>
+                            <p:childTnLst>
+                              <p:par>
+                                <p:cTn id="21" presetID="1" presetClass="entr" presetSubtype="0" fill="hold" grpId="0" nodeType="clickEffect">
+                                  <p:stCondLst>
+                                    <p:cond delay="0"/>
+                                  </p:stCondLst>
+                                  <p:childTnLst>
+                                    <p:set>
+                                      <p:cBhvr>
+                                        <p:cTn id="22" dur="1" fill="hold">
+                                          <p:stCondLst>
+                                            <p:cond delay="0"/>
+                                          </p:stCondLst>
+                                        </p:cTn>
+                                        <p:tgtEl>
+                                          <p:spTgt spid="5"/>
+                                        </p:tgtEl>
+                                        <p:attrNameLst>
+                                          <p:attrName>style.visibility</p:attrName>
+                                        </p:attrNameLst>
+                                      </p:cBhvr>
+                                      <p:to>
+                                        <p:strVal val="visible"/>
+                                      </p:to>
+                                    </p:set>
+                                  </p:childTnLst>
+                                </p:cTn>
+                              </p:par>
+                            </p:childTnLst>
+                          </p:cTn>
+                        </p:par>
+                      </p:childTnLst>
+                    </p:cTn>
+                  </p:par>
+                  <p:par>
+                    <p:cTn id="23" fill="hold">
+                      <p:stCondLst>
+                        <p:cond delay="indefinite"/>
+                      </p:stCondLst>
+                      <p:childTnLst>
+                        <p:par>
+                          <p:cTn id="24" fill="hold">
+                            <p:stCondLst>
+                              <p:cond delay="0"/>
+                            </p:stCondLst>
+                            <p:childTnLst>
+                              <p:par>
+                                <p:cTn id="25" presetID="1" presetClass="entr" presetSubtype="0" fill="hold" grpId="0" nodeType="clickEffect">
+                                  <p:stCondLst>
+                                    <p:cond delay="0"/>
+                                  </p:stCondLst>
+                                  <p:childTnLst>
+                                    <p:set>
+                                      <p:cBhvr>
+                                        <p:cTn id="26" dur="1" fill="hold">
+                                          <p:stCondLst>
+                                            <p:cond delay="0"/>
+                                          </p:stCondLst>
+                                        </p:cTn>
+                                        <p:tgtEl>
+                                          <p:spTgt spid="3">
+                                            <p:txEl>
+                                              <p:pRg st="6" end="6"/>
+                                            </p:txEl>
+                                          </p:spTgt>
+                                        </p:tgtEl>
+                                        <p:attrNameLst>
+                                          <p:attrName>style.visibility</p:attrName>
+                                        </p:attrNameLst>
+                                      </p:cBhvr>
+                                      <p:to>
+                                        <p:strVal val="visible"/>
+                                      </p:to>
+                                    </p:set>
+                                  </p:childTnLst>
+                                </p:cTn>
+                              </p:par>
+                            </p:childTnLst>
+                          </p:cTn>
+                        </p:par>
+                      </p:childTnLst>
+                    </p:cTn>
+                  </p:par>
+                  <p:par>
+                    <p:cTn id="27" fill="hold">
+                      <p:stCondLst>
+                        <p:cond delay="indefinite"/>
+                      </p:stCondLst>
+                      <p:childTnLst>
+                        <p:par>
+                          <p:cTn id="28" fill="hold">
+                            <p:stCondLst>
+                              <p:cond delay="0"/>
+                            </p:stCondLst>
+                            <p:childTnLst>
+                              <p:par>
+                                <p:cTn id="29" presetID="1" presetClass="entr" presetSubtype="0" fill="hold" grpId="0" nodeType="clickEffect">
+                                  <p:stCondLst>
+                                    <p:cond delay="0"/>
+                                  </p:stCondLst>
+                                  <p:childTnLst>
+                                    <p:set>
+                                      <p:cBhvr>
+                                        <p:cTn id="30" dur="1" fill="hold">
+                                          <p:stCondLst>
+                                            <p:cond delay="0"/>
+                                          </p:stCondLst>
+                                        </p:cTn>
+                                        <p:tgtEl>
+                                          <p:spTgt spid="3">
+                                            <p:txEl>
+                                              <p:pRg st="7" end="7"/>
+                                            </p:txEl>
+                                          </p:spTgt>
+                                        </p:tgtEl>
+                                        <p:attrNameLst>
+                                          <p:attrName>style.visibility</p:attrName>
+                                        </p:attrNameLst>
+                                      </p:cBhvr>
+                                      <p:to>
+                                        <p:strVal val="visible"/>
+                                      </p:to>
+                                    </p:set>
+                                  </p:childTnLst>
+                                </p:cTn>
+                              </p:par>
+                            </p:childTnLst>
+                          </p:cTn>
+                        </p:par>
+                      </p:childTnLst>
+                    </p:cTn>
+                  </p:par>
+                  <p:par>
+                    <p:cTn id="31" fill="hold">
+                      <p:stCondLst>
+                        <p:cond delay="indefinite"/>
+                      </p:stCondLst>
+                      <p:childTnLst>
+                        <p:par>
+                          <p:cTn id="32" fill="hold">
+                            <p:stCondLst>
+                              <p:cond delay="0"/>
+                            </p:stCondLst>
+                            <p:childTnLst>
+                              <p:par>
+                                <p:cTn id="33" presetID="1" presetClass="entr" presetSubtype="0" fill="hold" grpId="0" nodeType="clickEffect">
+                                  <p:stCondLst>
+                                    <p:cond delay="0"/>
+                                  </p:stCondLst>
+                                  <p:childTnLst>
+                                    <p:set>
+                                      <p:cBhvr>
+                                        <p:cTn id="34" dur="1" fill="hold">
+                                          <p:stCondLst>
+                                            <p:cond delay="0"/>
+                                          </p:stCondLst>
+                                        </p:cTn>
+                                        <p:tgtEl>
+                                          <p:spTgt spid="3">
+                                            <p:txEl>
+                                              <p:pRg st="8" end="8"/>
+                                            </p:txEl>
+                                          </p:spTgt>
+                                        </p:tgtEl>
+                                        <p:attrNameLst>
+                                          <p:attrName>style.visibility</p:attrName>
+                                        </p:attrNameLst>
+                                      </p:cBhvr>
+                                      <p:to>
+                                        <p:strVal val="visible"/>
+                                      </p:to>
+                                    </p:set>
+                                  </p:childTnLst>
+                                </p:cTn>
+                              </p:par>
+                            </p:childTnLst>
+                          </p:cTn>
+                        </p:par>
+                      </p:childTnLst>
+                    </p:cTn>
+                  </p:par>
+                  <p:par>
+                    <p:cTn id="35" fill="hold">
+                      <p:stCondLst>
+                        <p:cond delay="indefinite"/>
+                      </p:stCondLst>
+                      <p:childTnLst>
+                        <p:par>
+                          <p:cTn id="36" fill="hold">
+                            <p:stCondLst>
+                              <p:cond delay="0"/>
+                            </p:stCondLst>
+                            <p:childTnLst>
+                              <p:par>
+                                <p:cTn id="37" presetID="1" presetClass="entr" presetSubtype="0" fill="hold" grpId="0" nodeType="clickEffect">
+                                  <p:stCondLst>
+                                    <p:cond delay="0"/>
+                                  </p:stCondLst>
+                                  <p:childTnLst>
+                                    <p:set>
+                                      <p:cBhvr>
+                                        <p:cTn id="38" dur="1" fill="hold">
+                                          <p:stCondLst>
+                                            <p:cond delay="0"/>
+                                          </p:stCondLst>
+                                        </p:cTn>
+                                        <p:tgtEl>
+                                          <p:spTgt spid="3">
+                                            <p:txEl>
+                                              <p:pRg st="9" end="9"/>
+                                            </p:txEl>
+                                          </p:spTgt>
+                                        </p:tgtEl>
+                                        <p:attrNameLst>
+                                          <p:attrName>style.visibility</p:attrName>
+                                        </p:attrNameLst>
+                                      </p:cBhvr>
+                                      <p:to>
+                                        <p:strVal val="visible"/>
+                                      </p:to>
+                                    </p:set>
+                                  </p:childTnLst>
+                                </p:cTn>
+                              </p:par>
+                            </p:childTnLst>
+                          </p:cTn>
+                        </p:par>
+                      </p:childTnLst>
+                    </p:cTn>
+                  </p:par>
+                  <p:par>
+                    <p:cTn id="39" fill="hold">
+                      <p:stCondLst>
+                        <p:cond delay="indefinite"/>
+                      </p:stCondLst>
+                      <p:childTnLst>
+                        <p:par>
+                          <p:cTn id="40" fill="hold">
+                            <p:stCondLst>
+                              <p:cond delay="0"/>
+                            </p:stCondLst>
+                            <p:childTnLst>
+                              <p:par>
+                                <p:cTn id="41" presetID="1" presetClass="entr" presetSubtype="0" fill="hold" grpId="0" nodeType="clickEffect">
+                                  <p:stCondLst>
+                                    <p:cond delay="0"/>
+                                  </p:stCondLst>
+                                  <p:childTnLst>
+                                    <p:set>
+                                      <p:cBhvr>
+                                        <p:cTn id="42" dur="1" fill="hold">
+                                          <p:stCondLst>
+                                            <p:cond delay="0"/>
+                                          </p:stCondLst>
+                                        </p:cTn>
+                                        <p:tgtEl>
+                                          <p:spTgt spid="6"/>
+                                        </p:tgtEl>
+                                        <p:attrNameLst>
+                                          <p:attrName>style.visibility</p:attrName>
+                                        </p:attrNameLst>
+                                      </p:cBhvr>
+                                      <p:to>
+                                        <p:strVal val="visible"/>
+                                      </p:to>
+                                    </p:set>
+                                  </p:childTnLst>
+                                </p:cTn>
+                              </p:par>
+                            </p:childTnLst>
+                          </p:cTn>
+                        </p:par>
+                      </p:childTnLst>
+                    </p:cTn>
+                  </p:par>
+                </p:childTnLst>
+              </p:cTn>
+              <p:prevCondLst>
+                <p:cond evt="onPrev" delay="0">
+                  <p:tgtEl>
+                    <p:sldTgt/>
+                  </p:tgtEl>
+                </p:cond>
+              </p:prevCondLst>
+              <p:nextCondLst>
+                <p:cond evt="onNext" delay="0">
+                  <p:tgtEl>
+                    <p:sldTgt/>
+                  </p:tgtEl>
+                </p:cond>
+              </p:nextCondLst>
+            </p:seq>
+          </p:childTnLst>
+        </p:cTn>
+      </p:par>
+    </p:tnLst>
+    <p:bldLst>
+      <p:bldP spid="3" grpId="0" uiExpand="1" build="p" bldLvl="2"/>
+      <p:bldP spid="5" grpId="0" animBg="1"/>
+      <p:bldP spid="6" grpId="0" animBg="1"/>
+    </p:bldLst>
+  </p:timing>
+</p:sld>
+</file>
+
+<file path=ppt/slides/slide53.xml><?xml version="1.0" encoding="utf-8"?>
+<p:sld xmlns:a="http://schemas.openxmlformats.org/drawingml/2006/main" xmlns:r="http://schemas.openxmlformats.org/officeDocument/2006/relationships" xmlns:p="http://schemas.openxmlformats.org/presentationml/2006/main">
+  <p:cSld>
+    <p:spTree>
+      <p:nvGrpSpPr>
+        <p:cNvPr id="1" name=""/>
+        <p:cNvGrpSpPr/>
+        <p:nvPr/>
+      </p:nvGrpSpPr>
+      <p:grpSpPr>
+        <a:xfrm>
+          <a:off x="0" y="0"/>
+          <a:ext cx="0" cy="0"/>
+          <a:chOff x="0" y="0"/>
+          <a:chExt cx="0" cy="0"/>
+        </a:xfrm>
+      </p:grpSpPr>
+      <p:sp>
+        <p:nvSpPr>
+          <p:cNvPr id="2" name="Title 1"/>
+          <p:cNvSpPr>
+            <a:spLocks noGrp="1"/>
+          </p:cNvSpPr>
+          <p:nvPr>
+            <p:ph type="title"/>
+          </p:nvPr>
+        </p:nvSpPr>
+        <p:spPr/>
+        <p:txBody>
+          <a:bodyPr/>
+          <a:lstStyle/>
+          <a:p>
+            <a:r>
+              <a:rPr lang="en-US" dirty="0"/>
+              <a:t>Define service</a:t>
+            </a:r>
+          </a:p>
+        </p:txBody>
+      </p:sp>
+      <p:sp>
+        <p:nvSpPr>
+          <p:cNvPr id="4" name="Slide Number Placeholder 3"/>
+          <p:cNvSpPr>
+            <a:spLocks noGrp="1"/>
+          </p:cNvSpPr>
+          <p:nvPr>
+            <p:ph type="sldNum" sz="quarter" idx="12"/>
+          </p:nvPr>
+        </p:nvSpPr>
+        <p:spPr/>
+        <p:txBody>
+          <a:bodyPr/>
+          <a:lstStyle/>
+          <a:p>
+            <a:fld id="{AEFF399F-E3B5-4890-BC79-9BC8D4DF3F2D}" type="slidenum">
+              <a:rPr lang="nl-BE" smtClean="0"/>
+              <a:t>53</a:t>
             </a:fld>
             <a:endParaRPr lang="nl-BE"/>
           </a:p>
@@ -30029,7 +31144,7 @@
 </p:sld>
 </file>
 
-<file path=ppt/slides/slide51.xml><?xml version="1.0" encoding="utf-8"?>
+<file path=ppt/slides/slide54.xml><?xml version="1.0" encoding="utf-8"?>
 <p:sld xmlns:a="http://schemas.openxmlformats.org/drawingml/2006/main" xmlns:r="http://schemas.openxmlformats.org/officeDocument/2006/relationships" xmlns:p="http://schemas.openxmlformats.org/presentationml/2006/main">
   <p:cSld>
     <p:spTree>
@@ -30085,7 +31200,7 @@
           <a:p>
             <a:fld id="{AEFF399F-E3B5-4890-BC79-9BC8D4DF3F2D}" type="slidenum">
               <a:rPr lang="nl-BE" smtClean="0"/>
-              <a:t>51</a:t>
+              <a:t>54</a:t>
             </a:fld>
             <a:endParaRPr lang="nl-BE"/>
           </a:p>
@@ -30973,7 +32088,7 @@
 </p:sld>
 </file>
 
-<file path=ppt/slides/slide52.xml><?xml version="1.0" encoding="utf-8"?>
+<file path=ppt/slides/slide55.xml><?xml version="1.0" encoding="utf-8"?>
 <p:sld xmlns:a="http://schemas.openxmlformats.org/drawingml/2006/main" xmlns:r="http://schemas.openxmlformats.org/officeDocument/2006/relationships" xmlns:p="http://schemas.openxmlformats.org/presentationml/2006/main">
   <p:cSld>
     <p:spTree>
@@ -31081,7 +32196,7 @@
           <a:p>
             <a:fld id="{AEFF399F-E3B5-4890-BC79-9BC8D4DF3F2D}" type="slidenum">
               <a:rPr lang="nl-BE" smtClean="0"/>
-              <a:t>52</a:t>
+              <a:t>55</a:t>
             </a:fld>
             <a:endParaRPr lang="nl-BE" dirty="0"/>
           </a:p>
@@ -31949,7 +33064,7 @@
 </p:sld>
 </file>
 
-<file path=ppt/slides/slide53.xml><?xml version="1.0" encoding="utf-8"?>
+<file path=ppt/slides/slide56.xml><?xml version="1.0" encoding="utf-8"?>
 <p:sld xmlns:a="http://schemas.openxmlformats.org/drawingml/2006/main" xmlns:r="http://schemas.openxmlformats.org/officeDocument/2006/relationships" xmlns:p="http://schemas.openxmlformats.org/presentationml/2006/main">
   <p:cSld>
     <p:spTree>
@@ -32025,7 +33140,7 @@
           <a:p>
             <a:fld id="{AEFF399F-E3B5-4890-BC79-9BC8D4DF3F2D}" type="slidenum">
               <a:rPr lang="nl-BE" smtClean="0"/>
-              <a:t>53</a:t>
+              <a:t>56</a:t>
             </a:fld>
             <a:endParaRPr lang="nl-BE"/>
           </a:p>
@@ -32044,7 +33159,7 @@
 </p:sld>
 </file>
 
-<file path=ppt/slides/slide54.xml><?xml version="1.0" encoding="utf-8"?>
+<file path=ppt/slides/slide57.xml><?xml version="1.0" encoding="utf-8"?>
 <p:sld xmlns:a="http://schemas.openxmlformats.org/drawingml/2006/main" xmlns:r="http://schemas.openxmlformats.org/officeDocument/2006/relationships" xmlns:p="http://schemas.openxmlformats.org/presentationml/2006/main">
   <p:cSld>
     <p:spTree>
@@ -32258,7 +33373,7 @@
           <a:p>
             <a:fld id="{AEFF399F-E3B5-4890-BC79-9BC8D4DF3F2D}" type="slidenum">
               <a:rPr lang="nl-BE" smtClean="0"/>
-              <a:t>54</a:t>
+              <a:t>57</a:t>
             </a:fld>
             <a:endParaRPr lang="nl-BE"/>
           </a:p>
@@ -32788,7 +33903,7 @@
 </p:sld>
 </file>
 
-<file path=ppt/slides/slide55.xml><?xml version="1.0" encoding="utf-8"?>
+<file path=ppt/slides/slide58.xml><?xml version="1.0" encoding="utf-8"?>
 <p:sld xmlns:a="http://schemas.openxmlformats.org/drawingml/2006/main" xmlns:r="http://schemas.openxmlformats.org/officeDocument/2006/relationships" xmlns:p="http://schemas.openxmlformats.org/presentationml/2006/main">
   <p:cSld>
     <p:spTree>
@@ -32938,7 +34053,7 @@
           <a:p>
             <a:fld id="{AEFF399F-E3B5-4890-BC79-9BC8D4DF3F2D}" type="slidenum">
               <a:rPr lang="nl-BE" smtClean="0"/>
-              <a:t>55</a:t>
+              <a:t>58</a:t>
             </a:fld>
             <a:endParaRPr lang="nl-BE"/>
           </a:p>
@@ -33189,7 +34304,7 @@
 </p:sld>
 </file>
 
-<file path=ppt/slides/slide56.xml><?xml version="1.0" encoding="utf-8"?>
+<file path=ppt/slides/slide59.xml><?xml version="1.0" encoding="utf-8"?>
 <p:sld xmlns:a="http://schemas.openxmlformats.org/drawingml/2006/main" xmlns:r="http://schemas.openxmlformats.org/officeDocument/2006/relationships" xmlns:p="http://schemas.openxmlformats.org/presentationml/2006/main">
   <p:cSld>
     <p:spTree>
@@ -33400,7 +34515,7 @@
           <a:p>
             <a:fld id="{AEFF399F-E3B5-4890-BC79-9BC8D4DF3F2D}" type="slidenum">
               <a:rPr lang="nl-BE" smtClean="0"/>
-              <a:t>56</a:t>
+              <a:t>59</a:t>
             </a:fld>
             <a:endParaRPr lang="nl-BE"/>
           </a:p>
@@ -33731,7 +34846,7 @@
 </p:sld>
 </file>
 
-<file path=ppt/slides/slide57.xml><?xml version="1.0" encoding="utf-8"?>
+<file path=ppt/slides/slide6.xml><?xml version="1.0" encoding="utf-8"?>
 <p:sld xmlns:a="http://schemas.openxmlformats.org/drawingml/2006/main" xmlns:r="http://schemas.openxmlformats.org/officeDocument/2006/relationships" xmlns:p="http://schemas.openxmlformats.org/presentationml/2006/main">
   <p:cSld>
     <p:spTree>
@@ -33765,7 +34880,7 @@
           <a:p>
             <a:r>
               <a:rPr lang="en-US" dirty="0"/>
-              <a:t>Conclusions</a:t>
+              <a:t>Introduction</a:t>
             </a:r>
             <a:endParaRPr lang="nl-BE" dirty="0"/>
           </a:p>
@@ -33807,7 +34922,7 @@
           <a:p>
             <a:fld id="{AEFF399F-E3B5-4890-BC79-9BC8D4DF3F2D}" type="slidenum">
               <a:rPr lang="nl-BE" smtClean="0"/>
-              <a:t>57</a:t>
+              <a:t>6</a:t>
             </a:fld>
             <a:endParaRPr lang="nl-BE"/>
           </a:p>
@@ -33816,7 +34931,7 @@
     </p:spTree>
     <p:extLst>
       <p:ext uri="{BB962C8B-B14F-4D97-AF65-F5344CB8AC3E}">
-        <p14:creationId xmlns:p14="http://schemas.microsoft.com/office/powerpoint/2010/main" val="2192721825"/>
+        <p14:creationId xmlns:p14="http://schemas.microsoft.com/office/powerpoint/2010/main" val="2215557954"/>
       </p:ext>
     </p:extLst>
   </p:cSld>
@@ -33826,7 +34941,7 @@
 </p:sld>
 </file>
 
-<file path=ppt/slides/slide58.xml><?xml version="1.0" encoding="utf-8"?>
+<file path=ppt/slides/slide60.xml><?xml version="1.0" encoding="utf-8"?>
 <p:sld xmlns:a="http://schemas.openxmlformats.org/drawingml/2006/main" xmlns:r="http://schemas.openxmlformats.org/officeDocument/2006/relationships" xmlns:p="http://schemas.openxmlformats.org/presentationml/2006/main">
   <p:cSld>
     <p:spTree>
@@ -33868,12 +34983,12 @@
       </p:sp>
       <p:sp>
         <p:nvSpPr>
-          <p:cNvPr id="3" name="Content Placeholder 2"/>
+          <p:cNvPr id="3" name="Text Placeholder 2"/>
           <p:cNvSpPr>
             <a:spLocks noGrp="1"/>
           </p:cNvSpPr>
           <p:nvPr>
-            <p:ph idx="1"/>
+            <p:ph type="body" idx="1"/>
           </p:nvPr>
         </p:nvSpPr>
         <p:spPr/>
@@ -33881,85 +34996,7 @@
           <a:bodyPr/>
           <a:lstStyle/>
           <a:p>
-            <a:r>
-              <a:rPr lang="en-US" dirty="0" err="1"/>
-              <a:t>Apptainer</a:t>
-            </a:r>
-            <a:r>
-              <a:rPr lang="en-US" dirty="0"/>
-              <a:t> advantages</a:t>
-            </a:r>
-          </a:p>
-          <a:p>
-            <a:pPr lvl="1"/>
-            <a:r>
-              <a:rPr lang="en-US" dirty="0"/>
-              <a:t>Portability</a:t>
-            </a:r>
-          </a:p>
-          <a:p>
-            <a:pPr lvl="1"/>
-            <a:r>
-              <a:rPr lang="en-US" dirty="0"/>
-              <a:t>Reproducibility: recipes under version control</a:t>
-            </a:r>
-          </a:p>
-          <a:p>
-            <a:pPr lvl="1"/>
-            <a:r>
-              <a:rPr lang="en-US" dirty="0"/>
-              <a:t>Easily create images</a:t>
-            </a:r>
-          </a:p>
-          <a:p>
-            <a:pPr lvl="1"/>
-            <a:r>
-              <a:rPr lang="en-US" dirty="0"/>
-              <a:t>Integrate images into existing workflows</a:t>
-            </a:r>
-          </a:p>
-          <a:p>
-            <a:pPr lvl="1"/>
-            <a:r>
-              <a:rPr lang="en-US" dirty="0"/>
-              <a:t>No privilege escalation</a:t>
-            </a:r>
-          </a:p>
-          <a:p>
-            <a:pPr lvl="2"/>
-            <a:r>
-              <a:rPr lang="en-US" dirty="0"/>
-              <a:t>Create as root</a:t>
-            </a:r>
-          </a:p>
-          <a:p>
-            <a:pPr lvl="2"/>
-            <a:r>
-              <a:rPr lang="en-US" dirty="0"/>
-              <a:t>Run as user, no </a:t>
-            </a:r>
-            <a:r>
-              <a:rPr lang="en-US" dirty="0" err="1"/>
-              <a:t>sudo</a:t>
-            </a:r>
-            <a:r>
-              <a:rPr lang="en-US" dirty="0"/>
-              <a:t> possible</a:t>
-            </a:r>
-          </a:p>
-          <a:p>
-            <a:pPr lvl="1"/>
-            <a:r>
-              <a:rPr lang="en-US" dirty="0"/>
-              <a:t>Quite reasonable performance/overhead</a:t>
-            </a:r>
-          </a:p>
-          <a:p>
-            <a:r>
-              <a:rPr lang="en-US" dirty="0"/>
-              <a:t>Not an excuse to run crappy/suboptimal software!</a:t>
-            </a:r>
-            <a:endParaRPr lang="nl-BE" dirty="0"/>
+            <a:endParaRPr lang="nl-BE"/>
           </a:p>
         </p:txBody>
       </p:sp>
@@ -33980,7 +35017,180 @@
           <a:p>
             <a:fld id="{AEFF399F-E3B5-4890-BC79-9BC8D4DF3F2D}" type="slidenum">
               <a:rPr lang="nl-BE" smtClean="0"/>
-              <a:t>58</a:t>
+              <a:t>60</a:t>
+            </a:fld>
+            <a:endParaRPr lang="nl-BE"/>
+          </a:p>
+        </p:txBody>
+      </p:sp>
+    </p:spTree>
+    <p:extLst>
+      <p:ext uri="{BB962C8B-B14F-4D97-AF65-F5344CB8AC3E}">
+        <p14:creationId xmlns:p14="http://schemas.microsoft.com/office/powerpoint/2010/main" val="2192721825"/>
+      </p:ext>
+    </p:extLst>
+  </p:cSld>
+  <p:clrMapOvr>
+    <a:masterClrMapping/>
+  </p:clrMapOvr>
+</p:sld>
+</file>
+
+<file path=ppt/slides/slide61.xml><?xml version="1.0" encoding="utf-8"?>
+<p:sld xmlns:a="http://schemas.openxmlformats.org/drawingml/2006/main" xmlns:r="http://schemas.openxmlformats.org/officeDocument/2006/relationships" xmlns:p="http://schemas.openxmlformats.org/presentationml/2006/main">
+  <p:cSld>
+    <p:spTree>
+      <p:nvGrpSpPr>
+        <p:cNvPr id="1" name=""/>
+        <p:cNvGrpSpPr/>
+        <p:nvPr/>
+      </p:nvGrpSpPr>
+      <p:grpSpPr>
+        <a:xfrm>
+          <a:off x="0" y="0"/>
+          <a:ext cx="0" cy="0"/>
+          <a:chOff x="0" y="0"/>
+          <a:chExt cx="0" cy="0"/>
+        </a:xfrm>
+      </p:grpSpPr>
+      <p:sp>
+        <p:nvSpPr>
+          <p:cNvPr id="2" name="Title 1"/>
+          <p:cNvSpPr>
+            <a:spLocks noGrp="1"/>
+          </p:cNvSpPr>
+          <p:nvPr>
+            <p:ph type="title"/>
+          </p:nvPr>
+        </p:nvSpPr>
+        <p:spPr/>
+        <p:txBody>
+          <a:bodyPr/>
+          <a:lstStyle/>
+          <a:p>
+            <a:r>
+              <a:rPr lang="en-US" dirty="0"/>
+              <a:t>Conclusions</a:t>
+            </a:r>
+            <a:endParaRPr lang="nl-BE" dirty="0"/>
+          </a:p>
+        </p:txBody>
+      </p:sp>
+      <p:sp>
+        <p:nvSpPr>
+          <p:cNvPr id="3" name="Content Placeholder 2"/>
+          <p:cNvSpPr>
+            <a:spLocks noGrp="1"/>
+          </p:cNvSpPr>
+          <p:nvPr>
+            <p:ph idx="1"/>
+          </p:nvPr>
+        </p:nvSpPr>
+        <p:spPr/>
+        <p:txBody>
+          <a:bodyPr/>
+          <a:lstStyle/>
+          <a:p>
+            <a:r>
+              <a:rPr lang="en-US" dirty="0" err="1"/>
+              <a:t>Apptainer</a:t>
+            </a:r>
+            <a:r>
+              <a:rPr lang="en-US" dirty="0"/>
+              <a:t> advantages</a:t>
+            </a:r>
+          </a:p>
+          <a:p>
+            <a:pPr lvl="1"/>
+            <a:r>
+              <a:rPr lang="en-US" dirty="0"/>
+              <a:t>Portability</a:t>
+            </a:r>
+          </a:p>
+          <a:p>
+            <a:pPr lvl="1"/>
+            <a:r>
+              <a:rPr lang="en-US" dirty="0"/>
+              <a:t>Reproducibility: recipes under version control</a:t>
+            </a:r>
+          </a:p>
+          <a:p>
+            <a:pPr lvl="1"/>
+            <a:r>
+              <a:rPr lang="en-US" dirty="0"/>
+              <a:t>Easily create images</a:t>
+            </a:r>
+          </a:p>
+          <a:p>
+            <a:pPr lvl="1"/>
+            <a:r>
+              <a:rPr lang="en-US" dirty="0"/>
+              <a:t>Integrate images into existing workflows</a:t>
+            </a:r>
+          </a:p>
+          <a:p>
+            <a:pPr lvl="1"/>
+            <a:r>
+              <a:rPr lang="en-US" dirty="0"/>
+              <a:t>No privilege escalation</a:t>
+            </a:r>
+          </a:p>
+          <a:p>
+            <a:pPr lvl="2"/>
+            <a:r>
+              <a:rPr lang="en-US" dirty="0"/>
+              <a:t>Create as root</a:t>
+            </a:r>
+          </a:p>
+          <a:p>
+            <a:pPr lvl="2"/>
+            <a:r>
+              <a:rPr lang="en-US" dirty="0"/>
+              <a:t>Run as user, no </a:t>
+            </a:r>
+            <a:r>
+              <a:rPr lang="en-US" dirty="0" err="1"/>
+              <a:t>sudo</a:t>
+            </a:r>
+            <a:r>
+              <a:rPr lang="en-US" dirty="0"/>
+              <a:t> possible</a:t>
+            </a:r>
+          </a:p>
+          <a:p>
+            <a:pPr lvl="1"/>
+            <a:r>
+              <a:rPr lang="en-US" dirty="0"/>
+              <a:t>Quite reasonable performance/overhead</a:t>
+            </a:r>
+          </a:p>
+          <a:p>
+            <a:r>
+              <a:rPr lang="en-US" dirty="0"/>
+              <a:t>Not an excuse to run crappy/suboptimal software!</a:t>
+            </a:r>
+            <a:endParaRPr lang="nl-BE" dirty="0"/>
+          </a:p>
+        </p:txBody>
+      </p:sp>
+      <p:sp>
+        <p:nvSpPr>
+          <p:cNvPr id="4" name="Slide Number Placeholder 3"/>
+          <p:cNvSpPr>
+            <a:spLocks noGrp="1"/>
+          </p:cNvSpPr>
+          <p:nvPr>
+            <p:ph type="sldNum" sz="quarter" idx="12"/>
+          </p:nvPr>
+        </p:nvSpPr>
+        <p:spPr/>
+        <p:txBody>
+          <a:bodyPr/>
+          <a:lstStyle/>
+          <a:p>
+            <a:fld id="{AEFF399F-E3B5-4890-BC79-9BC8D4DF3F2D}" type="slidenum">
+              <a:rPr lang="nl-BE" smtClean="0"/>
+              <a:t>61</a:t>
             </a:fld>
             <a:endParaRPr lang="nl-BE"/>
           </a:p>
@@ -34489,7 +35699,7 @@
 </p:sld>
 </file>
 
-<file path=ppt/slides/slide59.xml><?xml version="1.0" encoding="utf-8"?>
+<file path=ppt/slides/slide62.xml><?xml version="1.0" encoding="utf-8"?>
 <p:sld xmlns:a="http://schemas.openxmlformats.org/drawingml/2006/main" xmlns:r="http://schemas.openxmlformats.org/officeDocument/2006/relationships" xmlns:p="http://schemas.openxmlformats.org/presentationml/2006/main">
   <p:cSld>
     <p:spTree>
@@ -34662,7 +35872,7 @@
           <a:p>
             <a:fld id="{AEFF399F-E3B5-4890-BC79-9BC8D4DF3F2D}" type="slidenum">
               <a:rPr lang="nl-BE" smtClean="0"/>
-              <a:t>59</a:t>
+              <a:t>62</a:t>
             </a:fld>
             <a:endParaRPr lang="nl-BE"/>
           </a:p>
@@ -34681,102 +35891,7 @@
 </p:sld>
 </file>
 
-<file path=ppt/slides/slide6.xml><?xml version="1.0" encoding="utf-8"?>
-<p:sld xmlns:a="http://schemas.openxmlformats.org/drawingml/2006/main" xmlns:r="http://schemas.openxmlformats.org/officeDocument/2006/relationships" xmlns:p="http://schemas.openxmlformats.org/presentationml/2006/main">
-  <p:cSld>
-    <p:spTree>
-      <p:nvGrpSpPr>
-        <p:cNvPr id="1" name=""/>
-        <p:cNvGrpSpPr/>
-        <p:nvPr/>
-      </p:nvGrpSpPr>
-      <p:grpSpPr>
-        <a:xfrm>
-          <a:off x="0" y="0"/>
-          <a:ext cx="0" cy="0"/>
-          <a:chOff x="0" y="0"/>
-          <a:chExt cx="0" cy="0"/>
-        </a:xfrm>
-      </p:grpSpPr>
-      <p:sp>
-        <p:nvSpPr>
-          <p:cNvPr id="2" name="Title 1"/>
-          <p:cNvSpPr>
-            <a:spLocks noGrp="1"/>
-          </p:cNvSpPr>
-          <p:nvPr>
-            <p:ph type="title"/>
-          </p:nvPr>
-        </p:nvSpPr>
-        <p:spPr/>
-        <p:txBody>
-          <a:bodyPr/>
-          <a:lstStyle/>
-          <a:p>
-            <a:r>
-              <a:rPr lang="en-US" dirty="0"/>
-              <a:t>Introduction</a:t>
-            </a:r>
-            <a:endParaRPr lang="nl-BE" dirty="0"/>
-          </a:p>
-        </p:txBody>
-      </p:sp>
-      <p:sp>
-        <p:nvSpPr>
-          <p:cNvPr id="3" name="Text Placeholder 2"/>
-          <p:cNvSpPr>
-            <a:spLocks noGrp="1"/>
-          </p:cNvSpPr>
-          <p:nvPr>
-            <p:ph type="body" idx="1"/>
-          </p:nvPr>
-        </p:nvSpPr>
-        <p:spPr/>
-        <p:txBody>
-          <a:bodyPr/>
-          <a:lstStyle/>
-          <a:p>
-            <a:endParaRPr lang="nl-BE"/>
-          </a:p>
-        </p:txBody>
-      </p:sp>
-      <p:sp>
-        <p:nvSpPr>
-          <p:cNvPr id="4" name="Slide Number Placeholder 3"/>
-          <p:cNvSpPr>
-            <a:spLocks noGrp="1"/>
-          </p:cNvSpPr>
-          <p:nvPr>
-            <p:ph type="sldNum" sz="quarter" idx="12"/>
-          </p:nvPr>
-        </p:nvSpPr>
-        <p:spPr/>
-        <p:txBody>
-          <a:bodyPr/>
-          <a:lstStyle/>
-          <a:p>
-            <a:fld id="{AEFF399F-E3B5-4890-BC79-9BC8D4DF3F2D}" type="slidenum">
-              <a:rPr lang="nl-BE" smtClean="0"/>
-              <a:t>6</a:t>
-            </a:fld>
-            <a:endParaRPr lang="nl-BE"/>
-          </a:p>
-        </p:txBody>
-      </p:sp>
-    </p:spTree>
-    <p:extLst>
-      <p:ext uri="{BB962C8B-B14F-4D97-AF65-F5344CB8AC3E}">
-        <p14:creationId xmlns:p14="http://schemas.microsoft.com/office/powerpoint/2010/main" val="2215557954"/>
-      </p:ext>
-    </p:extLst>
-  </p:cSld>
-  <p:clrMapOvr>
-    <a:masterClrMapping/>
-  </p:clrMapOvr>
-</p:sld>
-</file>
-
-<file path=ppt/slides/slide60.xml><?xml version="1.0" encoding="utf-8"?>
+<file path=ppt/slides/slide63.xml><?xml version="1.0" encoding="utf-8"?>
 <p:sld xmlns:a="http://schemas.openxmlformats.org/drawingml/2006/main" xmlns:r="http://schemas.openxmlformats.org/officeDocument/2006/relationships" xmlns:p="http://schemas.openxmlformats.org/presentationml/2006/main">
   <p:cSld>
     <p:spTree>
@@ -34870,7 +35985,7 @@
           <a:p>
             <a:fld id="{AEFF399F-E3B5-4890-BC79-9BC8D4DF3F2D}" type="slidenum">
               <a:rPr lang="nl-BE" smtClean="0"/>
-              <a:t>60</a:t>
+              <a:t>63</a:t>
             </a:fld>
             <a:endParaRPr lang="nl-BE"/>
           </a:p>
@@ -34889,7 +36004,7 @@
 </p:sld>
 </file>
 
-<file path=ppt/slides/slide61.xml><?xml version="1.0" encoding="utf-8"?>
+<file path=ppt/slides/slide64.xml><?xml version="1.0" encoding="utf-8"?>
 <p:sld xmlns:a="http://schemas.openxmlformats.org/drawingml/2006/main" xmlns:r="http://schemas.openxmlformats.org/officeDocument/2006/relationships" xmlns:p="http://schemas.openxmlformats.org/presentationml/2006/main">
   <p:cSld>
     <p:spTree>
@@ -35019,7 +36134,7 @@
           <a:p>
             <a:fld id="{AEFF399F-E3B5-4890-BC79-9BC8D4DF3F2D}" type="slidenum">
               <a:rPr lang="nl-BE" smtClean="0"/>
-              <a:t>61</a:t>
+              <a:t>64</a:t>
             </a:fld>
             <a:endParaRPr lang="nl-BE"/>
           </a:p>
@@ -35038,7 +36153,7 @@
 </p:sld>
 </file>
 
-<file path=ppt/slides/slide62.xml><?xml version="1.0" encoding="utf-8"?>
+<file path=ppt/slides/slide65.xml><?xml version="1.0" encoding="utf-8"?>
 <p:sld xmlns:a="http://schemas.openxmlformats.org/drawingml/2006/main" xmlns:r="http://schemas.openxmlformats.org/officeDocument/2006/relationships" xmlns:p="http://schemas.openxmlformats.org/presentationml/2006/main">
   <p:cSld>
     <p:spTree>
@@ -35390,7 +36505,7 @@
           <a:p>
             <a:fld id="{AEFF399F-E3B5-4890-BC79-9BC8D4DF3F2D}" type="slidenum">
               <a:rPr lang="nl-BE" smtClean="0"/>
-              <a:t>62</a:t>
+              <a:t>65</a:t>
             </a:fld>
             <a:endParaRPr lang="nl-BE"/>
           </a:p>

</xml_diff>

<commit_message>
Add slide on reproducibility best practices
</commit_message>
<xml_diff>
--- a/containers_for_hpc.pptx
+++ b/containers_for_hpc.pptx
@@ -5,7 +5,7 @@
     <p:sldMasterId id="2147483660" r:id="rId1"/>
   </p:sldMasterIdLst>
   <p:notesMasterIdLst>
-    <p:notesMasterId r:id="rId67"/>
+    <p:notesMasterId r:id="rId68"/>
   </p:notesMasterIdLst>
   <p:sldIdLst>
     <p:sldId id="256" r:id="rId2"/>
@@ -67,12 +67,13 @@
     <p:sldId id="286" r:id="rId58"/>
     <p:sldId id="287" r:id="rId59"/>
     <p:sldId id="270" r:id="rId60"/>
-    <p:sldId id="272" r:id="rId61"/>
-    <p:sldId id="276" r:id="rId62"/>
-    <p:sldId id="277" r:id="rId63"/>
-    <p:sldId id="307" r:id="rId64"/>
-    <p:sldId id="308" r:id="rId65"/>
-    <p:sldId id="291" r:id="rId66"/>
+    <p:sldId id="366" r:id="rId61"/>
+    <p:sldId id="272" r:id="rId62"/>
+    <p:sldId id="276" r:id="rId63"/>
+    <p:sldId id="277" r:id="rId64"/>
+    <p:sldId id="307" r:id="rId65"/>
+    <p:sldId id="308" r:id="rId66"/>
+    <p:sldId id="291" r:id="rId67"/>
   </p:sldIdLst>
   <p:sldSz cx="9144000" cy="6858000" type="screen4x3"/>
   <p:notesSz cx="6858000" cy="9144000"/>
@@ -271,6 +272,7 @@
             <p14:sldId id="286"/>
             <p14:sldId id="287"/>
             <p14:sldId id="270"/>
+            <p14:sldId id="366"/>
           </p14:sldIdLst>
         </p14:section>
         <p14:section name="Conclusions" id="{BD187F37-5316-4956-98DF-2B94953326CB}">
@@ -34414,14 +34416,7 @@
                 <a:latin typeface="Courier New" panose="02070309020205020404" pitchFamily="49" charset="0"/>
                 <a:cs typeface="Courier New" panose="02070309020205020404" pitchFamily="49" charset="0"/>
               </a:rPr>
-              <a:t>/</a:t>
-            </a:r>
-            <a:r>
-              <a:rPr lang="en-US" dirty="0" err="1">
-                <a:latin typeface="Courier New" panose="02070309020205020404" pitchFamily="49" charset="0"/>
-                <a:cs typeface="Courier New" panose="02070309020205020404" pitchFamily="49" charset="0"/>
-              </a:rPr>
-              <a:t>passwd</a:t>
+              <a:t>/passwd</a:t>
             </a:r>
             <a:r>
               <a:rPr lang="en-US" dirty="0"/>
@@ -34473,28 +34468,6 @@
               </a:rPr>
               <a:t>/shadow</a:t>
             </a:r>
-          </a:p>
-          <a:p>
-            <a:r>
-              <a:rPr lang="en-US" dirty="0"/>
-              <a:t>Do installation via recipe file, </a:t>
-            </a:r>
-            <a:r>
-              <a:rPr lang="en-US" i="1" dirty="0"/>
-              <a:t>not</a:t>
-            </a:r>
-            <a:r>
-              <a:rPr lang="en-US" dirty="0"/>
-              <a:t> by hand</a:t>
-            </a:r>
-          </a:p>
-          <a:p>
-            <a:pPr lvl="1"/>
-            <a:r>
-              <a:rPr lang="en-US" dirty="0"/>
-              <a:t>Better reproducibility</a:t>
-            </a:r>
-            <a:endParaRPr lang="nl-BE" dirty="0"/>
           </a:p>
         </p:txBody>
       </p:sp>
@@ -34738,86 +34711,6 @@
                       </p:childTnLst>
                     </p:cTn>
                   </p:par>
-                  <p:par>
-                    <p:cTn id="19" fill="hold">
-                      <p:stCondLst>
-                        <p:cond delay="indefinite"/>
-                      </p:stCondLst>
-                      <p:childTnLst>
-                        <p:par>
-                          <p:cTn id="20" fill="hold">
-                            <p:stCondLst>
-                              <p:cond delay="0"/>
-                            </p:stCondLst>
-                            <p:childTnLst>
-                              <p:par>
-                                <p:cTn id="21" presetID="1" presetClass="entr" presetSubtype="0" fill="hold" grpId="0" nodeType="clickEffect">
-                                  <p:stCondLst>
-                                    <p:cond delay="0"/>
-                                  </p:stCondLst>
-                                  <p:childTnLst>
-                                    <p:set>
-                                      <p:cBhvr>
-                                        <p:cTn id="22" dur="1" fill="hold">
-                                          <p:stCondLst>
-                                            <p:cond delay="0"/>
-                                          </p:stCondLst>
-                                        </p:cTn>
-                                        <p:tgtEl>
-                                          <p:spTgt spid="3">
-                                            <p:txEl>
-                                              <p:pRg st="4" end="4"/>
-                                            </p:txEl>
-                                          </p:spTgt>
-                                        </p:tgtEl>
-                                        <p:attrNameLst>
-                                          <p:attrName>style.visibility</p:attrName>
-                                        </p:attrNameLst>
-                                      </p:cBhvr>
-                                      <p:to>
-                                        <p:strVal val="visible"/>
-                                      </p:to>
-                                    </p:set>
-                                  </p:childTnLst>
-                                </p:cTn>
-                              </p:par>
-                              <p:par>
-                                <p:cTn id="23" presetID="1" presetClass="entr" presetSubtype="0" fill="hold" grpId="0" nodeType="withEffect">
-                                  <p:stCondLst>
-                                    <p:cond delay="0"/>
-                                  </p:stCondLst>
-                                  <p:childTnLst>
-                                    <p:set>
-                                      <p:cBhvr>
-                                        <p:cTn id="24" dur="1" fill="hold">
-                                          <p:stCondLst>
-                                            <p:cond delay="0"/>
-                                          </p:stCondLst>
-                                        </p:cTn>
-                                        <p:tgtEl>
-                                          <p:spTgt spid="3">
-                                            <p:txEl>
-                                              <p:pRg st="5" end="5"/>
-                                            </p:txEl>
-                                          </p:spTgt>
-                                        </p:tgtEl>
-                                        <p:attrNameLst>
-                                          <p:attrName>style.visibility</p:attrName>
-                                        </p:attrNameLst>
-                                      </p:cBhvr>
-                                      <p:to>
-                                        <p:strVal val="visible"/>
-                                      </p:to>
-                                    </p:set>
-                                  </p:childTnLst>
-                                </p:cTn>
-                              </p:par>
-                            </p:childTnLst>
-                          </p:cTn>
-                        </p:par>
-                      </p:childTnLst>
-                    </p:cTn>
-                  </p:par>
                 </p:childTnLst>
               </p:cTn>
               <p:prevCondLst>
@@ -34960,7 +34853,13 @@
       </p:grpSpPr>
       <p:sp>
         <p:nvSpPr>
-          <p:cNvPr id="2" name="Title 1"/>
+          <p:cNvPr id="2" name="Title 1">
+            <a:extLst>
+              <a:ext uri="{FF2B5EF4-FFF2-40B4-BE49-F238E27FC236}">
+                <a16:creationId xmlns:a16="http://schemas.microsoft.com/office/drawing/2014/main" id="{93B96A11-743F-3418-55CD-B23D1530E770}"/>
+              </a:ext>
+            </a:extLst>
+          </p:cNvPr>
           <p:cNvSpPr>
             <a:spLocks noGrp="1"/>
           </p:cNvSpPr>
@@ -34975,20 +34874,26 @@
           <a:p>
             <a:r>
               <a:rPr lang="en-US" dirty="0"/>
-              <a:t>Conclusions</a:t>
-            </a:r>
-            <a:endParaRPr lang="nl-BE" dirty="0"/>
+              <a:t>Reproducibility best practices</a:t>
+            </a:r>
+            <a:endParaRPr lang="LID4096" dirty="0"/>
           </a:p>
         </p:txBody>
       </p:sp>
       <p:sp>
         <p:nvSpPr>
-          <p:cNvPr id="3" name="Text Placeholder 2"/>
+          <p:cNvPr id="3" name="Content Placeholder 2">
+            <a:extLst>
+              <a:ext uri="{FF2B5EF4-FFF2-40B4-BE49-F238E27FC236}">
+                <a16:creationId xmlns:a16="http://schemas.microsoft.com/office/drawing/2014/main" id="{9019AE57-B6A1-417C-8590-DD0F521EA8AA}"/>
+              </a:ext>
+            </a:extLst>
+          </p:cNvPr>
           <p:cNvSpPr>
             <a:spLocks noGrp="1"/>
           </p:cNvSpPr>
           <p:nvPr>
-            <p:ph type="body" idx="1"/>
+            <p:ph idx="1"/>
           </p:nvPr>
         </p:nvSpPr>
         <p:spPr/>
@@ -34996,13 +34901,75 @@
           <a:bodyPr/>
           <a:lstStyle/>
           <a:p>
-            <a:endParaRPr lang="nl-BE"/>
+            <a:r>
+              <a:rPr lang="en-US" dirty="0"/>
+              <a:t>Do installation via recipe file, </a:t>
+            </a:r>
+            <a:r>
+              <a:rPr lang="en-US" i="1" dirty="0"/>
+              <a:t>not</a:t>
+            </a:r>
+            <a:r>
+              <a:rPr lang="en-US" dirty="0"/>
+              <a:t> by hand</a:t>
+            </a:r>
+          </a:p>
+          <a:p>
+            <a:r>
+              <a:rPr lang="en-US" dirty="0">
+                <a:latin typeface="Courier New" panose="02070309020205020404" pitchFamily="49" charset="0"/>
+                <a:cs typeface="Courier New" panose="02070309020205020404" pitchFamily="49" charset="0"/>
+              </a:rPr>
+              <a:t>latest</a:t>
+            </a:r>
+            <a:r>
+              <a:rPr lang="en-US" dirty="0"/>
+              <a:t> docker tag</a:t>
+            </a:r>
+          </a:p>
+          <a:p>
+            <a:pPr lvl="1"/>
+            <a:r>
+              <a:rPr lang="en-US" dirty="0"/>
+              <a:t>May/will be newer version when rebuild</a:t>
+            </a:r>
+          </a:p>
+          <a:p>
+            <a:pPr lvl="1"/>
+            <a:endParaRPr lang="en-US" dirty="0"/>
+          </a:p>
+          <a:p>
+            <a:pPr lvl="1"/>
+            <a:endParaRPr lang="en-US" dirty="0"/>
+          </a:p>
+          <a:p>
+            <a:pPr lvl="1"/>
+            <a:endParaRPr lang="en-US" dirty="0"/>
+          </a:p>
+          <a:p>
+            <a:pPr lvl="1"/>
+            <a:endParaRPr lang="en-US" dirty="0"/>
+          </a:p>
+          <a:p>
+            <a:endParaRPr lang="en-US" dirty="0"/>
+          </a:p>
+          <a:p>
+            <a:r>
+              <a:rPr lang="en-US" dirty="0"/>
+              <a:t>Consider version control of images using DVC</a:t>
+            </a:r>
           </a:p>
         </p:txBody>
       </p:sp>
       <p:sp>
         <p:nvSpPr>
-          <p:cNvPr id="4" name="Slide Number Placeholder 3"/>
+          <p:cNvPr id="4" name="Slide Number Placeholder 3">
+            <a:extLst>
+              <a:ext uri="{FF2B5EF4-FFF2-40B4-BE49-F238E27FC236}">
+                <a16:creationId xmlns:a16="http://schemas.microsoft.com/office/drawing/2014/main" id="{5364A0BC-4A57-EE44-9251-EE3AA085236B}"/>
+              </a:ext>
+            </a:extLst>
+          </p:cNvPr>
           <p:cNvSpPr>
             <a:spLocks noGrp="1"/>
           </p:cNvSpPr>
@@ -35023,16 +34990,404 @@
           </a:p>
         </p:txBody>
       </p:sp>
+      <p:grpSp>
+        <p:nvGrpSpPr>
+          <p:cNvPr id="7" name="Group 6">
+            <a:extLst>
+              <a:ext uri="{FF2B5EF4-FFF2-40B4-BE49-F238E27FC236}">
+                <a16:creationId xmlns:a16="http://schemas.microsoft.com/office/drawing/2014/main" id="{B8F09970-B72E-0A7E-1BFB-AB48A9E79249}"/>
+              </a:ext>
+            </a:extLst>
+          </p:cNvPr>
+          <p:cNvGrpSpPr/>
+          <p:nvPr/>
+        </p:nvGrpSpPr>
+        <p:grpSpPr>
+          <a:xfrm>
+            <a:off x="2338088" y="3280231"/>
+            <a:ext cx="4119862" cy="1691998"/>
+            <a:chOff x="2473170" y="3342577"/>
+            <a:chExt cx="4119862" cy="1691998"/>
+          </a:xfrm>
+        </p:grpSpPr>
+        <p:sp>
+          <p:nvSpPr>
+            <p:cNvPr id="5" name="TextBox 4">
+              <a:extLst>
+                <a:ext uri="{FF2B5EF4-FFF2-40B4-BE49-F238E27FC236}">
+                  <a16:creationId xmlns:a16="http://schemas.microsoft.com/office/drawing/2014/main" id="{788BD1CC-BA3E-4B10-9B90-002365785CC3}"/>
+                </a:ext>
+              </a:extLst>
+            </p:cNvPr>
+            <p:cNvSpPr txBox="1"/>
+            <p:nvPr/>
+          </p:nvSpPr>
+          <p:spPr>
+            <a:xfrm>
+              <a:off x="2473170" y="3834246"/>
+              <a:ext cx="3600409" cy="1200329"/>
+            </a:xfrm>
+            <a:prstGeom prst="rect">
+              <a:avLst/>
+            </a:prstGeom>
+            <a:solidFill>
+              <a:schemeClr val="bg1"/>
+            </a:solidFill>
+            <a:ln>
+              <a:solidFill>
+                <a:schemeClr val="tx1"/>
+              </a:solidFill>
+            </a:ln>
+          </p:spPr>
+          <p:txBody>
+            <a:bodyPr wrap="none" rtlCol="0">
+              <a:spAutoFit/>
+            </a:bodyPr>
+            <a:lstStyle/>
+            <a:p>
+              <a:pPr algn="ctr"/>
+              <a:r>
+                <a:rPr lang="en-US" sz="2400" dirty="0"/>
+                <a:t>git version control of recipe</a:t>
+              </a:r>
+            </a:p>
+            <a:p>
+              <a:pPr algn="ctr"/>
+              <a:r>
+                <a:rPr lang="en-US" sz="2400" dirty="0">
+                  <a:sym typeface="Symbol" panose="05050102010706020507" pitchFamily="18" charset="2"/>
+                </a:rPr>
+                <a:t></a:t>
+              </a:r>
+              <a:endParaRPr lang="en-US" sz="2400" dirty="0"/>
+            </a:p>
+            <a:p>
+              <a:pPr algn="ctr"/>
+              <a:r>
+                <a:rPr lang="en-US" sz="2400" dirty="0"/>
+                <a:t>reproducibility</a:t>
+              </a:r>
+              <a:endParaRPr lang="LID4096" sz="2400" dirty="0"/>
+            </a:p>
+          </p:txBody>
+        </p:sp>
+        <p:pic>
+          <p:nvPicPr>
+            <p:cNvPr id="6" name="Picture 2" descr="C:\Users\lucg5005\AppData\Local\Microsoft\Windows\Temporary Internet Files\Content.IE5\CWZUAEH4\lgi01a201309290600[1].jpg">
+              <a:extLst>
+                <a:ext uri="{FF2B5EF4-FFF2-40B4-BE49-F238E27FC236}">
+                  <a16:creationId xmlns:a16="http://schemas.microsoft.com/office/drawing/2014/main" id="{954D8D68-5AAA-A1D6-52C9-04B0D98DD134}"/>
+                </a:ext>
+              </a:extLst>
+            </p:cNvPr>
+            <p:cNvPicPr>
+              <a:picLocks noChangeAspect="1" noChangeArrowheads="1"/>
+            </p:cNvPicPr>
+            <p:nvPr/>
+          </p:nvPicPr>
+          <p:blipFill>
+            <a:blip r:embed="rId2" cstate="print">
+              <a:extLst>
+                <a:ext uri="{28A0092B-C50C-407E-A947-70E740481C1C}">
+                  <a14:useLocalDpi xmlns:a14="http://schemas.microsoft.com/office/drawing/2010/main" val="0"/>
+                </a:ext>
+              </a:extLst>
+            </a:blip>
+            <a:srcRect/>
+            <a:stretch>
+              <a:fillRect/>
+            </a:stretch>
+          </p:blipFill>
+          <p:spPr bwMode="auto">
+            <a:xfrm>
+              <a:off x="5897691" y="3342577"/>
+              <a:ext cx="695341" cy="713466"/>
+            </a:xfrm>
+            <a:prstGeom prst="rect">
+              <a:avLst/>
+            </a:prstGeom>
+            <a:noFill/>
+            <a:extLst>
+              <a:ext uri="{909E8E84-426E-40DD-AFC4-6F175D3DCCD1}">
+                <a14:hiddenFill xmlns:a14="http://schemas.microsoft.com/office/drawing/2010/main">
+                  <a:solidFill>
+                    <a:srgbClr val="FFFFFF"/>
+                  </a:solidFill>
+                </a14:hiddenFill>
+              </a:ext>
+            </a:extLst>
+          </p:spPr>
+        </p:pic>
+      </p:grpSp>
     </p:spTree>
     <p:extLst>
       <p:ext uri="{BB962C8B-B14F-4D97-AF65-F5344CB8AC3E}">
-        <p14:creationId xmlns:p14="http://schemas.microsoft.com/office/powerpoint/2010/main" val="2192721825"/>
+        <p14:creationId xmlns:p14="http://schemas.microsoft.com/office/powerpoint/2010/main" val="724131428"/>
       </p:ext>
     </p:extLst>
   </p:cSld>
   <p:clrMapOvr>
     <a:masterClrMapping/>
   </p:clrMapOvr>
+  <p:timing>
+    <p:tnLst>
+      <p:par>
+        <p:cTn id="1" dur="indefinite" restart="never" nodeType="tmRoot">
+          <p:childTnLst>
+            <p:seq concurrent="1" nextAc="seek">
+              <p:cTn id="2" dur="indefinite" nodeType="mainSeq">
+                <p:childTnLst>
+                  <p:par>
+                    <p:cTn id="3" fill="hold">
+                      <p:stCondLst>
+                        <p:cond delay="indefinite"/>
+                        <p:cond evt="onBegin" delay="0">
+                          <p:tn val="2"/>
+                        </p:cond>
+                      </p:stCondLst>
+                      <p:childTnLst>
+                        <p:par>
+                          <p:cTn id="4" fill="hold">
+                            <p:stCondLst>
+                              <p:cond delay="0"/>
+                            </p:stCondLst>
+                            <p:childTnLst>
+                              <p:par>
+                                <p:cTn id="5" presetID="1" presetClass="entr" presetSubtype="0" fill="hold" grpId="0" nodeType="withEffect">
+                                  <p:stCondLst>
+                                    <p:cond delay="0"/>
+                                  </p:stCondLst>
+                                  <p:childTnLst>
+                                    <p:set>
+                                      <p:cBhvr>
+                                        <p:cTn id="6" dur="1" fill="hold">
+                                          <p:stCondLst>
+                                            <p:cond delay="0"/>
+                                          </p:stCondLst>
+                                        </p:cTn>
+                                        <p:tgtEl>
+                                          <p:spTgt spid="3">
+                                            <p:txEl>
+                                              <p:pRg st="0" end="0"/>
+                                            </p:txEl>
+                                          </p:spTgt>
+                                        </p:tgtEl>
+                                        <p:attrNameLst>
+                                          <p:attrName>style.visibility</p:attrName>
+                                        </p:attrNameLst>
+                                      </p:cBhvr>
+                                      <p:to>
+                                        <p:strVal val="visible"/>
+                                      </p:to>
+                                    </p:set>
+                                  </p:childTnLst>
+                                </p:cTn>
+                              </p:par>
+                            </p:childTnLst>
+                          </p:cTn>
+                        </p:par>
+                      </p:childTnLst>
+                    </p:cTn>
+                  </p:par>
+                  <p:par>
+                    <p:cTn id="7" fill="hold">
+                      <p:stCondLst>
+                        <p:cond delay="indefinite"/>
+                      </p:stCondLst>
+                      <p:childTnLst>
+                        <p:par>
+                          <p:cTn id="8" fill="hold">
+                            <p:stCondLst>
+                              <p:cond delay="0"/>
+                            </p:stCondLst>
+                            <p:childTnLst>
+                              <p:par>
+                                <p:cTn id="9" presetID="1" presetClass="entr" presetSubtype="0" fill="hold" grpId="0" nodeType="clickEffect">
+                                  <p:stCondLst>
+                                    <p:cond delay="0"/>
+                                  </p:stCondLst>
+                                  <p:childTnLst>
+                                    <p:set>
+                                      <p:cBhvr>
+                                        <p:cTn id="10" dur="1" fill="hold">
+                                          <p:stCondLst>
+                                            <p:cond delay="0"/>
+                                          </p:stCondLst>
+                                        </p:cTn>
+                                        <p:tgtEl>
+                                          <p:spTgt spid="3">
+                                            <p:txEl>
+                                              <p:pRg st="1" end="1"/>
+                                            </p:txEl>
+                                          </p:spTgt>
+                                        </p:tgtEl>
+                                        <p:attrNameLst>
+                                          <p:attrName>style.visibility</p:attrName>
+                                        </p:attrNameLst>
+                                      </p:cBhvr>
+                                      <p:to>
+                                        <p:strVal val="visible"/>
+                                      </p:to>
+                                    </p:set>
+                                  </p:childTnLst>
+                                </p:cTn>
+                              </p:par>
+                              <p:par>
+                                <p:cTn id="11" presetID="1" presetClass="entr" presetSubtype="0" fill="hold" grpId="0" nodeType="withEffect">
+                                  <p:stCondLst>
+                                    <p:cond delay="0"/>
+                                  </p:stCondLst>
+                                  <p:childTnLst>
+                                    <p:set>
+                                      <p:cBhvr>
+                                        <p:cTn id="12" dur="1" fill="hold">
+                                          <p:stCondLst>
+                                            <p:cond delay="0"/>
+                                          </p:stCondLst>
+                                        </p:cTn>
+                                        <p:tgtEl>
+                                          <p:spTgt spid="3">
+                                            <p:txEl>
+                                              <p:pRg st="2" end="2"/>
+                                            </p:txEl>
+                                          </p:spTgt>
+                                        </p:tgtEl>
+                                        <p:attrNameLst>
+                                          <p:attrName>style.visibility</p:attrName>
+                                        </p:attrNameLst>
+                                      </p:cBhvr>
+                                      <p:to>
+                                        <p:strVal val="visible"/>
+                                      </p:to>
+                                    </p:set>
+                                  </p:childTnLst>
+                                </p:cTn>
+                              </p:par>
+                            </p:childTnLst>
+                          </p:cTn>
+                        </p:par>
+                      </p:childTnLst>
+                    </p:cTn>
+                  </p:par>
+                  <p:par>
+                    <p:cTn id="13" fill="hold">
+                      <p:stCondLst>
+                        <p:cond delay="indefinite"/>
+                      </p:stCondLst>
+                      <p:childTnLst>
+                        <p:par>
+                          <p:cTn id="14" fill="hold">
+                            <p:stCondLst>
+                              <p:cond delay="0"/>
+                            </p:stCondLst>
+                            <p:childTnLst>
+                              <p:par>
+                                <p:cTn id="15" presetID="1" presetClass="entr" presetSubtype="0" fill="hold" nodeType="clickEffect">
+                                  <p:stCondLst>
+                                    <p:cond delay="0"/>
+                                  </p:stCondLst>
+                                  <p:childTnLst>
+                                    <p:set>
+                                      <p:cBhvr>
+                                        <p:cTn id="16" dur="1" fill="hold">
+                                          <p:stCondLst>
+                                            <p:cond delay="0"/>
+                                          </p:stCondLst>
+                                        </p:cTn>
+                                        <p:tgtEl>
+                                          <p:spTgt spid="7"/>
+                                        </p:tgtEl>
+                                        <p:attrNameLst>
+                                          <p:attrName>style.visibility</p:attrName>
+                                        </p:attrNameLst>
+                                      </p:cBhvr>
+                                      <p:to>
+                                        <p:strVal val="visible"/>
+                                      </p:to>
+                                    </p:set>
+                                  </p:childTnLst>
+                                </p:cTn>
+                              </p:par>
+                            </p:childTnLst>
+                          </p:cTn>
+                        </p:par>
+                      </p:childTnLst>
+                    </p:cTn>
+                  </p:par>
+                  <p:par>
+                    <p:cTn id="17" fill="hold">
+                      <p:stCondLst>
+                        <p:cond delay="indefinite"/>
+                      </p:stCondLst>
+                      <p:childTnLst>
+                        <p:par>
+                          <p:cTn id="18" fill="hold">
+                            <p:stCondLst>
+                              <p:cond delay="0"/>
+                            </p:stCondLst>
+                            <p:childTnLst>
+                              <p:par>
+                                <p:cTn id="19" presetID="1" presetClass="entr" presetSubtype="0" fill="hold" grpId="0" nodeType="clickEffect">
+                                  <p:stCondLst>
+                                    <p:cond delay="0"/>
+                                  </p:stCondLst>
+                                  <p:childTnLst>
+                                    <p:set>
+                                      <p:cBhvr>
+                                        <p:cTn id="20" dur="1" fill="hold">
+                                          <p:stCondLst>
+                                            <p:cond delay="0"/>
+                                          </p:stCondLst>
+                                        </p:cTn>
+                                        <p:tgtEl>
+                                          <p:spTgt spid="3">
+                                            <p:txEl>
+                                              <p:pRg st="8" end="8"/>
+                                            </p:txEl>
+                                          </p:spTgt>
+                                        </p:tgtEl>
+                                        <p:attrNameLst>
+                                          <p:attrName>style.visibility</p:attrName>
+                                        </p:attrNameLst>
+                                      </p:cBhvr>
+                                      <p:to>
+                                        <p:strVal val="visible"/>
+                                      </p:to>
+                                    </p:set>
+                                  </p:childTnLst>
+                                </p:cTn>
+                              </p:par>
+                            </p:childTnLst>
+                          </p:cTn>
+                        </p:par>
+                      </p:childTnLst>
+                    </p:cTn>
+                  </p:par>
+                </p:childTnLst>
+              </p:cTn>
+              <p:prevCondLst>
+                <p:cond evt="onPrev" delay="0">
+                  <p:tgtEl>
+                    <p:sldTgt/>
+                  </p:tgtEl>
+                </p:cond>
+              </p:prevCondLst>
+              <p:nextCondLst>
+                <p:cond evt="onNext" delay="0">
+                  <p:tgtEl>
+                    <p:sldTgt/>
+                  </p:tgtEl>
+                </p:cond>
+              </p:nextCondLst>
+            </p:seq>
+          </p:childTnLst>
+        </p:cTn>
+      </p:par>
+    </p:tnLst>
+    <p:bldLst>
+      <p:bldP spid="3" grpId="0" uiExpand="1" build="p"/>
+    </p:bldLst>
+  </p:timing>
 </p:sld>
 </file>
 
@@ -35078,12 +35433,12 @@
       </p:sp>
       <p:sp>
         <p:nvSpPr>
-          <p:cNvPr id="3" name="Content Placeholder 2"/>
+          <p:cNvPr id="3" name="Text Placeholder 2"/>
           <p:cNvSpPr>
             <a:spLocks noGrp="1"/>
           </p:cNvSpPr>
           <p:nvPr>
-            <p:ph idx="1"/>
+            <p:ph type="body" idx="1"/>
           </p:nvPr>
         </p:nvSpPr>
         <p:spPr/>
@@ -35091,85 +35446,7 @@
           <a:bodyPr/>
           <a:lstStyle/>
           <a:p>
-            <a:r>
-              <a:rPr lang="en-US" dirty="0" err="1"/>
-              <a:t>Apptainer</a:t>
-            </a:r>
-            <a:r>
-              <a:rPr lang="en-US" dirty="0"/>
-              <a:t> advantages</a:t>
-            </a:r>
-          </a:p>
-          <a:p>
-            <a:pPr lvl="1"/>
-            <a:r>
-              <a:rPr lang="en-US" dirty="0"/>
-              <a:t>Portability</a:t>
-            </a:r>
-          </a:p>
-          <a:p>
-            <a:pPr lvl="1"/>
-            <a:r>
-              <a:rPr lang="en-US" dirty="0"/>
-              <a:t>Reproducibility: recipes under version control</a:t>
-            </a:r>
-          </a:p>
-          <a:p>
-            <a:pPr lvl="1"/>
-            <a:r>
-              <a:rPr lang="en-US" dirty="0"/>
-              <a:t>Easily create images</a:t>
-            </a:r>
-          </a:p>
-          <a:p>
-            <a:pPr lvl="1"/>
-            <a:r>
-              <a:rPr lang="en-US" dirty="0"/>
-              <a:t>Integrate images into existing workflows</a:t>
-            </a:r>
-          </a:p>
-          <a:p>
-            <a:pPr lvl="1"/>
-            <a:r>
-              <a:rPr lang="en-US" dirty="0"/>
-              <a:t>No privilege escalation</a:t>
-            </a:r>
-          </a:p>
-          <a:p>
-            <a:pPr lvl="2"/>
-            <a:r>
-              <a:rPr lang="en-US" dirty="0"/>
-              <a:t>Create as root</a:t>
-            </a:r>
-          </a:p>
-          <a:p>
-            <a:pPr lvl="2"/>
-            <a:r>
-              <a:rPr lang="en-US" dirty="0"/>
-              <a:t>Run as user, no </a:t>
-            </a:r>
-            <a:r>
-              <a:rPr lang="en-US" dirty="0" err="1"/>
-              <a:t>sudo</a:t>
-            </a:r>
-            <a:r>
-              <a:rPr lang="en-US" dirty="0"/>
-              <a:t> possible</a:t>
-            </a:r>
-          </a:p>
-          <a:p>
-            <a:pPr lvl="1"/>
-            <a:r>
-              <a:rPr lang="en-US" dirty="0"/>
-              <a:t>Quite reasonable performance/overhead</a:t>
-            </a:r>
-          </a:p>
-          <a:p>
-            <a:r>
-              <a:rPr lang="en-US" dirty="0"/>
-              <a:t>Not an excuse to run crappy/suboptimal software!</a:t>
-            </a:r>
-            <a:endParaRPr lang="nl-BE" dirty="0"/>
+            <a:endParaRPr lang="nl-BE"/>
           </a:p>
         </p:txBody>
       </p:sp>
@@ -35191,6 +35468,179 @@
             <a:fld id="{AEFF399F-E3B5-4890-BC79-9BC8D4DF3F2D}" type="slidenum">
               <a:rPr lang="nl-BE" smtClean="0"/>
               <a:t>61</a:t>
+            </a:fld>
+            <a:endParaRPr lang="nl-BE"/>
+          </a:p>
+        </p:txBody>
+      </p:sp>
+    </p:spTree>
+    <p:extLst>
+      <p:ext uri="{BB962C8B-B14F-4D97-AF65-F5344CB8AC3E}">
+        <p14:creationId xmlns:p14="http://schemas.microsoft.com/office/powerpoint/2010/main" val="2192721825"/>
+      </p:ext>
+    </p:extLst>
+  </p:cSld>
+  <p:clrMapOvr>
+    <a:masterClrMapping/>
+  </p:clrMapOvr>
+</p:sld>
+</file>
+
+<file path=ppt/slides/slide62.xml><?xml version="1.0" encoding="utf-8"?>
+<p:sld xmlns:a="http://schemas.openxmlformats.org/drawingml/2006/main" xmlns:r="http://schemas.openxmlformats.org/officeDocument/2006/relationships" xmlns:p="http://schemas.openxmlformats.org/presentationml/2006/main">
+  <p:cSld>
+    <p:spTree>
+      <p:nvGrpSpPr>
+        <p:cNvPr id="1" name=""/>
+        <p:cNvGrpSpPr/>
+        <p:nvPr/>
+      </p:nvGrpSpPr>
+      <p:grpSpPr>
+        <a:xfrm>
+          <a:off x="0" y="0"/>
+          <a:ext cx="0" cy="0"/>
+          <a:chOff x="0" y="0"/>
+          <a:chExt cx="0" cy="0"/>
+        </a:xfrm>
+      </p:grpSpPr>
+      <p:sp>
+        <p:nvSpPr>
+          <p:cNvPr id="2" name="Title 1"/>
+          <p:cNvSpPr>
+            <a:spLocks noGrp="1"/>
+          </p:cNvSpPr>
+          <p:nvPr>
+            <p:ph type="title"/>
+          </p:nvPr>
+        </p:nvSpPr>
+        <p:spPr/>
+        <p:txBody>
+          <a:bodyPr/>
+          <a:lstStyle/>
+          <a:p>
+            <a:r>
+              <a:rPr lang="en-US" dirty="0"/>
+              <a:t>Conclusions</a:t>
+            </a:r>
+            <a:endParaRPr lang="nl-BE" dirty="0"/>
+          </a:p>
+        </p:txBody>
+      </p:sp>
+      <p:sp>
+        <p:nvSpPr>
+          <p:cNvPr id="3" name="Content Placeholder 2"/>
+          <p:cNvSpPr>
+            <a:spLocks noGrp="1"/>
+          </p:cNvSpPr>
+          <p:nvPr>
+            <p:ph idx="1"/>
+          </p:nvPr>
+        </p:nvSpPr>
+        <p:spPr/>
+        <p:txBody>
+          <a:bodyPr/>
+          <a:lstStyle/>
+          <a:p>
+            <a:r>
+              <a:rPr lang="en-US" dirty="0" err="1"/>
+              <a:t>Apptainer</a:t>
+            </a:r>
+            <a:r>
+              <a:rPr lang="en-US" dirty="0"/>
+              <a:t> advantages</a:t>
+            </a:r>
+          </a:p>
+          <a:p>
+            <a:pPr lvl="1"/>
+            <a:r>
+              <a:rPr lang="en-US" dirty="0"/>
+              <a:t>Portability</a:t>
+            </a:r>
+          </a:p>
+          <a:p>
+            <a:pPr lvl="1"/>
+            <a:r>
+              <a:rPr lang="en-US" dirty="0"/>
+              <a:t>Reproducibility: recipes under version control</a:t>
+            </a:r>
+          </a:p>
+          <a:p>
+            <a:pPr lvl="1"/>
+            <a:r>
+              <a:rPr lang="en-US" dirty="0"/>
+              <a:t>Easily create images</a:t>
+            </a:r>
+          </a:p>
+          <a:p>
+            <a:pPr lvl="1"/>
+            <a:r>
+              <a:rPr lang="en-US" dirty="0"/>
+              <a:t>Integrate images into existing workflows</a:t>
+            </a:r>
+          </a:p>
+          <a:p>
+            <a:pPr lvl="1"/>
+            <a:r>
+              <a:rPr lang="en-US" dirty="0"/>
+              <a:t>No privilege escalation</a:t>
+            </a:r>
+          </a:p>
+          <a:p>
+            <a:pPr lvl="2"/>
+            <a:r>
+              <a:rPr lang="en-US" dirty="0"/>
+              <a:t>Create as root</a:t>
+            </a:r>
+          </a:p>
+          <a:p>
+            <a:pPr lvl="2"/>
+            <a:r>
+              <a:rPr lang="en-US" dirty="0"/>
+              <a:t>Run as user, no </a:t>
+            </a:r>
+            <a:r>
+              <a:rPr lang="en-US" dirty="0" err="1"/>
+              <a:t>sudo</a:t>
+            </a:r>
+            <a:r>
+              <a:rPr lang="en-US" dirty="0"/>
+              <a:t> possible</a:t>
+            </a:r>
+          </a:p>
+          <a:p>
+            <a:pPr lvl="1"/>
+            <a:r>
+              <a:rPr lang="en-US" dirty="0"/>
+              <a:t>Quite reasonable performance/overhead</a:t>
+            </a:r>
+          </a:p>
+          <a:p>
+            <a:r>
+              <a:rPr lang="en-US" dirty="0"/>
+              <a:t>Not an excuse to run crappy/suboptimal software!</a:t>
+            </a:r>
+            <a:endParaRPr lang="nl-BE" dirty="0"/>
+          </a:p>
+        </p:txBody>
+      </p:sp>
+      <p:sp>
+        <p:nvSpPr>
+          <p:cNvPr id="4" name="Slide Number Placeholder 3"/>
+          <p:cNvSpPr>
+            <a:spLocks noGrp="1"/>
+          </p:cNvSpPr>
+          <p:nvPr>
+            <p:ph type="sldNum" sz="quarter" idx="12"/>
+          </p:nvPr>
+        </p:nvSpPr>
+        <p:spPr/>
+        <p:txBody>
+          <a:bodyPr/>
+          <a:lstStyle/>
+          <a:p>
+            <a:fld id="{AEFF399F-E3B5-4890-BC79-9BC8D4DF3F2D}" type="slidenum">
+              <a:rPr lang="nl-BE" smtClean="0"/>
+              <a:t>62</a:t>
             </a:fld>
             <a:endParaRPr lang="nl-BE"/>
           </a:p>
@@ -35699,7 +36149,7 @@
 </p:sld>
 </file>
 
-<file path=ppt/slides/slide62.xml><?xml version="1.0" encoding="utf-8"?>
+<file path=ppt/slides/slide63.xml><?xml version="1.0" encoding="utf-8"?>
 <p:sld xmlns:a="http://schemas.openxmlformats.org/drawingml/2006/main" xmlns:r="http://schemas.openxmlformats.org/officeDocument/2006/relationships" xmlns:p="http://schemas.openxmlformats.org/presentationml/2006/main">
   <p:cSld>
     <p:spTree>
@@ -35872,7 +36322,7 @@
           <a:p>
             <a:fld id="{AEFF399F-E3B5-4890-BC79-9BC8D4DF3F2D}" type="slidenum">
               <a:rPr lang="nl-BE" smtClean="0"/>
-              <a:t>62</a:t>
+              <a:t>63</a:t>
             </a:fld>
             <a:endParaRPr lang="nl-BE"/>
           </a:p>
@@ -35891,7 +36341,7 @@
 </p:sld>
 </file>
 
-<file path=ppt/slides/slide63.xml><?xml version="1.0" encoding="utf-8"?>
+<file path=ppt/slides/slide64.xml><?xml version="1.0" encoding="utf-8"?>
 <p:sld xmlns:a="http://schemas.openxmlformats.org/drawingml/2006/main" xmlns:r="http://schemas.openxmlformats.org/officeDocument/2006/relationships" xmlns:p="http://schemas.openxmlformats.org/presentationml/2006/main">
   <p:cSld>
     <p:spTree>
@@ -35985,7 +36435,7 @@
           <a:p>
             <a:fld id="{AEFF399F-E3B5-4890-BC79-9BC8D4DF3F2D}" type="slidenum">
               <a:rPr lang="nl-BE" smtClean="0"/>
-              <a:t>63</a:t>
+              <a:t>64</a:t>
             </a:fld>
             <a:endParaRPr lang="nl-BE"/>
           </a:p>
@@ -36004,7 +36454,7 @@
 </p:sld>
 </file>
 
-<file path=ppt/slides/slide64.xml><?xml version="1.0" encoding="utf-8"?>
+<file path=ppt/slides/slide65.xml><?xml version="1.0" encoding="utf-8"?>
 <p:sld xmlns:a="http://schemas.openxmlformats.org/drawingml/2006/main" xmlns:r="http://schemas.openxmlformats.org/officeDocument/2006/relationships" xmlns:p="http://schemas.openxmlformats.org/presentationml/2006/main">
   <p:cSld>
     <p:spTree>
@@ -36134,7 +36584,7 @@
           <a:p>
             <a:fld id="{AEFF399F-E3B5-4890-BC79-9BC8D4DF3F2D}" type="slidenum">
               <a:rPr lang="nl-BE" smtClean="0"/>
-              <a:t>64</a:t>
+              <a:t>65</a:t>
             </a:fld>
             <a:endParaRPr lang="nl-BE"/>
           </a:p>
@@ -36153,7 +36603,7 @@
 </p:sld>
 </file>
 
-<file path=ppt/slides/slide65.xml><?xml version="1.0" encoding="utf-8"?>
+<file path=ppt/slides/slide66.xml><?xml version="1.0" encoding="utf-8"?>
 <p:sld xmlns:a="http://schemas.openxmlformats.org/drawingml/2006/main" xmlns:r="http://schemas.openxmlformats.org/officeDocument/2006/relationships" xmlns:p="http://schemas.openxmlformats.org/presentationml/2006/main">
   <p:cSld>
     <p:spTree>
@@ -36505,7 +36955,7 @@
           <a:p>
             <a:fld id="{AEFF399F-E3B5-4890-BC79-9BC8D4DF3F2D}" type="slidenum">
               <a:rPr lang="nl-BE" smtClean="0"/>
-              <a:t>65</a:t>
+              <a:t>66</a:t>
             </a:fld>
             <a:endParaRPr lang="nl-BE"/>
           </a:p>

</xml_diff>

<commit_message>
Add slides on apptainer for development
</commit_message>
<xml_diff>
--- a/containers_for_hpc.pptx
+++ b/containers_for_hpc.pptx
@@ -5,7 +5,7 @@
     <p:sldMasterId id="2147483660" r:id="rId1"/>
   </p:sldMasterIdLst>
   <p:notesMasterIdLst>
-    <p:notesMasterId r:id="rId68"/>
+    <p:notesMasterId r:id="rId71"/>
   </p:notesMasterIdLst>
   <p:sldIdLst>
     <p:sldId id="256" r:id="rId2"/>
@@ -58,22 +58,25 @@
     <p:sldId id="363" r:id="rId49"/>
     <p:sldId id="364" r:id="rId50"/>
     <p:sldId id="365" r:id="rId51"/>
-    <p:sldId id="296" r:id="rId52"/>
-    <p:sldId id="297" r:id="rId53"/>
-    <p:sldId id="298" r:id="rId54"/>
-    <p:sldId id="299" r:id="rId55"/>
-    <p:sldId id="300" r:id="rId56"/>
-    <p:sldId id="285" r:id="rId57"/>
-    <p:sldId id="286" r:id="rId58"/>
-    <p:sldId id="287" r:id="rId59"/>
-    <p:sldId id="270" r:id="rId60"/>
-    <p:sldId id="366" r:id="rId61"/>
-    <p:sldId id="272" r:id="rId62"/>
-    <p:sldId id="276" r:id="rId63"/>
-    <p:sldId id="277" r:id="rId64"/>
-    <p:sldId id="307" r:id="rId65"/>
-    <p:sldId id="308" r:id="rId66"/>
-    <p:sldId id="291" r:id="rId67"/>
+    <p:sldId id="367" r:id="rId52"/>
+    <p:sldId id="368" r:id="rId53"/>
+    <p:sldId id="369" r:id="rId54"/>
+    <p:sldId id="296" r:id="rId55"/>
+    <p:sldId id="297" r:id="rId56"/>
+    <p:sldId id="298" r:id="rId57"/>
+    <p:sldId id="299" r:id="rId58"/>
+    <p:sldId id="300" r:id="rId59"/>
+    <p:sldId id="285" r:id="rId60"/>
+    <p:sldId id="286" r:id="rId61"/>
+    <p:sldId id="287" r:id="rId62"/>
+    <p:sldId id="270" r:id="rId63"/>
+    <p:sldId id="366" r:id="rId64"/>
+    <p:sldId id="272" r:id="rId65"/>
+    <p:sldId id="276" r:id="rId66"/>
+    <p:sldId id="277" r:id="rId67"/>
+    <p:sldId id="307" r:id="rId68"/>
+    <p:sldId id="308" r:id="rId69"/>
+    <p:sldId id="291" r:id="rId70"/>
   </p:sldIdLst>
   <p:sldSz cx="9144000" cy="6858000" type="screen4x3"/>
   <p:notesSz cx="6858000" cy="9144000"/>
@@ -255,6 +258,13 @@
             <p14:sldId id="363"/>
             <p14:sldId id="364"/>
             <p14:sldId id="365"/>
+          </p14:sldIdLst>
+        </p14:section>
+        <p14:section name="Development" id="{A90536BE-1C5D-4B55-A6F5-283902624C4D}">
+          <p14:sldIdLst>
+            <p14:sldId id="367"/>
+            <p14:sldId id="368"/>
+            <p14:sldId id="369"/>
           </p14:sldIdLst>
         </p14:section>
         <p14:section name="Services" id="{73BC88DB-DEAD-4A8C-B24B-311D00DBBC0A}">
@@ -29502,7 +29512,13 @@
       </p:grpSpPr>
       <p:sp>
         <p:nvSpPr>
-          <p:cNvPr id="2" name="Title 1"/>
+          <p:cNvPr id="2" name="Title 1">
+            <a:extLst>
+              <a:ext uri="{FF2B5EF4-FFF2-40B4-BE49-F238E27FC236}">
+                <a16:creationId xmlns:a16="http://schemas.microsoft.com/office/drawing/2014/main" id="{86688369-12A7-5607-CA63-6A0C128042B9}"/>
+              </a:ext>
+            </a:extLst>
+          </p:cNvPr>
           <p:cNvSpPr>
             <a:spLocks noGrp="1"/>
           </p:cNvSpPr>
@@ -29516,15 +29532,26 @@
           <a:lstStyle/>
           <a:p>
             <a:r>
+              <a:rPr lang="en-US" dirty="0" err="1"/>
+              <a:t>Apptainer</a:t>
+            </a:r>
+            <a:r>
               <a:rPr lang="en-US" dirty="0"/>
-              <a:t>Services</a:t>
-            </a:r>
+              <a:t> for development</a:t>
+            </a:r>
+            <a:endParaRPr lang="LID4096" dirty="0"/>
           </a:p>
         </p:txBody>
       </p:sp>
       <p:sp>
         <p:nvSpPr>
-          <p:cNvPr id="3" name="Text Placeholder 2"/>
+          <p:cNvPr id="3" name="Text Placeholder 2">
+            <a:extLst>
+              <a:ext uri="{FF2B5EF4-FFF2-40B4-BE49-F238E27FC236}">
+                <a16:creationId xmlns:a16="http://schemas.microsoft.com/office/drawing/2014/main" id="{326217B4-19AD-5C13-485F-303FD2FCCEFF}"/>
+              </a:ext>
+            </a:extLst>
+          </p:cNvPr>
           <p:cNvSpPr>
             <a:spLocks noGrp="1"/>
           </p:cNvSpPr>
@@ -29537,13 +29564,19 @@
           <a:bodyPr/>
           <a:lstStyle/>
           <a:p>
-            <a:endParaRPr lang="en-US"/>
+            <a:endParaRPr lang="LID4096"/>
           </a:p>
         </p:txBody>
       </p:sp>
       <p:sp>
         <p:nvSpPr>
-          <p:cNvPr id="4" name="Slide Number Placeholder 3"/>
+          <p:cNvPr id="4" name="Slide Number Placeholder 3">
+            <a:extLst>
+              <a:ext uri="{FF2B5EF4-FFF2-40B4-BE49-F238E27FC236}">
+                <a16:creationId xmlns:a16="http://schemas.microsoft.com/office/drawing/2014/main" id="{4272E7CA-7BF4-5704-B676-B094689FAD56}"/>
+              </a:ext>
+            </a:extLst>
+          </p:cNvPr>
           <p:cNvSpPr>
             <a:spLocks noGrp="1"/>
           </p:cNvSpPr>
@@ -29567,7 +29600,7 @@
     </p:spTree>
     <p:extLst>
       <p:ext uri="{BB962C8B-B14F-4D97-AF65-F5344CB8AC3E}">
-        <p14:creationId xmlns:p14="http://schemas.microsoft.com/office/powerpoint/2010/main" val="1160171864"/>
+        <p14:creationId xmlns:p14="http://schemas.microsoft.com/office/powerpoint/2010/main" val="1885001539"/>
       </p:ext>
     </p:extLst>
   </p:cSld>
@@ -29578,6 +29611,1472 @@
 </file>
 
 <file path=ppt/slides/slide52.xml><?xml version="1.0" encoding="utf-8"?>
+<p:sld xmlns:a="http://schemas.openxmlformats.org/drawingml/2006/main" xmlns:r="http://schemas.openxmlformats.org/officeDocument/2006/relationships" xmlns:p="http://schemas.openxmlformats.org/presentationml/2006/main">
+  <p:cSld>
+    <p:spTree>
+      <p:nvGrpSpPr>
+        <p:cNvPr id="1" name=""/>
+        <p:cNvGrpSpPr/>
+        <p:nvPr/>
+      </p:nvGrpSpPr>
+      <p:grpSpPr>
+        <a:xfrm>
+          <a:off x="0" y="0"/>
+          <a:ext cx="0" cy="0"/>
+          <a:chOff x="0" y="0"/>
+          <a:chExt cx="0" cy="0"/>
+        </a:xfrm>
+      </p:grpSpPr>
+      <p:sp>
+        <p:nvSpPr>
+          <p:cNvPr id="2" name="Title 1">
+            <a:extLst>
+              <a:ext uri="{FF2B5EF4-FFF2-40B4-BE49-F238E27FC236}">
+                <a16:creationId xmlns:a16="http://schemas.microsoft.com/office/drawing/2014/main" id="{B21F630D-5AF9-D862-8FDA-CAB54ACB61C6}"/>
+              </a:ext>
+            </a:extLst>
+          </p:cNvPr>
+          <p:cNvSpPr>
+            <a:spLocks noGrp="1"/>
+          </p:cNvSpPr>
+          <p:nvPr>
+            <p:ph type="title"/>
+          </p:nvPr>
+        </p:nvSpPr>
+        <p:spPr/>
+        <p:txBody>
+          <a:bodyPr/>
+          <a:lstStyle/>
+          <a:p>
+            <a:r>
+              <a:rPr lang="en-US" dirty="0"/>
+              <a:t>Boon for developers</a:t>
+            </a:r>
+            <a:endParaRPr lang="LID4096" dirty="0"/>
+          </a:p>
+        </p:txBody>
+      </p:sp>
+      <p:sp>
+        <p:nvSpPr>
+          <p:cNvPr id="3" name="Content Placeholder 2">
+            <a:extLst>
+              <a:ext uri="{FF2B5EF4-FFF2-40B4-BE49-F238E27FC236}">
+                <a16:creationId xmlns:a16="http://schemas.microsoft.com/office/drawing/2014/main" id="{0980C711-26CC-6B97-8C06-4A8AB77F6294}"/>
+              </a:ext>
+            </a:extLst>
+          </p:cNvPr>
+          <p:cNvSpPr>
+            <a:spLocks noGrp="1"/>
+          </p:cNvSpPr>
+          <p:nvPr>
+            <p:ph idx="1"/>
+          </p:nvPr>
+        </p:nvSpPr>
+        <p:spPr/>
+        <p:txBody>
+          <a:bodyPr>
+            <a:normAutofit fontScale="92500" lnSpcReduction="20000"/>
+          </a:bodyPr>
+          <a:lstStyle/>
+          <a:p>
+            <a:r>
+              <a:rPr lang="en-US" dirty="0"/>
+              <a:t>Create image</a:t>
+            </a:r>
+          </a:p>
+          <a:p>
+            <a:pPr lvl="1"/>
+            <a:r>
+              <a:rPr lang="en-US" dirty="0"/>
+              <a:t>OS of choice</a:t>
+            </a:r>
+          </a:p>
+          <a:p>
+            <a:pPr lvl="1"/>
+            <a:r>
+              <a:rPr lang="en-US" dirty="0"/>
+              <a:t>Required tools</a:t>
+            </a:r>
+          </a:p>
+          <a:p>
+            <a:pPr lvl="2"/>
+            <a:r>
+              <a:rPr lang="en-US" dirty="0"/>
+              <a:t>Editor of choice</a:t>
+            </a:r>
+          </a:p>
+          <a:p>
+            <a:pPr lvl="2"/>
+            <a:r>
+              <a:rPr lang="en-US" dirty="0"/>
+              <a:t>Compilers/</a:t>
+            </a:r>
+            <a:r>
+              <a:rPr lang="en-US" dirty="0" err="1"/>
+              <a:t>CMake</a:t>
+            </a:r>
+            <a:r>
+              <a:rPr lang="en-US" dirty="0"/>
+              <a:t>/</a:t>
+            </a:r>
+            <a:r>
+              <a:rPr lang="en-US" dirty="0">
+                <a:sym typeface="Symbol" panose="05050102010706020507" pitchFamily="18" charset="2"/>
+              </a:rPr>
+              <a:t></a:t>
+            </a:r>
+            <a:endParaRPr lang="en-US" dirty="0"/>
+          </a:p>
+          <a:p>
+            <a:pPr lvl="2"/>
+            <a:r>
+              <a:rPr lang="en-US" dirty="0" err="1"/>
+              <a:t>gdb</a:t>
+            </a:r>
+            <a:r>
+              <a:rPr lang="en-US" dirty="0"/>
+              <a:t>/</a:t>
+            </a:r>
+            <a:r>
+              <a:rPr lang="en-US" dirty="0" err="1"/>
+              <a:t>gprof</a:t>
+            </a:r>
+            <a:r>
+              <a:rPr lang="en-US" dirty="0"/>
+              <a:t>/ hyperfine/</a:t>
+            </a:r>
+            <a:r>
+              <a:rPr lang="en-US" dirty="0">
+                <a:sym typeface="Symbol" panose="05050102010706020507" pitchFamily="18" charset="2"/>
+              </a:rPr>
+              <a:t> </a:t>
+            </a:r>
+            <a:endParaRPr lang="en-US" dirty="0"/>
+          </a:p>
+          <a:p>
+            <a:pPr lvl="2"/>
+            <a:r>
+              <a:rPr lang="en-US" dirty="0">
+                <a:sym typeface="Symbol" panose="05050102010706020507" pitchFamily="18" charset="2"/>
+              </a:rPr>
+              <a:t></a:t>
+            </a:r>
+            <a:endParaRPr lang="en-US" dirty="0"/>
+          </a:p>
+          <a:p>
+            <a:pPr lvl="1"/>
+            <a:r>
+              <a:rPr lang="en-US" dirty="0"/>
+              <a:t>Required libraries</a:t>
+            </a:r>
+          </a:p>
+          <a:p>
+            <a:pPr lvl="2"/>
+            <a:r>
+              <a:rPr lang="en-US" dirty="0"/>
+              <a:t>Boost/</a:t>
+            </a:r>
+            <a:r>
+              <a:rPr lang="en-US" dirty="0" err="1"/>
+              <a:t>OpenBLAS</a:t>
+            </a:r>
+            <a:r>
+              <a:rPr lang="en-US" dirty="0"/>
+              <a:t>/</a:t>
+            </a:r>
+            <a:r>
+              <a:rPr lang="en-US" dirty="0">
+                <a:sym typeface="Symbol" panose="05050102010706020507" pitchFamily="18" charset="2"/>
+              </a:rPr>
+              <a:t></a:t>
+            </a:r>
+          </a:p>
+          <a:p>
+            <a:r>
+              <a:rPr lang="en-US" dirty="0">
+                <a:sym typeface="Symbol" panose="05050102010706020507" pitchFamily="18" charset="2"/>
+              </a:rPr>
+              <a:t>Configuration</a:t>
+            </a:r>
+          </a:p>
+          <a:p>
+            <a:pPr lvl="1"/>
+            <a:r>
+              <a:rPr lang="en-US" dirty="0">
+                <a:sym typeface="Symbol" panose="05050102010706020507" pitchFamily="18" charset="2"/>
+              </a:rPr>
+              <a:t>Host home directory</a:t>
+            </a:r>
+          </a:p>
+          <a:p>
+            <a:pPr lvl="2"/>
+            <a:r>
+              <a:rPr lang="en-US" dirty="0">
+                <a:latin typeface="Courier New" panose="02070309020205020404" pitchFamily="49" charset="0"/>
+                <a:cs typeface="Courier New" panose="02070309020205020404" pitchFamily="49" charset="0"/>
+                <a:sym typeface="Symbol" panose="05050102010706020507" pitchFamily="18" charset="2"/>
+              </a:rPr>
+              <a:t>.</a:t>
+            </a:r>
+            <a:r>
+              <a:rPr lang="en-US" dirty="0" err="1">
+                <a:latin typeface="Courier New" panose="02070309020205020404" pitchFamily="49" charset="0"/>
+                <a:cs typeface="Courier New" panose="02070309020205020404" pitchFamily="49" charset="0"/>
+                <a:sym typeface="Symbol" panose="05050102010706020507" pitchFamily="18" charset="2"/>
+              </a:rPr>
+              <a:t>bashrc</a:t>
+            </a:r>
+            <a:r>
+              <a:rPr lang="en-US" dirty="0">
+                <a:sym typeface="Symbol" panose="05050102010706020507" pitchFamily="18" charset="2"/>
+              </a:rPr>
+              <a:t>/</a:t>
+            </a:r>
+            <a:r>
+              <a:rPr lang="en-US" dirty="0">
+                <a:latin typeface="Courier New" panose="02070309020205020404" pitchFamily="49" charset="0"/>
+                <a:cs typeface="Courier New" panose="02070309020205020404" pitchFamily="49" charset="0"/>
+                <a:sym typeface="Symbol" panose="05050102010706020507" pitchFamily="18" charset="2"/>
+              </a:rPr>
+              <a:t>.</a:t>
+            </a:r>
+            <a:r>
+              <a:rPr lang="en-US" dirty="0" err="1">
+                <a:latin typeface="Courier New" panose="02070309020205020404" pitchFamily="49" charset="0"/>
+                <a:cs typeface="Courier New" panose="02070309020205020404" pitchFamily="49" charset="0"/>
+                <a:sym typeface="Symbol" panose="05050102010706020507" pitchFamily="18" charset="2"/>
+              </a:rPr>
+              <a:t>vimrc</a:t>
+            </a:r>
+            <a:r>
+              <a:rPr lang="en-US" dirty="0">
+                <a:sym typeface="Symbol" panose="05050102010706020507" pitchFamily="18" charset="2"/>
+              </a:rPr>
+              <a:t>/ </a:t>
+            </a:r>
+          </a:p>
+          <a:p>
+            <a:r>
+              <a:rPr lang="en-US" dirty="0">
+                <a:sym typeface="Symbol" panose="05050102010706020507" pitchFamily="18" charset="2"/>
+              </a:rPr>
+              <a:t>Part of project via git + DVC</a:t>
+            </a:r>
+            <a:endParaRPr lang="LID4096" dirty="0"/>
+          </a:p>
+        </p:txBody>
+      </p:sp>
+      <p:sp>
+        <p:nvSpPr>
+          <p:cNvPr id="4" name="Slide Number Placeholder 3">
+            <a:extLst>
+              <a:ext uri="{FF2B5EF4-FFF2-40B4-BE49-F238E27FC236}">
+                <a16:creationId xmlns:a16="http://schemas.microsoft.com/office/drawing/2014/main" id="{3FC635DB-C9F7-F2B9-CF0F-7E93D92FD966}"/>
+              </a:ext>
+            </a:extLst>
+          </p:cNvPr>
+          <p:cNvSpPr>
+            <a:spLocks noGrp="1"/>
+          </p:cNvSpPr>
+          <p:nvPr>
+            <p:ph type="sldNum" sz="quarter" idx="12"/>
+          </p:nvPr>
+        </p:nvSpPr>
+        <p:spPr/>
+        <p:txBody>
+          <a:bodyPr/>
+          <a:lstStyle/>
+          <a:p>
+            <a:fld id="{AEFF399F-E3B5-4890-BC79-9BC8D4DF3F2D}" type="slidenum">
+              <a:rPr lang="nl-BE" smtClean="0"/>
+              <a:t>52</a:t>
+            </a:fld>
+            <a:endParaRPr lang="nl-BE"/>
+          </a:p>
+        </p:txBody>
+      </p:sp>
+      <p:grpSp>
+        <p:nvGrpSpPr>
+          <p:cNvPr id="8" name="Group 7">
+            <a:extLst>
+              <a:ext uri="{FF2B5EF4-FFF2-40B4-BE49-F238E27FC236}">
+                <a16:creationId xmlns:a16="http://schemas.microsoft.com/office/drawing/2014/main" id="{BD5CAF9A-6E0E-1B44-5C65-FC6540FFAD7F}"/>
+              </a:ext>
+            </a:extLst>
+          </p:cNvPr>
+          <p:cNvGrpSpPr/>
+          <p:nvPr/>
+        </p:nvGrpSpPr>
+        <p:grpSpPr>
+          <a:xfrm>
+            <a:off x="4720583" y="2686050"/>
+            <a:ext cx="3846209" cy="1826609"/>
+            <a:chOff x="4720583" y="2686050"/>
+            <a:chExt cx="3846209" cy="1826609"/>
+          </a:xfrm>
+        </p:grpSpPr>
+        <p:sp>
+          <p:nvSpPr>
+            <p:cNvPr id="5" name="TextBox 4">
+              <a:extLst>
+                <a:ext uri="{FF2B5EF4-FFF2-40B4-BE49-F238E27FC236}">
+                  <a16:creationId xmlns:a16="http://schemas.microsoft.com/office/drawing/2014/main" id="{DD408182-D01F-DB6D-CBF7-75E42AC3F63E}"/>
+                </a:ext>
+              </a:extLst>
+            </p:cNvPr>
+            <p:cNvSpPr txBox="1"/>
+            <p:nvPr/>
+          </p:nvSpPr>
+          <p:spPr>
+            <a:xfrm>
+              <a:off x="4720583" y="3127664"/>
+              <a:ext cx="3474734" cy="1384995"/>
+            </a:xfrm>
+            <a:prstGeom prst="rect">
+              <a:avLst/>
+            </a:prstGeom>
+            <a:solidFill>
+              <a:schemeClr val="bg1"/>
+            </a:solidFill>
+            <a:ln>
+              <a:solidFill>
+                <a:schemeClr val="tx1"/>
+              </a:solidFill>
+            </a:ln>
+          </p:spPr>
+          <p:txBody>
+            <a:bodyPr wrap="none" rtlCol="0">
+              <a:spAutoFit/>
+            </a:bodyPr>
+            <a:lstStyle/>
+            <a:p>
+              <a:r>
+                <a:rPr lang="en-US" sz="2800" dirty="0"/>
+                <a:t>Stable, reproducible,</a:t>
+              </a:r>
+              <a:br>
+                <a:rPr lang="en-US" sz="2800" dirty="0"/>
+              </a:br>
+              <a:r>
+                <a:rPr lang="en-US" sz="2800" dirty="0"/>
+                <a:t>per project, shareable,</a:t>
+              </a:r>
+              <a:br>
+                <a:rPr lang="en-US" sz="2800" dirty="0"/>
+              </a:br>
+              <a:r>
+                <a:rPr lang="en-US" sz="2800" dirty="0"/>
+                <a:t>zero-config</a:t>
+              </a:r>
+              <a:endParaRPr lang="LID4096" sz="2800" dirty="0"/>
+            </a:p>
+          </p:txBody>
+        </p:sp>
+        <p:pic>
+          <p:nvPicPr>
+            <p:cNvPr id="7" name="Graphic 6" descr="Thumbs up sign with solid fill">
+              <a:extLst>
+                <a:ext uri="{FF2B5EF4-FFF2-40B4-BE49-F238E27FC236}">
+                  <a16:creationId xmlns:a16="http://schemas.microsoft.com/office/drawing/2014/main" id="{889949DB-3CE5-C27B-9EB1-25CDC888894B}"/>
+                </a:ext>
+              </a:extLst>
+            </p:cNvPr>
+            <p:cNvPicPr>
+              <a:picLocks noChangeAspect="1"/>
+            </p:cNvPicPr>
+            <p:nvPr/>
+          </p:nvPicPr>
+          <p:blipFill>
+            <a:blip r:embed="rId2">
+              <a:extLst>
+                <a:ext uri="{96DAC541-7B7A-43D3-8B79-37D633B846F1}">
+                  <asvg:svgBlip xmlns:asvg="http://schemas.microsoft.com/office/drawing/2016/SVG/main" r:embed="rId3"/>
+                </a:ext>
+              </a:extLst>
+            </a:blip>
+            <a:stretch>
+              <a:fillRect/>
+            </a:stretch>
+          </p:blipFill>
+          <p:spPr>
+            <a:xfrm>
+              <a:off x="7823842" y="2686050"/>
+              <a:ext cx="742950" cy="742950"/>
+            </a:xfrm>
+            <a:prstGeom prst="rect">
+              <a:avLst/>
+            </a:prstGeom>
+          </p:spPr>
+        </p:pic>
+      </p:grpSp>
+    </p:spTree>
+    <p:extLst>
+      <p:ext uri="{BB962C8B-B14F-4D97-AF65-F5344CB8AC3E}">
+        <p14:creationId xmlns:p14="http://schemas.microsoft.com/office/powerpoint/2010/main" val="3530226277"/>
+      </p:ext>
+    </p:extLst>
+  </p:cSld>
+  <p:clrMapOvr>
+    <a:masterClrMapping/>
+  </p:clrMapOvr>
+  <p:timing>
+    <p:tnLst>
+      <p:par>
+        <p:cTn id="1" dur="indefinite" restart="never" nodeType="tmRoot">
+          <p:childTnLst>
+            <p:seq concurrent="1" nextAc="seek">
+              <p:cTn id="2" dur="indefinite" nodeType="mainSeq">
+                <p:childTnLst>
+                  <p:par>
+                    <p:cTn id="3" fill="hold">
+                      <p:stCondLst>
+                        <p:cond delay="indefinite"/>
+                        <p:cond evt="onBegin" delay="0">
+                          <p:tn val="2"/>
+                        </p:cond>
+                      </p:stCondLst>
+                      <p:childTnLst>
+                        <p:par>
+                          <p:cTn id="4" fill="hold">
+                            <p:stCondLst>
+                              <p:cond delay="0"/>
+                            </p:stCondLst>
+                            <p:childTnLst>
+                              <p:par>
+                                <p:cTn id="5" presetID="1" presetClass="entr" presetSubtype="0" fill="hold" grpId="0" nodeType="withEffect">
+                                  <p:stCondLst>
+                                    <p:cond delay="0"/>
+                                  </p:stCondLst>
+                                  <p:childTnLst>
+                                    <p:set>
+                                      <p:cBhvr>
+                                        <p:cTn id="6" dur="1" fill="hold">
+                                          <p:stCondLst>
+                                            <p:cond delay="0"/>
+                                          </p:stCondLst>
+                                        </p:cTn>
+                                        <p:tgtEl>
+                                          <p:spTgt spid="3">
+                                            <p:txEl>
+                                              <p:pRg st="0" end="0"/>
+                                            </p:txEl>
+                                          </p:spTgt>
+                                        </p:tgtEl>
+                                        <p:attrNameLst>
+                                          <p:attrName>style.visibility</p:attrName>
+                                        </p:attrNameLst>
+                                      </p:cBhvr>
+                                      <p:to>
+                                        <p:strVal val="visible"/>
+                                      </p:to>
+                                    </p:set>
+                                  </p:childTnLst>
+                                </p:cTn>
+                              </p:par>
+                            </p:childTnLst>
+                          </p:cTn>
+                        </p:par>
+                      </p:childTnLst>
+                    </p:cTn>
+                  </p:par>
+                  <p:par>
+                    <p:cTn id="7" fill="hold">
+                      <p:stCondLst>
+                        <p:cond delay="indefinite"/>
+                      </p:stCondLst>
+                      <p:childTnLst>
+                        <p:par>
+                          <p:cTn id="8" fill="hold">
+                            <p:stCondLst>
+                              <p:cond delay="0"/>
+                            </p:stCondLst>
+                            <p:childTnLst>
+                              <p:par>
+                                <p:cTn id="9" presetID="1" presetClass="entr" presetSubtype="0" fill="hold" grpId="0" nodeType="clickEffect">
+                                  <p:stCondLst>
+                                    <p:cond delay="0"/>
+                                  </p:stCondLst>
+                                  <p:childTnLst>
+                                    <p:set>
+                                      <p:cBhvr>
+                                        <p:cTn id="10" dur="1" fill="hold">
+                                          <p:stCondLst>
+                                            <p:cond delay="0"/>
+                                          </p:stCondLst>
+                                        </p:cTn>
+                                        <p:tgtEl>
+                                          <p:spTgt spid="3">
+                                            <p:txEl>
+                                              <p:pRg st="1" end="1"/>
+                                            </p:txEl>
+                                          </p:spTgt>
+                                        </p:tgtEl>
+                                        <p:attrNameLst>
+                                          <p:attrName>style.visibility</p:attrName>
+                                        </p:attrNameLst>
+                                      </p:cBhvr>
+                                      <p:to>
+                                        <p:strVal val="visible"/>
+                                      </p:to>
+                                    </p:set>
+                                  </p:childTnLst>
+                                </p:cTn>
+                              </p:par>
+                            </p:childTnLst>
+                          </p:cTn>
+                        </p:par>
+                      </p:childTnLst>
+                    </p:cTn>
+                  </p:par>
+                  <p:par>
+                    <p:cTn id="11" fill="hold">
+                      <p:stCondLst>
+                        <p:cond delay="indefinite"/>
+                      </p:stCondLst>
+                      <p:childTnLst>
+                        <p:par>
+                          <p:cTn id="12" fill="hold">
+                            <p:stCondLst>
+                              <p:cond delay="0"/>
+                            </p:stCondLst>
+                            <p:childTnLst>
+                              <p:par>
+                                <p:cTn id="13" presetID="1" presetClass="entr" presetSubtype="0" fill="hold" grpId="0" nodeType="clickEffect">
+                                  <p:stCondLst>
+                                    <p:cond delay="0"/>
+                                  </p:stCondLst>
+                                  <p:childTnLst>
+                                    <p:set>
+                                      <p:cBhvr>
+                                        <p:cTn id="14" dur="1" fill="hold">
+                                          <p:stCondLst>
+                                            <p:cond delay="0"/>
+                                          </p:stCondLst>
+                                        </p:cTn>
+                                        <p:tgtEl>
+                                          <p:spTgt spid="3">
+                                            <p:txEl>
+                                              <p:pRg st="2" end="2"/>
+                                            </p:txEl>
+                                          </p:spTgt>
+                                        </p:tgtEl>
+                                        <p:attrNameLst>
+                                          <p:attrName>style.visibility</p:attrName>
+                                        </p:attrNameLst>
+                                      </p:cBhvr>
+                                      <p:to>
+                                        <p:strVal val="visible"/>
+                                      </p:to>
+                                    </p:set>
+                                  </p:childTnLst>
+                                </p:cTn>
+                              </p:par>
+                              <p:par>
+                                <p:cTn id="15" presetID="1" presetClass="entr" presetSubtype="0" fill="hold" grpId="0" nodeType="withEffect">
+                                  <p:stCondLst>
+                                    <p:cond delay="0"/>
+                                  </p:stCondLst>
+                                  <p:childTnLst>
+                                    <p:set>
+                                      <p:cBhvr>
+                                        <p:cTn id="16" dur="1" fill="hold">
+                                          <p:stCondLst>
+                                            <p:cond delay="0"/>
+                                          </p:stCondLst>
+                                        </p:cTn>
+                                        <p:tgtEl>
+                                          <p:spTgt spid="3">
+                                            <p:txEl>
+                                              <p:pRg st="3" end="3"/>
+                                            </p:txEl>
+                                          </p:spTgt>
+                                        </p:tgtEl>
+                                        <p:attrNameLst>
+                                          <p:attrName>style.visibility</p:attrName>
+                                        </p:attrNameLst>
+                                      </p:cBhvr>
+                                      <p:to>
+                                        <p:strVal val="visible"/>
+                                      </p:to>
+                                    </p:set>
+                                  </p:childTnLst>
+                                </p:cTn>
+                              </p:par>
+                              <p:par>
+                                <p:cTn id="17" presetID="1" presetClass="entr" presetSubtype="0" fill="hold" grpId="0" nodeType="withEffect">
+                                  <p:stCondLst>
+                                    <p:cond delay="0"/>
+                                  </p:stCondLst>
+                                  <p:childTnLst>
+                                    <p:set>
+                                      <p:cBhvr>
+                                        <p:cTn id="18" dur="1" fill="hold">
+                                          <p:stCondLst>
+                                            <p:cond delay="0"/>
+                                          </p:stCondLst>
+                                        </p:cTn>
+                                        <p:tgtEl>
+                                          <p:spTgt spid="3">
+                                            <p:txEl>
+                                              <p:pRg st="4" end="4"/>
+                                            </p:txEl>
+                                          </p:spTgt>
+                                        </p:tgtEl>
+                                        <p:attrNameLst>
+                                          <p:attrName>style.visibility</p:attrName>
+                                        </p:attrNameLst>
+                                      </p:cBhvr>
+                                      <p:to>
+                                        <p:strVal val="visible"/>
+                                      </p:to>
+                                    </p:set>
+                                  </p:childTnLst>
+                                </p:cTn>
+                              </p:par>
+                              <p:par>
+                                <p:cTn id="19" presetID="1" presetClass="entr" presetSubtype="0" fill="hold" grpId="0" nodeType="withEffect">
+                                  <p:stCondLst>
+                                    <p:cond delay="0"/>
+                                  </p:stCondLst>
+                                  <p:childTnLst>
+                                    <p:set>
+                                      <p:cBhvr>
+                                        <p:cTn id="20" dur="1" fill="hold">
+                                          <p:stCondLst>
+                                            <p:cond delay="0"/>
+                                          </p:stCondLst>
+                                        </p:cTn>
+                                        <p:tgtEl>
+                                          <p:spTgt spid="3">
+                                            <p:txEl>
+                                              <p:pRg st="5" end="5"/>
+                                            </p:txEl>
+                                          </p:spTgt>
+                                        </p:tgtEl>
+                                        <p:attrNameLst>
+                                          <p:attrName>style.visibility</p:attrName>
+                                        </p:attrNameLst>
+                                      </p:cBhvr>
+                                      <p:to>
+                                        <p:strVal val="visible"/>
+                                      </p:to>
+                                    </p:set>
+                                  </p:childTnLst>
+                                </p:cTn>
+                              </p:par>
+                              <p:par>
+                                <p:cTn id="21" presetID="1" presetClass="entr" presetSubtype="0" fill="hold" grpId="0" nodeType="withEffect">
+                                  <p:stCondLst>
+                                    <p:cond delay="0"/>
+                                  </p:stCondLst>
+                                  <p:childTnLst>
+                                    <p:set>
+                                      <p:cBhvr>
+                                        <p:cTn id="22" dur="1" fill="hold">
+                                          <p:stCondLst>
+                                            <p:cond delay="0"/>
+                                          </p:stCondLst>
+                                        </p:cTn>
+                                        <p:tgtEl>
+                                          <p:spTgt spid="3">
+                                            <p:txEl>
+                                              <p:pRg st="6" end="6"/>
+                                            </p:txEl>
+                                          </p:spTgt>
+                                        </p:tgtEl>
+                                        <p:attrNameLst>
+                                          <p:attrName>style.visibility</p:attrName>
+                                        </p:attrNameLst>
+                                      </p:cBhvr>
+                                      <p:to>
+                                        <p:strVal val="visible"/>
+                                      </p:to>
+                                    </p:set>
+                                  </p:childTnLst>
+                                </p:cTn>
+                              </p:par>
+                            </p:childTnLst>
+                          </p:cTn>
+                        </p:par>
+                      </p:childTnLst>
+                    </p:cTn>
+                  </p:par>
+                  <p:par>
+                    <p:cTn id="23" fill="hold">
+                      <p:stCondLst>
+                        <p:cond delay="indefinite"/>
+                      </p:stCondLst>
+                      <p:childTnLst>
+                        <p:par>
+                          <p:cTn id="24" fill="hold">
+                            <p:stCondLst>
+                              <p:cond delay="0"/>
+                            </p:stCondLst>
+                            <p:childTnLst>
+                              <p:par>
+                                <p:cTn id="25" presetID="1" presetClass="entr" presetSubtype="0" fill="hold" grpId="0" nodeType="clickEffect">
+                                  <p:stCondLst>
+                                    <p:cond delay="0"/>
+                                  </p:stCondLst>
+                                  <p:childTnLst>
+                                    <p:set>
+                                      <p:cBhvr>
+                                        <p:cTn id="26" dur="1" fill="hold">
+                                          <p:stCondLst>
+                                            <p:cond delay="0"/>
+                                          </p:stCondLst>
+                                        </p:cTn>
+                                        <p:tgtEl>
+                                          <p:spTgt spid="3">
+                                            <p:txEl>
+                                              <p:pRg st="7" end="7"/>
+                                            </p:txEl>
+                                          </p:spTgt>
+                                        </p:tgtEl>
+                                        <p:attrNameLst>
+                                          <p:attrName>style.visibility</p:attrName>
+                                        </p:attrNameLst>
+                                      </p:cBhvr>
+                                      <p:to>
+                                        <p:strVal val="visible"/>
+                                      </p:to>
+                                    </p:set>
+                                  </p:childTnLst>
+                                </p:cTn>
+                              </p:par>
+                              <p:par>
+                                <p:cTn id="27" presetID="1" presetClass="entr" presetSubtype="0" fill="hold" grpId="0" nodeType="withEffect">
+                                  <p:stCondLst>
+                                    <p:cond delay="0"/>
+                                  </p:stCondLst>
+                                  <p:childTnLst>
+                                    <p:set>
+                                      <p:cBhvr>
+                                        <p:cTn id="28" dur="1" fill="hold">
+                                          <p:stCondLst>
+                                            <p:cond delay="0"/>
+                                          </p:stCondLst>
+                                        </p:cTn>
+                                        <p:tgtEl>
+                                          <p:spTgt spid="3">
+                                            <p:txEl>
+                                              <p:pRg st="8" end="8"/>
+                                            </p:txEl>
+                                          </p:spTgt>
+                                        </p:tgtEl>
+                                        <p:attrNameLst>
+                                          <p:attrName>style.visibility</p:attrName>
+                                        </p:attrNameLst>
+                                      </p:cBhvr>
+                                      <p:to>
+                                        <p:strVal val="visible"/>
+                                      </p:to>
+                                    </p:set>
+                                  </p:childTnLst>
+                                </p:cTn>
+                              </p:par>
+                            </p:childTnLst>
+                          </p:cTn>
+                        </p:par>
+                      </p:childTnLst>
+                    </p:cTn>
+                  </p:par>
+                  <p:par>
+                    <p:cTn id="29" fill="hold">
+                      <p:stCondLst>
+                        <p:cond delay="indefinite"/>
+                      </p:stCondLst>
+                      <p:childTnLst>
+                        <p:par>
+                          <p:cTn id="30" fill="hold">
+                            <p:stCondLst>
+                              <p:cond delay="0"/>
+                            </p:stCondLst>
+                            <p:childTnLst>
+                              <p:par>
+                                <p:cTn id="31" presetID="1" presetClass="entr" presetSubtype="0" fill="hold" grpId="0" nodeType="clickEffect">
+                                  <p:stCondLst>
+                                    <p:cond delay="0"/>
+                                  </p:stCondLst>
+                                  <p:childTnLst>
+                                    <p:set>
+                                      <p:cBhvr>
+                                        <p:cTn id="32" dur="1" fill="hold">
+                                          <p:stCondLst>
+                                            <p:cond delay="0"/>
+                                          </p:stCondLst>
+                                        </p:cTn>
+                                        <p:tgtEl>
+                                          <p:spTgt spid="3">
+                                            <p:txEl>
+                                              <p:pRg st="9" end="9"/>
+                                            </p:txEl>
+                                          </p:spTgt>
+                                        </p:tgtEl>
+                                        <p:attrNameLst>
+                                          <p:attrName>style.visibility</p:attrName>
+                                        </p:attrNameLst>
+                                      </p:cBhvr>
+                                      <p:to>
+                                        <p:strVal val="visible"/>
+                                      </p:to>
+                                    </p:set>
+                                  </p:childTnLst>
+                                </p:cTn>
+                              </p:par>
+                            </p:childTnLst>
+                          </p:cTn>
+                        </p:par>
+                      </p:childTnLst>
+                    </p:cTn>
+                  </p:par>
+                  <p:par>
+                    <p:cTn id="33" fill="hold">
+                      <p:stCondLst>
+                        <p:cond delay="indefinite"/>
+                      </p:stCondLst>
+                      <p:childTnLst>
+                        <p:par>
+                          <p:cTn id="34" fill="hold">
+                            <p:stCondLst>
+                              <p:cond delay="0"/>
+                            </p:stCondLst>
+                            <p:childTnLst>
+                              <p:par>
+                                <p:cTn id="35" presetID="1" presetClass="entr" presetSubtype="0" fill="hold" grpId="0" nodeType="clickEffect">
+                                  <p:stCondLst>
+                                    <p:cond delay="0"/>
+                                  </p:stCondLst>
+                                  <p:childTnLst>
+                                    <p:set>
+                                      <p:cBhvr>
+                                        <p:cTn id="36" dur="1" fill="hold">
+                                          <p:stCondLst>
+                                            <p:cond delay="0"/>
+                                          </p:stCondLst>
+                                        </p:cTn>
+                                        <p:tgtEl>
+                                          <p:spTgt spid="3">
+                                            <p:txEl>
+                                              <p:pRg st="10" end="10"/>
+                                            </p:txEl>
+                                          </p:spTgt>
+                                        </p:tgtEl>
+                                        <p:attrNameLst>
+                                          <p:attrName>style.visibility</p:attrName>
+                                        </p:attrNameLst>
+                                      </p:cBhvr>
+                                      <p:to>
+                                        <p:strVal val="visible"/>
+                                      </p:to>
+                                    </p:set>
+                                  </p:childTnLst>
+                                </p:cTn>
+                              </p:par>
+                              <p:par>
+                                <p:cTn id="37" presetID="1" presetClass="entr" presetSubtype="0" fill="hold" grpId="0" nodeType="withEffect">
+                                  <p:stCondLst>
+                                    <p:cond delay="0"/>
+                                  </p:stCondLst>
+                                  <p:childTnLst>
+                                    <p:set>
+                                      <p:cBhvr>
+                                        <p:cTn id="38" dur="1" fill="hold">
+                                          <p:stCondLst>
+                                            <p:cond delay="0"/>
+                                          </p:stCondLst>
+                                        </p:cTn>
+                                        <p:tgtEl>
+                                          <p:spTgt spid="3">
+                                            <p:txEl>
+                                              <p:pRg st="11" end="11"/>
+                                            </p:txEl>
+                                          </p:spTgt>
+                                        </p:tgtEl>
+                                        <p:attrNameLst>
+                                          <p:attrName>style.visibility</p:attrName>
+                                        </p:attrNameLst>
+                                      </p:cBhvr>
+                                      <p:to>
+                                        <p:strVal val="visible"/>
+                                      </p:to>
+                                    </p:set>
+                                  </p:childTnLst>
+                                </p:cTn>
+                              </p:par>
+                            </p:childTnLst>
+                          </p:cTn>
+                        </p:par>
+                      </p:childTnLst>
+                    </p:cTn>
+                  </p:par>
+                  <p:par>
+                    <p:cTn id="39" fill="hold">
+                      <p:stCondLst>
+                        <p:cond delay="indefinite"/>
+                      </p:stCondLst>
+                      <p:childTnLst>
+                        <p:par>
+                          <p:cTn id="40" fill="hold">
+                            <p:stCondLst>
+                              <p:cond delay="0"/>
+                            </p:stCondLst>
+                            <p:childTnLst>
+                              <p:par>
+                                <p:cTn id="41" presetID="1" presetClass="entr" presetSubtype="0" fill="hold" grpId="0" nodeType="clickEffect">
+                                  <p:stCondLst>
+                                    <p:cond delay="0"/>
+                                  </p:stCondLst>
+                                  <p:childTnLst>
+                                    <p:set>
+                                      <p:cBhvr>
+                                        <p:cTn id="42" dur="1" fill="hold">
+                                          <p:stCondLst>
+                                            <p:cond delay="0"/>
+                                          </p:stCondLst>
+                                        </p:cTn>
+                                        <p:tgtEl>
+                                          <p:spTgt spid="3">
+                                            <p:txEl>
+                                              <p:pRg st="12" end="12"/>
+                                            </p:txEl>
+                                          </p:spTgt>
+                                        </p:tgtEl>
+                                        <p:attrNameLst>
+                                          <p:attrName>style.visibility</p:attrName>
+                                        </p:attrNameLst>
+                                      </p:cBhvr>
+                                      <p:to>
+                                        <p:strVal val="visible"/>
+                                      </p:to>
+                                    </p:set>
+                                  </p:childTnLst>
+                                </p:cTn>
+                              </p:par>
+                            </p:childTnLst>
+                          </p:cTn>
+                        </p:par>
+                      </p:childTnLst>
+                    </p:cTn>
+                  </p:par>
+                  <p:par>
+                    <p:cTn id="43" fill="hold">
+                      <p:stCondLst>
+                        <p:cond delay="indefinite"/>
+                      </p:stCondLst>
+                      <p:childTnLst>
+                        <p:par>
+                          <p:cTn id="44" fill="hold">
+                            <p:stCondLst>
+                              <p:cond delay="0"/>
+                            </p:stCondLst>
+                            <p:childTnLst>
+                              <p:par>
+                                <p:cTn id="45" presetID="1" presetClass="entr" presetSubtype="0" fill="hold" nodeType="clickEffect">
+                                  <p:stCondLst>
+                                    <p:cond delay="0"/>
+                                  </p:stCondLst>
+                                  <p:childTnLst>
+                                    <p:set>
+                                      <p:cBhvr>
+                                        <p:cTn id="46" dur="1" fill="hold">
+                                          <p:stCondLst>
+                                            <p:cond delay="0"/>
+                                          </p:stCondLst>
+                                        </p:cTn>
+                                        <p:tgtEl>
+                                          <p:spTgt spid="8"/>
+                                        </p:tgtEl>
+                                        <p:attrNameLst>
+                                          <p:attrName>style.visibility</p:attrName>
+                                        </p:attrNameLst>
+                                      </p:cBhvr>
+                                      <p:to>
+                                        <p:strVal val="visible"/>
+                                      </p:to>
+                                    </p:set>
+                                  </p:childTnLst>
+                                </p:cTn>
+                              </p:par>
+                            </p:childTnLst>
+                          </p:cTn>
+                        </p:par>
+                      </p:childTnLst>
+                    </p:cTn>
+                  </p:par>
+                </p:childTnLst>
+              </p:cTn>
+              <p:prevCondLst>
+                <p:cond evt="onPrev" delay="0">
+                  <p:tgtEl>
+                    <p:sldTgt/>
+                  </p:tgtEl>
+                </p:cond>
+              </p:prevCondLst>
+              <p:nextCondLst>
+                <p:cond evt="onNext" delay="0">
+                  <p:tgtEl>
+                    <p:sldTgt/>
+                  </p:tgtEl>
+                </p:cond>
+              </p:nextCondLst>
+            </p:seq>
+          </p:childTnLst>
+        </p:cTn>
+      </p:par>
+    </p:tnLst>
+    <p:bldLst>
+      <p:bldP spid="3" grpId="0" uiExpand="1" build="p" bldLvl="2"/>
+    </p:bldLst>
+  </p:timing>
+</p:sld>
+</file>
+
+<file path=ppt/slides/slide53.xml><?xml version="1.0" encoding="utf-8"?>
+<p:sld xmlns:a="http://schemas.openxmlformats.org/drawingml/2006/main" xmlns:r="http://schemas.openxmlformats.org/officeDocument/2006/relationships" xmlns:p="http://schemas.openxmlformats.org/presentationml/2006/main">
+  <p:cSld>
+    <p:spTree>
+      <p:nvGrpSpPr>
+        <p:cNvPr id="1" name=""/>
+        <p:cNvGrpSpPr/>
+        <p:nvPr/>
+      </p:nvGrpSpPr>
+      <p:grpSpPr>
+        <a:xfrm>
+          <a:off x="0" y="0"/>
+          <a:ext cx="0" cy="0"/>
+          <a:chOff x="0" y="0"/>
+          <a:chExt cx="0" cy="0"/>
+        </a:xfrm>
+      </p:grpSpPr>
+      <p:sp>
+        <p:nvSpPr>
+          <p:cNvPr id="2" name="Title 1">
+            <a:extLst>
+              <a:ext uri="{FF2B5EF4-FFF2-40B4-BE49-F238E27FC236}">
+                <a16:creationId xmlns:a16="http://schemas.microsoft.com/office/drawing/2014/main" id="{F067AD92-71A8-7E2F-1FC6-42723E309A2F}"/>
+              </a:ext>
+            </a:extLst>
+          </p:cNvPr>
+          <p:cNvSpPr>
+            <a:spLocks noGrp="1"/>
+          </p:cNvSpPr>
+          <p:nvPr>
+            <p:ph type="title"/>
+          </p:nvPr>
+        </p:nvSpPr>
+        <p:spPr/>
+        <p:txBody>
+          <a:bodyPr/>
+          <a:lstStyle/>
+          <a:p>
+            <a:r>
+              <a:rPr lang="en-US" dirty="0"/>
+              <a:t>Base images</a:t>
+            </a:r>
+            <a:endParaRPr lang="LID4096" dirty="0"/>
+          </a:p>
+        </p:txBody>
+      </p:sp>
+      <p:sp>
+        <p:nvSpPr>
+          <p:cNvPr id="3" name="Content Placeholder 2">
+            <a:extLst>
+              <a:ext uri="{FF2B5EF4-FFF2-40B4-BE49-F238E27FC236}">
+                <a16:creationId xmlns:a16="http://schemas.microsoft.com/office/drawing/2014/main" id="{802B81B1-19B2-0058-0700-D99FC70817E0}"/>
+              </a:ext>
+            </a:extLst>
+          </p:cNvPr>
+          <p:cNvSpPr>
+            <a:spLocks noGrp="1"/>
+          </p:cNvSpPr>
+          <p:nvPr>
+            <p:ph idx="1"/>
+          </p:nvPr>
+        </p:nvSpPr>
+        <p:spPr/>
+        <p:txBody>
+          <a:bodyPr/>
+          <a:lstStyle/>
+          <a:p>
+            <a:r>
+              <a:rPr lang="en-US" dirty="0"/>
+              <a:t>Intel </a:t>
+            </a:r>
+            <a:r>
+              <a:rPr lang="en-US" dirty="0" err="1"/>
+              <a:t>OneAPI</a:t>
+            </a:r>
+            <a:br>
+              <a:rPr lang="en-US" dirty="0"/>
+            </a:br>
+            <a:r>
+              <a:rPr lang="en-US" sz="2000" dirty="0">
+                <a:hlinkClick r:id="rId2"/>
+              </a:rPr>
+              <a:t>https://github.com/intel/oneapi-containers</a:t>
+            </a:r>
+            <a:r>
+              <a:rPr lang="en-US" sz="2000" dirty="0"/>
+              <a:t> </a:t>
+            </a:r>
+          </a:p>
+          <a:p>
+            <a:pPr lvl="1"/>
+            <a:r>
+              <a:rPr lang="en-US" dirty="0"/>
+              <a:t>C/C++/Fortran compilers</a:t>
+            </a:r>
+          </a:p>
+          <a:p>
+            <a:pPr lvl="1"/>
+            <a:r>
+              <a:rPr lang="en-US" dirty="0"/>
+              <a:t>SYCL/TBB</a:t>
+            </a:r>
+          </a:p>
+          <a:p>
+            <a:pPr lvl="1"/>
+            <a:r>
+              <a:rPr lang="en-US" dirty="0"/>
+              <a:t>MPI</a:t>
+            </a:r>
+          </a:p>
+          <a:p>
+            <a:r>
+              <a:rPr lang="en-US" dirty="0"/>
+              <a:t>NVIDIA HPC Toolkit</a:t>
+            </a:r>
+            <a:br>
+              <a:rPr lang="en-US" dirty="0"/>
+            </a:br>
+            <a:r>
+              <a:rPr lang="en-US" sz="2000" dirty="0">
+                <a:hlinkClick r:id="rId3"/>
+              </a:rPr>
+              <a:t>https://catalog.ngc.nvidia.com/orgs/nvidia/containers/nvhpc</a:t>
+            </a:r>
+            <a:r>
+              <a:rPr lang="en-US" sz="2000" dirty="0"/>
+              <a:t> </a:t>
+            </a:r>
+            <a:endParaRPr lang="LID4096" dirty="0"/>
+          </a:p>
+        </p:txBody>
+      </p:sp>
+      <p:sp>
+        <p:nvSpPr>
+          <p:cNvPr id="4" name="Slide Number Placeholder 3">
+            <a:extLst>
+              <a:ext uri="{FF2B5EF4-FFF2-40B4-BE49-F238E27FC236}">
+                <a16:creationId xmlns:a16="http://schemas.microsoft.com/office/drawing/2014/main" id="{CABFCBED-2927-C601-A960-5E8BD754EF72}"/>
+              </a:ext>
+            </a:extLst>
+          </p:cNvPr>
+          <p:cNvSpPr>
+            <a:spLocks noGrp="1"/>
+          </p:cNvSpPr>
+          <p:nvPr>
+            <p:ph type="sldNum" sz="quarter" idx="12"/>
+          </p:nvPr>
+        </p:nvSpPr>
+        <p:spPr/>
+        <p:txBody>
+          <a:bodyPr/>
+          <a:lstStyle/>
+          <a:p>
+            <a:fld id="{AEFF399F-E3B5-4890-BC79-9BC8D4DF3F2D}" type="slidenum">
+              <a:rPr lang="nl-BE" smtClean="0"/>
+              <a:t>53</a:t>
+            </a:fld>
+            <a:endParaRPr lang="nl-BE"/>
+          </a:p>
+        </p:txBody>
+      </p:sp>
+      <p:sp>
+        <p:nvSpPr>
+          <p:cNvPr id="5" name="TextBox 4">
+            <a:extLst>
+              <a:ext uri="{FF2B5EF4-FFF2-40B4-BE49-F238E27FC236}">
+                <a16:creationId xmlns:a16="http://schemas.microsoft.com/office/drawing/2014/main" id="{59005044-A9BE-FB01-CB5F-F1C25A7E0A8A}"/>
+              </a:ext>
+            </a:extLst>
+          </p:cNvPr>
+          <p:cNvSpPr txBox="1"/>
+          <p:nvPr/>
+        </p:nvSpPr>
+        <p:spPr>
+          <a:xfrm>
+            <a:off x="2576945" y="5018808"/>
+            <a:ext cx="3793283" cy="461665"/>
+          </a:xfrm>
+          <a:prstGeom prst="rect">
+            <a:avLst/>
+          </a:prstGeom>
+          <a:solidFill>
+            <a:schemeClr val="bg1"/>
+          </a:solidFill>
+          <a:ln>
+            <a:solidFill>
+              <a:schemeClr val="tx1"/>
+            </a:solidFill>
+          </a:ln>
+        </p:spPr>
+        <p:txBody>
+          <a:bodyPr wrap="none" rtlCol="0">
+            <a:spAutoFit/>
+          </a:bodyPr>
+          <a:lstStyle/>
+          <a:p>
+            <a:r>
+              <a:rPr lang="en-US" sz="2400" dirty="0"/>
+              <a:t>Add your own requirements!</a:t>
+            </a:r>
+            <a:endParaRPr lang="LID4096" sz="2400" dirty="0"/>
+          </a:p>
+        </p:txBody>
+      </p:sp>
+    </p:spTree>
+    <p:extLst>
+      <p:ext uri="{BB962C8B-B14F-4D97-AF65-F5344CB8AC3E}">
+        <p14:creationId xmlns:p14="http://schemas.microsoft.com/office/powerpoint/2010/main" val="2111193207"/>
+      </p:ext>
+    </p:extLst>
+  </p:cSld>
+  <p:clrMapOvr>
+    <a:masterClrMapping/>
+  </p:clrMapOvr>
+  <p:timing>
+    <p:tnLst>
+      <p:par>
+        <p:cTn id="1" dur="indefinite" restart="never" nodeType="tmRoot">
+          <p:childTnLst>
+            <p:seq concurrent="1" nextAc="seek">
+              <p:cTn id="2" dur="indefinite" nodeType="mainSeq">
+                <p:childTnLst>
+                  <p:par>
+                    <p:cTn id="3" fill="hold">
+                      <p:stCondLst>
+                        <p:cond delay="indefinite"/>
+                        <p:cond evt="onBegin" delay="0">
+                          <p:tn val="2"/>
+                        </p:cond>
+                      </p:stCondLst>
+                      <p:childTnLst>
+                        <p:par>
+                          <p:cTn id="4" fill="hold">
+                            <p:stCondLst>
+                              <p:cond delay="0"/>
+                            </p:stCondLst>
+                            <p:childTnLst>
+                              <p:par>
+                                <p:cTn id="5" presetID="1" presetClass="entr" presetSubtype="0" fill="hold" grpId="0" nodeType="withEffect">
+                                  <p:stCondLst>
+                                    <p:cond delay="0"/>
+                                  </p:stCondLst>
+                                  <p:childTnLst>
+                                    <p:set>
+                                      <p:cBhvr>
+                                        <p:cTn id="6" dur="1" fill="hold">
+                                          <p:stCondLst>
+                                            <p:cond delay="0"/>
+                                          </p:stCondLst>
+                                        </p:cTn>
+                                        <p:tgtEl>
+                                          <p:spTgt spid="3">
+                                            <p:txEl>
+                                              <p:pRg st="0" end="0"/>
+                                            </p:txEl>
+                                          </p:spTgt>
+                                        </p:tgtEl>
+                                        <p:attrNameLst>
+                                          <p:attrName>style.visibility</p:attrName>
+                                        </p:attrNameLst>
+                                      </p:cBhvr>
+                                      <p:to>
+                                        <p:strVal val="visible"/>
+                                      </p:to>
+                                    </p:set>
+                                  </p:childTnLst>
+                                </p:cTn>
+                              </p:par>
+                              <p:par>
+                                <p:cTn id="7" presetID="1" presetClass="entr" presetSubtype="0" fill="hold" grpId="0" nodeType="withEffect">
+                                  <p:stCondLst>
+                                    <p:cond delay="0"/>
+                                  </p:stCondLst>
+                                  <p:childTnLst>
+                                    <p:set>
+                                      <p:cBhvr>
+                                        <p:cTn id="8" dur="1" fill="hold">
+                                          <p:stCondLst>
+                                            <p:cond delay="0"/>
+                                          </p:stCondLst>
+                                        </p:cTn>
+                                        <p:tgtEl>
+                                          <p:spTgt spid="3">
+                                            <p:txEl>
+                                              <p:pRg st="1" end="1"/>
+                                            </p:txEl>
+                                          </p:spTgt>
+                                        </p:tgtEl>
+                                        <p:attrNameLst>
+                                          <p:attrName>style.visibility</p:attrName>
+                                        </p:attrNameLst>
+                                      </p:cBhvr>
+                                      <p:to>
+                                        <p:strVal val="visible"/>
+                                      </p:to>
+                                    </p:set>
+                                  </p:childTnLst>
+                                </p:cTn>
+                              </p:par>
+                              <p:par>
+                                <p:cTn id="9" presetID="1" presetClass="entr" presetSubtype="0" fill="hold" grpId="0" nodeType="withEffect">
+                                  <p:stCondLst>
+                                    <p:cond delay="0"/>
+                                  </p:stCondLst>
+                                  <p:childTnLst>
+                                    <p:set>
+                                      <p:cBhvr>
+                                        <p:cTn id="10" dur="1" fill="hold">
+                                          <p:stCondLst>
+                                            <p:cond delay="0"/>
+                                          </p:stCondLst>
+                                        </p:cTn>
+                                        <p:tgtEl>
+                                          <p:spTgt spid="3">
+                                            <p:txEl>
+                                              <p:pRg st="2" end="2"/>
+                                            </p:txEl>
+                                          </p:spTgt>
+                                        </p:tgtEl>
+                                        <p:attrNameLst>
+                                          <p:attrName>style.visibility</p:attrName>
+                                        </p:attrNameLst>
+                                      </p:cBhvr>
+                                      <p:to>
+                                        <p:strVal val="visible"/>
+                                      </p:to>
+                                    </p:set>
+                                  </p:childTnLst>
+                                </p:cTn>
+                              </p:par>
+                              <p:par>
+                                <p:cTn id="11" presetID="1" presetClass="entr" presetSubtype="0" fill="hold" grpId="0" nodeType="withEffect">
+                                  <p:stCondLst>
+                                    <p:cond delay="0"/>
+                                  </p:stCondLst>
+                                  <p:childTnLst>
+                                    <p:set>
+                                      <p:cBhvr>
+                                        <p:cTn id="12" dur="1" fill="hold">
+                                          <p:stCondLst>
+                                            <p:cond delay="0"/>
+                                          </p:stCondLst>
+                                        </p:cTn>
+                                        <p:tgtEl>
+                                          <p:spTgt spid="3">
+                                            <p:txEl>
+                                              <p:pRg st="3" end="3"/>
+                                            </p:txEl>
+                                          </p:spTgt>
+                                        </p:tgtEl>
+                                        <p:attrNameLst>
+                                          <p:attrName>style.visibility</p:attrName>
+                                        </p:attrNameLst>
+                                      </p:cBhvr>
+                                      <p:to>
+                                        <p:strVal val="visible"/>
+                                      </p:to>
+                                    </p:set>
+                                  </p:childTnLst>
+                                </p:cTn>
+                              </p:par>
+                            </p:childTnLst>
+                          </p:cTn>
+                        </p:par>
+                      </p:childTnLst>
+                    </p:cTn>
+                  </p:par>
+                  <p:par>
+                    <p:cTn id="13" fill="hold">
+                      <p:stCondLst>
+                        <p:cond delay="indefinite"/>
+                      </p:stCondLst>
+                      <p:childTnLst>
+                        <p:par>
+                          <p:cTn id="14" fill="hold">
+                            <p:stCondLst>
+                              <p:cond delay="0"/>
+                            </p:stCondLst>
+                            <p:childTnLst>
+                              <p:par>
+                                <p:cTn id="15" presetID="1" presetClass="entr" presetSubtype="0" fill="hold" grpId="0" nodeType="clickEffect">
+                                  <p:stCondLst>
+                                    <p:cond delay="0"/>
+                                  </p:stCondLst>
+                                  <p:childTnLst>
+                                    <p:set>
+                                      <p:cBhvr>
+                                        <p:cTn id="16" dur="1" fill="hold">
+                                          <p:stCondLst>
+                                            <p:cond delay="0"/>
+                                          </p:stCondLst>
+                                        </p:cTn>
+                                        <p:tgtEl>
+                                          <p:spTgt spid="3">
+                                            <p:txEl>
+                                              <p:pRg st="4" end="4"/>
+                                            </p:txEl>
+                                          </p:spTgt>
+                                        </p:tgtEl>
+                                        <p:attrNameLst>
+                                          <p:attrName>style.visibility</p:attrName>
+                                        </p:attrNameLst>
+                                      </p:cBhvr>
+                                      <p:to>
+                                        <p:strVal val="visible"/>
+                                      </p:to>
+                                    </p:set>
+                                  </p:childTnLst>
+                                </p:cTn>
+                              </p:par>
+                            </p:childTnLst>
+                          </p:cTn>
+                        </p:par>
+                      </p:childTnLst>
+                    </p:cTn>
+                  </p:par>
+                </p:childTnLst>
+              </p:cTn>
+              <p:prevCondLst>
+                <p:cond evt="onPrev" delay="0">
+                  <p:tgtEl>
+                    <p:sldTgt/>
+                  </p:tgtEl>
+                </p:cond>
+              </p:prevCondLst>
+              <p:nextCondLst>
+                <p:cond evt="onNext" delay="0">
+                  <p:tgtEl>
+                    <p:sldTgt/>
+                  </p:tgtEl>
+                </p:cond>
+              </p:nextCondLst>
+            </p:seq>
+          </p:childTnLst>
+        </p:cTn>
+      </p:par>
+    </p:tnLst>
+    <p:bldLst>
+      <p:bldP spid="3" grpId="0" uiExpand="1" build="p"/>
+    </p:bldLst>
+  </p:timing>
+</p:sld>
+</file>
+
+<file path=ppt/slides/slide54.xml><?xml version="1.0" encoding="utf-8"?>
 <p:sld xmlns:a="http://schemas.openxmlformats.org/drawingml/2006/main" xmlns:r="http://schemas.openxmlformats.org/officeDocument/2006/relationships" xmlns:p="http://schemas.openxmlformats.org/presentationml/2006/main">
   <p:cSld>
     <p:spTree>
@@ -29611,6 +31110,100 @@
           <a:p>
             <a:r>
               <a:rPr lang="en-US" dirty="0"/>
+              <a:t>Services</a:t>
+            </a:r>
+          </a:p>
+        </p:txBody>
+      </p:sp>
+      <p:sp>
+        <p:nvSpPr>
+          <p:cNvPr id="3" name="Text Placeholder 2"/>
+          <p:cNvSpPr>
+            <a:spLocks noGrp="1"/>
+          </p:cNvSpPr>
+          <p:nvPr>
+            <p:ph type="body" idx="1"/>
+          </p:nvPr>
+        </p:nvSpPr>
+        <p:spPr/>
+        <p:txBody>
+          <a:bodyPr/>
+          <a:lstStyle/>
+          <a:p>
+            <a:endParaRPr lang="en-US"/>
+          </a:p>
+        </p:txBody>
+      </p:sp>
+      <p:sp>
+        <p:nvSpPr>
+          <p:cNvPr id="4" name="Slide Number Placeholder 3"/>
+          <p:cNvSpPr>
+            <a:spLocks noGrp="1"/>
+          </p:cNvSpPr>
+          <p:nvPr>
+            <p:ph type="sldNum" sz="quarter" idx="12"/>
+          </p:nvPr>
+        </p:nvSpPr>
+        <p:spPr/>
+        <p:txBody>
+          <a:bodyPr/>
+          <a:lstStyle/>
+          <a:p>
+            <a:fld id="{AEFF399F-E3B5-4890-BC79-9BC8D4DF3F2D}" type="slidenum">
+              <a:rPr lang="nl-BE" smtClean="0"/>
+              <a:t>54</a:t>
+            </a:fld>
+            <a:endParaRPr lang="nl-BE"/>
+          </a:p>
+        </p:txBody>
+      </p:sp>
+    </p:spTree>
+    <p:extLst>
+      <p:ext uri="{BB962C8B-B14F-4D97-AF65-F5344CB8AC3E}">
+        <p14:creationId xmlns:p14="http://schemas.microsoft.com/office/powerpoint/2010/main" val="1160171864"/>
+      </p:ext>
+    </p:extLst>
+  </p:cSld>
+  <p:clrMapOvr>
+    <a:masterClrMapping/>
+  </p:clrMapOvr>
+</p:sld>
+</file>
+
+<file path=ppt/slides/slide55.xml><?xml version="1.0" encoding="utf-8"?>
+<p:sld xmlns:a="http://schemas.openxmlformats.org/drawingml/2006/main" xmlns:r="http://schemas.openxmlformats.org/officeDocument/2006/relationships" xmlns:p="http://schemas.openxmlformats.org/presentationml/2006/main">
+  <p:cSld>
+    <p:spTree>
+      <p:nvGrpSpPr>
+        <p:cNvPr id="1" name=""/>
+        <p:cNvGrpSpPr/>
+        <p:nvPr/>
+      </p:nvGrpSpPr>
+      <p:grpSpPr>
+        <a:xfrm>
+          <a:off x="0" y="0"/>
+          <a:ext cx="0" cy="0"/>
+          <a:chOff x="0" y="0"/>
+          <a:chExt cx="0" cy="0"/>
+        </a:xfrm>
+      </p:grpSpPr>
+      <p:sp>
+        <p:nvSpPr>
+          <p:cNvPr id="2" name="Title 1"/>
+          <p:cNvSpPr>
+            <a:spLocks noGrp="1"/>
+          </p:cNvSpPr>
+          <p:nvPr>
+            <p:ph type="title"/>
+          </p:nvPr>
+        </p:nvSpPr>
+        <p:spPr/>
+        <p:txBody>
+          <a:bodyPr/>
+          <a:lstStyle/>
+          <a:p>
+            <a:r>
+              <a:rPr lang="en-US" dirty="0"/>
               <a:t>Server processes</a:t>
             </a:r>
           </a:p>
@@ -29715,7 +31308,7 @@
           <a:p>
             <a:fld id="{AEFF399F-E3B5-4890-BC79-9BC8D4DF3F2D}" type="slidenum">
               <a:rPr lang="nl-BE" smtClean="0"/>
-              <a:t>52</a:t>
+              <a:t>55</a:t>
             </a:fld>
             <a:endParaRPr lang="nl-BE"/>
           </a:p>
@@ -30326,7 +31919,7 @@
 </p:sld>
 </file>
 
-<file path=ppt/slides/slide53.xml><?xml version="1.0" encoding="utf-8"?>
+<file path=ppt/slides/slide56.xml><?xml version="1.0" encoding="utf-8"?>
 <p:sld xmlns:a="http://schemas.openxmlformats.org/drawingml/2006/main" xmlns:r="http://schemas.openxmlformats.org/officeDocument/2006/relationships" xmlns:p="http://schemas.openxmlformats.org/presentationml/2006/main">
   <p:cSld>
     <p:spTree>
@@ -30382,7 +31975,7 @@
           <a:p>
             <a:fld id="{AEFF399F-E3B5-4890-BC79-9BC8D4DF3F2D}" type="slidenum">
               <a:rPr lang="nl-BE" smtClean="0"/>
-              <a:t>53</a:t>
+              <a:t>56</a:t>
             </a:fld>
             <a:endParaRPr lang="nl-BE"/>
           </a:p>
@@ -31146,7 +32739,7 @@
 </p:sld>
 </file>
 
-<file path=ppt/slides/slide54.xml><?xml version="1.0" encoding="utf-8"?>
+<file path=ppt/slides/slide57.xml><?xml version="1.0" encoding="utf-8"?>
 <p:sld xmlns:a="http://schemas.openxmlformats.org/drawingml/2006/main" xmlns:r="http://schemas.openxmlformats.org/officeDocument/2006/relationships" xmlns:p="http://schemas.openxmlformats.org/presentationml/2006/main">
   <p:cSld>
     <p:spTree>
@@ -31202,7 +32795,7 @@
           <a:p>
             <a:fld id="{AEFF399F-E3B5-4890-BC79-9BC8D4DF3F2D}" type="slidenum">
               <a:rPr lang="nl-BE" smtClean="0"/>
-              <a:t>54</a:t>
+              <a:t>57</a:t>
             </a:fld>
             <a:endParaRPr lang="nl-BE"/>
           </a:p>
@@ -32090,7 +33683,7 @@
 </p:sld>
 </file>
 
-<file path=ppt/slides/slide55.xml><?xml version="1.0" encoding="utf-8"?>
+<file path=ppt/slides/slide58.xml><?xml version="1.0" encoding="utf-8"?>
 <p:sld xmlns:a="http://schemas.openxmlformats.org/drawingml/2006/main" xmlns:r="http://schemas.openxmlformats.org/officeDocument/2006/relationships" xmlns:p="http://schemas.openxmlformats.org/presentationml/2006/main">
   <p:cSld>
     <p:spTree>
@@ -32198,7 +33791,7 @@
           <a:p>
             <a:fld id="{AEFF399F-E3B5-4890-BC79-9BC8D4DF3F2D}" type="slidenum">
               <a:rPr lang="nl-BE" smtClean="0"/>
-              <a:t>55</a:t>
+              <a:t>58</a:t>
             </a:fld>
             <a:endParaRPr lang="nl-BE" dirty="0"/>
           </a:p>
@@ -33066,7 +34659,7 @@
 </p:sld>
 </file>
 
-<file path=ppt/slides/slide56.xml><?xml version="1.0" encoding="utf-8"?>
+<file path=ppt/slides/slide59.xml><?xml version="1.0" encoding="utf-8"?>
 <p:sld xmlns:a="http://schemas.openxmlformats.org/drawingml/2006/main" xmlns:r="http://schemas.openxmlformats.org/officeDocument/2006/relationships" xmlns:p="http://schemas.openxmlformats.org/presentationml/2006/main">
   <p:cSld>
     <p:spTree>
@@ -33142,7 +34735,7 @@
           <a:p>
             <a:fld id="{AEFF399F-E3B5-4890-BC79-9BC8D4DF3F2D}" type="slidenum">
               <a:rPr lang="nl-BE" smtClean="0"/>
-              <a:t>56</a:t>
+              <a:t>59</a:t>
             </a:fld>
             <a:endParaRPr lang="nl-BE"/>
           </a:p>
@@ -33161,7 +34754,102 @@
 </p:sld>
 </file>
 
-<file path=ppt/slides/slide57.xml><?xml version="1.0" encoding="utf-8"?>
+<file path=ppt/slides/slide6.xml><?xml version="1.0" encoding="utf-8"?>
+<p:sld xmlns:a="http://schemas.openxmlformats.org/drawingml/2006/main" xmlns:r="http://schemas.openxmlformats.org/officeDocument/2006/relationships" xmlns:p="http://schemas.openxmlformats.org/presentationml/2006/main">
+  <p:cSld>
+    <p:spTree>
+      <p:nvGrpSpPr>
+        <p:cNvPr id="1" name=""/>
+        <p:cNvGrpSpPr/>
+        <p:nvPr/>
+      </p:nvGrpSpPr>
+      <p:grpSpPr>
+        <a:xfrm>
+          <a:off x="0" y="0"/>
+          <a:ext cx="0" cy="0"/>
+          <a:chOff x="0" y="0"/>
+          <a:chExt cx="0" cy="0"/>
+        </a:xfrm>
+      </p:grpSpPr>
+      <p:sp>
+        <p:nvSpPr>
+          <p:cNvPr id="2" name="Title 1"/>
+          <p:cNvSpPr>
+            <a:spLocks noGrp="1"/>
+          </p:cNvSpPr>
+          <p:nvPr>
+            <p:ph type="title"/>
+          </p:nvPr>
+        </p:nvSpPr>
+        <p:spPr/>
+        <p:txBody>
+          <a:bodyPr/>
+          <a:lstStyle/>
+          <a:p>
+            <a:r>
+              <a:rPr lang="en-US" dirty="0"/>
+              <a:t>Introduction</a:t>
+            </a:r>
+            <a:endParaRPr lang="nl-BE" dirty="0"/>
+          </a:p>
+        </p:txBody>
+      </p:sp>
+      <p:sp>
+        <p:nvSpPr>
+          <p:cNvPr id="3" name="Text Placeholder 2"/>
+          <p:cNvSpPr>
+            <a:spLocks noGrp="1"/>
+          </p:cNvSpPr>
+          <p:nvPr>
+            <p:ph type="body" idx="1"/>
+          </p:nvPr>
+        </p:nvSpPr>
+        <p:spPr/>
+        <p:txBody>
+          <a:bodyPr/>
+          <a:lstStyle/>
+          <a:p>
+            <a:endParaRPr lang="nl-BE"/>
+          </a:p>
+        </p:txBody>
+      </p:sp>
+      <p:sp>
+        <p:nvSpPr>
+          <p:cNvPr id="4" name="Slide Number Placeholder 3"/>
+          <p:cNvSpPr>
+            <a:spLocks noGrp="1"/>
+          </p:cNvSpPr>
+          <p:nvPr>
+            <p:ph type="sldNum" sz="quarter" idx="12"/>
+          </p:nvPr>
+        </p:nvSpPr>
+        <p:spPr/>
+        <p:txBody>
+          <a:bodyPr/>
+          <a:lstStyle/>
+          <a:p>
+            <a:fld id="{AEFF399F-E3B5-4890-BC79-9BC8D4DF3F2D}" type="slidenum">
+              <a:rPr lang="nl-BE" smtClean="0"/>
+              <a:t>6</a:t>
+            </a:fld>
+            <a:endParaRPr lang="nl-BE"/>
+          </a:p>
+        </p:txBody>
+      </p:sp>
+    </p:spTree>
+    <p:extLst>
+      <p:ext uri="{BB962C8B-B14F-4D97-AF65-F5344CB8AC3E}">
+        <p14:creationId xmlns:p14="http://schemas.microsoft.com/office/powerpoint/2010/main" val="2215557954"/>
+      </p:ext>
+    </p:extLst>
+  </p:cSld>
+  <p:clrMapOvr>
+    <a:masterClrMapping/>
+  </p:clrMapOvr>
+</p:sld>
+</file>
+
+<file path=ppt/slides/slide60.xml><?xml version="1.0" encoding="utf-8"?>
 <p:sld xmlns:a="http://schemas.openxmlformats.org/drawingml/2006/main" xmlns:r="http://schemas.openxmlformats.org/officeDocument/2006/relationships" xmlns:p="http://schemas.openxmlformats.org/presentationml/2006/main">
   <p:cSld>
     <p:spTree>
@@ -33375,7 +35063,7 @@
           <a:p>
             <a:fld id="{AEFF399F-E3B5-4890-BC79-9BC8D4DF3F2D}" type="slidenum">
               <a:rPr lang="nl-BE" smtClean="0"/>
-              <a:t>57</a:t>
+              <a:t>60</a:t>
             </a:fld>
             <a:endParaRPr lang="nl-BE"/>
           </a:p>
@@ -33905,7 +35593,7 @@
 </p:sld>
 </file>
 
-<file path=ppt/slides/slide58.xml><?xml version="1.0" encoding="utf-8"?>
+<file path=ppt/slides/slide61.xml><?xml version="1.0" encoding="utf-8"?>
 <p:sld xmlns:a="http://schemas.openxmlformats.org/drawingml/2006/main" xmlns:r="http://schemas.openxmlformats.org/officeDocument/2006/relationships" xmlns:p="http://schemas.openxmlformats.org/presentationml/2006/main">
   <p:cSld>
     <p:spTree>
@@ -34055,7 +35743,7 @@
           <a:p>
             <a:fld id="{AEFF399F-E3B5-4890-BC79-9BC8D4DF3F2D}" type="slidenum">
               <a:rPr lang="nl-BE" smtClean="0"/>
-              <a:t>58</a:t>
+              <a:t>61</a:t>
             </a:fld>
             <a:endParaRPr lang="nl-BE"/>
           </a:p>
@@ -34306,7 +35994,7 @@
 </p:sld>
 </file>
 
-<file path=ppt/slides/slide59.xml><?xml version="1.0" encoding="utf-8"?>
+<file path=ppt/slides/slide62.xml><?xml version="1.0" encoding="utf-8"?>
 <p:sld xmlns:a="http://schemas.openxmlformats.org/drawingml/2006/main" xmlns:r="http://schemas.openxmlformats.org/officeDocument/2006/relationships" xmlns:p="http://schemas.openxmlformats.org/presentationml/2006/main">
   <p:cSld>
     <p:spTree>
@@ -34488,7 +36176,7 @@
           <a:p>
             <a:fld id="{AEFF399F-E3B5-4890-BC79-9BC8D4DF3F2D}" type="slidenum">
               <a:rPr lang="nl-BE" smtClean="0"/>
-              <a:t>59</a:t>
+              <a:t>62</a:t>
             </a:fld>
             <a:endParaRPr lang="nl-BE"/>
           </a:p>
@@ -34739,102 +36427,7 @@
 </p:sld>
 </file>
 
-<file path=ppt/slides/slide6.xml><?xml version="1.0" encoding="utf-8"?>
-<p:sld xmlns:a="http://schemas.openxmlformats.org/drawingml/2006/main" xmlns:r="http://schemas.openxmlformats.org/officeDocument/2006/relationships" xmlns:p="http://schemas.openxmlformats.org/presentationml/2006/main">
-  <p:cSld>
-    <p:spTree>
-      <p:nvGrpSpPr>
-        <p:cNvPr id="1" name=""/>
-        <p:cNvGrpSpPr/>
-        <p:nvPr/>
-      </p:nvGrpSpPr>
-      <p:grpSpPr>
-        <a:xfrm>
-          <a:off x="0" y="0"/>
-          <a:ext cx="0" cy="0"/>
-          <a:chOff x="0" y="0"/>
-          <a:chExt cx="0" cy="0"/>
-        </a:xfrm>
-      </p:grpSpPr>
-      <p:sp>
-        <p:nvSpPr>
-          <p:cNvPr id="2" name="Title 1"/>
-          <p:cNvSpPr>
-            <a:spLocks noGrp="1"/>
-          </p:cNvSpPr>
-          <p:nvPr>
-            <p:ph type="title"/>
-          </p:nvPr>
-        </p:nvSpPr>
-        <p:spPr/>
-        <p:txBody>
-          <a:bodyPr/>
-          <a:lstStyle/>
-          <a:p>
-            <a:r>
-              <a:rPr lang="en-US" dirty="0"/>
-              <a:t>Introduction</a:t>
-            </a:r>
-            <a:endParaRPr lang="nl-BE" dirty="0"/>
-          </a:p>
-        </p:txBody>
-      </p:sp>
-      <p:sp>
-        <p:nvSpPr>
-          <p:cNvPr id="3" name="Text Placeholder 2"/>
-          <p:cNvSpPr>
-            <a:spLocks noGrp="1"/>
-          </p:cNvSpPr>
-          <p:nvPr>
-            <p:ph type="body" idx="1"/>
-          </p:nvPr>
-        </p:nvSpPr>
-        <p:spPr/>
-        <p:txBody>
-          <a:bodyPr/>
-          <a:lstStyle/>
-          <a:p>
-            <a:endParaRPr lang="nl-BE"/>
-          </a:p>
-        </p:txBody>
-      </p:sp>
-      <p:sp>
-        <p:nvSpPr>
-          <p:cNvPr id="4" name="Slide Number Placeholder 3"/>
-          <p:cNvSpPr>
-            <a:spLocks noGrp="1"/>
-          </p:cNvSpPr>
-          <p:nvPr>
-            <p:ph type="sldNum" sz="quarter" idx="12"/>
-          </p:nvPr>
-        </p:nvSpPr>
-        <p:spPr/>
-        <p:txBody>
-          <a:bodyPr/>
-          <a:lstStyle/>
-          <a:p>
-            <a:fld id="{AEFF399F-E3B5-4890-BC79-9BC8D4DF3F2D}" type="slidenum">
-              <a:rPr lang="nl-BE" smtClean="0"/>
-              <a:t>6</a:t>
-            </a:fld>
-            <a:endParaRPr lang="nl-BE"/>
-          </a:p>
-        </p:txBody>
-      </p:sp>
-    </p:spTree>
-    <p:extLst>
-      <p:ext uri="{BB962C8B-B14F-4D97-AF65-F5344CB8AC3E}">
-        <p14:creationId xmlns:p14="http://schemas.microsoft.com/office/powerpoint/2010/main" val="2215557954"/>
-      </p:ext>
-    </p:extLst>
-  </p:cSld>
-  <p:clrMapOvr>
-    <a:masterClrMapping/>
-  </p:clrMapOvr>
-</p:sld>
-</file>
-
-<file path=ppt/slides/slide60.xml><?xml version="1.0" encoding="utf-8"?>
+<file path=ppt/slides/slide63.xml><?xml version="1.0" encoding="utf-8"?>
 <p:sld xmlns:a="http://schemas.openxmlformats.org/drawingml/2006/main" xmlns:r="http://schemas.openxmlformats.org/officeDocument/2006/relationships" xmlns:p="http://schemas.openxmlformats.org/presentationml/2006/main">
   <p:cSld>
     <p:spTree>
@@ -34984,7 +36577,7 @@
           <a:p>
             <a:fld id="{AEFF399F-E3B5-4890-BC79-9BC8D4DF3F2D}" type="slidenum">
               <a:rPr lang="nl-BE" smtClean="0"/>
-              <a:t>60</a:t>
+              <a:t>63</a:t>
             </a:fld>
             <a:endParaRPr lang="nl-BE"/>
           </a:p>
@@ -35391,7 +36984,7 @@
 </p:sld>
 </file>
 
-<file path=ppt/slides/slide61.xml><?xml version="1.0" encoding="utf-8"?>
+<file path=ppt/slides/slide64.xml><?xml version="1.0" encoding="utf-8"?>
 <p:sld xmlns:a="http://schemas.openxmlformats.org/drawingml/2006/main" xmlns:r="http://schemas.openxmlformats.org/officeDocument/2006/relationships" xmlns:p="http://schemas.openxmlformats.org/presentationml/2006/main">
   <p:cSld>
     <p:spTree>
@@ -35467,7 +37060,7 @@
           <a:p>
             <a:fld id="{AEFF399F-E3B5-4890-BC79-9BC8D4DF3F2D}" type="slidenum">
               <a:rPr lang="nl-BE" smtClean="0"/>
-              <a:t>61</a:t>
+              <a:t>64</a:t>
             </a:fld>
             <a:endParaRPr lang="nl-BE"/>
           </a:p>
@@ -35486,7 +37079,7 @@
 </p:sld>
 </file>
 
-<file path=ppt/slides/slide62.xml><?xml version="1.0" encoding="utf-8"?>
+<file path=ppt/slides/slide65.xml><?xml version="1.0" encoding="utf-8"?>
 <p:sld xmlns:a="http://schemas.openxmlformats.org/drawingml/2006/main" xmlns:r="http://schemas.openxmlformats.org/officeDocument/2006/relationships" xmlns:p="http://schemas.openxmlformats.org/presentationml/2006/main">
   <p:cSld>
     <p:spTree>
@@ -35640,7 +37233,7 @@
           <a:p>
             <a:fld id="{AEFF399F-E3B5-4890-BC79-9BC8D4DF3F2D}" type="slidenum">
               <a:rPr lang="nl-BE" smtClean="0"/>
-              <a:t>62</a:t>
+              <a:t>65</a:t>
             </a:fld>
             <a:endParaRPr lang="nl-BE"/>
           </a:p>
@@ -36149,7 +37742,7 @@
 </p:sld>
 </file>
 
-<file path=ppt/slides/slide63.xml><?xml version="1.0" encoding="utf-8"?>
+<file path=ppt/slides/slide66.xml><?xml version="1.0" encoding="utf-8"?>
 <p:sld xmlns:a="http://schemas.openxmlformats.org/drawingml/2006/main" xmlns:r="http://schemas.openxmlformats.org/officeDocument/2006/relationships" xmlns:p="http://schemas.openxmlformats.org/presentationml/2006/main">
   <p:cSld>
     <p:spTree>
@@ -36322,7 +37915,7 @@
           <a:p>
             <a:fld id="{AEFF399F-E3B5-4890-BC79-9BC8D4DF3F2D}" type="slidenum">
               <a:rPr lang="nl-BE" smtClean="0"/>
-              <a:t>63</a:t>
+              <a:t>66</a:t>
             </a:fld>
             <a:endParaRPr lang="nl-BE"/>
           </a:p>
@@ -36341,7 +37934,7 @@
 </p:sld>
 </file>
 
-<file path=ppt/slides/slide64.xml><?xml version="1.0" encoding="utf-8"?>
+<file path=ppt/slides/slide67.xml><?xml version="1.0" encoding="utf-8"?>
 <p:sld xmlns:a="http://schemas.openxmlformats.org/drawingml/2006/main" xmlns:r="http://schemas.openxmlformats.org/officeDocument/2006/relationships" xmlns:p="http://schemas.openxmlformats.org/presentationml/2006/main">
   <p:cSld>
     <p:spTree>
@@ -36435,7 +38028,7 @@
           <a:p>
             <a:fld id="{AEFF399F-E3B5-4890-BC79-9BC8D4DF3F2D}" type="slidenum">
               <a:rPr lang="nl-BE" smtClean="0"/>
-              <a:t>64</a:t>
+              <a:t>67</a:t>
             </a:fld>
             <a:endParaRPr lang="nl-BE"/>
           </a:p>
@@ -36454,7 +38047,7 @@
 </p:sld>
 </file>
 
-<file path=ppt/slides/slide65.xml><?xml version="1.0" encoding="utf-8"?>
+<file path=ppt/slides/slide68.xml><?xml version="1.0" encoding="utf-8"?>
 <p:sld xmlns:a="http://schemas.openxmlformats.org/drawingml/2006/main" xmlns:r="http://schemas.openxmlformats.org/officeDocument/2006/relationships" xmlns:p="http://schemas.openxmlformats.org/presentationml/2006/main">
   <p:cSld>
     <p:spTree>
@@ -36584,7 +38177,7 @@
           <a:p>
             <a:fld id="{AEFF399F-E3B5-4890-BC79-9BC8D4DF3F2D}" type="slidenum">
               <a:rPr lang="nl-BE" smtClean="0"/>
-              <a:t>65</a:t>
+              <a:t>68</a:t>
             </a:fld>
             <a:endParaRPr lang="nl-BE"/>
           </a:p>
@@ -36603,7 +38196,7 @@
 </p:sld>
 </file>
 
-<file path=ppt/slides/slide66.xml><?xml version="1.0" encoding="utf-8"?>
+<file path=ppt/slides/slide69.xml><?xml version="1.0" encoding="utf-8"?>
 <p:sld xmlns:a="http://schemas.openxmlformats.org/drawingml/2006/main" xmlns:r="http://schemas.openxmlformats.org/officeDocument/2006/relationships" xmlns:p="http://schemas.openxmlformats.org/presentationml/2006/main">
   <p:cSld>
     <p:spTree>
@@ -36955,7 +38548,7 @@
           <a:p>
             <a:fld id="{AEFF399F-E3B5-4890-BC79-9BC8D4DF3F2D}" type="slidenum">
               <a:rPr lang="nl-BE" smtClean="0"/>
-              <a:t>66</a:t>
+              <a:t>69</a:t>
             </a:fld>
             <a:endParaRPr lang="nl-BE"/>
           </a:p>

</xml_diff>

<commit_message>
Add section on modifying images
</commit_message>
<xml_diff>
--- a/containers_for_hpc.pptx
+++ b/containers_for_hpc.pptx
@@ -5,7 +5,7 @@
     <p:sldMasterId id="2147483660" r:id="rId1"/>
   </p:sldMasterIdLst>
   <p:notesMasterIdLst>
-    <p:notesMasterId r:id="rId71"/>
+    <p:notesMasterId r:id="rId74"/>
   </p:notesMasterIdLst>
   <p:sldIdLst>
     <p:sldId id="256" r:id="rId2"/>
@@ -66,17 +66,20 @@
     <p:sldId id="298" r:id="rId57"/>
     <p:sldId id="299" r:id="rId58"/>
     <p:sldId id="300" r:id="rId59"/>
-    <p:sldId id="285" r:id="rId60"/>
-    <p:sldId id="286" r:id="rId61"/>
-    <p:sldId id="287" r:id="rId62"/>
-    <p:sldId id="270" r:id="rId63"/>
-    <p:sldId id="366" r:id="rId64"/>
-    <p:sldId id="272" r:id="rId65"/>
-    <p:sldId id="276" r:id="rId66"/>
-    <p:sldId id="277" r:id="rId67"/>
-    <p:sldId id="307" r:id="rId68"/>
-    <p:sldId id="308" r:id="rId69"/>
-    <p:sldId id="291" r:id="rId70"/>
+    <p:sldId id="370" r:id="rId60"/>
+    <p:sldId id="371" r:id="rId61"/>
+    <p:sldId id="372" r:id="rId62"/>
+    <p:sldId id="285" r:id="rId63"/>
+    <p:sldId id="286" r:id="rId64"/>
+    <p:sldId id="287" r:id="rId65"/>
+    <p:sldId id="270" r:id="rId66"/>
+    <p:sldId id="366" r:id="rId67"/>
+    <p:sldId id="272" r:id="rId68"/>
+    <p:sldId id="276" r:id="rId69"/>
+    <p:sldId id="277" r:id="rId70"/>
+    <p:sldId id="307" r:id="rId71"/>
+    <p:sldId id="308" r:id="rId72"/>
+    <p:sldId id="291" r:id="rId73"/>
   </p:sldIdLst>
   <p:sldSz cx="9144000" cy="6858000" type="screen4x3"/>
   <p:notesSz cx="6858000" cy="9144000"/>
@@ -274,6 +277,13 @@
             <p14:sldId id="298"/>
             <p14:sldId id="299"/>
             <p14:sldId id="300"/>
+          </p14:sldIdLst>
+        </p14:section>
+        <p14:section name="Modifying images" id="{E905122A-C14D-4C44-912A-C00B0F615727}">
+          <p14:sldIdLst>
+            <p14:sldId id="370"/>
+            <p14:sldId id="371"/>
+            <p14:sldId id="372"/>
           </p14:sldIdLst>
         </p14:section>
         <p14:section name="Performance" id="{1D232FD6-D204-4223-84D0-EC32B6360BF3}">
@@ -34801,7 +34811,13 @@
       </p:grpSpPr>
       <p:sp>
         <p:nvSpPr>
-          <p:cNvPr id="2" name="Title 1"/>
+          <p:cNvPr id="2" name="Title 1">
+            <a:extLst>
+              <a:ext uri="{FF2B5EF4-FFF2-40B4-BE49-F238E27FC236}">
+                <a16:creationId xmlns:a16="http://schemas.microsoft.com/office/drawing/2014/main" id="{211BB9D5-3D2F-E2A6-54D3-7D0BE7EB2A2D}"/>
+              </a:ext>
+            </a:extLst>
+          </p:cNvPr>
           <p:cNvSpPr>
             <a:spLocks noGrp="1"/>
           </p:cNvSpPr>
@@ -34816,15 +34832,21 @@
           <a:p>
             <a:r>
               <a:rPr lang="en-US" dirty="0"/>
-              <a:t>Performance &amp; best practices</a:t>
-            </a:r>
-            <a:endParaRPr lang="nl-BE" dirty="0"/>
+              <a:t>Messing with images</a:t>
+            </a:r>
+            <a:endParaRPr lang="LID4096" dirty="0"/>
           </a:p>
         </p:txBody>
       </p:sp>
       <p:sp>
         <p:nvSpPr>
-          <p:cNvPr id="3" name="Text Placeholder 2"/>
+          <p:cNvPr id="3" name="Text Placeholder 2">
+            <a:extLst>
+              <a:ext uri="{FF2B5EF4-FFF2-40B4-BE49-F238E27FC236}">
+                <a16:creationId xmlns:a16="http://schemas.microsoft.com/office/drawing/2014/main" id="{9963CF2E-67A5-6245-A3C1-736851DE6859}"/>
+              </a:ext>
+            </a:extLst>
+          </p:cNvPr>
           <p:cNvSpPr>
             <a:spLocks noGrp="1"/>
           </p:cNvSpPr>
@@ -34837,13 +34859,19 @@
           <a:bodyPr/>
           <a:lstStyle/>
           <a:p>
-            <a:endParaRPr lang="nl-BE"/>
+            <a:endParaRPr lang="LID4096"/>
           </a:p>
         </p:txBody>
       </p:sp>
       <p:sp>
         <p:nvSpPr>
-          <p:cNvPr id="4" name="Slide Number Placeholder 3"/>
+          <p:cNvPr id="4" name="Slide Number Placeholder 3">
+            <a:extLst>
+              <a:ext uri="{FF2B5EF4-FFF2-40B4-BE49-F238E27FC236}">
+                <a16:creationId xmlns:a16="http://schemas.microsoft.com/office/drawing/2014/main" id="{3FACC56F-7F0E-87F9-6287-DDD6C3DE33E8}"/>
+              </a:ext>
+            </a:extLst>
+          </p:cNvPr>
           <p:cNvSpPr>
             <a:spLocks noGrp="1"/>
           </p:cNvSpPr>
@@ -34867,7 +34895,7 @@
     </p:spTree>
     <p:extLst>
       <p:ext uri="{BB962C8B-B14F-4D97-AF65-F5344CB8AC3E}">
-        <p14:creationId xmlns:p14="http://schemas.microsoft.com/office/powerpoint/2010/main" val="3021828449"/>
+        <p14:creationId xmlns:p14="http://schemas.microsoft.com/office/powerpoint/2010/main" val="406372139"/>
       </p:ext>
     </p:extLst>
   </p:cSld>
@@ -34991,6 +35019,1381 @@
       </p:grpSpPr>
       <p:sp>
         <p:nvSpPr>
+          <p:cNvPr id="2" name="Title 1">
+            <a:extLst>
+              <a:ext uri="{FF2B5EF4-FFF2-40B4-BE49-F238E27FC236}">
+                <a16:creationId xmlns:a16="http://schemas.microsoft.com/office/drawing/2014/main" id="{DD246B4D-F191-FAB5-84FA-2020C059868F}"/>
+              </a:ext>
+            </a:extLst>
+          </p:cNvPr>
+          <p:cNvSpPr>
+            <a:spLocks noGrp="1"/>
+          </p:cNvSpPr>
+          <p:nvPr>
+            <p:ph type="title"/>
+          </p:nvPr>
+        </p:nvSpPr>
+        <p:spPr/>
+        <p:txBody>
+          <a:bodyPr/>
+          <a:lstStyle/>
+          <a:p>
+            <a:r>
+              <a:rPr lang="en-US" dirty="0"/>
+              <a:t>Modifying images</a:t>
+            </a:r>
+            <a:endParaRPr lang="LID4096" dirty="0"/>
+          </a:p>
+        </p:txBody>
+      </p:sp>
+      <p:sp>
+        <p:nvSpPr>
+          <p:cNvPr id="3" name="Content Placeholder 2">
+            <a:extLst>
+              <a:ext uri="{FF2B5EF4-FFF2-40B4-BE49-F238E27FC236}">
+                <a16:creationId xmlns:a16="http://schemas.microsoft.com/office/drawing/2014/main" id="{931B5F68-65BE-F14A-FF70-C17BD4B96B28}"/>
+              </a:ext>
+            </a:extLst>
+          </p:cNvPr>
+          <p:cNvSpPr>
+            <a:spLocks noGrp="1"/>
+          </p:cNvSpPr>
+          <p:nvPr>
+            <p:ph idx="1"/>
+          </p:nvPr>
+        </p:nvSpPr>
+        <p:spPr/>
+        <p:txBody>
+          <a:bodyPr>
+            <a:normAutofit lnSpcReduction="10000"/>
+          </a:bodyPr>
+          <a:lstStyle/>
+          <a:p>
+            <a:r>
+              <a:rPr lang="en-US" dirty="0"/>
+              <a:t>Not possible directly</a:t>
+            </a:r>
+          </a:p>
+          <a:p>
+            <a:r>
+              <a:rPr lang="en-US" dirty="0"/>
+              <a:t>Create sandbox, i.e., directory</a:t>
+            </a:r>
+          </a:p>
+          <a:p>
+            <a:endParaRPr lang="en-US" dirty="0"/>
+          </a:p>
+          <a:p>
+            <a:endParaRPr lang="en-US" dirty="0"/>
+          </a:p>
+          <a:p>
+            <a:r>
+              <a:rPr lang="en-US" dirty="0"/>
+              <a:t>Execute command in sandbox</a:t>
+            </a:r>
+          </a:p>
+          <a:p>
+            <a:endParaRPr lang="en-US" dirty="0"/>
+          </a:p>
+          <a:p>
+            <a:endParaRPr lang="en-US" dirty="0"/>
+          </a:p>
+          <a:p>
+            <a:endParaRPr lang="en-US" dirty="0"/>
+          </a:p>
+          <a:p>
+            <a:r>
+              <a:rPr lang="en-US" dirty="0"/>
+              <a:t>Create image from sandbox</a:t>
+            </a:r>
+          </a:p>
+        </p:txBody>
+      </p:sp>
+      <p:sp>
+        <p:nvSpPr>
+          <p:cNvPr id="4" name="Slide Number Placeholder 3">
+            <a:extLst>
+              <a:ext uri="{FF2B5EF4-FFF2-40B4-BE49-F238E27FC236}">
+                <a16:creationId xmlns:a16="http://schemas.microsoft.com/office/drawing/2014/main" id="{EC00F8DF-5034-7D14-DF07-5AC3BDF7434D}"/>
+              </a:ext>
+            </a:extLst>
+          </p:cNvPr>
+          <p:cNvSpPr>
+            <a:spLocks noGrp="1"/>
+          </p:cNvSpPr>
+          <p:nvPr>
+            <p:ph type="sldNum" sz="quarter" idx="12"/>
+          </p:nvPr>
+        </p:nvSpPr>
+        <p:spPr/>
+        <p:txBody>
+          <a:bodyPr/>
+          <a:lstStyle/>
+          <a:p>
+            <a:fld id="{AEFF399F-E3B5-4890-BC79-9BC8D4DF3F2D}" type="slidenum">
+              <a:rPr lang="nl-BE" smtClean="0"/>
+              <a:t>60</a:t>
+            </a:fld>
+            <a:endParaRPr lang="nl-BE"/>
+          </a:p>
+        </p:txBody>
+      </p:sp>
+      <p:sp>
+        <p:nvSpPr>
+          <p:cNvPr id="5" name="TextBox 4">
+            <a:extLst>
+              <a:ext uri="{FF2B5EF4-FFF2-40B4-BE49-F238E27FC236}">
+                <a16:creationId xmlns:a16="http://schemas.microsoft.com/office/drawing/2014/main" id="{220FD4E2-2AA7-8BA9-6EB3-58E22E3D66D7}"/>
+              </a:ext>
+            </a:extLst>
+          </p:cNvPr>
+          <p:cNvSpPr txBox="1"/>
+          <p:nvPr/>
+        </p:nvSpPr>
+        <p:spPr>
+          <a:xfrm>
+            <a:off x="1004968" y="2880280"/>
+            <a:ext cx="6653132" cy="646331"/>
+          </a:xfrm>
+          <a:prstGeom prst="rect">
+            <a:avLst/>
+          </a:prstGeom>
+          <a:solidFill>
+            <a:schemeClr val="tx1"/>
+          </a:solidFill>
+        </p:spPr>
+        <p:txBody>
+          <a:bodyPr wrap="square" rtlCol="0">
+            <a:spAutoFit/>
+          </a:bodyPr>
+          <a:lstStyle/>
+          <a:p>
+            <a:r>
+              <a:rPr lang="en-US" b="1" dirty="0">
+                <a:solidFill>
+                  <a:schemeClr val="bg1"/>
+                </a:solidFill>
+                <a:latin typeface="Courier New" panose="02070309020205020404" pitchFamily="49" charset="0"/>
+                <a:cs typeface="Courier New" panose="02070309020205020404" pitchFamily="49" charset="0"/>
+              </a:rPr>
+              <a:t>$ </a:t>
+            </a:r>
+            <a:r>
+              <a:rPr lang="en-US" b="1" dirty="0" err="1">
+                <a:solidFill>
+                  <a:schemeClr val="bg1"/>
+                </a:solidFill>
+                <a:latin typeface="Courier New" panose="02070309020205020404" pitchFamily="49" charset="0"/>
+                <a:cs typeface="Courier New" panose="02070309020205020404" pitchFamily="49" charset="0"/>
+              </a:rPr>
+              <a:t>apptainer</a:t>
+            </a:r>
+            <a:r>
+              <a:rPr lang="en-US" b="1" dirty="0">
+                <a:solidFill>
+                  <a:schemeClr val="bg1"/>
+                </a:solidFill>
+                <a:latin typeface="Courier New" panose="02070309020205020404" pitchFamily="49" charset="0"/>
+                <a:cs typeface="Courier New" panose="02070309020205020404" pitchFamily="49" charset="0"/>
+              </a:rPr>
+              <a:t>  build  --</a:t>
+            </a:r>
+            <a:r>
+              <a:rPr lang="en-US" b="1" dirty="0" err="1">
+                <a:solidFill>
+                  <a:schemeClr val="bg1"/>
+                </a:solidFill>
+                <a:latin typeface="Courier New" panose="02070309020205020404" pitchFamily="49" charset="0"/>
+                <a:cs typeface="Courier New" panose="02070309020205020404" pitchFamily="49" charset="0"/>
+              </a:rPr>
+              <a:t>fakeroot</a:t>
+            </a:r>
+            <a:r>
+              <a:rPr lang="en-US" b="1" dirty="0">
+                <a:solidFill>
+                  <a:schemeClr val="bg1"/>
+                </a:solidFill>
+                <a:latin typeface="Courier New" panose="02070309020205020404" pitchFamily="49" charset="0"/>
+                <a:cs typeface="Courier New" panose="02070309020205020404" pitchFamily="49" charset="0"/>
+              </a:rPr>
+              <a:t>  \</a:t>
+            </a:r>
+          </a:p>
+          <a:p>
+            <a:r>
+              <a:rPr lang="en-US" b="1" dirty="0">
+                <a:solidFill>
+                  <a:schemeClr val="bg1"/>
+                </a:solidFill>
+                <a:latin typeface="Courier New" panose="02070309020205020404" pitchFamily="49" charset="0"/>
+                <a:cs typeface="Courier New" panose="02070309020205020404" pitchFamily="49" charset="0"/>
+              </a:rPr>
+              <a:t>      ./sandbox/  </a:t>
+            </a:r>
+            <a:r>
+              <a:rPr lang="en-US" b="1" dirty="0" err="1">
+                <a:solidFill>
+                  <a:schemeClr val="bg1"/>
+                </a:solidFill>
+                <a:latin typeface="Courier New" panose="02070309020205020404" pitchFamily="49" charset="0"/>
+                <a:cs typeface="Courier New" panose="02070309020205020404" pitchFamily="49" charset="0"/>
+              </a:rPr>
+              <a:t>original.sif</a:t>
+            </a:r>
+            <a:endParaRPr lang="en-US" b="1" dirty="0">
+              <a:solidFill>
+                <a:schemeClr val="bg1"/>
+              </a:solidFill>
+              <a:latin typeface="Courier New" panose="02070309020205020404" pitchFamily="49" charset="0"/>
+              <a:cs typeface="Courier New" panose="02070309020205020404" pitchFamily="49" charset="0"/>
+            </a:endParaRPr>
+          </a:p>
+        </p:txBody>
+      </p:sp>
+      <p:sp>
+        <p:nvSpPr>
+          <p:cNvPr id="6" name="TextBox 5">
+            <a:extLst>
+              <a:ext uri="{FF2B5EF4-FFF2-40B4-BE49-F238E27FC236}">
+                <a16:creationId xmlns:a16="http://schemas.microsoft.com/office/drawing/2014/main" id="{B56EBAA8-39BC-BA8F-B6B6-8CD450F72FCF}"/>
+              </a:ext>
+            </a:extLst>
+          </p:cNvPr>
+          <p:cNvSpPr txBox="1"/>
+          <p:nvPr/>
+        </p:nvSpPr>
+        <p:spPr>
+          <a:xfrm>
+            <a:off x="1004968" y="4119958"/>
+            <a:ext cx="6653132" cy="1477328"/>
+          </a:xfrm>
+          <a:prstGeom prst="rect">
+            <a:avLst/>
+          </a:prstGeom>
+          <a:solidFill>
+            <a:schemeClr val="tx1"/>
+          </a:solidFill>
+        </p:spPr>
+        <p:txBody>
+          <a:bodyPr wrap="square" rtlCol="0">
+            <a:spAutoFit/>
+          </a:bodyPr>
+          <a:lstStyle/>
+          <a:p>
+            <a:r>
+              <a:rPr lang="en-US" b="1" dirty="0">
+                <a:solidFill>
+                  <a:schemeClr val="bg1"/>
+                </a:solidFill>
+                <a:latin typeface="Courier New" panose="02070309020205020404" pitchFamily="49" charset="0"/>
+                <a:cs typeface="Courier New" panose="02070309020205020404" pitchFamily="49" charset="0"/>
+              </a:rPr>
+              <a:t>$ </a:t>
+            </a:r>
+            <a:r>
+              <a:rPr lang="en-US" b="1" dirty="0" err="1">
+                <a:solidFill>
+                  <a:schemeClr val="bg1"/>
+                </a:solidFill>
+                <a:latin typeface="Courier New" panose="02070309020205020404" pitchFamily="49" charset="0"/>
+                <a:cs typeface="Courier New" panose="02070309020205020404" pitchFamily="49" charset="0"/>
+              </a:rPr>
+              <a:t>apptainer</a:t>
+            </a:r>
+            <a:r>
+              <a:rPr lang="en-US" b="1" dirty="0">
+                <a:solidFill>
+                  <a:schemeClr val="bg1"/>
+                </a:solidFill>
+                <a:latin typeface="Courier New" panose="02070309020205020404" pitchFamily="49" charset="0"/>
+                <a:cs typeface="Courier New" panose="02070309020205020404" pitchFamily="49" charset="0"/>
+              </a:rPr>
+              <a:t>  shell  --writable  --</a:t>
+            </a:r>
+            <a:r>
+              <a:rPr lang="en-US" b="1" dirty="0" err="1">
+                <a:solidFill>
+                  <a:schemeClr val="bg1"/>
+                </a:solidFill>
+                <a:latin typeface="Courier New" panose="02070309020205020404" pitchFamily="49" charset="0"/>
+                <a:cs typeface="Courier New" panose="02070309020205020404" pitchFamily="49" charset="0"/>
+              </a:rPr>
+              <a:t>fakeroot</a:t>
+            </a:r>
+            <a:r>
+              <a:rPr lang="en-US" b="1" dirty="0">
+                <a:solidFill>
+                  <a:schemeClr val="bg1"/>
+                </a:solidFill>
+                <a:latin typeface="Courier New" panose="02070309020205020404" pitchFamily="49" charset="0"/>
+                <a:cs typeface="Courier New" panose="02070309020205020404" pitchFamily="49" charset="0"/>
+              </a:rPr>
+              <a:t>  \</a:t>
+            </a:r>
+            <a:br>
+              <a:rPr lang="en-US" b="1" dirty="0">
+                <a:solidFill>
+                  <a:schemeClr val="bg1"/>
+                </a:solidFill>
+                <a:latin typeface="Courier New" panose="02070309020205020404" pitchFamily="49" charset="0"/>
+                <a:cs typeface="Courier New" panose="02070309020205020404" pitchFamily="49" charset="0"/>
+              </a:rPr>
+            </a:br>
+            <a:r>
+              <a:rPr lang="en-US" b="1" dirty="0">
+                <a:solidFill>
+                  <a:schemeClr val="bg1"/>
+                </a:solidFill>
+                <a:latin typeface="Courier New" panose="02070309020205020404" pitchFamily="49" charset="0"/>
+                <a:cs typeface="Courier New" panose="02070309020205020404" pitchFamily="49" charset="0"/>
+              </a:rPr>
+              <a:t>      ./sandbox/</a:t>
+            </a:r>
+          </a:p>
+          <a:p>
+            <a:r>
+              <a:rPr lang="en-US" b="1" dirty="0" err="1">
+                <a:solidFill>
+                  <a:schemeClr val="bg1"/>
+                </a:solidFill>
+                <a:latin typeface="Courier New" panose="02070309020205020404" pitchFamily="49" charset="0"/>
+                <a:cs typeface="Courier New" panose="02070309020205020404" pitchFamily="49" charset="0"/>
+              </a:rPr>
+              <a:t>apptainer</a:t>
+            </a:r>
+            <a:r>
+              <a:rPr lang="en-US" b="1" dirty="0">
+                <a:solidFill>
+                  <a:schemeClr val="bg1"/>
+                </a:solidFill>
+                <a:latin typeface="Courier New" panose="02070309020205020404" pitchFamily="49" charset="0"/>
+                <a:cs typeface="Courier New" panose="02070309020205020404" pitchFamily="49" charset="0"/>
+              </a:rPr>
+              <a:t>&gt; apt update</a:t>
+            </a:r>
+          </a:p>
+          <a:p>
+            <a:r>
+              <a:rPr lang="en-US" b="1" dirty="0" err="1">
+                <a:solidFill>
+                  <a:schemeClr val="bg1"/>
+                </a:solidFill>
+                <a:latin typeface="Courier New" panose="02070309020205020404" pitchFamily="49" charset="0"/>
+                <a:cs typeface="Courier New" panose="02070309020205020404" pitchFamily="49" charset="0"/>
+              </a:rPr>
+              <a:t>apptainer</a:t>
+            </a:r>
+            <a:r>
+              <a:rPr lang="en-US" b="1" dirty="0">
+                <a:solidFill>
+                  <a:schemeClr val="bg1"/>
+                </a:solidFill>
+                <a:latin typeface="Courier New" panose="02070309020205020404" pitchFamily="49" charset="0"/>
+                <a:cs typeface="Courier New" panose="02070309020205020404" pitchFamily="49" charset="0"/>
+              </a:rPr>
+              <a:t>&gt; apt install less</a:t>
+            </a:r>
+          </a:p>
+          <a:p>
+            <a:r>
+              <a:rPr lang="en-US" b="1" dirty="0" err="1">
+                <a:solidFill>
+                  <a:schemeClr val="bg1"/>
+                </a:solidFill>
+                <a:latin typeface="Courier New" panose="02070309020205020404" pitchFamily="49" charset="0"/>
+                <a:cs typeface="Courier New" panose="02070309020205020404" pitchFamily="49" charset="0"/>
+              </a:rPr>
+              <a:t>apptainer</a:t>
+            </a:r>
+            <a:r>
+              <a:rPr lang="en-US" b="1" dirty="0">
+                <a:solidFill>
+                  <a:schemeClr val="bg1"/>
+                </a:solidFill>
+                <a:latin typeface="Courier New" panose="02070309020205020404" pitchFamily="49" charset="0"/>
+                <a:cs typeface="Courier New" panose="02070309020205020404" pitchFamily="49" charset="0"/>
+              </a:rPr>
+              <a:t>&gt; exit</a:t>
+            </a:r>
+          </a:p>
+        </p:txBody>
+      </p:sp>
+      <p:sp>
+        <p:nvSpPr>
+          <p:cNvPr id="7" name="TextBox 6">
+            <a:extLst>
+              <a:ext uri="{FF2B5EF4-FFF2-40B4-BE49-F238E27FC236}">
+                <a16:creationId xmlns:a16="http://schemas.microsoft.com/office/drawing/2014/main" id="{01EE0B36-DA22-CF32-BF23-9992A5B32968}"/>
+              </a:ext>
+            </a:extLst>
+          </p:cNvPr>
+          <p:cNvSpPr txBox="1"/>
+          <p:nvPr/>
+        </p:nvSpPr>
+        <p:spPr>
+          <a:xfrm>
+            <a:off x="1004967" y="5981230"/>
+            <a:ext cx="6653132" cy="646331"/>
+          </a:xfrm>
+          <a:prstGeom prst="rect">
+            <a:avLst/>
+          </a:prstGeom>
+          <a:solidFill>
+            <a:schemeClr val="tx1"/>
+          </a:solidFill>
+        </p:spPr>
+        <p:txBody>
+          <a:bodyPr wrap="square" rtlCol="0">
+            <a:spAutoFit/>
+          </a:bodyPr>
+          <a:lstStyle/>
+          <a:p>
+            <a:r>
+              <a:rPr lang="en-US" b="1" dirty="0">
+                <a:solidFill>
+                  <a:schemeClr val="bg1"/>
+                </a:solidFill>
+                <a:latin typeface="Courier New" panose="02070309020205020404" pitchFamily="49" charset="0"/>
+                <a:cs typeface="Courier New" panose="02070309020205020404" pitchFamily="49" charset="0"/>
+              </a:rPr>
+              <a:t>$ </a:t>
+            </a:r>
+            <a:r>
+              <a:rPr lang="en-US" b="1" dirty="0" err="1">
+                <a:solidFill>
+                  <a:schemeClr val="bg1"/>
+                </a:solidFill>
+                <a:latin typeface="Courier New" panose="02070309020205020404" pitchFamily="49" charset="0"/>
+                <a:cs typeface="Courier New" panose="02070309020205020404" pitchFamily="49" charset="0"/>
+              </a:rPr>
+              <a:t>apptainer</a:t>
+            </a:r>
+            <a:r>
+              <a:rPr lang="en-US" b="1" dirty="0">
+                <a:solidFill>
+                  <a:schemeClr val="bg1"/>
+                </a:solidFill>
+                <a:latin typeface="Courier New" panose="02070309020205020404" pitchFamily="49" charset="0"/>
+                <a:cs typeface="Courier New" panose="02070309020205020404" pitchFamily="49" charset="0"/>
+              </a:rPr>
+              <a:t>  build  --</a:t>
+            </a:r>
+            <a:r>
+              <a:rPr lang="en-US" b="1" dirty="0" err="1">
+                <a:solidFill>
+                  <a:schemeClr val="bg1"/>
+                </a:solidFill>
+                <a:latin typeface="Courier New" panose="02070309020205020404" pitchFamily="49" charset="0"/>
+                <a:cs typeface="Courier New" panose="02070309020205020404" pitchFamily="49" charset="0"/>
+              </a:rPr>
+              <a:t>fakeroot</a:t>
+            </a:r>
+            <a:r>
+              <a:rPr lang="en-US" b="1" dirty="0">
+                <a:solidFill>
+                  <a:schemeClr val="bg1"/>
+                </a:solidFill>
+                <a:latin typeface="Courier New" panose="02070309020205020404" pitchFamily="49" charset="0"/>
+                <a:cs typeface="Courier New" panose="02070309020205020404" pitchFamily="49" charset="0"/>
+              </a:rPr>
+              <a:t>  \</a:t>
+            </a:r>
+          </a:p>
+          <a:p>
+            <a:r>
+              <a:rPr lang="en-US" b="1" dirty="0">
+                <a:solidFill>
+                  <a:schemeClr val="bg1"/>
+                </a:solidFill>
+                <a:latin typeface="Courier New" panose="02070309020205020404" pitchFamily="49" charset="0"/>
+                <a:cs typeface="Courier New" panose="02070309020205020404" pitchFamily="49" charset="0"/>
+              </a:rPr>
+              <a:t>      </a:t>
+            </a:r>
+            <a:r>
+              <a:rPr lang="en-US" b="1" dirty="0" err="1">
+                <a:solidFill>
+                  <a:schemeClr val="bg1"/>
+                </a:solidFill>
+                <a:latin typeface="Courier New" panose="02070309020205020404" pitchFamily="49" charset="0"/>
+                <a:cs typeface="Courier New" panose="02070309020205020404" pitchFamily="49" charset="0"/>
+              </a:rPr>
+              <a:t>new.sif</a:t>
+            </a:r>
+            <a:r>
+              <a:rPr lang="en-US" b="1" dirty="0">
+                <a:solidFill>
+                  <a:schemeClr val="bg1"/>
+                </a:solidFill>
+                <a:latin typeface="Courier New" panose="02070309020205020404" pitchFamily="49" charset="0"/>
+                <a:cs typeface="Courier New" panose="02070309020205020404" pitchFamily="49" charset="0"/>
+              </a:rPr>
+              <a:t>  ./sandbox/</a:t>
+            </a:r>
+          </a:p>
+        </p:txBody>
+      </p:sp>
+    </p:spTree>
+    <p:extLst>
+      <p:ext uri="{BB962C8B-B14F-4D97-AF65-F5344CB8AC3E}">
+        <p14:creationId xmlns:p14="http://schemas.microsoft.com/office/powerpoint/2010/main" val="4241731535"/>
+      </p:ext>
+    </p:extLst>
+  </p:cSld>
+  <p:clrMapOvr>
+    <a:masterClrMapping/>
+  </p:clrMapOvr>
+  <p:timing>
+    <p:tnLst>
+      <p:par>
+        <p:cTn id="1" dur="indefinite" restart="never" nodeType="tmRoot">
+          <p:childTnLst>
+            <p:seq concurrent="1" nextAc="seek">
+              <p:cTn id="2" dur="indefinite" nodeType="mainSeq">
+                <p:childTnLst>
+                  <p:par>
+                    <p:cTn id="3" fill="hold">
+                      <p:stCondLst>
+                        <p:cond delay="indefinite"/>
+                        <p:cond evt="onBegin" delay="0">
+                          <p:tn val="2"/>
+                        </p:cond>
+                      </p:stCondLst>
+                      <p:childTnLst>
+                        <p:par>
+                          <p:cTn id="4" fill="hold">
+                            <p:stCondLst>
+                              <p:cond delay="0"/>
+                            </p:stCondLst>
+                            <p:childTnLst>
+                              <p:par>
+                                <p:cTn id="5" presetID="1" presetClass="entr" presetSubtype="0" fill="hold" grpId="0" nodeType="withEffect">
+                                  <p:stCondLst>
+                                    <p:cond delay="0"/>
+                                  </p:stCondLst>
+                                  <p:childTnLst>
+                                    <p:set>
+                                      <p:cBhvr>
+                                        <p:cTn id="6" dur="1" fill="hold">
+                                          <p:stCondLst>
+                                            <p:cond delay="0"/>
+                                          </p:stCondLst>
+                                        </p:cTn>
+                                        <p:tgtEl>
+                                          <p:spTgt spid="5"/>
+                                        </p:tgtEl>
+                                        <p:attrNameLst>
+                                          <p:attrName>style.visibility</p:attrName>
+                                        </p:attrNameLst>
+                                      </p:cBhvr>
+                                      <p:to>
+                                        <p:strVal val="visible"/>
+                                      </p:to>
+                                    </p:set>
+                                  </p:childTnLst>
+                                </p:cTn>
+                              </p:par>
+                              <p:par>
+                                <p:cTn id="7" presetID="1" presetClass="entr" presetSubtype="0" fill="hold" grpId="0" nodeType="withEffect">
+                                  <p:stCondLst>
+                                    <p:cond delay="0"/>
+                                  </p:stCondLst>
+                                  <p:childTnLst>
+                                    <p:set>
+                                      <p:cBhvr>
+                                        <p:cTn id="8" dur="1" fill="hold">
+                                          <p:stCondLst>
+                                            <p:cond delay="0"/>
+                                          </p:stCondLst>
+                                        </p:cTn>
+                                        <p:tgtEl>
+                                          <p:spTgt spid="6"/>
+                                        </p:tgtEl>
+                                        <p:attrNameLst>
+                                          <p:attrName>style.visibility</p:attrName>
+                                        </p:attrNameLst>
+                                      </p:cBhvr>
+                                      <p:to>
+                                        <p:strVal val="visible"/>
+                                      </p:to>
+                                    </p:set>
+                                  </p:childTnLst>
+                                </p:cTn>
+                              </p:par>
+                              <p:par>
+                                <p:cTn id="9" presetID="1" presetClass="entr" presetSubtype="0" fill="hold" grpId="0" nodeType="withEffect">
+                                  <p:stCondLst>
+                                    <p:cond delay="0"/>
+                                  </p:stCondLst>
+                                  <p:childTnLst>
+                                    <p:set>
+                                      <p:cBhvr>
+                                        <p:cTn id="10" dur="1" fill="hold">
+                                          <p:stCondLst>
+                                            <p:cond delay="0"/>
+                                          </p:stCondLst>
+                                        </p:cTn>
+                                        <p:tgtEl>
+                                          <p:spTgt spid="7"/>
+                                        </p:tgtEl>
+                                        <p:attrNameLst>
+                                          <p:attrName>style.visibility</p:attrName>
+                                        </p:attrNameLst>
+                                      </p:cBhvr>
+                                      <p:to>
+                                        <p:strVal val="visible"/>
+                                      </p:to>
+                                    </p:set>
+                                  </p:childTnLst>
+                                </p:cTn>
+                              </p:par>
+                            </p:childTnLst>
+                          </p:cTn>
+                        </p:par>
+                      </p:childTnLst>
+                    </p:cTn>
+                  </p:par>
+                </p:childTnLst>
+              </p:cTn>
+              <p:prevCondLst>
+                <p:cond evt="onPrev" delay="0">
+                  <p:tgtEl>
+                    <p:sldTgt/>
+                  </p:tgtEl>
+                </p:cond>
+              </p:prevCondLst>
+              <p:nextCondLst>
+                <p:cond evt="onNext" delay="0">
+                  <p:tgtEl>
+                    <p:sldTgt/>
+                  </p:tgtEl>
+                </p:cond>
+              </p:nextCondLst>
+            </p:seq>
+          </p:childTnLst>
+        </p:cTn>
+      </p:par>
+    </p:tnLst>
+    <p:bldLst>
+      <p:bldP spid="5" grpId="0" animBg="1"/>
+      <p:bldP spid="6" grpId="0" animBg="1"/>
+      <p:bldP spid="7" grpId="0" animBg="1"/>
+    </p:bldLst>
+  </p:timing>
+</p:sld>
+</file>
+
+<file path=ppt/slides/slide61.xml><?xml version="1.0" encoding="utf-8"?>
+<p:sld xmlns:a="http://schemas.openxmlformats.org/drawingml/2006/main" xmlns:r="http://schemas.openxmlformats.org/officeDocument/2006/relationships" xmlns:p="http://schemas.openxmlformats.org/presentationml/2006/main">
+  <p:cSld>
+    <p:spTree>
+      <p:nvGrpSpPr>
+        <p:cNvPr id="1" name=""/>
+        <p:cNvGrpSpPr/>
+        <p:nvPr/>
+      </p:nvGrpSpPr>
+      <p:grpSpPr>
+        <a:xfrm>
+          <a:off x="0" y="0"/>
+          <a:ext cx="0" cy="0"/>
+          <a:chOff x="0" y="0"/>
+          <a:chExt cx="0" cy="0"/>
+        </a:xfrm>
+      </p:grpSpPr>
+      <p:sp>
+        <p:nvSpPr>
+          <p:cNvPr id="2" name="Title 1">
+            <a:extLst>
+              <a:ext uri="{FF2B5EF4-FFF2-40B4-BE49-F238E27FC236}">
+                <a16:creationId xmlns:a16="http://schemas.microsoft.com/office/drawing/2014/main" id="{A7F0DB7C-11AE-733B-4341-58C9F782E3E8}"/>
+              </a:ext>
+            </a:extLst>
+          </p:cNvPr>
+          <p:cNvSpPr>
+            <a:spLocks noGrp="1"/>
+          </p:cNvSpPr>
+          <p:nvPr>
+            <p:ph type="title"/>
+          </p:nvPr>
+        </p:nvSpPr>
+        <p:spPr/>
+        <p:txBody>
+          <a:bodyPr/>
+          <a:lstStyle/>
+          <a:p>
+            <a:r>
+              <a:rPr lang="en-US" dirty="0"/>
+              <a:t>Use cases</a:t>
+            </a:r>
+            <a:endParaRPr lang="LID4096" dirty="0"/>
+          </a:p>
+        </p:txBody>
+      </p:sp>
+      <p:sp>
+        <p:nvSpPr>
+          <p:cNvPr id="3" name="Content Placeholder 2">
+            <a:extLst>
+              <a:ext uri="{FF2B5EF4-FFF2-40B4-BE49-F238E27FC236}">
+                <a16:creationId xmlns:a16="http://schemas.microsoft.com/office/drawing/2014/main" id="{B39D928F-41B0-6F58-D3D0-5E920553C9E1}"/>
+              </a:ext>
+            </a:extLst>
+          </p:cNvPr>
+          <p:cNvSpPr>
+            <a:spLocks noGrp="1"/>
+          </p:cNvSpPr>
+          <p:nvPr>
+            <p:ph idx="1"/>
+          </p:nvPr>
+        </p:nvSpPr>
+        <p:spPr/>
+        <p:txBody>
+          <a:bodyPr/>
+          <a:lstStyle/>
+          <a:p>
+            <a:r>
+              <a:rPr lang="en-US" dirty="0"/>
+              <a:t>Experimentation</a:t>
+            </a:r>
+          </a:p>
+          <a:p>
+            <a:r>
+              <a:rPr lang="en-US" dirty="0"/>
+              <a:t>Debugging</a:t>
+            </a:r>
+          </a:p>
+          <a:p>
+            <a:r>
+              <a:rPr lang="en-US" dirty="0"/>
+              <a:t>Quick hack</a:t>
+            </a:r>
+          </a:p>
+          <a:p>
+            <a:endParaRPr lang="en-US" dirty="0"/>
+          </a:p>
+          <a:p>
+            <a:endParaRPr lang="en-US" dirty="0"/>
+          </a:p>
+          <a:p>
+            <a:endParaRPr lang="en-US" dirty="0"/>
+          </a:p>
+          <a:p>
+            <a:r>
+              <a:rPr lang="en-US" dirty="0"/>
+              <a:t>Never put image in production!</a:t>
+            </a:r>
+          </a:p>
+          <a:p>
+            <a:pPr lvl="1"/>
+            <a:r>
+              <a:rPr lang="en-US" dirty="0"/>
+              <a:t>Update recipe</a:t>
+            </a:r>
+          </a:p>
+          <a:p>
+            <a:pPr lvl="1"/>
+            <a:r>
+              <a:rPr lang="en-US" dirty="0"/>
+              <a:t>Unless under DVC control</a:t>
+            </a:r>
+            <a:endParaRPr lang="LID4096" dirty="0"/>
+          </a:p>
+        </p:txBody>
+      </p:sp>
+      <p:sp>
+        <p:nvSpPr>
+          <p:cNvPr id="4" name="Slide Number Placeholder 3">
+            <a:extLst>
+              <a:ext uri="{FF2B5EF4-FFF2-40B4-BE49-F238E27FC236}">
+                <a16:creationId xmlns:a16="http://schemas.microsoft.com/office/drawing/2014/main" id="{B4F3B60C-F600-7D76-7D49-B1A227FB1BED}"/>
+              </a:ext>
+            </a:extLst>
+          </p:cNvPr>
+          <p:cNvSpPr>
+            <a:spLocks noGrp="1"/>
+          </p:cNvSpPr>
+          <p:nvPr>
+            <p:ph type="sldNum" sz="quarter" idx="12"/>
+          </p:nvPr>
+        </p:nvSpPr>
+        <p:spPr/>
+        <p:txBody>
+          <a:bodyPr/>
+          <a:lstStyle/>
+          <a:p>
+            <a:fld id="{AEFF399F-E3B5-4890-BC79-9BC8D4DF3F2D}" type="slidenum">
+              <a:rPr lang="nl-BE" smtClean="0"/>
+              <a:t>61</a:t>
+            </a:fld>
+            <a:endParaRPr lang="nl-BE"/>
+          </a:p>
+        </p:txBody>
+      </p:sp>
+      <p:grpSp>
+        <p:nvGrpSpPr>
+          <p:cNvPr id="7" name="Group 6">
+            <a:extLst>
+              <a:ext uri="{FF2B5EF4-FFF2-40B4-BE49-F238E27FC236}">
+                <a16:creationId xmlns:a16="http://schemas.microsoft.com/office/drawing/2014/main" id="{C77E7B5C-5F39-ADE4-B880-70CDAD8F1C17}"/>
+              </a:ext>
+            </a:extLst>
+          </p:cNvPr>
+          <p:cNvGrpSpPr/>
+          <p:nvPr/>
+        </p:nvGrpSpPr>
+        <p:grpSpPr>
+          <a:xfrm>
+            <a:off x="1848100" y="3465295"/>
+            <a:ext cx="5740157" cy="1071997"/>
+            <a:chOff x="1983182" y="3221684"/>
+            <a:chExt cx="5740157" cy="1071997"/>
+          </a:xfrm>
+        </p:grpSpPr>
+        <p:sp>
+          <p:nvSpPr>
+            <p:cNvPr id="5" name="TextBox 4">
+              <a:extLst>
+                <a:ext uri="{FF2B5EF4-FFF2-40B4-BE49-F238E27FC236}">
+                  <a16:creationId xmlns:a16="http://schemas.microsoft.com/office/drawing/2014/main" id="{28F5FBEC-0693-6589-1407-9FE85A42D947}"/>
+                </a:ext>
+              </a:extLst>
+            </p:cNvPr>
+            <p:cNvSpPr txBox="1"/>
+            <p:nvPr/>
+          </p:nvSpPr>
+          <p:spPr>
+            <a:xfrm>
+              <a:off x="1983182" y="3708906"/>
+              <a:ext cx="5177636" cy="584775"/>
+            </a:xfrm>
+            <a:prstGeom prst="rect">
+              <a:avLst/>
+            </a:prstGeom>
+            <a:solidFill>
+              <a:schemeClr val="bg1"/>
+            </a:solidFill>
+            <a:ln>
+              <a:solidFill>
+                <a:schemeClr val="tx1"/>
+              </a:solidFill>
+            </a:ln>
+          </p:spPr>
+          <p:txBody>
+            <a:bodyPr wrap="none" rtlCol="0">
+              <a:spAutoFit/>
+            </a:bodyPr>
+            <a:lstStyle/>
+            <a:p>
+              <a:r>
+                <a:rPr lang="en-US" sz="3200" dirty="0"/>
+                <a:t>Note: this is not reproducible!</a:t>
+              </a:r>
+              <a:endParaRPr lang="LID4096" sz="3200" dirty="0"/>
+            </a:p>
+          </p:txBody>
+        </p:sp>
+        <p:pic>
+          <p:nvPicPr>
+            <p:cNvPr id="6" name="Graphic 5" descr="Thumbs Down with solid fill">
+              <a:extLst>
+                <a:ext uri="{FF2B5EF4-FFF2-40B4-BE49-F238E27FC236}">
+                  <a16:creationId xmlns:a16="http://schemas.microsoft.com/office/drawing/2014/main" id="{B40581C5-960E-6996-23AA-AE9C653BBCCE}"/>
+                </a:ext>
+              </a:extLst>
+            </p:cNvPr>
+            <p:cNvPicPr>
+              <a:picLocks noChangeAspect="1"/>
+            </p:cNvPicPr>
+            <p:nvPr/>
+          </p:nvPicPr>
+          <p:blipFill>
+            <a:blip r:embed="rId2">
+              <a:extLst>
+                <a:ext uri="{96DAC541-7B7A-43D3-8B79-37D633B846F1}">
+                  <asvg:svgBlip xmlns:asvg="http://schemas.microsoft.com/office/drawing/2016/SVG/main" r:embed="rId3"/>
+                </a:ext>
+              </a:extLst>
+            </a:blip>
+            <a:stretch>
+              <a:fillRect/>
+            </a:stretch>
+          </p:blipFill>
+          <p:spPr>
+            <a:xfrm>
+              <a:off x="6748896" y="3221684"/>
+              <a:ext cx="974443" cy="974443"/>
+            </a:xfrm>
+            <a:prstGeom prst="rect">
+              <a:avLst/>
+            </a:prstGeom>
+          </p:spPr>
+        </p:pic>
+      </p:grpSp>
+    </p:spTree>
+    <p:extLst>
+      <p:ext uri="{BB962C8B-B14F-4D97-AF65-F5344CB8AC3E}">
+        <p14:creationId xmlns:p14="http://schemas.microsoft.com/office/powerpoint/2010/main" val="2295008408"/>
+      </p:ext>
+    </p:extLst>
+  </p:cSld>
+  <p:clrMapOvr>
+    <a:masterClrMapping/>
+  </p:clrMapOvr>
+  <p:timing>
+    <p:tnLst>
+      <p:par>
+        <p:cTn id="1" dur="indefinite" restart="never" nodeType="tmRoot">
+          <p:childTnLst>
+            <p:seq concurrent="1" nextAc="seek">
+              <p:cTn id="2" dur="indefinite" nodeType="mainSeq">
+                <p:childTnLst>
+                  <p:par>
+                    <p:cTn id="3" fill="hold">
+                      <p:stCondLst>
+                        <p:cond delay="indefinite"/>
+                        <p:cond evt="onBegin" delay="0">
+                          <p:tn val="2"/>
+                        </p:cond>
+                      </p:stCondLst>
+                      <p:childTnLst>
+                        <p:par>
+                          <p:cTn id="4" fill="hold">
+                            <p:stCondLst>
+                              <p:cond delay="0"/>
+                            </p:stCondLst>
+                            <p:childTnLst>
+                              <p:par>
+                                <p:cTn id="5" presetID="1" presetClass="entr" presetSubtype="0" fill="hold" grpId="0" nodeType="withEffect">
+                                  <p:stCondLst>
+                                    <p:cond delay="0"/>
+                                  </p:stCondLst>
+                                  <p:childTnLst>
+                                    <p:set>
+                                      <p:cBhvr>
+                                        <p:cTn id="6" dur="1" fill="hold">
+                                          <p:stCondLst>
+                                            <p:cond delay="0"/>
+                                          </p:stCondLst>
+                                        </p:cTn>
+                                        <p:tgtEl>
+                                          <p:spTgt spid="3">
+                                            <p:txEl>
+                                              <p:pRg st="0" end="0"/>
+                                            </p:txEl>
+                                          </p:spTgt>
+                                        </p:tgtEl>
+                                        <p:attrNameLst>
+                                          <p:attrName>style.visibility</p:attrName>
+                                        </p:attrNameLst>
+                                      </p:cBhvr>
+                                      <p:to>
+                                        <p:strVal val="visible"/>
+                                      </p:to>
+                                    </p:set>
+                                  </p:childTnLst>
+                                </p:cTn>
+                              </p:par>
+                            </p:childTnLst>
+                          </p:cTn>
+                        </p:par>
+                      </p:childTnLst>
+                    </p:cTn>
+                  </p:par>
+                  <p:par>
+                    <p:cTn id="7" fill="hold">
+                      <p:stCondLst>
+                        <p:cond delay="indefinite"/>
+                      </p:stCondLst>
+                      <p:childTnLst>
+                        <p:par>
+                          <p:cTn id="8" fill="hold">
+                            <p:stCondLst>
+                              <p:cond delay="0"/>
+                            </p:stCondLst>
+                            <p:childTnLst>
+                              <p:par>
+                                <p:cTn id="9" presetID="1" presetClass="entr" presetSubtype="0" fill="hold" grpId="0" nodeType="clickEffect">
+                                  <p:stCondLst>
+                                    <p:cond delay="0"/>
+                                  </p:stCondLst>
+                                  <p:childTnLst>
+                                    <p:set>
+                                      <p:cBhvr>
+                                        <p:cTn id="10" dur="1" fill="hold">
+                                          <p:stCondLst>
+                                            <p:cond delay="0"/>
+                                          </p:stCondLst>
+                                        </p:cTn>
+                                        <p:tgtEl>
+                                          <p:spTgt spid="3">
+                                            <p:txEl>
+                                              <p:pRg st="1" end="1"/>
+                                            </p:txEl>
+                                          </p:spTgt>
+                                        </p:tgtEl>
+                                        <p:attrNameLst>
+                                          <p:attrName>style.visibility</p:attrName>
+                                        </p:attrNameLst>
+                                      </p:cBhvr>
+                                      <p:to>
+                                        <p:strVal val="visible"/>
+                                      </p:to>
+                                    </p:set>
+                                  </p:childTnLst>
+                                </p:cTn>
+                              </p:par>
+                            </p:childTnLst>
+                          </p:cTn>
+                        </p:par>
+                      </p:childTnLst>
+                    </p:cTn>
+                  </p:par>
+                  <p:par>
+                    <p:cTn id="11" fill="hold">
+                      <p:stCondLst>
+                        <p:cond delay="indefinite"/>
+                      </p:stCondLst>
+                      <p:childTnLst>
+                        <p:par>
+                          <p:cTn id="12" fill="hold">
+                            <p:stCondLst>
+                              <p:cond delay="0"/>
+                            </p:stCondLst>
+                            <p:childTnLst>
+                              <p:par>
+                                <p:cTn id="13" presetID="1" presetClass="entr" presetSubtype="0" fill="hold" grpId="0" nodeType="clickEffect">
+                                  <p:stCondLst>
+                                    <p:cond delay="0"/>
+                                  </p:stCondLst>
+                                  <p:childTnLst>
+                                    <p:set>
+                                      <p:cBhvr>
+                                        <p:cTn id="14" dur="1" fill="hold">
+                                          <p:stCondLst>
+                                            <p:cond delay="0"/>
+                                          </p:stCondLst>
+                                        </p:cTn>
+                                        <p:tgtEl>
+                                          <p:spTgt spid="3">
+                                            <p:txEl>
+                                              <p:pRg st="2" end="2"/>
+                                            </p:txEl>
+                                          </p:spTgt>
+                                        </p:tgtEl>
+                                        <p:attrNameLst>
+                                          <p:attrName>style.visibility</p:attrName>
+                                        </p:attrNameLst>
+                                      </p:cBhvr>
+                                      <p:to>
+                                        <p:strVal val="visible"/>
+                                      </p:to>
+                                    </p:set>
+                                  </p:childTnLst>
+                                </p:cTn>
+                              </p:par>
+                            </p:childTnLst>
+                          </p:cTn>
+                        </p:par>
+                      </p:childTnLst>
+                    </p:cTn>
+                  </p:par>
+                  <p:par>
+                    <p:cTn id="15" fill="hold">
+                      <p:stCondLst>
+                        <p:cond delay="indefinite"/>
+                      </p:stCondLst>
+                      <p:childTnLst>
+                        <p:par>
+                          <p:cTn id="16" fill="hold">
+                            <p:stCondLst>
+                              <p:cond delay="0"/>
+                            </p:stCondLst>
+                            <p:childTnLst>
+                              <p:par>
+                                <p:cTn id="17" presetID="1" presetClass="entr" presetSubtype="0" fill="hold" nodeType="clickEffect">
+                                  <p:stCondLst>
+                                    <p:cond delay="0"/>
+                                  </p:stCondLst>
+                                  <p:childTnLst>
+                                    <p:set>
+                                      <p:cBhvr>
+                                        <p:cTn id="18" dur="1" fill="hold">
+                                          <p:stCondLst>
+                                            <p:cond delay="0"/>
+                                          </p:stCondLst>
+                                        </p:cTn>
+                                        <p:tgtEl>
+                                          <p:spTgt spid="7"/>
+                                        </p:tgtEl>
+                                        <p:attrNameLst>
+                                          <p:attrName>style.visibility</p:attrName>
+                                        </p:attrNameLst>
+                                      </p:cBhvr>
+                                      <p:to>
+                                        <p:strVal val="visible"/>
+                                      </p:to>
+                                    </p:set>
+                                  </p:childTnLst>
+                                </p:cTn>
+                              </p:par>
+                            </p:childTnLst>
+                          </p:cTn>
+                        </p:par>
+                      </p:childTnLst>
+                    </p:cTn>
+                  </p:par>
+                  <p:par>
+                    <p:cTn id="19" fill="hold">
+                      <p:stCondLst>
+                        <p:cond delay="indefinite"/>
+                      </p:stCondLst>
+                      <p:childTnLst>
+                        <p:par>
+                          <p:cTn id="20" fill="hold">
+                            <p:stCondLst>
+                              <p:cond delay="0"/>
+                            </p:stCondLst>
+                            <p:childTnLst>
+                              <p:par>
+                                <p:cTn id="21" presetID="1" presetClass="entr" presetSubtype="0" fill="hold" grpId="0" nodeType="clickEffect">
+                                  <p:stCondLst>
+                                    <p:cond delay="0"/>
+                                  </p:stCondLst>
+                                  <p:childTnLst>
+                                    <p:set>
+                                      <p:cBhvr>
+                                        <p:cTn id="22" dur="1" fill="hold">
+                                          <p:stCondLst>
+                                            <p:cond delay="0"/>
+                                          </p:stCondLst>
+                                        </p:cTn>
+                                        <p:tgtEl>
+                                          <p:spTgt spid="3">
+                                            <p:txEl>
+                                              <p:pRg st="6" end="6"/>
+                                            </p:txEl>
+                                          </p:spTgt>
+                                        </p:tgtEl>
+                                        <p:attrNameLst>
+                                          <p:attrName>style.visibility</p:attrName>
+                                        </p:attrNameLst>
+                                      </p:cBhvr>
+                                      <p:to>
+                                        <p:strVal val="visible"/>
+                                      </p:to>
+                                    </p:set>
+                                  </p:childTnLst>
+                                </p:cTn>
+                              </p:par>
+                              <p:par>
+                                <p:cTn id="23" presetID="1" presetClass="entr" presetSubtype="0" fill="hold" grpId="0" nodeType="withEffect">
+                                  <p:stCondLst>
+                                    <p:cond delay="0"/>
+                                  </p:stCondLst>
+                                  <p:childTnLst>
+                                    <p:set>
+                                      <p:cBhvr>
+                                        <p:cTn id="24" dur="1" fill="hold">
+                                          <p:stCondLst>
+                                            <p:cond delay="0"/>
+                                          </p:stCondLst>
+                                        </p:cTn>
+                                        <p:tgtEl>
+                                          <p:spTgt spid="3">
+                                            <p:txEl>
+                                              <p:pRg st="7" end="7"/>
+                                            </p:txEl>
+                                          </p:spTgt>
+                                        </p:tgtEl>
+                                        <p:attrNameLst>
+                                          <p:attrName>style.visibility</p:attrName>
+                                        </p:attrNameLst>
+                                      </p:cBhvr>
+                                      <p:to>
+                                        <p:strVal val="visible"/>
+                                      </p:to>
+                                    </p:set>
+                                  </p:childTnLst>
+                                </p:cTn>
+                              </p:par>
+                              <p:par>
+                                <p:cTn id="25" presetID="1" presetClass="entr" presetSubtype="0" fill="hold" grpId="0" nodeType="withEffect">
+                                  <p:stCondLst>
+                                    <p:cond delay="0"/>
+                                  </p:stCondLst>
+                                  <p:childTnLst>
+                                    <p:set>
+                                      <p:cBhvr>
+                                        <p:cTn id="26" dur="1" fill="hold">
+                                          <p:stCondLst>
+                                            <p:cond delay="0"/>
+                                          </p:stCondLst>
+                                        </p:cTn>
+                                        <p:tgtEl>
+                                          <p:spTgt spid="3">
+                                            <p:txEl>
+                                              <p:pRg st="8" end="8"/>
+                                            </p:txEl>
+                                          </p:spTgt>
+                                        </p:tgtEl>
+                                        <p:attrNameLst>
+                                          <p:attrName>style.visibility</p:attrName>
+                                        </p:attrNameLst>
+                                      </p:cBhvr>
+                                      <p:to>
+                                        <p:strVal val="visible"/>
+                                      </p:to>
+                                    </p:set>
+                                  </p:childTnLst>
+                                </p:cTn>
+                              </p:par>
+                            </p:childTnLst>
+                          </p:cTn>
+                        </p:par>
+                      </p:childTnLst>
+                    </p:cTn>
+                  </p:par>
+                </p:childTnLst>
+              </p:cTn>
+              <p:prevCondLst>
+                <p:cond evt="onPrev" delay="0">
+                  <p:tgtEl>
+                    <p:sldTgt/>
+                  </p:tgtEl>
+                </p:cond>
+              </p:prevCondLst>
+              <p:nextCondLst>
+                <p:cond evt="onNext" delay="0">
+                  <p:tgtEl>
+                    <p:sldTgt/>
+                  </p:tgtEl>
+                </p:cond>
+              </p:nextCondLst>
+            </p:seq>
+          </p:childTnLst>
+        </p:cTn>
+      </p:par>
+    </p:tnLst>
+    <p:bldLst>
+      <p:bldP spid="3" grpId="0" uiExpand="1" build="p"/>
+    </p:bldLst>
+  </p:timing>
+</p:sld>
+</file>
+
+<file path=ppt/slides/slide62.xml><?xml version="1.0" encoding="utf-8"?>
+<p:sld xmlns:a="http://schemas.openxmlformats.org/drawingml/2006/main" xmlns:r="http://schemas.openxmlformats.org/officeDocument/2006/relationships" xmlns:p="http://schemas.openxmlformats.org/presentationml/2006/main">
+  <p:cSld>
+    <p:spTree>
+      <p:nvGrpSpPr>
+        <p:cNvPr id="1" name=""/>
+        <p:cNvGrpSpPr/>
+        <p:nvPr/>
+      </p:nvGrpSpPr>
+      <p:grpSpPr>
+        <a:xfrm>
+          <a:off x="0" y="0"/>
+          <a:ext cx="0" cy="0"/>
+          <a:chOff x="0" y="0"/>
+          <a:chExt cx="0" cy="0"/>
+        </a:xfrm>
+      </p:grpSpPr>
+      <p:sp>
+        <p:nvSpPr>
+          <p:cNvPr id="2" name="Title 1"/>
+          <p:cNvSpPr>
+            <a:spLocks noGrp="1"/>
+          </p:cNvSpPr>
+          <p:nvPr>
+            <p:ph type="title"/>
+          </p:nvPr>
+        </p:nvSpPr>
+        <p:spPr/>
+        <p:txBody>
+          <a:bodyPr/>
+          <a:lstStyle/>
+          <a:p>
+            <a:r>
+              <a:rPr lang="en-US" dirty="0"/>
+              <a:t>Performance &amp; best practices</a:t>
+            </a:r>
+            <a:endParaRPr lang="nl-BE" dirty="0"/>
+          </a:p>
+        </p:txBody>
+      </p:sp>
+      <p:sp>
+        <p:nvSpPr>
+          <p:cNvPr id="3" name="Text Placeholder 2"/>
+          <p:cNvSpPr>
+            <a:spLocks noGrp="1"/>
+          </p:cNvSpPr>
+          <p:nvPr>
+            <p:ph type="body" idx="1"/>
+          </p:nvPr>
+        </p:nvSpPr>
+        <p:spPr/>
+        <p:txBody>
+          <a:bodyPr/>
+          <a:lstStyle/>
+          <a:p>
+            <a:endParaRPr lang="nl-BE"/>
+          </a:p>
+        </p:txBody>
+      </p:sp>
+      <p:sp>
+        <p:nvSpPr>
+          <p:cNvPr id="4" name="Slide Number Placeholder 3"/>
+          <p:cNvSpPr>
+            <a:spLocks noGrp="1"/>
+          </p:cNvSpPr>
+          <p:nvPr>
+            <p:ph type="sldNum" sz="quarter" idx="12"/>
+          </p:nvPr>
+        </p:nvSpPr>
+        <p:spPr/>
+        <p:txBody>
+          <a:bodyPr/>
+          <a:lstStyle/>
+          <a:p>
+            <a:fld id="{AEFF399F-E3B5-4890-BC79-9BC8D4DF3F2D}" type="slidenum">
+              <a:rPr lang="nl-BE" smtClean="0"/>
+              <a:t>62</a:t>
+            </a:fld>
+            <a:endParaRPr lang="nl-BE"/>
+          </a:p>
+        </p:txBody>
+      </p:sp>
+    </p:spTree>
+    <p:extLst>
+      <p:ext uri="{BB962C8B-B14F-4D97-AF65-F5344CB8AC3E}">
+        <p14:creationId xmlns:p14="http://schemas.microsoft.com/office/powerpoint/2010/main" val="3021828449"/>
+      </p:ext>
+    </p:extLst>
+  </p:cSld>
+  <p:clrMapOvr>
+    <a:masterClrMapping/>
+  </p:clrMapOvr>
+</p:sld>
+</file>
+
+<file path=ppt/slides/slide63.xml><?xml version="1.0" encoding="utf-8"?>
+<p:sld xmlns:a="http://schemas.openxmlformats.org/drawingml/2006/main" xmlns:r="http://schemas.openxmlformats.org/officeDocument/2006/relationships" xmlns:p="http://schemas.openxmlformats.org/presentationml/2006/main">
+  <p:cSld>
+    <p:spTree>
+      <p:nvGrpSpPr>
+        <p:cNvPr id="1" name=""/>
+        <p:cNvGrpSpPr/>
+        <p:nvPr/>
+      </p:nvGrpSpPr>
+      <p:grpSpPr>
+        <a:xfrm>
+          <a:off x="0" y="0"/>
+          <a:ext cx="0" cy="0"/>
+          <a:chOff x="0" y="0"/>
+          <a:chExt cx="0" cy="0"/>
+        </a:xfrm>
+      </p:grpSpPr>
+      <p:sp>
+        <p:nvSpPr>
           <p:cNvPr id="5" name="Title 4"/>
           <p:cNvSpPr>
             <a:spLocks noGrp="1"/>
@@ -35186,7 +36589,7 @@
           <a:p>
             <a:fld id="{AEFF399F-E3B5-4890-BC79-9BC8D4DF3F2D}" type="slidenum">
               <a:rPr lang="nl-BE" smtClean="0"/>
-              <a:t>60</a:t>
+              <a:t>63</a:t>
             </a:fld>
             <a:endParaRPr lang="nl-BE"/>
           </a:p>
@@ -35716,7 +37119,7 @@
 </p:sld>
 </file>
 
-<file path=ppt/slides/slide61.xml><?xml version="1.0" encoding="utf-8"?>
+<file path=ppt/slides/slide64.xml><?xml version="1.0" encoding="utf-8"?>
 <p:sld xmlns:a="http://schemas.openxmlformats.org/drawingml/2006/main" xmlns:r="http://schemas.openxmlformats.org/officeDocument/2006/relationships" xmlns:p="http://schemas.openxmlformats.org/presentationml/2006/main">
   <p:cSld>
     <p:spTree>
@@ -35866,7 +37269,7 @@
           <a:p>
             <a:fld id="{AEFF399F-E3B5-4890-BC79-9BC8D4DF3F2D}" type="slidenum">
               <a:rPr lang="nl-BE" smtClean="0"/>
-              <a:t>61</a:t>
+              <a:t>64</a:t>
             </a:fld>
             <a:endParaRPr lang="nl-BE"/>
           </a:p>
@@ -36117,7 +37520,7 @@
 </p:sld>
 </file>
 
-<file path=ppt/slides/slide62.xml><?xml version="1.0" encoding="utf-8"?>
+<file path=ppt/slides/slide65.xml><?xml version="1.0" encoding="utf-8"?>
 <p:sld xmlns:a="http://schemas.openxmlformats.org/drawingml/2006/main" xmlns:r="http://schemas.openxmlformats.org/officeDocument/2006/relationships" xmlns:p="http://schemas.openxmlformats.org/presentationml/2006/main">
   <p:cSld>
     <p:spTree>
@@ -36299,7 +37702,7 @@
           <a:p>
             <a:fld id="{AEFF399F-E3B5-4890-BC79-9BC8D4DF3F2D}" type="slidenum">
               <a:rPr lang="nl-BE" smtClean="0"/>
-              <a:t>62</a:t>
+              <a:t>65</a:t>
             </a:fld>
             <a:endParaRPr lang="nl-BE"/>
           </a:p>
@@ -36550,7 +37953,7 @@
 </p:sld>
 </file>
 
-<file path=ppt/slides/slide63.xml><?xml version="1.0" encoding="utf-8"?>
+<file path=ppt/slides/slide66.xml><?xml version="1.0" encoding="utf-8"?>
 <p:sld xmlns:a="http://schemas.openxmlformats.org/drawingml/2006/main" xmlns:r="http://schemas.openxmlformats.org/officeDocument/2006/relationships" xmlns:p="http://schemas.openxmlformats.org/presentationml/2006/main">
   <p:cSld>
     <p:spTree>
@@ -36700,7 +38103,7 @@
           <a:p>
             <a:fld id="{AEFF399F-E3B5-4890-BC79-9BC8D4DF3F2D}" type="slidenum">
               <a:rPr lang="nl-BE" smtClean="0"/>
-              <a:t>63</a:t>
+              <a:t>66</a:t>
             </a:fld>
             <a:endParaRPr lang="nl-BE"/>
           </a:p>
@@ -37107,7 +38510,7 @@
 </p:sld>
 </file>
 
-<file path=ppt/slides/slide64.xml><?xml version="1.0" encoding="utf-8"?>
+<file path=ppt/slides/slide67.xml><?xml version="1.0" encoding="utf-8"?>
 <p:sld xmlns:a="http://schemas.openxmlformats.org/drawingml/2006/main" xmlns:r="http://schemas.openxmlformats.org/officeDocument/2006/relationships" xmlns:p="http://schemas.openxmlformats.org/presentationml/2006/main">
   <p:cSld>
     <p:spTree>
@@ -37183,7 +38586,7 @@
           <a:p>
             <a:fld id="{AEFF399F-E3B5-4890-BC79-9BC8D4DF3F2D}" type="slidenum">
               <a:rPr lang="nl-BE" smtClean="0"/>
-              <a:t>64</a:t>
+              <a:t>67</a:t>
             </a:fld>
             <a:endParaRPr lang="nl-BE"/>
           </a:p>
@@ -37202,7 +38605,7 @@
 </p:sld>
 </file>
 
-<file path=ppt/slides/slide65.xml><?xml version="1.0" encoding="utf-8"?>
+<file path=ppt/slides/slide68.xml><?xml version="1.0" encoding="utf-8"?>
 <p:sld xmlns:a="http://schemas.openxmlformats.org/drawingml/2006/main" xmlns:r="http://schemas.openxmlformats.org/officeDocument/2006/relationships" xmlns:p="http://schemas.openxmlformats.org/presentationml/2006/main">
   <p:cSld>
     <p:spTree>
@@ -37356,7 +38759,7 @@
           <a:p>
             <a:fld id="{AEFF399F-E3B5-4890-BC79-9BC8D4DF3F2D}" type="slidenum">
               <a:rPr lang="nl-BE" smtClean="0"/>
-              <a:t>65</a:t>
+              <a:t>68</a:t>
             </a:fld>
             <a:endParaRPr lang="nl-BE"/>
           </a:p>
@@ -37865,7 +39268,7 @@
 </p:sld>
 </file>
 
-<file path=ppt/slides/slide66.xml><?xml version="1.0" encoding="utf-8"?>
+<file path=ppt/slides/slide69.xml><?xml version="1.0" encoding="utf-8"?>
 <p:sld xmlns:a="http://schemas.openxmlformats.org/drawingml/2006/main" xmlns:r="http://schemas.openxmlformats.org/officeDocument/2006/relationships" xmlns:p="http://schemas.openxmlformats.org/presentationml/2006/main">
   <p:cSld>
     <p:spTree>
@@ -37918,7 +39321,7 @@
         <p:spPr/>
         <p:txBody>
           <a:bodyPr>
-            <a:normAutofit/>
+            <a:normAutofit fontScale="92500" lnSpcReduction="20000"/>
           </a:bodyPr>
           <a:lstStyle/>
           <a:p>
@@ -38016,6 +39419,25 @@
             <a:r>
               <a:rPr lang="en-US" dirty="0"/>
               <a:t> discussing singularity versus Docker/Shifter</a:t>
+            </a:r>
+          </a:p>
+          <a:p>
+            <a:r>
+              <a:rPr lang="en-US" dirty="0"/>
+              <a:t>DVC (Data Version Control)</a:t>
+            </a:r>
+            <a:br>
+              <a:rPr lang="en-US" dirty="0"/>
+            </a:br>
+            <a:r>
+              <a:rPr lang="en-US" dirty="0">
+                <a:hlinkClick r:id="rId6"/>
+              </a:rPr>
+              <a:t>https://dvc.org/</a:t>
+            </a:r>
+            <a:r>
+              <a:rPr lang="en-US" dirty="0"/>
+              <a:t> </a:t>
             </a:r>
             <a:endParaRPr lang="nl-BE" dirty="0"/>
           </a:p>
@@ -38038,7 +39460,7 @@
           <a:p>
             <a:fld id="{AEFF399F-E3B5-4890-BC79-9BC8D4DF3F2D}" type="slidenum">
               <a:rPr lang="nl-BE" smtClean="0"/>
-              <a:t>66</a:t>
+              <a:t>69</a:t>
             </a:fld>
             <a:endParaRPr lang="nl-BE"/>
           </a:p>
@@ -38057,7 +39479,516 @@
 </p:sld>
 </file>
 
-<file path=ppt/slides/slide67.xml><?xml version="1.0" encoding="utf-8"?>
+<file path=ppt/slides/slide7.xml><?xml version="1.0" encoding="utf-8"?>
+<p:sld xmlns:a="http://schemas.openxmlformats.org/drawingml/2006/main" xmlns:r="http://schemas.openxmlformats.org/officeDocument/2006/relationships" xmlns:p="http://schemas.openxmlformats.org/presentationml/2006/main">
+  <p:cSld>
+    <p:spTree>
+      <p:nvGrpSpPr>
+        <p:cNvPr id="1" name=""/>
+        <p:cNvGrpSpPr/>
+        <p:nvPr/>
+      </p:nvGrpSpPr>
+      <p:grpSpPr>
+        <a:xfrm>
+          <a:off x="0" y="0"/>
+          <a:ext cx="0" cy="0"/>
+          <a:chOff x="0" y="0"/>
+          <a:chExt cx="0" cy="0"/>
+        </a:xfrm>
+      </p:grpSpPr>
+      <p:sp>
+        <p:nvSpPr>
+          <p:cNvPr id="2" name="Title 1"/>
+          <p:cNvSpPr>
+            <a:spLocks noGrp="1"/>
+          </p:cNvSpPr>
+          <p:nvPr>
+            <p:ph type="title"/>
+          </p:nvPr>
+        </p:nvSpPr>
+        <p:spPr/>
+        <p:txBody>
+          <a:bodyPr/>
+          <a:lstStyle/>
+          <a:p>
+            <a:r>
+              <a:rPr lang="en-US" dirty="0"/>
+              <a:t>Introduction</a:t>
+            </a:r>
+            <a:endParaRPr lang="nl-BE" dirty="0"/>
+          </a:p>
+        </p:txBody>
+      </p:sp>
+      <p:sp>
+        <p:nvSpPr>
+          <p:cNvPr id="3" name="Content Placeholder 2"/>
+          <p:cNvSpPr>
+            <a:spLocks noGrp="1"/>
+          </p:cNvSpPr>
+          <p:nvPr>
+            <p:ph idx="1"/>
+          </p:nvPr>
+        </p:nvSpPr>
+        <p:spPr/>
+        <p:txBody>
+          <a:bodyPr/>
+          <a:lstStyle/>
+          <a:p>
+            <a:r>
+              <a:rPr lang="en-US" dirty="0"/>
+              <a:t>Singularity originally developed by Berkeley Lab, now at </a:t>
+            </a:r>
+            <a:r>
+              <a:rPr lang="en-US" dirty="0" err="1"/>
+              <a:t>Sylabs</a:t>
+            </a:r>
+            <a:br>
+              <a:rPr lang="en-US" dirty="0"/>
+            </a:br>
+            <a:r>
+              <a:rPr lang="en-US" dirty="0">
+                <a:hlinkClick r:id="rId2"/>
+              </a:rPr>
+              <a:t>https://sylabs.io/singularity/</a:t>
+            </a:r>
+            <a:endParaRPr lang="en-US" dirty="0"/>
+          </a:p>
+          <a:p>
+            <a:r>
+              <a:rPr lang="en-US" dirty="0"/>
+              <a:t>Intended as HPC alternative to</a:t>
+            </a:r>
+          </a:p>
+          <a:p>
+            <a:pPr lvl="1"/>
+            <a:r>
+              <a:rPr lang="en-US" dirty="0"/>
+              <a:t>Docker</a:t>
+            </a:r>
+            <a:br>
+              <a:rPr lang="en-US" dirty="0"/>
+            </a:br>
+            <a:r>
+              <a:rPr lang="en-US" dirty="0">
+                <a:hlinkClick r:id="rId3"/>
+              </a:rPr>
+              <a:t>https://www.docker.com/</a:t>
+            </a:r>
+            <a:r>
+              <a:rPr lang="en-US" dirty="0"/>
+              <a:t> </a:t>
+            </a:r>
+          </a:p>
+          <a:p>
+            <a:pPr lvl="1"/>
+            <a:r>
+              <a:rPr lang="en-US" dirty="0"/>
+              <a:t>Shifter</a:t>
+            </a:r>
+            <a:br>
+              <a:rPr lang="en-US" dirty="0"/>
+            </a:br>
+            <a:r>
+              <a:rPr lang="en-US" dirty="0">
+                <a:hlinkClick r:id="rId4"/>
+              </a:rPr>
+              <a:t>https://github.com/NERSC/shifter</a:t>
+            </a:r>
+            <a:r>
+              <a:rPr lang="en-US" dirty="0"/>
+              <a:t> </a:t>
+            </a:r>
+          </a:p>
+          <a:p>
+            <a:r>
+              <a:rPr lang="en-US" dirty="0"/>
+              <a:t>Open-source project: name change to </a:t>
+            </a:r>
+            <a:r>
+              <a:rPr lang="en-US" dirty="0" err="1"/>
+              <a:t>Apptainer</a:t>
+            </a:r>
+            <a:br>
+              <a:rPr lang="en-US" dirty="0"/>
+            </a:br>
+            <a:r>
+              <a:rPr lang="en-US" dirty="0">
+                <a:hlinkClick r:id="rId5"/>
+              </a:rPr>
+              <a:t>https://apptainer.org/</a:t>
+            </a:r>
+            <a:r>
+              <a:rPr lang="en-US" dirty="0"/>
+              <a:t> </a:t>
+            </a:r>
+            <a:endParaRPr lang="nl-BE" dirty="0"/>
+          </a:p>
+        </p:txBody>
+      </p:sp>
+      <p:sp>
+        <p:nvSpPr>
+          <p:cNvPr id="4" name="Slide Number Placeholder 3"/>
+          <p:cNvSpPr>
+            <a:spLocks noGrp="1"/>
+          </p:cNvSpPr>
+          <p:nvPr>
+            <p:ph type="sldNum" sz="quarter" idx="12"/>
+          </p:nvPr>
+        </p:nvSpPr>
+        <p:spPr/>
+        <p:txBody>
+          <a:bodyPr/>
+          <a:lstStyle/>
+          <a:p>
+            <a:fld id="{AEFF399F-E3B5-4890-BC79-9BC8D4DF3F2D}" type="slidenum">
+              <a:rPr lang="nl-BE" smtClean="0"/>
+              <a:t>7</a:t>
+            </a:fld>
+            <a:endParaRPr lang="nl-BE"/>
+          </a:p>
+        </p:txBody>
+      </p:sp>
+      <p:sp>
+        <p:nvSpPr>
+          <p:cNvPr id="5" name="Rectangle: Rounded Corners 4">
+            <a:extLst>
+              <a:ext uri="{FF2B5EF4-FFF2-40B4-BE49-F238E27FC236}">
+                <a16:creationId xmlns:a16="http://schemas.microsoft.com/office/drawing/2014/main" id="{037F983B-06B8-82E5-960E-0F35700C8237}"/>
+              </a:ext>
+            </a:extLst>
+          </p:cNvPr>
+          <p:cNvSpPr/>
+          <p:nvPr/>
+        </p:nvSpPr>
+        <p:spPr>
+          <a:xfrm>
+            <a:off x="6432072" y="5115464"/>
+            <a:ext cx="1512858" cy="388188"/>
+          </a:xfrm>
+          <a:prstGeom prst="roundRect">
+            <a:avLst/>
+          </a:prstGeom>
+          <a:solidFill>
+            <a:srgbClr val="FFC000">
+              <a:alpha val="24000"/>
+            </a:srgbClr>
+          </a:solidFill>
+          <a:ln>
+            <a:noFill/>
+          </a:ln>
+        </p:spPr>
+        <p:style>
+          <a:lnRef idx="2">
+            <a:schemeClr val="accent1">
+              <a:shade val="50000"/>
+            </a:schemeClr>
+          </a:lnRef>
+          <a:fillRef idx="1">
+            <a:schemeClr val="accent1"/>
+          </a:fillRef>
+          <a:effectRef idx="0">
+            <a:schemeClr val="accent1"/>
+          </a:effectRef>
+          <a:fontRef idx="minor">
+            <a:schemeClr val="lt1"/>
+          </a:fontRef>
+        </p:style>
+        <p:txBody>
+          <a:bodyPr rtlCol="0" anchor="ctr"/>
+          <a:lstStyle/>
+          <a:p>
+            <a:pPr algn="ctr"/>
+            <a:endParaRPr lang="en-US"/>
+          </a:p>
+        </p:txBody>
+      </p:sp>
+    </p:spTree>
+    <p:extLst>
+      <p:ext uri="{BB962C8B-B14F-4D97-AF65-F5344CB8AC3E}">
+        <p14:creationId xmlns:p14="http://schemas.microsoft.com/office/powerpoint/2010/main" val="658783311"/>
+      </p:ext>
+    </p:extLst>
+  </p:cSld>
+  <p:clrMapOvr>
+    <a:masterClrMapping/>
+  </p:clrMapOvr>
+  <p:timing>
+    <p:tnLst>
+      <p:par>
+        <p:cTn id="1" dur="indefinite" restart="never" nodeType="tmRoot">
+          <p:childTnLst>
+            <p:seq concurrent="1" nextAc="seek">
+              <p:cTn id="2" dur="indefinite" nodeType="mainSeq">
+                <p:childTnLst>
+                  <p:par>
+                    <p:cTn id="3" fill="hold">
+                      <p:stCondLst>
+                        <p:cond delay="indefinite"/>
+                        <p:cond evt="onBegin" delay="0">
+                          <p:tn val="2"/>
+                        </p:cond>
+                      </p:stCondLst>
+                      <p:childTnLst>
+                        <p:par>
+                          <p:cTn id="4" fill="hold">
+                            <p:stCondLst>
+                              <p:cond delay="0"/>
+                            </p:stCondLst>
+                            <p:childTnLst>
+                              <p:par>
+                                <p:cTn id="5" presetID="1" presetClass="entr" presetSubtype="0" fill="hold" grpId="0" nodeType="withEffect">
+                                  <p:stCondLst>
+                                    <p:cond delay="0"/>
+                                  </p:stCondLst>
+                                  <p:childTnLst>
+                                    <p:set>
+                                      <p:cBhvr>
+                                        <p:cTn id="6" dur="1" fill="hold">
+                                          <p:stCondLst>
+                                            <p:cond delay="0"/>
+                                          </p:stCondLst>
+                                        </p:cTn>
+                                        <p:tgtEl>
+                                          <p:spTgt spid="3">
+                                            <p:txEl>
+                                              <p:pRg st="0" end="0"/>
+                                            </p:txEl>
+                                          </p:spTgt>
+                                        </p:tgtEl>
+                                        <p:attrNameLst>
+                                          <p:attrName>style.visibility</p:attrName>
+                                        </p:attrNameLst>
+                                      </p:cBhvr>
+                                      <p:to>
+                                        <p:strVal val="visible"/>
+                                      </p:to>
+                                    </p:set>
+                                  </p:childTnLst>
+                                </p:cTn>
+                              </p:par>
+                            </p:childTnLst>
+                          </p:cTn>
+                        </p:par>
+                      </p:childTnLst>
+                    </p:cTn>
+                  </p:par>
+                  <p:par>
+                    <p:cTn id="7" fill="hold">
+                      <p:stCondLst>
+                        <p:cond delay="indefinite"/>
+                      </p:stCondLst>
+                      <p:childTnLst>
+                        <p:par>
+                          <p:cTn id="8" fill="hold">
+                            <p:stCondLst>
+                              <p:cond delay="0"/>
+                            </p:stCondLst>
+                            <p:childTnLst>
+                              <p:par>
+                                <p:cTn id="9" presetID="1" presetClass="entr" presetSubtype="0" fill="hold" grpId="0" nodeType="clickEffect">
+                                  <p:stCondLst>
+                                    <p:cond delay="0"/>
+                                  </p:stCondLst>
+                                  <p:childTnLst>
+                                    <p:set>
+                                      <p:cBhvr>
+                                        <p:cTn id="10" dur="1" fill="hold">
+                                          <p:stCondLst>
+                                            <p:cond delay="0"/>
+                                          </p:stCondLst>
+                                        </p:cTn>
+                                        <p:tgtEl>
+                                          <p:spTgt spid="3">
+                                            <p:txEl>
+                                              <p:pRg st="1" end="1"/>
+                                            </p:txEl>
+                                          </p:spTgt>
+                                        </p:tgtEl>
+                                        <p:attrNameLst>
+                                          <p:attrName>style.visibility</p:attrName>
+                                        </p:attrNameLst>
+                                      </p:cBhvr>
+                                      <p:to>
+                                        <p:strVal val="visible"/>
+                                      </p:to>
+                                    </p:set>
+                                  </p:childTnLst>
+                                </p:cTn>
+                              </p:par>
+                              <p:par>
+                                <p:cTn id="11" presetID="1" presetClass="entr" presetSubtype="0" fill="hold" grpId="0" nodeType="withEffect">
+                                  <p:stCondLst>
+                                    <p:cond delay="0"/>
+                                  </p:stCondLst>
+                                  <p:childTnLst>
+                                    <p:set>
+                                      <p:cBhvr>
+                                        <p:cTn id="12" dur="1" fill="hold">
+                                          <p:stCondLst>
+                                            <p:cond delay="0"/>
+                                          </p:stCondLst>
+                                        </p:cTn>
+                                        <p:tgtEl>
+                                          <p:spTgt spid="3">
+                                            <p:txEl>
+                                              <p:pRg st="2" end="2"/>
+                                            </p:txEl>
+                                          </p:spTgt>
+                                        </p:tgtEl>
+                                        <p:attrNameLst>
+                                          <p:attrName>style.visibility</p:attrName>
+                                        </p:attrNameLst>
+                                      </p:cBhvr>
+                                      <p:to>
+                                        <p:strVal val="visible"/>
+                                      </p:to>
+                                    </p:set>
+                                  </p:childTnLst>
+                                </p:cTn>
+                              </p:par>
+                              <p:par>
+                                <p:cTn id="13" presetID="1" presetClass="entr" presetSubtype="0" fill="hold" grpId="0" nodeType="withEffect">
+                                  <p:stCondLst>
+                                    <p:cond delay="0"/>
+                                  </p:stCondLst>
+                                  <p:childTnLst>
+                                    <p:set>
+                                      <p:cBhvr>
+                                        <p:cTn id="14" dur="1" fill="hold">
+                                          <p:stCondLst>
+                                            <p:cond delay="0"/>
+                                          </p:stCondLst>
+                                        </p:cTn>
+                                        <p:tgtEl>
+                                          <p:spTgt spid="3">
+                                            <p:txEl>
+                                              <p:pRg st="3" end="3"/>
+                                            </p:txEl>
+                                          </p:spTgt>
+                                        </p:tgtEl>
+                                        <p:attrNameLst>
+                                          <p:attrName>style.visibility</p:attrName>
+                                        </p:attrNameLst>
+                                      </p:cBhvr>
+                                      <p:to>
+                                        <p:strVal val="visible"/>
+                                      </p:to>
+                                    </p:set>
+                                  </p:childTnLst>
+                                </p:cTn>
+                              </p:par>
+                            </p:childTnLst>
+                          </p:cTn>
+                        </p:par>
+                      </p:childTnLst>
+                    </p:cTn>
+                  </p:par>
+                  <p:par>
+                    <p:cTn id="15" fill="hold">
+                      <p:stCondLst>
+                        <p:cond delay="indefinite"/>
+                      </p:stCondLst>
+                      <p:childTnLst>
+                        <p:par>
+                          <p:cTn id="16" fill="hold">
+                            <p:stCondLst>
+                              <p:cond delay="0"/>
+                            </p:stCondLst>
+                            <p:childTnLst>
+                              <p:par>
+                                <p:cTn id="17" presetID="1" presetClass="entr" presetSubtype="0" fill="hold" grpId="0" nodeType="clickEffect">
+                                  <p:stCondLst>
+                                    <p:cond delay="0"/>
+                                  </p:stCondLst>
+                                  <p:childTnLst>
+                                    <p:set>
+                                      <p:cBhvr>
+                                        <p:cTn id="18" dur="1" fill="hold">
+                                          <p:stCondLst>
+                                            <p:cond delay="0"/>
+                                          </p:stCondLst>
+                                        </p:cTn>
+                                        <p:tgtEl>
+                                          <p:spTgt spid="3">
+                                            <p:txEl>
+                                              <p:pRg st="4" end="4"/>
+                                            </p:txEl>
+                                          </p:spTgt>
+                                        </p:tgtEl>
+                                        <p:attrNameLst>
+                                          <p:attrName>style.visibility</p:attrName>
+                                        </p:attrNameLst>
+                                      </p:cBhvr>
+                                      <p:to>
+                                        <p:strVal val="visible"/>
+                                      </p:to>
+                                    </p:set>
+                                  </p:childTnLst>
+                                </p:cTn>
+                              </p:par>
+                              <p:par>
+                                <p:cTn id="19" presetID="1" presetClass="entr" presetSubtype="0" fill="hold" grpId="0" nodeType="withEffect">
+                                  <p:stCondLst>
+                                    <p:cond delay="0"/>
+                                  </p:stCondLst>
+                                  <p:childTnLst>
+                                    <p:set>
+                                      <p:cBhvr>
+                                        <p:cTn id="20" dur="1" fill="hold">
+                                          <p:stCondLst>
+                                            <p:cond delay="0"/>
+                                          </p:stCondLst>
+                                        </p:cTn>
+                                        <p:tgtEl>
+                                          <p:spTgt spid="5"/>
+                                        </p:tgtEl>
+                                        <p:attrNameLst>
+                                          <p:attrName>style.visibility</p:attrName>
+                                        </p:attrNameLst>
+                                      </p:cBhvr>
+                                      <p:to>
+                                        <p:strVal val="visible"/>
+                                      </p:to>
+                                    </p:set>
+                                  </p:childTnLst>
+                                </p:cTn>
+                              </p:par>
+                            </p:childTnLst>
+                          </p:cTn>
+                        </p:par>
+                      </p:childTnLst>
+                    </p:cTn>
+                  </p:par>
+                </p:childTnLst>
+              </p:cTn>
+              <p:prevCondLst>
+                <p:cond evt="onPrev" delay="0">
+                  <p:tgtEl>
+                    <p:sldTgt/>
+                  </p:tgtEl>
+                </p:cond>
+              </p:prevCondLst>
+              <p:nextCondLst>
+                <p:cond evt="onNext" delay="0">
+                  <p:tgtEl>
+                    <p:sldTgt/>
+                  </p:tgtEl>
+                </p:cond>
+              </p:nextCondLst>
+            </p:seq>
+          </p:childTnLst>
+        </p:cTn>
+      </p:par>
+    </p:tnLst>
+    <p:bldLst>
+      <p:bldP spid="3" grpId="0" uiExpand="1" build="p"/>
+      <p:bldP spid="5" grpId="0" animBg="1"/>
+    </p:bldLst>
+  </p:timing>
+</p:sld>
+</file>
+
+<file path=ppt/slides/slide70.xml><?xml version="1.0" encoding="utf-8"?>
 <p:sld xmlns:a="http://schemas.openxmlformats.org/drawingml/2006/main" xmlns:r="http://schemas.openxmlformats.org/officeDocument/2006/relationships" xmlns:p="http://schemas.openxmlformats.org/presentationml/2006/main">
   <p:cSld>
     <p:spTree>
@@ -38151,7 +40082,7 @@
           <a:p>
             <a:fld id="{AEFF399F-E3B5-4890-BC79-9BC8D4DF3F2D}" type="slidenum">
               <a:rPr lang="nl-BE" smtClean="0"/>
-              <a:t>67</a:t>
+              <a:t>70</a:t>
             </a:fld>
             <a:endParaRPr lang="nl-BE"/>
           </a:p>
@@ -38170,7 +40101,7 @@
 </p:sld>
 </file>
 
-<file path=ppt/slides/slide68.xml><?xml version="1.0" encoding="utf-8"?>
+<file path=ppt/slides/slide71.xml><?xml version="1.0" encoding="utf-8"?>
 <p:sld xmlns:a="http://schemas.openxmlformats.org/drawingml/2006/main" xmlns:r="http://schemas.openxmlformats.org/officeDocument/2006/relationships" xmlns:p="http://schemas.openxmlformats.org/presentationml/2006/main">
   <p:cSld>
     <p:spTree>
@@ -38300,7 +40231,7 @@
           <a:p>
             <a:fld id="{AEFF399F-E3B5-4890-BC79-9BC8D4DF3F2D}" type="slidenum">
               <a:rPr lang="nl-BE" smtClean="0"/>
-              <a:t>68</a:t>
+              <a:t>71</a:t>
             </a:fld>
             <a:endParaRPr lang="nl-BE"/>
           </a:p>
@@ -38319,7 +40250,7 @@
 </p:sld>
 </file>
 
-<file path=ppt/slides/slide69.xml><?xml version="1.0" encoding="utf-8"?>
+<file path=ppt/slides/slide72.xml><?xml version="1.0" encoding="utf-8"?>
 <p:sld xmlns:a="http://schemas.openxmlformats.org/drawingml/2006/main" xmlns:r="http://schemas.openxmlformats.org/officeDocument/2006/relationships" xmlns:p="http://schemas.openxmlformats.org/presentationml/2006/main">
   <p:cSld>
     <p:spTree>
@@ -38671,7 +40602,7 @@
           <a:p>
             <a:fld id="{AEFF399F-E3B5-4890-BC79-9BC8D4DF3F2D}" type="slidenum">
               <a:rPr lang="nl-BE" smtClean="0"/>
-              <a:t>69</a:t>
+              <a:t>72</a:t>
             </a:fld>
             <a:endParaRPr lang="nl-BE"/>
           </a:p>
@@ -39021,515 +40952,6 @@
     <p:bldLst>
       <p:bldP spid="3" grpId="0" uiExpand="1" build="p"/>
       <p:bldP spid="4" grpId="0" animBg="1"/>
-      <p:bldP spid="5" grpId="0" animBg="1"/>
-    </p:bldLst>
-  </p:timing>
-</p:sld>
-</file>
-
-<file path=ppt/slides/slide7.xml><?xml version="1.0" encoding="utf-8"?>
-<p:sld xmlns:a="http://schemas.openxmlformats.org/drawingml/2006/main" xmlns:r="http://schemas.openxmlformats.org/officeDocument/2006/relationships" xmlns:p="http://schemas.openxmlformats.org/presentationml/2006/main">
-  <p:cSld>
-    <p:spTree>
-      <p:nvGrpSpPr>
-        <p:cNvPr id="1" name=""/>
-        <p:cNvGrpSpPr/>
-        <p:nvPr/>
-      </p:nvGrpSpPr>
-      <p:grpSpPr>
-        <a:xfrm>
-          <a:off x="0" y="0"/>
-          <a:ext cx="0" cy="0"/>
-          <a:chOff x="0" y="0"/>
-          <a:chExt cx="0" cy="0"/>
-        </a:xfrm>
-      </p:grpSpPr>
-      <p:sp>
-        <p:nvSpPr>
-          <p:cNvPr id="2" name="Title 1"/>
-          <p:cNvSpPr>
-            <a:spLocks noGrp="1"/>
-          </p:cNvSpPr>
-          <p:nvPr>
-            <p:ph type="title"/>
-          </p:nvPr>
-        </p:nvSpPr>
-        <p:spPr/>
-        <p:txBody>
-          <a:bodyPr/>
-          <a:lstStyle/>
-          <a:p>
-            <a:r>
-              <a:rPr lang="en-US" dirty="0"/>
-              <a:t>Introduction</a:t>
-            </a:r>
-            <a:endParaRPr lang="nl-BE" dirty="0"/>
-          </a:p>
-        </p:txBody>
-      </p:sp>
-      <p:sp>
-        <p:nvSpPr>
-          <p:cNvPr id="3" name="Content Placeholder 2"/>
-          <p:cNvSpPr>
-            <a:spLocks noGrp="1"/>
-          </p:cNvSpPr>
-          <p:nvPr>
-            <p:ph idx="1"/>
-          </p:nvPr>
-        </p:nvSpPr>
-        <p:spPr/>
-        <p:txBody>
-          <a:bodyPr/>
-          <a:lstStyle/>
-          <a:p>
-            <a:r>
-              <a:rPr lang="en-US" dirty="0"/>
-              <a:t>Singularity originally developed by Berkeley Lab, now at </a:t>
-            </a:r>
-            <a:r>
-              <a:rPr lang="en-US" dirty="0" err="1"/>
-              <a:t>Sylabs</a:t>
-            </a:r>
-            <a:br>
-              <a:rPr lang="en-US" dirty="0"/>
-            </a:br>
-            <a:r>
-              <a:rPr lang="en-US" dirty="0">
-                <a:hlinkClick r:id="rId2"/>
-              </a:rPr>
-              <a:t>https://sylabs.io/singularity/</a:t>
-            </a:r>
-            <a:endParaRPr lang="en-US" dirty="0"/>
-          </a:p>
-          <a:p>
-            <a:r>
-              <a:rPr lang="en-US" dirty="0"/>
-              <a:t>Intended as HPC alternative to</a:t>
-            </a:r>
-          </a:p>
-          <a:p>
-            <a:pPr lvl="1"/>
-            <a:r>
-              <a:rPr lang="en-US" dirty="0"/>
-              <a:t>Docker</a:t>
-            </a:r>
-            <a:br>
-              <a:rPr lang="en-US" dirty="0"/>
-            </a:br>
-            <a:r>
-              <a:rPr lang="en-US" dirty="0">
-                <a:hlinkClick r:id="rId3"/>
-              </a:rPr>
-              <a:t>https://www.docker.com/</a:t>
-            </a:r>
-            <a:r>
-              <a:rPr lang="en-US" dirty="0"/>
-              <a:t> </a:t>
-            </a:r>
-          </a:p>
-          <a:p>
-            <a:pPr lvl="1"/>
-            <a:r>
-              <a:rPr lang="en-US" dirty="0"/>
-              <a:t>Shifter</a:t>
-            </a:r>
-            <a:br>
-              <a:rPr lang="en-US" dirty="0"/>
-            </a:br>
-            <a:r>
-              <a:rPr lang="en-US" dirty="0">
-                <a:hlinkClick r:id="rId4"/>
-              </a:rPr>
-              <a:t>https://github.com/NERSC/shifter</a:t>
-            </a:r>
-            <a:r>
-              <a:rPr lang="en-US" dirty="0"/>
-              <a:t> </a:t>
-            </a:r>
-          </a:p>
-          <a:p>
-            <a:r>
-              <a:rPr lang="en-US" dirty="0"/>
-              <a:t>Open-source project: name change to </a:t>
-            </a:r>
-            <a:r>
-              <a:rPr lang="en-US" dirty="0" err="1"/>
-              <a:t>Apptainer</a:t>
-            </a:r>
-            <a:br>
-              <a:rPr lang="en-US" dirty="0"/>
-            </a:br>
-            <a:r>
-              <a:rPr lang="en-US" dirty="0">
-                <a:hlinkClick r:id="rId5"/>
-              </a:rPr>
-              <a:t>https://apptainer.org/</a:t>
-            </a:r>
-            <a:r>
-              <a:rPr lang="en-US" dirty="0"/>
-              <a:t> </a:t>
-            </a:r>
-            <a:endParaRPr lang="nl-BE" dirty="0"/>
-          </a:p>
-        </p:txBody>
-      </p:sp>
-      <p:sp>
-        <p:nvSpPr>
-          <p:cNvPr id="4" name="Slide Number Placeholder 3"/>
-          <p:cNvSpPr>
-            <a:spLocks noGrp="1"/>
-          </p:cNvSpPr>
-          <p:nvPr>
-            <p:ph type="sldNum" sz="quarter" idx="12"/>
-          </p:nvPr>
-        </p:nvSpPr>
-        <p:spPr/>
-        <p:txBody>
-          <a:bodyPr/>
-          <a:lstStyle/>
-          <a:p>
-            <a:fld id="{AEFF399F-E3B5-4890-BC79-9BC8D4DF3F2D}" type="slidenum">
-              <a:rPr lang="nl-BE" smtClean="0"/>
-              <a:t>7</a:t>
-            </a:fld>
-            <a:endParaRPr lang="nl-BE"/>
-          </a:p>
-        </p:txBody>
-      </p:sp>
-      <p:sp>
-        <p:nvSpPr>
-          <p:cNvPr id="5" name="Rectangle: Rounded Corners 4">
-            <a:extLst>
-              <a:ext uri="{FF2B5EF4-FFF2-40B4-BE49-F238E27FC236}">
-                <a16:creationId xmlns:a16="http://schemas.microsoft.com/office/drawing/2014/main" id="{037F983B-06B8-82E5-960E-0F35700C8237}"/>
-              </a:ext>
-            </a:extLst>
-          </p:cNvPr>
-          <p:cNvSpPr/>
-          <p:nvPr/>
-        </p:nvSpPr>
-        <p:spPr>
-          <a:xfrm>
-            <a:off x="6432072" y="5115464"/>
-            <a:ext cx="1512858" cy="388188"/>
-          </a:xfrm>
-          <a:prstGeom prst="roundRect">
-            <a:avLst/>
-          </a:prstGeom>
-          <a:solidFill>
-            <a:srgbClr val="FFC000">
-              <a:alpha val="24000"/>
-            </a:srgbClr>
-          </a:solidFill>
-          <a:ln>
-            <a:noFill/>
-          </a:ln>
-        </p:spPr>
-        <p:style>
-          <a:lnRef idx="2">
-            <a:schemeClr val="accent1">
-              <a:shade val="50000"/>
-            </a:schemeClr>
-          </a:lnRef>
-          <a:fillRef idx="1">
-            <a:schemeClr val="accent1"/>
-          </a:fillRef>
-          <a:effectRef idx="0">
-            <a:schemeClr val="accent1"/>
-          </a:effectRef>
-          <a:fontRef idx="minor">
-            <a:schemeClr val="lt1"/>
-          </a:fontRef>
-        </p:style>
-        <p:txBody>
-          <a:bodyPr rtlCol="0" anchor="ctr"/>
-          <a:lstStyle/>
-          <a:p>
-            <a:pPr algn="ctr"/>
-            <a:endParaRPr lang="en-US"/>
-          </a:p>
-        </p:txBody>
-      </p:sp>
-    </p:spTree>
-    <p:extLst>
-      <p:ext uri="{BB962C8B-B14F-4D97-AF65-F5344CB8AC3E}">
-        <p14:creationId xmlns:p14="http://schemas.microsoft.com/office/powerpoint/2010/main" val="658783311"/>
-      </p:ext>
-    </p:extLst>
-  </p:cSld>
-  <p:clrMapOvr>
-    <a:masterClrMapping/>
-  </p:clrMapOvr>
-  <p:timing>
-    <p:tnLst>
-      <p:par>
-        <p:cTn id="1" dur="indefinite" restart="never" nodeType="tmRoot">
-          <p:childTnLst>
-            <p:seq concurrent="1" nextAc="seek">
-              <p:cTn id="2" dur="indefinite" nodeType="mainSeq">
-                <p:childTnLst>
-                  <p:par>
-                    <p:cTn id="3" fill="hold">
-                      <p:stCondLst>
-                        <p:cond delay="indefinite"/>
-                        <p:cond evt="onBegin" delay="0">
-                          <p:tn val="2"/>
-                        </p:cond>
-                      </p:stCondLst>
-                      <p:childTnLst>
-                        <p:par>
-                          <p:cTn id="4" fill="hold">
-                            <p:stCondLst>
-                              <p:cond delay="0"/>
-                            </p:stCondLst>
-                            <p:childTnLst>
-                              <p:par>
-                                <p:cTn id="5" presetID="1" presetClass="entr" presetSubtype="0" fill="hold" grpId="0" nodeType="withEffect">
-                                  <p:stCondLst>
-                                    <p:cond delay="0"/>
-                                  </p:stCondLst>
-                                  <p:childTnLst>
-                                    <p:set>
-                                      <p:cBhvr>
-                                        <p:cTn id="6" dur="1" fill="hold">
-                                          <p:stCondLst>
-                                            <p:cond delay="0"/>
-                                          </p:stCondLst>
-                                        </p:cTn>
-                                        <p:tgtEl>
-                                          <p:spTgt spid="3">
-                                            <p:txEl>
-                                              <p:pRg st="0" end="0"/>
-                                            </p:txEl>
-                                          </p:spTgt>
-                                        </p:tgtEl>
-                                        <p:attrNameLst>
-                                          <p:attrName>style.visibility</p:attrName>
-                                        </p:attrNameLst>
-                                      </p:cBhvr>
-                                      <p:to>
-                                        <p:strVal val="visible"/>
-                                      </p:to>
-                                    </p:set>
-                                  </p:childTnLst>
-                                </p:cTn>
-                              </p:par>
-                            </p:childTnLst>
-                          </p:cTn>
-                        </p:par>
-                      </p:childTnLst>
-                    </p:cTn>
-                  </p:par>
-                  <p:par>
-                    <p:cTn id="7" fill="hold">
-                      <p:stCondLst>
-                        <p:cond delay="indefinite"/>
-                      </p:stCondLst>
-                      <p:childTnLst>
-                        <p:par>
-                          <p:cTn id="8" fill="hold">
-                            <p:stCondLst>
-                              <p:cond delay="0"/>
-                            </p:stCondLst>
-                            <p:childTnLst>
-                              <p:par>
-                                <p:cTn id="9" presetID="1" presetClass="entr" presetSubtype="0" fill="hold" grpId="0" nodeType="clickEffect">
-                                  <p:stCondLst>
-                                    <p:cond delay="0"/>
-                                  </p:stCondLst>
-                                  <p:childTnLst>
-                                    <p:set>
-                                      <p:cBhvr>
-                                        <p:cTn id="10" dur="1" fill="hold">
-                                          <p:stCondLst>
-                                            <p:cond delay="0"/>
-                                          </p:stCondLst>
-                                        </p:cTn>
-                                        <p:tgtEl>
-                                          <p:spTgt spid="3">
-                                            <p:txEl>
-                                              <p:pRg st="1" end="1"/>
-                                            </p:txEl>
-                                          </p:spTgt>
-                                        </p:tgtEl>
-                                        <p:attrNameLst>
-                                          <p:attrName>style.visibility</p:attrName>
-                                        </p:attrNameLst>
-                                      </p:cBhvr>
-                                      <p:to>
-                                        <p:strVal val="visible"/>
-                                      </p:to>
-                                    </p:set>
-                                  </p:childTnLst>
-                                </p:cTn>
-                              </p:par>
-                              <p:par>
-                                <p:cTn id="11" presetID="1" presetClass="entr" presetSubtype="0" fill="hold" grpId="0" nodeType="withEffect">
-                                  <p:stCondLst>
-                                    <p:cond delay="0"/>
-                                  </p:stCondLst>
-                                  <p:childTnLst>
-                                    <p:set>
-                                      <p:cBhvr>
-                                        <p:cTn id="12" dur="1" fill="hold">
-                                          <p:stCondLst>
-                                            <p:cond delay="0"/>
-                                          </p:stCondLst>
-                                        </p:cTn>
-                                        <p:tgtEl>
-                                          <p:spTgt spid="3">
-                                            <p:txEl>
-                                              <p:pRg st="2" end="2"/>
-                                            </p:txEl>
-                                          </p:spTgt>
-                                        </p:tgtEl>
-                                        <p:attrNameLst>
-                                          <p:attrName>style.visibility</p:attrName>
-                                        </p:attrNameLst>
-                                      </p:cBhvr>
-                                      <p:to>
-                                        <p:strVal val="visible"/>
-                                      </p:to>
-                                    </p:set>
-                                  </p:childTnLst>
-                                </p:cTn>
-                              </p:par>
-                              <p:par>
-                                <p:cTn id="13" presetID="1" presetClass="entr" presetSubtype="0" fill="hold" grpId="0" nodeType="withEffect">
-                                  <p:stCondLst>
-                                    <p:cond delay="0"/>
-                                  </p:stCondLst>
-                                  <p:childTnLst>
-                                    <p:set>
-                                      <p:cBhvr>
-                                        <p:cTn id="14" dur="1" fill="hold">
-                                          <p:stCondLst>
-                                            <p:cond delay="0"/>
-                                          </p:stCondLst>
-                                        </p:cTn>
-                                        <p:tgtEl>
-                                          <p:spTgt spid="3">
-                                            <p:txEl>
-                                              <p:pRg st="3" end="3"/>
-                                            </p:txEl>
-                                          </p:spTgt>
-                                        </p:tgtEl>
-                                        <p:attrNameLst>
-                                          <p:attrName>style.visibility</p:attrName>
-                                        </p:attrNameLst>
-                                      </p:cBhvr>
-                                      <p:to>
-                                        <p:strVal val="visible"/>
-                                      </p:to>
-                                    </p:set>
-                                  </p:childTnLst>
-                                </p:cTn>
-                              </p:par>
-                            </p:childTnLst>
-                          </p:cTn>
-                        </p:par>
-                      </p:childTnLst>
-                    </p:cTn>
-                  </p:par>
-                  <p:par>
-                    <p:cTn id="15" fill="hold">
-                      <p:stCondLst>
-                        <p:cond delay="indefinite"/>
-                      </p:stCondLst>
-                      <p:childTnLst>
-                        <p:par>
-                          <p:cTn id="16" fill="hold">
-                            <p:stCondLst>
-                              <p:cond delay="0"/>
-                            </p:stCondLst>
-                            <p:childTnLst>
-                              <p:par>
-                                <p:cTn id="17" presetID="1" presetClass="entr" presetSubtype="0" fill="hold" grpId="0" nodeType="clickEffect">
-                                  <p:stCondLst>
-                                    <p:cond delay="0"/>
-                                  </p:stCondLst>
-                                  <p:childTnLst>
-                                    <p:set>
-                                      <p:cBhvr>
-                                        <p:cTn id="18" dur="1" fill="hold">
-                                          <p:stCondLst>
-                                            <p:cond delay="0"/>
-                                          </p:stCondLst>
-                                        </p:cTn>
-                                        <p:tgtEl>
-                                          <p:spTgt spid="3">
-                                            <p:txEl>
-                                              <p:pRg st="4" end="4"/>
-                                            </p:txEl>
-                                          </p:spTgt>
-                                        </p:tgtEl>
-                                        <p:attrNameLst>
-                                          <p:attrName>style.visibility</p:attrName>
-                                        </p:attrNameLst>
-                                      </p:cBhvr>
-                                      <p:to>
-                                        <p:strVal val="visible"/>
-                                      </p:to>
-                                    </p:set>
-                                  </p:childTnLst>
-                                </p:cTn>
-                              </p:par>
-                              <p:par>
-                                <p:cTn id="19" presetID="1" presetClass="entr" presetSubtype="0" fill="hold" grpId="0" nodeType="withEffect">
-                                  <p:stCondLst>
-                                    <p:cond delay="0"/>
-                                  </p:stCondLst>
-                                  <p:childTnLst>
-                                    <p:set>
-                                      <p:cBhvr>
-                                        <p:cTn id="20" dur="1" fill="hold">
-                                          <p:stCondLst>
-                                            <p:cond delay="0"/>
-                                          </p:stCondLst>
-                                        </p:cTn>
-                                        <p:tgtEl>
-                                          <p:spTgt spid="5"/>
-                                        </p:tgtEl>
-                                        <p:attrNameLst>
-                                          <p:attrName>style.visibility</p:attrName>
-                                        </p:attrNameLst>
-                                      </p:cBhvr>
-                                      <p:to>
-                                        <p:strVal val="visible"/>
-                                      </p:to>
-                                    </p:set>
-                                  </p:childTnLst>
-                                </p:cTn>
-                              </p:par>
-                            </p:childTnLst>
-                          </p:cTn>
-                        </p:par>
-                      </p:childTnLst>
-                    </p:cTn>
-                  </p:par>
-                </p:childTnLst>
-              </p:cTn>
-              <p:prevCondLst>
-                <p:cond evt="onPrev" delay="0">
-                  <p:tgtEl>
-                    <p:sldTgt/>
-                  </p:tgtEl>
-                </p:cond>
-              </p:prevCondLst>
-              <p:nextCondLst>
-                <p:cond evt="onNext" delay="0">
-                  <p:tgtEl>
-                    <p:sldTgt/>
-                  </p:tgtEl>
-                </p:cond>
-              </p:nextCondLst>
-            </p:seq>
-          </p:childTnLst>
-        </p:cTn>
-      </p:par>
-    </p:tnLst>
-    <p:bldLst>
-      <p:bldP spid="3" grpId="0" uiExpand="1" build="p"/>
       <p:bldP spid="5" grpId="0" animBg="1"/>
     </p:bldLst>
   </p:timing>

</xml_diff>

<commit_message>
Add slide on overlays
</commit_message>
<xml_diff>
--- a/containers_for_hpc.pptx
+++ b/containers_for_hpc.pptx
@@ -5,7 +5,7 @@
     <p:sldMasterId id="2147483660" r:id="rId1"/>
   </p:sldMasterIdLst>
   <p:notesMasterIdLst>
-    <p:notesMasterId r:id="rId74"/>
+    <p:notesMasterId r:id="rId75"/>
   </p:notesMasterIdLst>
   <p:sldIdLst>
     <p:sldId id="256" r:id="rId2"/>
@@ -69,17 +69,18 @@
     <p:sldId id="370" r:id="rId60"/>
     <p:sldId id="371" r:id="rId61"/>
     <p:sldId id="372" r:id="rId62"/>
-    <p:sldId id="285" r:id="rId63"/>
-    <p:sldId id="286" r:id="rId64"/>
-    <p:sldId id="287" r:id="rId65"/>
-    <p:sldId id="270" r:id="rId66"/>
-    <p:sldId id="366" r:id="rId67"/>
-    <p:sldId id="272" r:id="rId68"/>
-    <p:sldId id="276" r:id="rId69"/>
-    <p:sldId id="277" r:id="rId70"/>
-    <p:sldId id="307" r:id="rId71"/>
-    <p:sldId id="308" r:id="rId72"/>
-    <p:sldId id="291" r:id="rId73"/>
+    <p:sldId id="373" r:id="rId63"/>
+    <p:sldId id="285" r:id="rId64"/>
+    <p:sldId id="286" r:id="rId65"/>
+    <p:sldId id="287" r:id="rId66"/>
+    <p:sldId id="270" r:id="rId67"/>
+    <p:sldId id="366" r:id="rId68"/>
+    <p:sldId id="272" r:id="rId69"/>
+    <p:sldId id="276" r:id="rId70"/>
+    <p:sldId id="277" r:id="rId71"/>
+    <p:sldId id="307" r:id="rId72"/>
+    <p:sldId id="308" r:id="rId73"/>
+    <p:sldId id="291" r:id="rId74"/>
   </p:sldIdLst>
   <p:sldSz cx="9144000" cy="6858000" type="screen4x3"/>
   <p:notesSz cx="6858000" cy="9144000"/>
@@ -284,6 +285,7 @@
             <p14:sldId id="370"/>
             <p14:sldId id="371"/>
             <p14:sldId id="372"/>
+            <p14:sldId id="373"/>
           </p14:sldIdLst>
         </p14:section>
         <p14:section name="Performance" id="{1D232FD6-D204-4223-84D0-EC32B6360BF3}">
@@ -400,7 +402,7 @@
           <a:p>
             <a:fld id="{6BD974B4-F374-4E74-84D3-1EB7DBF32A2A}" type="datetimeFigureOut">
               <a:rPr lang="nl-BE" smtClean="0"/>
-              <a:t>8/08/2025</a:t>
+              <a:t>11/08/2025</a:t>
             </a:fld>
             <a:endParaRPr lang="nl-BE"/>
           </a:p>
@@ -883,7 +885,7 @@
           <a:p>
             <a:fld id="{A433E747-842D-4EF3-8202-AC54FEC33061}" type="datetime1">
               <a:rPr lang="nl-BE" smtClean="0"/>
-              <a:t>8/08/2025</a:t>
+              <a:t>11/08/2025</a:t>
             </a:fld>
             <a:endParaRPr lang="nl-BE"/>
           </a:p>
@@ -1053,7 +1055,7 @@
           <a:p>
             <a:fld id="{7C821354-3381-4DF5-ABED-FDAFA2BAD3F8}" type="datetime1">
               <a:rPr lang="nl-BE" smtClean="0"/>
-              <a:t>8/08/2025</a:t>
+              <a:t>11/08/2025</a:t>
             </a:fld>
             <a:endParaRPr lang="nl-BE"/>
           </a:p>
@@ -1233,7 +1235,7 @@
           <a:p>
             <a:fld id="{C6B54B95-9964-4BBF-B171-A69413AB9FC5}" type="datetime1">
               <a:rPr lang="nl-BE" smtClean="0"/>
-              <a:t>8/08/2025</a:t>
+              <a:t>11/08/2025</a:t>
             </a:fld>
             <a:endParaRPr lang="nl-BE"/>
           </a:p>
@@ -1403,7 +1405,7 @@
           <a:p>
             <a:fld id="{BE45CDE5-064C-4862-90E9-83B8FD778625}" type="datetime1">
               <a:rPr lang="nl-BE" smtClean="0"/>
-              <a:t>8/08/2025</a:t>
+              <a:t>11/08/2025</a:t>
             </a:fld>
             <a:endParaRPr lang="nl-BE"/>
           </a:p>
@@ -1647,7 +1649,7 @@
           <a:p>
             <a:fld id="{C75A345C-628E-463E-B8F7-69C25D344DF5}" type="datetime1">
               <a:rPr lang="nl-BE" smtClean="0"/>
-              <a:t>8/08/2025</a:t>
+              <a:t>11/08/2025</a:t>
             </a:fld>
             <a:endParaRPr lang="nl-BE"/>
           </a:p>
@@ -1879,7 +1881,7 @@
           <a:p>
             <a:fld id="{65B04534-538C-4249-A635-8BB2B8486464}" type="datetime1">
               <a:rPr lang="nl-BE" smtClean="0"/>
-              <a:t>8/08/2025</a:t>
+              <a:t>11/08/2025</a:t>
             </a:fld>
             <a:endParaRPr lang="nl-BE"/>
           </a:p>
@@ -2246,7 +2248,7 @@
           <a:p>
             <a:fld id="{089671CB-8547-4C91-A3D5-012E6E8790E6}" type="datetime1">
               <a:rPr lang="nl-BE" smtClean="0"/>
-              <a:t>8/08/2025</a:t>
+              <a:t>11/08/2025</a:t>
             </a:fld>
             <a:endParaRPr lang="nl-BE"/>
           </a:p>
@@ -2364,7 +2366,7 @@
           <a:p>
             <a:fld id="{5765335F-FC99-4A2B-B87B-6AF6F3762B67}" type="datetime1">
               <a:rPr lang="nl-BE" smtClean="0"/>
-              <a:t>8/08/2025</a:t>
+              <a:t>11/08/2025</a:t>
             </a:fld>
             <a:endParaRPr lang="nl-BE"/>
           </a:p>
@@ -2459,7 +2461,7 @@
           <a:p>
             <a:fld id="{1711BA58-B677-4D21-BDCD-9DD1AEA8A328}" type="datetime1">
               <a:rPr lang="nl-BE" smtClean="0"/>
-              <a:t>8/08/2025</a:t>
+              <a:t>11/08/2025</a:t>
             </a:fld>
             <a:endParaRPr lang="nl-BE"/>
           </a:p>
@@ -2736,7 +2738,7 @@
           <a:p>
             <a:fld id="{5513BE8B-B89C-461B-89D1-D5BE33ADB6B9}" type="datetime1">
               <a:rPr lang="nl-BE" smtClean="0"/>
-              <a:t>8/08/2025</a:t>
+              <a:t>11/08/2025</a:t>
             </a:fld>
             <a:endParaRPr lang="nl-BE"/>
           </a:p>
@@ -2993,7 +2995,7 @@
           <a:p>
             <a:fld id="{AEE65485-0554-4482-9B9C-289893A0B56B}" type="datetime1">
               <a:rPr lang="nl-BE" smtClean="0"/>
-              <a:t>8/08/2025</a:t>
+              <a:t>11/08/2025</a:t>
             </a:fld>
             <a:endParaRPr lang="nl-BE"/>
           </a:p>
@@ -3206,7 +3208,7 @@
           <a:p>
             <a:fld id="{6FF26CEC-AF8A-4096-9A53-521F7571A055}" type="datetime1">
               <a:rPr lang="nl-BE" smtClean="0"/>
-              <a:t>8/08/2025</a:t>
+              <a:t>11/08/2025</a:t>
             </a:fld>
             <a:endParaRPr lang="nl-BE"/>
           </a:p>
@@ -36299,6 +36301,930 @@
       </p:grpSpPr>
       <p:sp>
         <p:nvSpPr>
+          <p:cNvPr id="2" name="Title 1">
+            <a:extLst>
+              <a:ext uri="{FF2B5EF4-FFF2-40B4-BE49-F238E27FC236}">
+                <a16:creationId xmlns:a16="http://schemas.microsoft.com/office/drawing/2014/main" id="{578BA64E-125A-13B8-EE70-A0FD13EBEEAB}"/>
+              </a:ext>
+            </a:extLst>
+          </p:cNvPr>
+          <p:cNvSpPr>
+            <a:spLocks noGrp="1"/>
+          </p:cNvSpPr>
+          <p:nvPr>
+            <p:ph type="title"/>
+          </p:nvPr>
+        </p:nvSpPr>
+        <p:spPr/>
+        <p:txBody>
+          <a:bodyPr/>
+          <a:lstStyle/>
+          <a:p>
+            <a:r>
+              <a:rPr lang="en-US" dirty="0"/>
+              <a:t>Overlays</a:t>
+            </a:r>
+            <a:endParaRPr lang="LID4096" dirty="0"/>
+          </a:p>
+        </p:txBody>
+      </p:sp>
+      <p:sp>
+        <p:nvSpPr>
+          <p:cNvPr id="3" name="Content Placeholder 2">
+            <a:extLst>
+              <a:ext uri="{FF2B5EF4-FFF2-40B4-BE49-F238E27FC236}">
+                <a16:creationId xmlns:a16="http://schemas.microsoft.com/office/drawing/2014/main" id="{EE003810-130E-633C-32BC-9C989CF6DEB6}"/>
+              </a:ext>
+            </a:extLst>
+          </p:cNvPr>
+          <p:cNvSpPr>
+            <a:spLocks noGrp="1"/>
+          </p:cNvSpPr>
+          <p:nvPr>
+            <p:ph idx="1"/>
+          </p:nvPr>
+        </p:nvSpPr>
+        <p:spPr/>
+        <p:txBody>
+          <a:bodyPr/>
+          <a:lstStyle/>
+          <a:p>
+            <a:r>
+              <a:rPr lang="en-US" dirty="0"/>
+              <a:t>Clean(er) modifications</a:t>
+            </a:r>
+          </a:p>
+          <a:p>
+            <a:endParaRPr lang="en-US" dirty="0"/>
+          </a:p>
+          <a:p>
+            <a:endParaRPr lang="en-US" dirty="0"/>
+          </a:p>
+          <a:p>
+            <a:endParaRPr lang="en-US" dirty="0"/>
+          </a:p>
+          <a:p>
+            <a:endParaRPr lang="en-US" dirty="0"/>
+          </a:p>
+          <a:p>
+            <a:endParaRPr lang="en-US" dirty="0"/>
+          </a:p>
+          <a:p>
+            <a:endParaRPr lang="en-US" dirty="0"/>
+          </a:p>
+          <a:p>
+            <a:r>
+              <a:rPr lang="en-US" dirty="0"/>
+              <a:t>Run with overlay</a:t>
+            </a:r>
+            <a:endParaRPr lang="LID4096" dirty="0"/>
+          </a:p>
+        </p:txBody>
+      </p:sp>
+      <p:sp>
+        <p:nvSpPr>
+          <p:cNvPr id="4" name="Slide Number Placeholder 3">
+            <a:extLst>
+              <a:ext uri="{FF2B5EF4-FFF2-40B4-BE49-F238E27FC236}">
+                <a16:creationId xmlns:a16="http://schemas.microsoft.com/office/drawing/2014/main" id="{9A3FE116-9E8E-706C-0636-D404B0FBE05B}"/>
+              </a:ext>
+            </a:extLst>
+          </p:cNvPr>
+          <p:cNvSpPr>
+            <a:spLocks noGrp="1"/>
+          </p:cNvSpPr>
+          <p:nvPr>
+            <p:ph type="sldNum" sz="quarter" idx="12"/>
+          </p:nvPr>
+        </p:nvSpPr>
+        <p:spPr/>
+        <p:txBody>
+          <a:bodyPr/>
+          <a:lstStyle/>
+          <a:p>
+            <a:fld id="{AEFF399F-E3B5-4890-BC79-9BC8D4DF3F2D}" type="slidenum">
+              <a:rPr lang="nl-BE" smtClean="0"/>
+              <a:t>62</a:t>
+            </a:fld>
+            <a:endParaRPr lang="nl-BE"/>
+          </a:p>
+        </p:txBody>
+      </p:sp>
+      <p:sp>
+        <p:nvSpPr>
+          <p:cNvPr id="5" name="TextBox 4">
+            <a:extLst>
+              <a:ext uri="{FF2B5EF4-FFF2-40B4-BE49-F238E27FC236}">
+                <a16:creationId xmlns:a16="http://schemas.microsoft.com/office/drawing/2014/main" id="{E57751BA-A2DF-A2AF-FC0F-8AFC2F0CBDD9}"/>
+              </a:ext>
+            </a:extLst>
+          </p:cNvPr>
+          <p:cNvSpPr txBox="1"/>
+          <p:nvPr/>
+        </p:nvSpPr>
+        <p:spPr>
+          <a:xfrm>
+            <a:off x="1004968" y="2395068"/>
+            <a:ext cx="6653132" cy="2585323"/>
+          </a:xfrm>
+          <a:prstGeom prst="rect">
+            <a:avLst/>
+          </a:prstGeom>
+          <a:solidFill>
+            <a:schemeClr val="tx1"/>
+          </a:solidFill>
+        </p:spPr>
+        <p:txBody>
+          <a:bodyPr wrap="square" rtlCol="0">
+            <a:spAutoFit/>
+          </a:bodyPr>
+          <a:lstStyle/>
+          <a:p>
+            <a:r>
+              <a:rPr lang="en-US" b="1" dirty="0">
+                <a:solidFill>
+                  <a:schemeClr val="bg1"/>
+                </a:solidFill>
+                <a:latin typeface="Courier New" panose="02070309020205020404" pitchFamily="49" charset="0"/>
+                <a:cs typeface="Courier New" panose="02070309020205020404" pitchFamily="49" charset="0"/>
+              </a:rPr>
+              <a:t>$ </a:t>
+            </a:r>
+            <a:r>
+              <a:rPr lang="en-US" b="1" dirty="0" err="1">
+                <a:solidFill>
+                  <a:schemeClr val="bg1"/>
+                </a:solidFill>
+                <a:latin typeface="Courier New" panose="02070309020205020404" pitchFamily="49" charset="0"/>
+                <a:cs typeface="Courier New" panose="02070309020205020404" pitchFamily="49" charset="0"/>
+              </a:rPr>
+              <a:t>mkdir</a:t>
+            </a:r>
+            <a:r>
+              <a:rPr lang="en-US" b="1" dirty="0">
+                <a:solidFill>
+                  <a:schemeClr val="bg1"/>
+                </a:solidFill>
+                <a:latin typeface="Courier New" panose="02070309020205020404" pitchFamily="49" charset="0"/>
+                <a:cs typeface="Courier New" panose="02070309020205020404" pitchFamily="49" charset="0"/>
+              </a:rPr>
+              <a:t> overlay/</a:t>
+            </a:r>
+          </a:p>
+          <a:p>
+            <a:r>
+              <a:rPr lang="en-US" b="1" dirty="0">
+                <a:solidFill>
+                  <a:schemeClr val="bg1"/>
+                </a:solidFill>
+                <a:latin typeface="Courier New" panose="02070309020205020404" pitchFamily="49" charset="0"/>
+                <a:cs typeface="Courier New" panose="02070309020205020404" pitchFamily="49" charset="0"/>
+              </a:rPr>
+              <a:t>$ </a:t>
+            </a:r>
+            <a:r>
+              <a:rPr lang="en-US" b="1" dirty="0" err="1">
+                <a:solidFill>
+                  <a:schemeClr val="bg1"/>
+                </a:solidFill>
+                <a:latin typeface="Courier New" panose="02070309020205020404" pitchFamily="49" charset="0"/>
+                <a:cs typeface="Courier New" panose="02070309020205020404" pitchFamily="49" charset="0"/>
+              </a:rPr>
+              <a:t>apptainer</a:t>
+            </a:r>
+            <a:r>
+              <a:rPr lang="en-US" b="1" dirty="0">
+                <a:solidFill>
+                  <a:schemeClr val="bg1"/>
+                </a:solidFill>
+                <a:latin typeface="Courier New" panose="02070309020205020404" pitchFamily="49" charset="0"/>
+                <a:cs typeface="Courier New" panose="02070309020205020404" pitchFamily="49" charset="0"/>
+              </a:rPr>
+              <a:t>  shell  --overlay overlay/  \</a:t>
+            </a:r>
+          </a:p>
+          <a:p>
+            <a:r>
+              <a:rPr lang="en-US" b="1" dirty="0">
+                <a:solidFill>
+                  <a:schemeClr val="bg1"/>
+                </a:solidFill>
+                <a:latin typeface="Courier New" panose="02070309020205020404" pitchFamily="49" charset="0"/>
+                <a:cs typeface="Courier New" panose="02070309020205020404" pitchFamily="49" charset="0"/>
+              </a:rPr>
+              <a:t>      --</a:t>
+            </a:r>
+            <a:r>
+              <a:rPr lang="en-US" b="1" dirty="0" err="1">
+                <a:solidFill>
+                  <a:schemeClr val="bg1"/>
+                </a:solidFill>
+                <a:latin typeface="Courier New" panose="02070309020205020404" pitchFamily="49" charset="0"/>
+                <a:cs typeface="Courier New" panose="02070309020205020404" pitchFamily="49" charset="0"/>
+              </a:rPr>
+              <a:t>fakeroot</a:t>
+            </a:r>
+            <a:r>
+              <a:rPr lang="en-US" b="1" dirty="0">
+                <a:solidFill>
+                  <a:schemeClr val="bg1"/>
+                </a:solidFill>
+                <a:latin typeface="Courier New" panose="02070309020205020404" pitchFamily="49" charset="0"/>
+                <a:cs typeface="Courier New" panose="02070309020205020404" pitchFamily="49" charset="0"/>
+              </a:rPr>
+              <a:t>  \</a:t>
+            </a:r>
+            <a:br>
+              <a:rPr lang="en-US" b="1" dirty="0">
+                <a:solidFill>
+                  <a:schemeClr val="bg1"/>
+                </a:solidFill>
+                <a:latin typeface="Courier New" panose="02070309020205020404" pitchFamily="49" charset="0"/>
+                <a:cs typeface="Courier New" panose="02070309020205020404" pitchFamily="49" charset="0"/>
+              </a:rPr>
+            </a:br>
+            <a:r>
+              <a:rPr lang="en-US" b="1" dirty="0">
+                <a:solidFill>
+                  <a:schemeClr val="bg1"/>
+                </a:solidFill>
+                <a:latin typeface="Courier New" panose="02070309020205020404" pitchFamily="49" charset="0"/>
+                <a:cs typeface="Courier New" panose="02070309020205020404" pitchFamily="49" charset="0"/>
+              </a:rPr>
+              <a:t>      </a:t>
+            </a:r>
+            <a:r>
+              <a:rPr lang="en-US" b="1" dirty="0" err="1">
+                <a:solidFill>
+                  <a:schemeClr val="bg1"/>
+                </a:solidFill>
+                <a:latin typeface="Courier New" panose="02070309020205020404" pitchFamily="49" charset="0"/>
+                <a:cs typeface="Courier New" panose="02070309020205020404" pitchFamily="49" charset="0"/>
+              </a:rPr>
+              <a:t>r_base.sif</a:t>
+            </a:r>
+            <a:br>
+              <a:rPr lang="en-US" b="1" dirty="0">
+                <a:solidFill>
+                  <a:schemeClr val="bg1"/>
+                </a:solidFill>
+                <a:latin typeface="Courier New" panose="02070309020205020404" pitchFamily="49" charset="0"/>
+                <a:cs typeface="Courier New" panose="02070309020205020404" pitchFamily="49" charset="0"/>
+              </a:rPr>
+            </a:br>
+            <a:r>
+              <a:rPr lang="en-US" b="1" dirty="0" err="1">
+                <a:solidFill>
+                  <a:schemeClr val="bg1"/>
+                </a:solidFill>
+                <a:latin typeface="Courier New" panose="02070309020205020404" pitchFamily="49" charset="0"/>
+                <a:cs typeface="Courier New" panose="02070309020205020404" pitchFamily="49" charset="0"/>
+              </a:rPr>
+              <a:t>apptainer</a:t>
+            </a:r>
+            <a:r>
+              <a:rPr lang="en-US" b="1" dirty="0">
+                <a:solidFill>
+                  <a:schemeClr val="bg1"/>
+                </a:solidFill>
+                <a:latin typeface="Courier New" panose="02070309020205020404" pitchFamily="49" charset="0"/>
+                <a:cs typeface="Courier New" panose="02070309020205020404" pitchFamily="49" charset="0"/>
+              </a:rPr>
+              <a:t>&gt; R</a:t>
+            </a:r>
+          </a:p>
+          <a:p>
+            <a:r>
+              <a:rPr lang="en-US" b="1" dirty="0">
+                <a:solidFill>
+                  <a:schemeClr val="bg1"/>
+                </a:solidFill>
+                <a:latin typeface="Courier New" panose="02070309020205020404" pitchFamily="49" charset="0"/>
+                <a:cs typeface="Courier New" panose="02070309020205020404" pitchFamily="49" charset="0"/>
+                <a:sym typeface="Symbol" panose="05050102010706020507" pitchFamily="18" charset="2"/>
+              </a:rPr>
+              <a:t></a:t>
+            </a:r>
+            <a:endParaRPr lang="en-US" b="1" dirty="0">
+              <a:solidFill>
+                <a:schemeClr val="bg1"/>
+              </a:solidFill>
+              <a:latin typeface="Courier New" panose="02070309020205020404" pitchFamily="49" charset="0"/>
+              <a:cs typeface="Courier New" panose="02070309020205020404" pitchFamily="49" charset="0"/>
+            </a:endParaRPr>
+          </a:p>
+          <a:p>
+            <a:r>
+              <a:rPr lang="en-US" b="1" dirty="0">
+                <a:solidFill>
+                  <a:schemeClr val="bg1"/>
+                </a:solidFill>
+                <a:latin typeface="Courier New" panose="02070309020205020404" pitchFamily="49" charset="0"/>
+                <a:cs typeface="Courier New" panose="02070309020205020404" pitchFamily="49" charset="0"/>
+              </a:rPr>
+              <a:t>&gt; </a:t>
+            </a:r>
+            <a:r>
+              <a:rPr lang="en-US" b="1" dirty="0" err="1">
+                <a:solidFill>
+                  <a:schemeClr val="bg1"/>
+                </a:solidFill>
+                <a:latin typeface="Courier New" panose="02070309020205020404" pitchFamily="49" charset="0"/>
+                <a:cs typeface="Courier New" panose="02070309020205020404" pitchFamily="49" charset="0"/>
+              </a:rPr>
+              <a:t>install.packages</a:t>
+            </a:r>
+            <a:r>
+              <a:rPr lang="en-US" b="1" dirty="0">
+                <a:solidFill>
+                  <a:schemeClr val="bg1"/>
+                </a:solidFill>
+                <a:latin typeface="Courier New" panose="02070309020205020404" pitchFamily="49" charset="0"/>
+                <a:cs typeface="Courier New" panose="02070309020205020404" pitchFamily="49" charset="0"/>
+              </a:rPr>
+              <a:t>('</a:t>
+            </a:r>
+            <a:r>
+              <a:rPr lang="en-US" b="1" dirty="0" err="1">
+                <a:solidFill>
+                  <a:schemeClr val="bg1"/>
+                </a:solidFill>
+                <a:latin typeface="Courier New" panose="02070309020205020404" pitchFamily="49" charset="0"/>
+                <a:cs typeface="Courier New" panose="02070309020205020404" pitchFamily="49" charset="0"/>
+              </a:rPr>
+              <a:t>Rcpp</a:t>
+            </a:r>
+            <a:r>
+              <a:rPr lang="en-US" b="1" dirty="0">
+                <a:solidFill>
+                  <a:schemeClr val="bg1"/>
+                </a:solidFill>
+                <a:latin typeface="Courier New" panose="02070309020205020404" pitchFamily="49" charset="0"/>
+                <a:cs typeface="Courier New" panose="02070309020205020404" pitchFamily="49" charset="0"/>
+              </a:rPr>
+              <a:t>')</a:t>
+            </a:r>
+            <a:br>
+              <a:rPr lang="en-US" b="1" dirty="0">
+                <a:solidFill>
+                  <a:schemeClr val="bg1"/>
+                </a:solidFill>
+                <a:latin typeface="Courier New" panose="02070309020205020404" pitchFamily="49" charset="0"/>
+                <a:cs typeface="Courier New" panose="02070309020205020404" pitchFamily="49" charset="0"/>
+              </a:rPr>
+            </a:br>
+            <a:r>
+              <a:rPr lang="en-US" b="1" dirty="0">
+                <a:solidFill>
+                  <a:schemeClr val="bg1"/>
+                </a:solidFill>
+                <a:latin typeface="Courier New" panose="02070309020205020404" pitchFamily="49" charset="0"/>
+                <a:cs typeface="Courier New" panose="02070309020205020404" pitchFamily="49" charset="0"/>
+              </a:rPr>
+              <a:t>&gt; q()</a:t>
+            </a:r>
+          </a:p>
+          <a:p>
+            <a:r>
+              <a:rPr lang="en-US" b="1" dirty="0" err="1">
+                <a:solidFill>
+                  <a:schemeClr val="bg1"/>
+                </a:solidFill>
+                <a:latin typeface="Courier New" panose="02070309020205020404" pitchFamily="49" charset="0"/>
+                <a:cs typeface="Courier New" panose="02070309020205020404" pitchFamily="49" charset="0"/>
+              </a:rPr>
+              <a:t>apptainer</a:t>
+            </a:r>
+            <a:r>
+              <a:rPr lang="en-US" b="1" dirty="0">
+                <a:solidFill>
+                  <a:schemeClr val="bg1"/>
+                </a:solidFill>
+                <a:latin typeface="Courier New" panose="02070309020205020404" pitchFamily="49" charset="0"/>
+                <a:cs typeface="Courier New" panose="02070309020205020404" pitchFamily="49" charset="0"/>
+              </a:rPr>
+              <a:t>&gt; exit</a:t>
+            </a:r>
+          </a:p>
+        </p:txBody>
+      </p:sp>
+      <p:sp>
+        <p:nvSpPr>
+          <p:cNvPr id="6" name="TextBox 5">
+            <a:extLst>
+              <a:ext uri="{FF2B5EF4-FFF2-40B4-BE49-F238E27FC236}">
+                <a16:creationId xmlns:a16="http://schemas.microsoft.com/office/drawing/2014/main" id="{7A010250-19A1-94C7-51D7-B033B83EC9A0}"/>
+              </a:ext>
+            </a:extLst>
+          </p:cNvPr>
+          <p:cNvSpPr txBox="1"/>
+          <p:nvPr/>
+        </p:nvSpPr>
+        <p:spPr>
+          <a:xfrm>
+            <a:off x="1004968" y="5892582"/>
+            <a:ext cx="6653132" cy="646331"/>
+          </a:xfrm>
+          <a:prstGeom prst="rect">
+            <a:avLst/>
+          </a:prstGeom>
+          <a:solidFill>
+            <a:schemeClr val="tx1"/>
+          </a:solidFill>
+        </p:spPr>
+        <p:txBody>
+          <a:bodyPr wrap="square" rtlCol="0">
+            <a:spAutoFit/>
+          </a:bodyPr>
+          <a:lstStyle/>
+          <a:p>
+            <a:r>
+              <a:rPr lang="en-US" b="1" dirty="0">
+                <a:solidFill>
+                  <a:schemeClr val="bg1"/>
+                </a:solidFill>
+                <a:latin typeface="Courier New" panose="02070309020205020404" pitchFamily="49" charset="0"/>
+                <a:cs typeface="Courier New" panose="02070309020205020404" pitchFamily="49" charset="0"/>
+              </a:rPr>
+              <a:t>$ </a:t>
+            </a:r>
+            <a:r>
+              <a:rPr lang="en-US" b="1" dirty="0" err="1">
+                <a:solidFill>
+                  <a:schemeClr val="bg1"/>
+                </a:solidFill>
+                <a:latin typeface="Courier New" panose="02070309020205020404" pitchFamily="49" charset="0"/>
+                <a:cs typeface="Courier New" panose="02070309020205020404" pitchFamily="49" charset="0"/>
+              </a:rPr>
+              <a:t>apptainer</a:t>
+            </a:r>
+            <a:r>
+              <a:rPr lang="en-US" b="1" dirty="0">
+                <a:solidFill>
+                  <a:schemeClr val="bg1"/>
+                </a:solidFill>
+                <a:latin typeface="Courier New" panose="02070309020205020404" pitchFamily="49" charset="0"/>
+                <a:cs typeface="Courier New" panose="02070309020205020404" pitchFamily="49" charset="0"/>
+              </a:rPr>
+              <a:t>  shell  --overlay overlay/:</a:t>
+            </a:r>
+            <a:r>
+              <a:rPr lang="en-US" b="1" dirty="0" err="1">
+                <a:solidFill>
+                  <a:schemeClr val="bg1"/>
+                </a:solidFill>
+                <a:latin typeface="Courier New" panose="02070309020205020404" pitchFamily="49" charset="0"/>
+                <a:cs typeface="Courier New" panose="02070309020205020404" pitchFamily="49" charset="0"/>
+              </a:rPr>
+              <a:t>ro</a:t>
+            </a:r>
+            <a:r>
+              <a:rPr lang="en-US" b="1" dirty="0">
+                <a:solidFill>
+                  <a:schemeClr val="bg1"/>
+                </a:solidFill>
+                <a:latin typeface="Courier New" panose="02070309020205020404" pitchFamily="49" charset="0"/>
+                <a:cs typeface="Courier New" panose="02070309020205020404" pitchFamily="49" charset="0"/>
+              </a:rPr>
+              <a:t>  \</a:t>
+            </a:r>
+          </a:p>
+          <a:p>
+            <a:r>
+              <a:rPr lang="en-US" b="1" dirty="0">
+                <a:solidFill>
+                  <a:schemeClr val="bg1"/>
+                </a:solidFill>
+                <a:latin typeface="Courier New" panose="02070309020205020404" pitchFamily="49" charset="0"/>
+                <a:cs typeface="Courier New" panose="02070309020205020404" pitchFamily="49" charset="0"/>
+              </a:rPr>
+              <a:t>      </a:t>
+            </a:r>
+            <a:r>
+              <a:rPr lang="en-US" b="1" dirty="0" err="1">
+                <a:solidFill>
+                  <a:schemeClr val="bg1"/>
+                </a:solidFill>
+                <a:latin typeface="Courier New" panose="02070309020205020404" pitchFamily="49" charset="0"/>
+                <a:cs typeface="Courier New" panose="02070309020205020404" pitchFamily="49" charset="0"/>
+              </a:rPr>
+              <a:t>r_base.sif</a:t>
+            </a:r>
+            <a:endParaRPr lang="en-US" b="1" dirty="0">
+              <a:solidFill>
+                <a:schemeClr val="bg1"/>
+              </a:solidFill>
+              <a:latin typeface="Courier New" panose="02070309020205020404" pitchFamily="49" charset="0"/>
+              <a:cs typeface="Courier New" panose="02070309020205020404" pitchFamily="49" charset="0"/>
+            </a:endParaRPr>
+          </a:p>
+        </p:txBody>
+      </p:sp>
+      <p:grpSp>
+        <p:nvGrpSpPr>
+          <p:cNvPr id="7" name="Group 6">
+            <a:extLst>
+              <a:ext uri="{FF2B5EF4-FFF2-40B4-BE49-F238E27FC236}">
+                <a16:creationId xmlns:a16="http://schemas.microsoft.com/office/drawing/2014/main" id="{9BA5F4F1-87B2-20B6-97E5-05B88C95B7A9}"/>
+              </a:ext>
+            </a:extLst>
+          </p:cNvPr>
+          <p:cNvGrpSpPr/>
+          <p:nvPr/>
+        </p:nvGrpSpPr>
+        <p:grpSpPr>
+          <a:xfrm>
+            <a:off x="6286500" y="5161300"/>
+            <a:ext cx="2521464" cy="1054052"/>
+            <a:chOff x="5344359" y="2404456"/>
+            <a:chExt cx="2521464" cy="1054052"/>
+          </a:xfrm>
+        </p:grpSpPr>
+        <p:sp>
+          <p:nvSpPr>
+            <p:cNvPr id="8" name="Rectangle: Rounded Corners 7">
+              <a:extLst>
+                <a:ext uri="{FF2B5EF4-FFF2-40B4-BE49-F238E27FC236}">
+                  <a16:creationId xmlns:a16="http://schemas.microsoft.com/office/drawing/2014/main" id="{A28CD972-E4D5-FFE7-A771-60246BAB7AC7}"/>
+                </a:ext>
+              </a:extLst>
+            </p:cNvPr>
+            <p:cNvSpPr/>
+            <p:nvPr/>
+          </p:nvSpPr>
+          <p:spPr>
+            <a:xfrm>
+              <a:off x="5344359" y="3165266"/>
+              <a:ext cx="384466" cy="293242"/>
+            </a:xfrm>
+            <a:prstGeom prst="roundRect">
+              <a:avLst/>
+            </a:prstGeom>
+            <a:solidFill>
+              <a:srgbClr val="FF0000">
+                <a:alpha val="40000"/>
+              </a:srgbClr>
+            </a:solidFill>
+            <a:ln>
+              <a:solidFill>
+                <a:srgbClr val="FF0000"/>
+              </a:solidFill>
+            </a:ln>
+          </p:spPr>
+          <p:style>
+            <a:lnRef idx="2">
+              <a:schemeClr val="accent1">
+                <a:shade val="50000"/>
+              </a:schemeClr>
+            </a:lnRef>
+            <a:fillRef idx="1">
+              <a:schemeClr val="accent1"/>
+            </a:fillRef>
+            <a:effectRef idx="0">
+              <a:schemeClr val="accent1"/>
+            </a:effectRef>
+            <a:fontRef idx="minor">
+              <a:schemeClr val="lt1"/>
+            </a:fontRef>
+          </p:style>
+          <p:txBody>
+            <a:bodyPr rtlCol="0" anchor="ctr"/>
+            <a:lstStyle/>
+            <a:p>
+              <a:pPr algn="ctr"/>
+              <a:endParaRPr lang="en-BE"/>
+            </a:p>
+          </p:txBody>
+        </p:sp>
+        <p:sp>
+          <p:nvSpPr>
+            <p:cNvPr id="9" name="TextBox 8">
+              <a:extLst>
+                <a:ext uri="{FF2B5EF4-FFF2-40B4-BE49-F238E27FC236}">
+                  <a16:creationId xmlns:a16="http://schemas.microsoft.com/office/drawing/2014/main" id="{EB13FE97-96BD-28EB-457B-385B2FB6CA20}"/>
+                </a:ext>
+              </a:extLst>
+            </p:cNvPr>
+            <p:cNvSpPr txBox="1"/>
+            <p:nvPr/>
+          </p:nvSpPr>
+          <p:spPr>
+            <a:xfrm>
+              <a:off x="6715959" y="2404456"/>
+              <a:ext cx="1149864" cy="369332"/>
+            </a:xfrm>
+            <a:prstGeom prst="rect">
+              <a:avLst/>
+            </a:prstGeom>
+            <a:solidFill>
+              <a:schemeClr val="bg1"/>
+            </a:solidFill>
+            <a:ln>
+              <a:solidFill>
+                <a:schemeClr val="tx1"/>
+              </a:solidFill>
+            </a:ln>
+          </p:spPr>
+          <p:txBody>
+            <a:bodyPr wrap="square" rtlCol="0">
+              <a:spAutoFit/>
+            </a:bodyPr>
+            <a:lstStyle/>
+            <a:p>
+              <a:r>
+                <a:rPr lang="en-US" dirty="0"/>
+                <a:t>Read-only</a:t>
+              </a:r>
+              <a:endParaRPr lang="en-BE" dirty="0"/>
+            </a:p>
+          </p:txBody>
+        </p:sp>
+        <p:cxnSp>
+          <p:nvCxnSpPr>
+            <p:cNvPr id="10" name="Straight Arrow Connector 9">
+              <a:extLst>
+                <a:ext uri="{FF2B5EF4-FFF2-40B4-BE49-F238E27FC236}">
+                  <a16:creationId xmlns:a16="http://schemas.microsoft.com/office/drawing/2014/main" id="{3212D4D2-228E-4590-9042-01A4A7302DDE}"/>
+                </a:ext>
+              </a:extLst>
+            </p:cNvPr>
+            <p:cNvCxnSpPr>
+              <a:cxnSpLocks/>
+              <a:stCxn id="9" idx="1"/>
+              <a:endCxn id="8" idx="3"/>
+            </p:cNvCxnSpPr>
+            <p:nvPr/>
+          </p:nvCxnSpPr>
+          <p:spPr>
+            <a:xfrm flipH="1">
+              <a:off x="5728825" y="2589122"/>
+              <a:ext cx="987134" cy="722765"/>
+            </a:xfrm>
+            <a:prstGeom prst="straightConnector1">
+              <a:avLst/>
+            </a:prstGeom>
+            <a:ln>
+              <a:solidFill>
+                <a:schemeClr val="tx1"/>
+              </a:solidFill>
+              <a:tailEnd type="stealth" w="lg" len="lg"/>
+            </a:ln>
+          </p:spPr>
+          <p:style>
+            <a:lnRef idx="1">
+              <a:schemeClr val="accent1"/>
+            </a:lnRef>
+            <a:fillRef idx="0">
+              <a:schemeClr val="accent1"/>
+            </a:fillRef>
+            <a:effectRef idx="0">
+              <a:schemeClr val="accent1"/>
+            </a:effectRef>
+            <a:fontRef idx="minor">
+              <a:schemeClr val="tx1"/>
+            </a:fontRef>
+          </p:style>
+        </p:cxnSp>
+      </p:grpSp>
+    </p:spTree>
+    <p:extLst>
+      <p:ext uri="{BB962C8B-B14F-4D97-AF65-F5344CB8AC3E}">
+        <p14:creationId xmlns:p14="http://schemas.microsoft.com/office/powerpoint/2010/main" val="2261907103"/>
+      </p:ext>
+    </p:extLst>
+  </p:cSld>
+  <p:clrMapOvr>
+    <a:masterClrMapping/>
+  </p:clrMapOvr>
+  <p:timing>
+    <p:tnLst>
+      <p:par>
+        <p:cTn id="1" dur="indefinite" restart="never" nodeType="tmRoot">
+          <p:childTnLst>
+            <p:seq concurrent="1" nextAc="seek">
+              <p:cTn id="2" dur="indefinite" nodeType="mainSeq">
+                <p:childTnLst>
+                  <p:par>
+                    <p:cTn id="3" fill="hold">
+                      <p:stCondLst>
+                        <p:cond delay="indefinite"/>
+                        <p:cond evt="onBegin" delay="0">
+                          <p:tn val="2"/>
+                        </p:cond>
+                      </p:stCondLst>
+                      <p:childTnLst>
+                        <p:par>
+                          <p:cTn id="4" fill="hold">
+                            <p:stCondLst>
+                              <p:cond delay="0"/>
+                            </p:stCondLst>
+                            <p:childTnLst>
+                              <p:par>
+                                <p:cTn id="5" presetID="1" presetClass="entr" presetSubtype="0" fill="hold" grpId="0" nodeType="withEffect">
+                                  <p:stCondLst>
+                                    <p:cond delay="0"/>
+                                  </p:stCondLst>
+                                  <p:childTnLst>
+                                    <p:set>
+                                      <p:cBhvr>
+                                        <p:cTn id="6" dur="1" fill="hold">
+                                          <p:stCondLst>
+                                            <p:cond delay="0"/>
+                                          </p:stCondLst>
+                                        </p:cTn>
+                                        <p:tgtEl>
+                                          <p:spTgt spid="3">
+                                            <p:txEl>
+                                              <p:pRg st="0" end="0"/>
+                                            </p:txEl>
+                                          </p:spTgt>
+                                        </p:tgtEl>
+                                        <p:attrNameLst>
+                                          <p:attrName>style.visibility</p:attrName>
+                                        </p:attrNameLst>
+                                      </p:cBhvr>
+                                      <p:to>
+                                        <p:strVal val="visible"/>
+                                      </p:to>
+                                    </p:set>
+                                  </p:childTnLst>
+                                </p:cTn>
+                              </p:par>
+                            </p:childTnLst>
+                          </p:cTn>
+                        </p:par>
+                      </p:childTnLst>
+                    </p:cTn>
+                  </p:par>
+                  <p:par>
+                    <p:cTn id="7" fill="hold">
+                      <p:stCondLst>
+                        <p:cond delay="indefinite"/>
+                      </p:stCondLst>
+                      <p:childTnLst>
+                        <p:par>
+                          <p:cTn id="8" fill="hold">
+                            <p:stCondLst>
+                              <p:cond delay="0"/>
+                            </p:stCondLst>
+                            <p:childTnLst>
+                              <p:par>
+                                <p:cTn id="9" presetID="1" presetClass="entr" presetSubtype="0" fill="hold" grpId="0" nodeType="clickEffect">
+                                  <p:stCondLst>
+                                    <p:cond delay="0"/>
+                                  </p:stCondLst>
+                                  <p:childTnLst>
+                                    <p:set>
+                                      <p:cBhvr>
+                                        <p:cTn id="10" dur="1" fill="hold">
+                                          <p:stCondLst>
+                                            <p:cond delay="0"/>
+                                          </p:stCondLst>
+                                        </p:cTn>
+                                        <p:tgtEl>
+                                          <p:spTgt spid="3">
+                                            <p:txEl>
+                                              <p:pRg st="7" end="7"/>
+                                            </p:txEl>
+                                          </p:spTgt>
+                                        </p:tgtEl>
+                                        <p:attrNameLst>
+                                          <p:attrName>style.visibility</p:attrName>
+                                        </p:attrNameLst>
+                                      </p:cBhvr>
+                                      <p:to>
+                                        <p:strVal val="visible"/>
+                                      </p:to>
+                                    </p:set>
+                                  </p:childTnLst>
+                                </p:cTn>
+                              </p:par>
+                              <p:par>
+                                <p:cTn id="11" presetID="1" presetClass="entr" presetSubtype="0" fill="hold" grpId="0" nodeType="withEffect">
+                                  <p:stCondLst>
+                                    <p:cond delay="0"/>
+                                  </p:stCondLst>
+                                  <p:childTnLst>
+                                    <p:set>
+                                      <p:cBhvr>
+                                        <p:cTn id="12" dur="1" fill="hold">
+                                          <p:stCondLst>
+                                            <p:cond delay="0"/>
+                                          </p:stCondLst>
+                                        </p:cTn>
+                                        <p:tgtEl>
+                                          <p:spTgt spid="6"/>
+                                        </p:tgtEl>
+                                        <p:attrNameLst>
+                                          <p:attrName>style.visibility</p:attrName>
+                                        </p:attrNameLst>
+                                      </p:cBhvr>
+                                      <p:to>
+                                        <p:strVal val="visible"/>
+                                      </p:to>
+                                    </p:set>
+                                  </p:childTnLst>
+                                </p:cTn>
+                              </p:par>
+                            </p:childTnLst>
+                          </p:cTn>
+                        </p:par>
+                      </p:childTnLst>
+                    </p:cTn>
+                  </p:par>
+                  <p:par>
+                    <p:cTn id="13" fill="hold">
+                      <p:stCondLst>
+                        <p:cond delay="indefinite"/>
+                      </p:stCondLst>
+                      <p:childTnLst>
+                        <p:par>
+                          <p:cTn id="14" fill="hold">
+                            <p:stCondLst>
+                              <p:cond delay="0"/>
+                            </p:stCondLst>
+                            <p:childTnLst>
+                              <p:par>
+                                <p:cTn id="15" presetID="1" presetClass="entr" presetSubtype="0" fill="hold" nodeType="clickEffect">
+                                  <p:stCondLst>
+                                    <p:cond delay="0"/>
+                                  </p:stCondLst>
+                                  <p:childTnLst>
+                                    <p:set>
+                                      <p:cBhvr>
+                                        <p:cTn id="16" dur="1" fill="hold">
+                                          <p:stCondLst>
+                                            <p:cond delay="0"/>
+                                          </p:stCondLst>
+                                        </p:cTn>
+                                        <p:tgtEl>
+                                          <p:spTgt spid="7"/>
+                                        </p:tgtEl>
+                                        <p:attrNameLst>
+                                          <p:attrName>style.visibility</p:attrName>
+                                        </p:attrNameLst>
+                                      </p:cBhvr>
+                                      <p:to>
+                                        <p:strVal val="visible"/>
+                                      </p:to>
+                                    </p:set>
+                                  </p:childTnLst>
+                                </p:cTn>
+                              </p:par>
+                            </p:childTnLst>
+                          </p:cTn>
+                        </p:par>
+                      </p:childTnLst>
+                    </p:cTn>
+                  </p:par>
+                </p:childTnLst>
+              </p:cTn>
+              <p:prevCondLst>
+                <p:cond evt="onPrev" delay="0">
+                  <p:tgtEl>
+                    <p:sldTgt/>
+                  </p:tgtEl>
+                </p:cond>
+              </p:prevCondLst>
+              <p:nextCondLst>
+                <p:cond evt="onNext" delay="0">
+                  <p:tgtEl>
+                    <p:sldTgt/>
+                  </p:tgtEl>
+                </p:cond>
+              </p:nextCondLst>
+            </p:seq>
+          </p:childTnLst>
+        </p:cTn>
+      </p:par>
+    </p:tnLst>
+    <p:bldLst>
+      <p:bldP spid="3" grpId="0" uiExpand="1" build="p"/>
+      <p:bldP spid="6" grpId="0" animBg="1"/>
+    </p:bldLst>
+  </p:timing>
+</p:sld>
+</file>
+
+<file path=ppt/slides/slide63.xml><?xml version="1.0" encoding="utf-8"?>
+<p:sld xmlns:a="http://schemas.openxmlformats.org/drawingml/2006/main" xmlns:r="http://schemas.openxmlformats.org/officeDocument/2006/relationships" xmlns:p="http://schemas.openxmlformats.org/presentationml/2006/main">
+  <p:cSld>
+    <p:spTree>
+      <p:nvGrpSpPr>
+        <p:cNvPr id="1" name=""/>
+        <p:cNvGrpSpPr/>
+        <p:nvPr/>
+      </p:nvGrpSpPr>
+      <p:grpSpPr>
+        <a:xfrm>
+          <a:off x="0" y="0"/>
+          <a:ext cx="0" cy="0"/>
+          <a:chOff x="0" y="0"/>
+          <a:chExt cx="0" cy="0"/>
+        </a:xfrm>
+      </p:grpSpPr>
+      <p:sp>
+        <p:nvSpPr>
           <p:cNvPr id="2" name="Title 1"/>
           <p:cNvSpPr>
             <a:spLocks noGrp="1"/>
@@ -36356,7 +37282,7 @@
           <a:p>
             <a:fld id="{AEFF399F-E3B5-4890-BC79-9BC8D4DF3F2D}" type="slidenum">
               <a:rPr lang="nl-BE" smtClean="0"/>
-              <a:t>62</a:t>
+              <a:t>63</a:t>
             </a:fld>
             <a:endParaRPr lang="nl-BE"/>
           </a:p>
@@ -36375,7 +37301,7 @@
 </p:sld>
 </file>
 
-<file path=ppt/slides/slide63.xml><?xml version="1.0" encoding="utf-8"?>
+<file path=ppt/slides/slide64.xml><?xml version="1.0" encoding="utf-8"?>
 <p:sld xmlns:a="http://schemas.openxmlformats.org/drawingml/2006/main" xmlns:r="http://schemas.openxmlformats.org/officeDocument/2006/relationships" xmlns:p="http://schemas.openxmlformats.org/presentationml/2006/main">
   <p:cSld>
     <p:spTree>
@@ -36589,7 +37515,7 @@
           <a:p>
             <a:fld id="{AEFF399F-E3B5-4890-BC79-9BC8D4DF3F2D}" type="slidenum">
               <a:rPr lang="nl-BE" smtClean="0"/>
-              <a:t>63</a:t>
+              <a:t>64</a:t>
             </a:fld>
             <a:endParaRPr lang="nl-BE"/>
           </a:p>
@@ -37119,7 +38045,7 @@
 </p:sld>
 </file>
 
-<file path=ppt/slides/slide64.xml><?xml version="1.0" encoding="utf-8"?>
+<file path=ppt/slides/slide65.xml><?xml version="1.0" encoding="utf-8"?>
 <p:sld xmlns:a="http://schemas.openxmlformats.org/drawingml/2006/main" xmlns:r="http://schemas.openxmlformats.org/officeDocument/2006/relationships" xmlns:p="http://schemas.openxmlformats.org/presentationml/2006/main">
   <p:cSld>
     <p:spTree>
@@ -37269,7 +38195,7 @@
           <a:p>
             <a:fld id="{AEFF399F-E3B5-4890-BC79-9BC8D4DF3F2D}" type="slidenum">
               <a:rPr lang="nl-BE" smtClean="0"/>
-              <a:t>64</a:t>
+              <a:t>65</a:t>
             </a:fld>
             <a:endParaRPr lang="nl-BE"/>
           </a:p>
@@ -37520,7 +38446,7 @@
 </p:sld>
 </file>
 
-<file path=ppt/slides/slide65.xml><?xml version="1.0" encoding="utf-8"?>
+<file path=ppt/slides/slide66.xml><?xml version="1.0" encoding="utf-8"?>
 <p:sld xmlns:a="http://schemas.openxmlformats.org/drawingml/2006/main" xmlns:r="http://schemas.openxmlformats.org/officeDocument/2006/relationships" xmlns:p="http://schemas.openxmlformats.org/presentationml/2006/main">
   <p:cSld>
     <p:spTree>
@@ -37702,7 +38628,7 @@
           <a:p>
             <a:fld id="{AEFF399F-E3B5-4890-BC79-9BC8D4DF3F2D}" type="slidenum">
               <a:rPr lang="nl-BE" smtClean="0"/>
-              <a:t>65</a:t>
+              <a:t>66</a:t>
             </a:fld>
             <a:endParaRPr lang="nl-BE"/>
           </a:p>
@@ -37953,7 +38879,7 @@
 </p:sld>
 </file>
 
-<file path=ppt/slides/slide66.xml><?xml version="1.0" encoding="utf-8"?>
+<file path=ppt/slides/slide67.xml><?xml version="1.0" encoding="utf-8"?>
 <p:sld xmlns:a="http://schemas.openxmlformats.org/drawingml/2006/main" xmlns:r="http://schemas.openxmlformats.org/officeDocument/2006/relationships" xmlns:p="http://schemas.openxmlformats.org/presentationml/2006/main">
   <p:cSld>
     <p:spTree>
@@ -38103,7 +39029,7 @@
           <a:p>
             <a:fld id="{AEFF399F-E3B5-4890-BC79-9BC8D4DF3F2D}" type="slidenum">
               <a:rPr lang="nl-BE" smtClean="0"/>
-              <a:t>66</a:t>
+              <a:t>67</a:t>
             </a:fld>
             <a:endParaRPr lang="nl-BE"/>
           </a:p>
@@ -38510,101 +39436,6 @@
 </p:sld>
 </file>
 
-<file path=ppt/slides/slide67.xml><?xml version="1.0" encoding="utf-8"?>
-<p:sld xmlns:a="http://schemas.openxmlformats.org/drawingml/2006/main" xmlns:r="http://schemas.openxmlformats.org/officeDocument/2006/relationships" xmlns:p="http://schemas.openxmlformats.org/presentationml/2006/main">
-  <p:cSld>
-    <p:spTree>
-      <p:nvGrpSpPr>
-        <p:cNvPr id="1" name=""/>
-        <p:cNvGrpSpPr/>
-        <p:nvPr/>
-      </p:nvGrpSpPr>
-      <p:grpSpPr>
-        <a:xfrm>
-          <a:off x="0" y="0"/>
-          <a:ext cx="0" cy="0"/>
-          <a:chOff x="0" y="0"/>
-          <a:chExt cx="0" cy="0"/>
-        </a:xfrm>
-      </p:grpSpPr>
-      <p:sp>
-        <p:nvSpPr>
-          <p:cNvPr id="2" name="Title 1"/>
-          <p:cNvSpPr>
-            <a:spLocks noGrp="1"/>
-          </p:cNvSpPr>
-          <p:nvPr>
-            <p:ph type="title"/>
-          </p:nvPr>
-        </p:nvSpPr>
-        <p:spPr/>
-        <p:txBody>
-          <a:bodyPr/>
-          <a:lstStyle/>
-          <a:p>
-            <a:r>
-              <a:rPr lang="en-US" dirty="0"/>
-              <a:t>Conclusions</a:t>
-            </a:r>
-            <a:endParaRPr lang="nl-BE" dirty="0"/>
-          </a:p>
-        </p:txBody>
-      </p:sp>
-      <p:sp>
-        <p:nvSpPr>
-          <p:cNvPr id="3" name="Text Placeholder 2"/>
-          <p:cNvSpPr>
-            <a:spLocks noGrp="1"/>
-          </p:cNvSpPr>
-          <p:nvPr>
-            <p:ph type="body" idx="1"/>
-          </p:nvPr>
-        </p:nvSpPr>
-        <p:spPr/>
-        <p:txBody>
-          <a:bodyPr/>
-          <a:lstStyle/>
-          <a:p>
-            <a:endParaRPr lang="nl-BE"/>
-          </a:p>
-        </p:txBody>
-      </p:sp>
-      <p:sp>
-        <p:nvSpPr>
-          <p:cNvPr id="4" name="Slide Number Placeholder 3"/>
-          <p:cNvSpPr>
-            <a:spLocks noGrp="1"/>
-          </p:cNvSpPr>
-          <p:nvPr>
-            <p:ph type="sldNum" sz="quarter" idx="12"/>
-          </p:nvPr>
-        </p:nvSpPr>
-        <p:spPr/>
-        <p:txBody>
-          <a:bodyPr/>
-          <a:lstStyle/>
-          <a:p>
-            <a:fld id="{AEFF399F-E3B5-4890-BC79-9BC8D4DF3F2D}" type="slidenum">
-              <a:rPr lang="nl-BE" smtClean="0"/>
-              <a:t>67</a:t>
-            </a:fld>
-            <a:endParaRPr lang="nl-BE"/>
-          </a:p>
-        </p:txBody>
-      </p:sp>
-    </p:spTree>
-    <p:extLst>
-      <p:ext uri="{BB962C8B-B14F-4D97-AF65-F5344CB8AC3E}">
-        <p14:creationId xmlns:p14="http://schemas.microsoft.com/office/powerpoint/2010/main" val="2192721825"/>
-      </p:ext>
-    </p:extLst>
-  </p:cSld>
-  <p:clrMapOvr>
-    <a:masterClrMapping/>
-  </p:clrMapOvr>
-</p:sld>
-</file>
-
 <file path=ppt/slides/slide68.xml><?xml version="1.0" encoding="utf-8"?>
 <p:sld xmlns:a="http://schemas.openxmlformats.org/drawingml/2006/main" xmlns:r="http://schemas.openxmlformats.org/officeDocument/2006/relationships" xmlns:p="http://schemas.openxmlformats.org/presentationml/2006/main">
   <p:cSld>
@@ -38647,12 +39478,12 @@
       </p:sp>
       <p:sp>
         <p:nvSpPr>
-          <p:cNvPr id="3" name="Content Placeholder 2"/>
+          <p:cNvPr id="3" name="Text Placeholder 2"/>
           <p:cNvSpPr>
             <a:spLocks noGrp="1"/>
           </p:cNvSpPr>
           <p:nvPr>
-            <p:ph idx="1"/>
+            <p:ph type="body" idx="1"/>
           </p:nvPr>
         </p:nvSpPr>
         <p:spPr/>
@@ -38660,85 +39491,7 @@
           <a:bodyPr/>
           <a:lstStyle/>
           <a:p>
-            <a:r>
-              <a:rPr lang="en-US" dirty="0" err="1"/>
-              <a:t>Apptainer</a:t>
-            </a:r>
-            <a:r>
-              <a:rPr lang="en-US" dirty="0"/>
-              <a:t> advantages</a:t>
-            </a:r>
-          </a:p>
-          <a:p>
-            <a:pPr lvl="1"/>
-            <a:r>
-              <a:rPr lang="en-US" dirty="0"/>
-              <a:t>Portability</a:t>
-            </a:r>
-          </a:p>
-          <a:p>
-            <a:pPr lvl="1"/>
-            <a:r>
-              <a:rPr lang="en-US" dirty="0"/>
-              <a:t>Reproducibility: recipes under version control</a:t>
-            </a:r>
-          </a:p>
-          <a:p>
-            <a:pPr lvl="1"/>
-            <a:r>
-              <a:rPr lang="en-US" dirty="0"/>
-              <a:t>Easily create images</a:t>
-            </a:r>
-          </a:p>
-          <a:p>
-            <a:pPr lvl="1"/>
-            <a:r>
-              <a:rPr lang="en-US" dirty="0"/>
-              <a:t>Integrate images into existing workflows</a:t>
-            </a:r>
-          </a:p>
-          <a:p>
-            <a:pPr lvl="1"/>
-            <a:r>
-              <a:rPr lang="en-US" dirty="0"/>
-              <a:t>No privilege escalation</a:t>
-            </a:r>
-          </a:p>
-          <a:p>
-            <a:pPr lvl="2"/>
-            <a:r>
-              <a:rPr lang="en-US" dirty="0"/>
-              <a:t>Create as root</a:t>
-            </a:r>
-          </a:p>
-          <a:p>
-            <a:pPr lvl="2"/>
-            <a:r>
-              <a:rPr lang="en-US" dirty="0"/>
-              <a:t>Run as user, no </a:t>
-            </a:r>
-            <a:r>
-              <a:rPr lang="en-US" dirty="0" err="1"/>
-              <a:t>sudo</a:t>
-            </a:r>
-            <a:r>
-              <a:rPr lang="en-US" dirty="0"/>
-              <a:t> possible</a:t>
-            </a:r>
-          </a:p>
-          <a:p>
-            <a:pPr lvl="1"/>
-            <a:r>
-              <a:rPr lang="en-US" dirty="0"/>
-              <a:t>Quite reasonable performance/overhead</a:t>
-            </a:r>
-          </a:p>
-          <a:p>
-            <a:r>
-              <a:rPr lang="en-US" dirty="0"/>
-              <a:t>Not an excuse to run crappy/suboptimal software!</a:t>
-            </a:r>
-            <a:endParaRPr lang="nl-BE" dirty="0"/>
+            <a:endParaRPr lang="nl-BE"/>
           </a:p>
         </p:txBody>
       </p:sp>
@@ -38760,6 +39513,179 @@
             <a:fld id="{AEFF399F-E3B5-4890-BC79-9BC8D4DF3F2D}" type="slidenum">
               <a:rPr lang="nl-BE" smtClean="0"/>
               <a:t>68</a:t>
+            </a:fld>
+            <a:endParaRPr lang="nl-BE"/>
+          </a:p>
+        </p:txBody>
+      </p:sp>
+    </p:spTree>
+    <p:extLst>
+      <p:ext uri="{BB962C8B-B14F-4D97-AF65-F5344CB8AC3E}">
+        <p14:creationId xmlns:p14="http://schemas.microsoft.com/office/powerpoint/2010/main" val="2192721825"/>
+      </p:ext>
+    </p:extLst>
+  </p:cSld>
+  <p:clrMapOvr>
+    <a:masterClrMapping/>
+  </p:clrMapOvr>
+</p:sld>
+</file>
+
+<file path=ppt/slides/slide69.xml><?xml version="1.0" encoding="utf-8"?>
+<p:sld xmlns:a="http://schemas.openxmlformats.org/drawingml/2006/main" xmlns:r="http://schemas.openxmlformats.org/officeDocument/2006/relationships" xmlns:p="http://schemas.openxmlformats.org/presentationml/2006/main">
+  <p:cSld>
+    <p:spTree>
+      <p:nvGrpSpPr>
+        <p:cNvPr id="1" name=""/>
+        <p:cNvGrpSpPr/>
+        <p:nvPr/>
+      </p:nvGrpSpPr>
+      <p:grpSpPr>
+        <a:xfrm>
+          <a:off x="0" y="0"/>
+          <a:ext cx="0" cy="0"/>
+          <a:chOff x="0" y="0"/>
+          <a:chExt cx="0" cy="0"/>
+        </a:xfrm>
+      </p:grpSpPr>
+      <p:sp>
+        <p:nvSpPr>
+          <p:cNvPr id="2" name="Title 1"/>
+          <p:cNvSpPr>
+            <a:spLocks noGrp="1"/>
+          </p:cNvSpPr>
+          <p:nvPr>
+            <p:ph type="title"/>
+          </p:nvPr>
+        </p:nvSpPr>
+        <p:spPr/>
+        <p:txBody>
+          <a:bodyPr/>
+          <a:lstStyle/>
+          <a:p>
+            <a:r>
+              <a:rPr lang="en-US" dirty="0"/>
+              <a:t>Conclusions</a:t>
+            </a:r>
+            <a:endParaRPr lang="nl-BE" dirty="0"/>
+          </a:p>
+        </p:txBody>
+      </p:sp>
+      <p:sp>
+        <p:nvSpPr>
+          <p:cNvPr id="3" name="Content Placeholder 2"/>
+          <p:cNvSpPr>
+            <a:spLocks noGrp="1"/>
+          </p:cNvSpPr>
+          <p:nvPr>
+            <p:ph idx="1"/>
+          </p:nvPr>
+        </p:nvSpPr>
+        <p:spPr/>
+        <p:txBody>
+          <a:bodyPr/>
+          <a:lstStyle/>
+          <a:p>
+            <a:r>
+              <a:rPr lang="en-US" dirty="0" err="1"/>
+              <a:t>Apptainer</a:t>
+            </a:r>
+            <a:r>
+              <a:rPr lang="en-US" dirty="0"/>
+              <a:t> advantages</a:t>
+            </a:r>
+          </a:p>
+          <a:p>
+            <a:pPr lvl="1"/>
+            <a:r>
+              <a:rPr lang="en-US" dirty="0"/>
+              <a:t>Portability</a:t>
+            </a:r>
+          </a:p>
+          <a:p>
+            <a:pPr lvl="1"/>
+            <a:r>
+              <a:rPr lang="en-US" dirty="0"/>
+              <a:t>Reproducibility: recipes under version control</a:t>
+            </a:r>
+          </a:p>
+          <a:p>
+            <a:pPr lvl="1"/>
+            <a:r>
+              <a:rPr lang="en-US" dirty="0"/>
+              <a:t>Easily create images</a:t>
+            </a:r>
+          </a:p>
+          <a:p>
+            <a:pPr lvl="1"/>
+            <a:r>
+              <a:rPr lang="en-US" dirty="0"/>
+              <a:t>Integrate images into existing workflows</a:t>
+            </a:r>
+          </a:p>
+          <a:p>
+            <a:pPr lvl="1"/>
+            <a:r>
+              <a:rPr lang="en-US" dirty="0"/>
+              <a:t>No privilege escalation</a:t>
+            </a:r>
+          </a:p>
+          <a:p>
+            <a:pPr lvl="2"/>
+            <a:r>
+              <a:rPr lang="en-US" dirty="0"/>
+              <a:t>Create as root</a:t>
+            </a:r>
+          </a:p>
+          <a:p>
+            <a:pPr lvl="2"/>
+            <a:r>
+              <a:rPr lang="en-US" dirty="0"/>
+              <a:t>Run as user, no </a:t>
+            </a:r>
+            <a:r>
+              <a:rPr lang="en-US" dirty="0" err="1"/>
+              <a:t>sudo</a:t>
+            </a:r>
+            <a:r>
+              <a:rPr lang="en-US" dirty="0"/>
+              <a:t> possible</a:t>
+            </a:r>
+          </a:p>
+          <a:p>
+            <a:pPr lvl="1"/>
+            <a:r>
+              <a:rPr lang="en-US" dirty="0"/>
+              <a:t>Quite reasonable performance/overhead</a:t>
+            </a:r>
+          </a:p>
+          <a:p>
+            <a:r>
+              <a:rPr lang="en-US" dirty="0"/>
+              <a:t>Not an excuse to run crappy/suboptimal software!</a:t>
+            </a:r>
+            <a:endParaRPr lang="nl-BE" dirty="0"/>
+          </a:p>
+        </p:txBody>
+      </p:sp>
+      <p:sp>
+        <p:nvSpPr>
+          <p:cNvPr id="4" name="Slide Number Placeholder 3"/>
+          <p:cNvSpPr>
+            <a:spLocks noGrp="1"/>
+          </p:cNvSpPr>
+          <p:nvPr>
+            <p:ph type="sldNum" sz="quarter" idx="12"/>
+          </p:nvPr>
+        </p:nvSpPr>
+        <p:spPr/>
+        <p:txBody>
+          <a:bodyPr/>
+          <a:lstStyle/>
+          <a:p>
+            <a:fld id="{AEFF399F-E3B5-4890-BC79-9BC8D4DF3F2D}" type="slidenum">
+              <a:rPr lang="nl-BE" smtClean="0"/>
+              <a:t>69</a:t>
             </a:fld>
             <a:endParaRPr lang="nl-BE"/>
           </a:p>
@@ -39268,217 +40194,6 @@
 </p:sld>
 </file>
 
-<file path=ppt/slides/slide69.xml><?xml version="1.0" encoding="utf-8"?>
-<p:sld xmlns:a="http://schemas.openxmlformats.org/drawingml/2006/main" xmlns:r="http://schemas.openxmlformats.org/officeDocument/2006/relationships" xmlns:p="http://schemas.openxmlformats.org/presentationml/2006/main">
-  <p:cSld>
-    <p:spTree>
-      <p:nvGrpSpPr>
-        <p:cNvPr id="1" name=""/>
-        <p:cNvGrpSpPr/>
-        <p:nvPr/>
-      </p:nvGrpSpPr>
-      <p:grpSpPr>
-        <a:xfrm>
-          <a:off x="0" y="0"/>
-          <a:ext cx="0" cy="0"/>
-          <a:chOff x="0" y="0"/>
-          <a:chExt cx="0" cy="0"/>
-        </a:xfrm>
-      </p:grpSpPr>
-      <p:sp>
-        <p:nvSpPr>
-          <p:cNvPr id="2" name="Title 1"/>
-          <p:cNvSpPr>
-            <a:spLocks noGrp="1"/>
-          </p:cNvSpPr>
-          <p:nvPr>
-            <p:ph type="title"/>
-          </p:nvPr>
-        </p:nvSpPr>
-        <p:spPr/>
-        <p:txBody>
-          <a:bodyPr/>
-          <a:lstStyle/>
-          <a:p>
-            <a:r>
-              <a:rPr lang="en-US" dirty="0"/>
-              <a:t>References</a:t>
-            </a:r>
-            <a:endParaRPr lang="nl-BE" dirty="0"/>
-          </a:p>
-        </p:txBody>
-      </p:sp>
-      <p:sp>
-        <p:nvSpPr>
-          <p:cNvPr id="3" name="Content Placeholder 2"/>
-          <p:cNvSpPr>
-            <a:spLocks noGrp="1"/>
-          </p:cNvSpPr>
-          <p:nvPr>
-            <p:ph idx="1"/>
-          </p:nvPr>
-        </p:nvSpPr>
-        <p:spPr/>
-        <p:txBody>
-          <a:bodyPr>
-            <a:normAutofit fontScale="92500" lnSpcReduction="20000"/>
-          </a:bodyPr>
-          <a:lstStyle/>
-          <a:p>
-            <a:r>
-              <a:rPr lang="en-US" dirty="0" err="1"/>
-              <a:t>Apptainer</a:t>
-            </a:r>
-            <a:r>
-              <a:rPr lang="en-US" dirty="0"/>
-              <a:t> documentation</a:t>
-            </a:r>
-            <a:br>
-              <a:rPr lang="en-US" dirty="0"/>
-            </a:br>
-            <a:r>
-              <a:rPr lang="en-US" dirty="0">
-                <a:hlinkClick r:id="rId2"/>
-              </a:rPr>
-              <a:t>https://apptainer.org/docs/</a:t>
-            </a:r>
-            <a:r>
-              <a:rPr lang="en-US" dirty="0"/>
-              <a:t> </a:t>
-            </a:r>
-          </a:p>
-          <a:p>
-            <a:pPr lvl="1"/>
-            <a:r>
-              <a:rPr lang="en-US" dirty="0"/>
-              <a:t>User guide</a:t>
-            </a:r>
-          </a:p>
-          <a:p>
-            <a:pPr lvl="1"/>
-            <a:r>
-              <a:rPr lang="en-US" dirty="0"/>
-              <a:t>Admin guide</a:t>
-            </a:r>
-          </a:p>
-          <a:p>
-            <a:r>
-              <a:rPr lang="en-US" dirty="0" err="1"/>
-              <a:t>Apptainer</a:t>
-            </a:r>
-            <a:r>
-              <a:rPr lang="en-US" dirty="0"/>
-              <a:t> GitHub repository</a:t>
-            </a:r>
-            <a:br>
-              <a:rPr lang="en-US" dirty="0"/>
-            </a:br>
-            <a:r>
-              <a:rPr lang="en-US" dirty="0">
-                <a:hlinkClick r:id="rId3"/>
-              </a:rPr>
-              <a:t>https://github.com/apptainer/apptainer</a:t>
-            </a:r>
-            <a:r>
-              <a:rPr lang="en-US" dirty="0"/>
-              <a:t> </a:t>
-            </a:r>
-          </a:p>
-          <a:p>
-            <a:r>
-              <a:rPr lang="en-US" dirty="0" err="1"/>
-              <a:t>hpccm</a:t>
-            </a:r>
-            <a:br>
-              <a:rPr lang="en-US" dirty="0"/>
-            </a:br>
-            <a:r>
-              <a:rPr lang="en-US" dirty="0">
-                <a:hlinkClick r:id="rId4"/>
-              </a:rPr>
-              <a:t>https://github.com/NVIDIA/hpc-container-maker</a:t>
-            </a:r>
-            <a:r>
-              <a:rPr lang="en-US" dirty="0"/>
-              <a:t> </a:t>
-            </a:r>
-          </a:p>
-          <a:p>
-            <a:r>
-              <a:rPr lang="en-US" dirty="0" err="1">
-                <a:hlinkClick r:id="rId5"/>
-              </a:rPr>
-              <a:t>HPCWired</a:t>
-            </a:r>
-            <a:r>
-              <a:rPr lang="en-US" dirty="0">
-                <a:hlinkClick r:id="rId5"/>
-              </a:rPr>
-              <a:t> article</a:t>
-            </a:r>
-            <a:r>
-              <a:rPr lang="en-US" dirty="0"/>
-              <a:t> discussing singularity versus Docker/Shifter</a:t>
-            </a:r>
-          </a:p>
-          <a:p>
-            <a:r>
-              <a:rPr lang="en-US" dirty="0"/>
-              <a:t>DVC (Data Version Control)</a:t>
-            </a:r>
-            <a:br>
-              <a:rPr lang="en-US" dirty="0"/>
-            </a:br>
-            <a:r>
-              <a:rPr lang="en-US" dirty="0">
-                <a:hlinkClick r:id="rId6"/>
-              </a:rPr>
-              <a:t>https://dvc.org/</a:t>
-            </a:r>
-            <a:r>
-              <a:rPr lang="en-US" dirty="0"/>
-              <a:t> </a:t>
-            </a:r>
-            <a:endParaRPr lang="nl-BE" dirty="0"/>
-          </a:p>
-        </p:txBody>
-      </p:sp>
-      <p:sp>
-        <p:nvSpPr>
-          <p:cNvPr id="4" name="Slide Number Placeholder 3"/>
-          <p:cNvSpPr>
-            <a:spLocks noGrp="1"/>
-          </p:cNvSpPr>
-          <p:nvPr>
-            <p:ph type="sldNum" sz="quarter" idx="12"/>
-          </p:nvPr>
-        </p:nvSpPr>
-        <p:spPr/>
-        <p:txBody>
-          <a:bodyPr/>
-          <a:lstStyle/>
-          <a:p>
-            <a:fld id="{AEFF399F-E3B5-4890-BC79-9BC8D4DF3F2D}" type="slidenum">
-              <a:rPr lang="nl-BE" smtClean="0"/>
-              <a:t>69</a:t>
-            </a:fld>
-            <a:endParaRPr lang="nl-BE"/>
-          </a:p>
-        </p:txBody>
-      </p:sp>
-    </p:spTree>
-    <p:extLst>
-      <p:ext uri="{BB962C8B-B14F-4D97-AF65-F5344CB8AC3E}">
-        <p14:creationId xmlns:p14="http://schemas.microsoft.com/office/powerpoint/2010/main" val="3984500910"/>
-      </p:ext>
-    </p:extLst>
-  </p:cSld>
-  <p:clrMapOvr>
-    <a:masterClrMapping/>
-  </p:clrMapOvr>
-</p:sld>
-</file>
-
 <file path=ppt/slides/slide7.xml><?xml version="1.0" encoding="utf-8"?>
 <p:sld xmlns:a="http://schemas.openxmlformats.org/drawingml/2006/main" xmlns:r="http://schemas.openxmlformats.org/officeDocument/2006/relationships" xmlns:p="http://schemas.openxmlformats.org/presentationml/2006/main">
   <p:cSld>
@@ -40007,6 +40722,217 @@
       </p:grpSpPr>
       <p:sp>
         <p:nvSpPr>
+          <p:cNvPr id="2" name="Title 1"/>
+          <p:cNvSpPr>
+            <a:spLocks noGrp="1"/>
+          </p:cNvSpPr>
+          <p:nvPr>
+            <p:ph type="title"/>
+          </p:nvPr>
+        </p:nvSpPr>
+        <p:spPr/>
+        <p:txBody>
+          <a:bodyPr/>
+          <a:lstStyle/>
+          <a:p>
+            <a:r>
+              <a:rPr lang="en-US" dirty="0"/>
+              <a:t>References</a:t>
+            </a:r>
+            <a:endParaRPr lang="nl-BE" dirty="0"/>
+          </a:p>
+        </p:txBody>
+      </p:sp>
+      <p:sp>
+        <p:nvSpPr>
+          <p:cNvPr id="3" name="Content Placeholder 2"/>
+          <p:cNvSpPr>
+            <a:spLocks noGrp="1"/>
+          </p:cNvSpPr>
+          <p:nvPr>
+            <p:ph idx="1"/>
+          </p:nvPr>
+        </p:nvSpPr>
+        <p:spPr/>
+        <p:txBody>
+          <a:bodyPr>
+            <a:normAutofit fontScale="92500" lnSpcReduction="20000"/>
+          </a:bodyPr>
+          <a:lstStyle/>
+          <a:p>
+            <a:r>
+              <a:rPr lang="en-US" dirty="0" err="1"/>
+              <a:t>Apptainer</a:t>
+            </a:r>
+            <a:r>
+              <a:rPr lang="en-US" dirty="0"/>
+              <a:t> documentation</a:t>
+            </a:r>
+            <a:br>
+              <a:rPr lang="en-US" dirty="0"/>
+            </a:br>
+            <a:r>
+              <a:rPr lang="en-US" dirty="0">
+                <a:hlinkClick r:id="rId2"/>
+              </a:rPr>
+              <a:t>https://apptainer.org/docs/</a:t>
+            </a:r>
+            <a:r>
+              <a:rPr lang="en-US" dirty="0"/>
+              <a:t> </a:t>
+            </a:r>
+          </a:p>
+          <a:p>
+            <a:pPr lvl="1"/>
+            <a:r>
+              <a:rPr lang="en-US" dirty="0"/>
+              <a:t>User guide</a:t>
+            </a:r>
+          </a:p>
+          <a:p>
+            <a:pPr lvl="1"/>
+            <a:r>
+              <a:rPr lang="en-US" dirty="0"/>
+              <a:t>Admin guide</a:t>
+            </a:r>
+          </a:p>
+          <a:p>
+            <a:r>
+              <a:rPr lang="en-US" dirty="0" err="1"/>
+              <a:t>Apptainer</a:t>
+            </a:r>
+            <a:r>
+              <a:rPr lang="en-US" dirty="0"/>
+              <a:t> GitHub repository</a:t>
+            </a:r>
+            <a:br>
+              <a:rPr lang="en-US" dirty="0"/>
+            </a:br>
+            <a:r>
+              <a:rPr lang="en-US" dirty="0">
+                <a:hlinkClick r:id="rId3"/>
+              </a:rPr>
+              <a:t>https://github.com/apptainer/apptainer</a:t>
+            </a:r>
+            <a:r>
+              <a:rPr lang="en-US" dirty="0"/>
+              <a:t> </a:t>
+            </a:r>
+          </a:p>
+          <a:p>
+            <a:r>
+              <a:rPr lang="en-US" dirty="0" err="1"/>
+              <a:t>hpccm</a:t>
+            </a:r>
+            <a:br>
+              <a:rPr lang="en-US" dirty="0"/>
+            </a:br>
+            <a:r>
+              <a:rPr lang="en-US" dirty="0">
+                <a:hlinkClick r:id="rId4"/>
+              </a:rPr>
+              <a:t>https://github.com/NVIDIA/hpc-container-maker</a:t>
+            </a:r>
+            <a:r>
+              <a:rPr lang="en-US" dirty="0"/>
+              <a:t> </a:t>
+            </a:r>
+          </a:p>
+          <a:p>
+            <a:r>
+              <a:rPr lang="en-US" dirty="0" err="1">
+                <a:hlinkClick r:id="rId5"/>
+              </a:rPr>
+              <a:t>HPCWired</a:t>
+            </a:r>
+            <a:r>
+              <a:rPr lang="en-US" dirty="0">
+                <a:hlinkClick r:id="rId5"/>
+              </a:rPr>
+              <a:t> article</a:t>
+            </a:r>
+            <a:r>
+              <a:rPr lang="en-US" dirty="0"/>
+              <a:t> discussing singularity versus Docker/Shifter</a:t>
+            </a:r>
+          </a:p>
+          <a:p>
+            <a:r>
+              <a:rPr lang="en-US" dirty="0"/>
+              <a:t>DVC (Data Version Control)</a:t>
+            </a:r>
+            <a:br>
+              <a:rPr lang="en-US" dirty="0"/>
+            </a:br>
+            <a:r>
+              <a:rPr lang="en-US" dirty="0">
+                <a:hlinkClick r:id="rId6"/>
+              </a:rPr>
+              <a:t>https://dvc.org/</a:t>
+            </a:r>
+            <a:r>
+              <a:rPr lang="en-US" dirty="0"/>
+              <a:t> </a:t>
+            </a:r>
+            <a:endParaRPr lang="nl-BE" dirty="0"/>
+          </a:p>
+        </p:txBody>
+      </p:sp>
+      <p:sp>
+        <p:nvSpPr>
+          <p:cNvPr id="4" name="Slide Number Placeholder 3"/>
+          <p:cNvSpPr>
+            <a:spLocks noGrp="1"/>
+          </p:cNvSpPr>
+          <p:nvPr>
+            <p:ph type="sldNum" sz="quarter" idx="12"/>
+          </p:nvPr>
+        </p:nvSpPr>
+        <p:spPr/>
+        <p:txBody>
+          <a:bodyPr/>
+          <a:lstStyle/>
+          <a:p>
+            <a:fld id="{AEFF399F-E3B5-4890-BC79-9BC8D4DF3F2D}" type="slidenum">
+              <a:rPr lang="nl-BE" smtClean="0"/>
+              <a:t>70</a:t>
+            </a:fld>
+            <a:endParaRPr lang="nl-BE"/>
+          </a:p>
+        </p:txBody>
+      </p:sp>
+    </p:spTree>
+    <p:extLst>
+      <p:ext uri="{BB962C8B-B14F-4D97-AF65-F5344CB8AC3E}">
+        <p14:creationId xmlns:p14="http://schemas.microsoft.com/office/powerpoint/2010/main" val="3984500910"/>
+      </p:ext>
+    </p:extLst>
+  </p:cSld>
+  <p:clrMapOvr>
+    <a:masterClrMapping/>
+  </p:clrMapOvr>
+</p:sld>
+</file>
+
+<file path=ppt/slides/slide71.xml><?xml version="1.0" encoding="utf-8"?>
+<p:sld xmlns:a="http://schemas.openxmlformats.org/drawingml/2006/main" xmlns:r="http://schemas.openxmlformats.org/officeDocument/2006/relationships" xmlns:p="http://schemas.openxmlformats.org/presentationml/2006/main">
+  <p:cSld>
+    <p:spTree>
+      <p:nvGrpSpPr>
+        <p:cNvPr id="1" name=""/>
+        <p:cNvGrpSpPr/>
+        <p:nvPr/>
+      </p:nvGrpSpPr>
+      <p:grpSpPr>
+        <a:xfrm>
+          <a:off x="0" y="0"/>
+          <a:ext cx="0" cy="0"/>
+          <a:chOff x="0" y="0"/>
+          <a:chExt cx="0" cy="0"/>
+        </a:xfrm>
+      </p:grpSpPr>
+      <p:sp>
+        <p:nvSpPr>
           <p:cNvPr id="5" name="Title 4">
             <a:extLst>
               <a:ext uri="{FF2B5EF4-FFF2-40B4-BE49-F238E27FC236}">
@@ -40082,7 +41008,7 @@
           <a:p>
             <a:fld id="{AEFF399F-E3B5-4890-BC79-9BC8D4DF3F2D}" type="slidenum">
               <a:rPr lang="nl-BE" smtClean="0"/>
-              <a:t>70</a:t>
+              <a:t>71</a:t>
             </a:fld>
             <a:endParaRPr lang="nl-BE"/>
           </a:p>
@@ -40101,7 +41027,7 @@
 </p:sld>
 </file>
 
-<file path=ppt/slides/slide71.xml><?xml version="1.0" encoding="utf-8"?>
+<file path=ppt/slides/slide72.xml><?xml version="1.0" encoding="utf-8"?>
 <p:sld xmlns:a="http://schemas.openxmlformats.org/drawingml/2006/main" xmlns:r="http://schemas.openxmlformats.org/officeDocument/2006/relationships" xmlns:p="http://schemas.openxmlformats.org/presentationml/2006/main">
   <p:cSld>
     <p:spTree>
@@ -40231,7 +41157,7 @@
           <a:p>
             <a:fld id="{AEFF399F-E3B5-4890-BC79-9BC8D4DF3F2D}" type="slidenum">
               <a:rPr lang="nl-BE" smtClean="0"/>
-              <a:t>71</a:t>
+              <a:t>72</a:t>
             </a:fld>
             <a:endParaRPr lang="nl-BE"/>
           </a:p>
@@ -40250,7 +41176,7 @@
 </p:sld>
 </file>
 
-<file path=ppt/slides/slide72.xml><?xml version="1.0" encoding="utf-8"?>
+<file path=ppt/slides/slide73.xml><?xml version="1.0" encoding="utf-8"?>
 <p:sld xmlns:a="http://schemas.openxmlformats.org/drawingml/2006/main" xmlns:r="http://schemas.openxmlformats.org/officeDocument/2006/relationships" xmlns:p="http://schemas.openxmlformats.org/presentationml/2006/main">
   <p:cSld>
     <p:spTree>
@@ -40602,7 +41528,7 @@
           <a:p>
             <a:fld id="{AEFF399F-E3B5-4890-BC79-9BC8D4DF3F2D}" type="slidenum">
               <a:rPr lang="nl-BE" smtClean="0"/>
-              <a:t>72</a:t>
+              <a:t>73</a:t>
             </a:fld>
             <a:endParaRPr lang="nl-BE"/>
           </a:p>

</xml_diff>